<commit_message>
Changed the font of the main text to the Ubuntu font to improve readibility. This should Fixes #3
</commit_message>
<xml_diff>
--- a/Exploring Self-Management.pptx
+++ b/Exploring Self-Management.pptx
@@ -26,51 +26,51 @@
     <p:sldId id="318" r:id="rId17"/>
     <p:sldId id="269" r:id="rId18"/>
     <p:sldId id="270" r:id="rId19"/>
-    <p:sldId id="273" r:id="rId20"/>
+    <p:sldId id="321" r:id="rId20"/>
     <p:sldId id="271" r:id="rId21"/>
-    <p:sldId id="274" r:id="rId22"/>
+    <p:sldId id="322" r:id="rId22"/>
     <p:sldId id="275" r:id="rId23"/>
-    <p:sldId id="276" r:id="rId24"/>
+    <p:sldId id="323" r:id="rId24"/>
     <p:sldId id="278" r:id="rId25"/>
-    <p:sldId id="279" r:id="rId26"/>
+    <p:sldId id="324" r:id="rId26"/>
     <p:sldId id="280" r:id="rId27"/>
-    <p:sldId id="281" r:id="rId28"/>
+    <p:sldId id="325" r:id="rId28"/>
     <p:sldId id="282" r:id="rId29"/>
     <p:sldId id="284" r:id="rId30"/>
     <p:sldId id="283" r:id="rId31"/>
-    <p:sldId id="285" r:id="rId32"/>
+    <p:sldId id="326" r:id="rId32"/>
     <p:sldId id="286" r:id="rId33"/>
-    <p:sldId id="287" r:id="rId34"/>
+    <p:sldId id="327" r:id="rId34"/>
     <p:sldId id="288" r:id="rId35"/>
-    <p:sldId id="289" r:id="rId36"/>
+    <p:sldId id="328" r:id="rId36"/>
     <p:sldId id="290" r:id="rId37"/>
-    <p:sldId id="291" r:id="rId38"/>
+    <p:sldId id="329" r:id="rId38"/>
     <p:sldId id="292" r:id="rId39"/>
-    <p:sldId id="293" r:id="rId40"/>
+    <p:sldId id="330" r:id="rId40"/>
     <p:sldId id="294" r:id="rId41"/>
     <p:sldId id="295" r:id="rId42"/>
     <p:sldId id="296" r:id="rId43"/>
-    <p:sldId id="297" r:id="rId44"/>
+    <p:sldId id="331" r:id="rId44"/>
     <p:sldId id="298" r:id="rId45"/>
-    <p:sldId id="299" r:id="rId46"/>
+    <p:sldId id="332" r:id="rId46"/>
     <p:sldId id="300" r:id="rId47"/>
-    <p:sldId id="301" r:id="rId48"/>
+    <p:sldId id="333" r:id="rId48"/>
     <p:sldId id="302" r:id="rId49"/>
-    <p:sldId id="303" r:id="rId50"/>
+    <p:sldId id="334" r:id="rId50"/>
     <p:sldId id="304" r:id="rId51"/>
-    <p:sldId id="305" r:id="rId52"/>
+    <p:sldId id="335" r:id="rId52"/>
     <p:sldId id="306" r:id="rId53"/>
     <p:sldId id="307" r:id="rId54"/>
     <p:sldId id="308" r:id="rId55"/>
-    <p:sldId id="309" r:id="rId56"/>
+    <p:sldId id="336" r:id="rId56"/>
     <p:sldId id="310" r:id="rId57"/>
-    <p:sldId id="311" r:id="rId58"/>
+    <p:sldId id="337" r:id="rId58"/>
     <p:sldId id="312" r:id="rId59"/>
-    <p:sldId id="313" r:id="rId60"/>
+    <p:sldId id="338" r:id="rId60"/>
     <p:sldId id="314" r:id="rId61"/>
-    <p:sldId id="315" r:id="rId62"/>
+    <p:sldId id="339" r:id="rId62"/>
     <p:sldId id="316" r:id="rId63"/>
-    <p:sldId id="317" r:id="rId64"/>
+    <p:sldId id="340" r:id="rId64"/>
     <p:sldId id="319" r:id="rId65"/>
     <p:sldId id="320" r:id="rId66"/>
   </p:sldIdLst>
@@ -192,7 +192,7 @@
   <pc:docChgLst>
     <pc:chgData name="Hsia, Cheehong" userId="6bc27941-0d5a-4c11-8dfb-8bbe9da0911b" providerId="ADAL" clId="{5BE5096F-7F8C-496A-A13C-FF7D0CA7A6B4}"/>
     <pc:docChg chg="undo custSel addSld delSld modSld modMainMaster">
-      <pc:chgData name="Hsia, Cheehong" userId="6bc27941-0d5a-4c11-8dfb-8bbe9da0911b" providerId="ADAL" clId="{5BE5096F-7F8C-496A-A13C-FF7D0CA7A6B4}" dt="2024-02-03T16:00:29.879" v="1021" actId="680"/>
+      <pc:chgData name="Hsia, Cheehong" userId="6bc27941-0d5a-4c11-8dfb-8bbe9da0911b" providerId="ADAL" clId="{5BE5096F-7F8C-496A-A13C-FF7D0CA7A6B4}" dt="2024-02-14T15:30:29.053" v="1624" actId="700"/>
       <pc:docMkLst>
         <pc:docMk/>
       </pc:docMkLst>
@@ -308,11 +308,27 @@
         </pc:picChg>
       </pc:sldChg>
       <pc:sldChg chg="addSp modSp mod">
-        <pc:chgData name="Hsia, Cheehong" userId="6bc27941-0d5a-4c11-8dfb-8bbe9da0911b" providerId="ADAL" clId="{5BE5096F-7F8C-496A-A13C-FF7D0CA7A6B4}" dt="2024-02-03T15:43:14.771" v="812" actId="255"/>
+        <pc:chgData name="Hsia, Cheehong" userId="6bc27941-0d5a-4c11-8dfb-8bbe9da0911b" providerId="ADAL" clId="{5BE5096F-7F8C-496A-A13C-FF7D0CA7A6B4}" dt="2024-02-14T15:18:37.824" v="1036" actId="20577"/>
         <pc:sldMkLst>
           <pc:docMk/>
           <pc:sldMk cId="1496529656" sldId="270"/>
         </pc:sldMkLst>
+        <pc:spChg chg="mod">
+          <ac:chgData name="Hsia, Cheehong" userId="6bc27941-0d5a-4c11-8dfb-8bbe9da0911b" providerId="ADAL" clId="{5BE5096F-7F8C-496A-A13C-FF7D0CA7A6B4}" dt="2024-02-14T15:18:37.824" v="1036" actId="20577"/>
+          <ac:spMkLst>
+            <pc:docMk/>
+            <pc:sldMk cId="1496529656" sldId="270"/>
+            <ac:spMk id="2" creationId="{700D1D6A-607B-8919-A042-BCCDC9CF0CF0}"/>
+          </ac:spMkLst>
+        </pc:spChg>
+        <pc:spChg chg="mod">
+          <ac:chgData name="Hsia, Cheehong" userId="6bc27941-0d5a-4c11-8dfb-8bbe9da0911b" providerId="ADAL" clId="{5BE5096F-7F8C-496A-A13C-FF7D0CA7A6B4}" dt="2024-02-14T15:17:03.412" v="1025" actId="255"/>
+          <ac:spMkLst>
+            <pc:docMk/>
+            <pc:sldMk cId="1496529656" sldId="270"/>
+            <ac:spMk id="4" creationId="{101FB840-DD80-334A-87FD-81DC71AD8A57}"/>
+          </ac:spMkLst>
+        </pc:spChg>
         <pc:spChg chg="add mod">
           <ac:chgData name="Hsia, Cheehong" userId="6bc27941-0d5a-4c11-8dfb-8bbe9da0911b" providerId="ADAL" clId="{5BE5096F-7F8C-496A-A13C-FF7D0CA7A6B4}" dt="2024-02-03T15:43:14.771" v="812" actId="255"/>
           <ac:spMkLst>
@@ -323,11 +339,27 @@
         </pc:spChg>
       </pc:sldChg>
       <pc:sldChg chg="addSp modSp mod">
-        <pc:chgData name="Hsia, Cheehong" userId="6bc27941-0d5a-4c11-8dfb-8bbe9da0911b" providerId="ADAL" clId="{5BE5096F-7F8C-496A-A13C-FF7D0CA7A6B4}" dt="2024-02-03T15:43:33.700" v="816" actId="20577"/>
+        <pc:chgData name="Hsia, Cheehong" userId="6bc27941-0d5a-4c11-8dfb-8bbe9da0911b" providerId="ADAL" clId="{5BE5096F-7F8C-496A-A13C-FF7D0CA7A6B4}" dt="2024-02-14T15:18:31.948" v="1035" actId="20577"/>
         <pc:sldMkLst>
           <pc:docMk/>
           <pc:sldMk cId="2685147449" sldId="271"/>
         </pc:sldMkLst>
+        <pc:spChg chg="mod">
+          <ac:chgData name="Hsia, Cheehong" userId="6bc27941-0d5a-4c11-8dfb-8bbe9da0911b" providerId="ADAL" clId="{5BE5096F-7F8C-496A-A13C-FF7D0CA7A6B4}" dt="2024-02-14T15:18:31.948" v="1035" actId="20577"/>
+          <ac:spMkLst>
+            <pc:docMk/>
+            <pc:sldMk cId="2685147449" sldId="271"/>
+            <ac:spMk id="2" creationId="{509F87C3-07A1-0EDC-D899-CD15F645C37F}"/>
+          </ac:spMkLst>
+        </pc:spChg>
+        <pc:spChg chg="mod">
+          <ac:chgData name="Hsia, Cheehong" userId="6bc27941-0d5a-4c11-8dfb-8bbe9da0911b" providerId="ADAL" clId="{5BE5096F-7F8C-496A-A13C-FF7D0CA7A6B4}" dt="2024-02-14T15:18:28.898" v="1034" actId="2711"/>
+          <ac:spMkLst>
+            <pc:docMk/>
+            <pc:sldMk cId="2685147449" sldId="271"/>
+            <ac:spMk id="4" creationId="{AA1D8D56-7997-9149-E3C2-4243BC163909}"/>
+          </ac:spMkLst>
+        </pc:spChg>
         <pc:spChg chg="add mod">
           <ac:chgData name="Hsia, Cheehong" userId="6bc27941-0d5a-4c11-8dfb-8bbe9da0911b" providerId="ADAL" clId="{5BE5096F-7F8C-496A-A13C-FF7D0CA7A6B4}" dt="2024-02-03T15:43:33.700" v="816" actId="20577"/>
           <ac:spMkLst>
@@ -337,12 +369,20 @@
           </ac:spMkLst>
         </pc:spChg>
       </pc:sldChg>
-      <pc:sldChg chg="addSp modSp">
-        <pc:chgData name="Hsia, Cheehong" userId="6bc27941-0d5a-4c11-8dfb-8bbe9da0911b" providerId="ADAL" clId="{5BE5096F-7F8C-496A-A13C-FF7D0CA7A6B4}" dt="2024-02-03T15:43:19.831" v="813"/>
+      <pc:sldChg chg="addSp modSp del mod">
+        <pc:chgData name="Hsia, Cheehong" userId="6bc27941-0d5a-4c11-8dfb-8bbe9da0911b" providerId="ADAL" clId="{5BE5096F-7F8C-496A-A13C-FF7D0CA7A6B4}" dt="2024-02-14T15:17:28.919" v="1028" actId="47"/>
         <pc:sldMkLst>
           <pc:docMk/>
           <pc:sldMk cId="106282829" sldId="273"/>
         </pc:sldMkLst>
+        <pc:spChg chg="mod">
+          <ac:chgData name="Hsia, Cheehong" userId="6bc27941-0d5a-4c11-8dfb-8bbe9da0911b" providerId="ADAL" clId="{5BE5096F-7F8C-496A-A13C-FF7D0CA7A6B4}" dt="2024-02-14T15:17:22.994" v="1027" actId="255"/>
+          <ac:spMkLst>
+            <pc:docMk/>
+            <pc:sldMk cId="106282829" sldId="273"/>
+            <ac:spMk id="2" creationId="{94189FDF-7B80-50D5-3AD1-CB96FAC44E6D}"/>
+          </ac:spMkLst>
+        </pc:spChg>
         <pc:spChg chg="add mod">
           <ac:chgData name="Hsia, Cheehong" userId="6bc27941-0d5a-4c11-8dfb-8bbe9da0911b" providerId="ADAL" clId="{5BE5096F-7F8C-496A-A13C-FF7D0CA7A6B4}" dt="2024-02-03T15:43:19.831" v="813"/>
           <ac:spMkLst>
@@ -352,8 +392,8 @@
           </ac:spMkLst>
         </pc:spChg>
       </pc:sldChg>
-      <pc:sldChg chg="addSp modSp">
-        <pc:chgData name="Hsia, Cheehong" userId="6bc27941-0d5a-4c11-8dfb-8bbe9da0911b" providerId="ADAL" clId="{5BE5096F-7F8C-496A-A13C-FF7D0CA7A6B4}" dt="2024-02-03T15:43:37.989" v="817"/>
+      <pc:sldChg chg="addSp modSp del">
+        <pc:chgData name="Hsia, Cheehong" userId="6bc27941-0d5a-4c11-8dfb-8bbe9da0911b" providerId="ADAL" clId="{5BE5096F-7F8C-496A-A13C-FF7D0CA7A6B4}" dt="2024-02-14T15:18:52.358" v="1038" actId="47"/>
         <pc:sldMkLst>
           <pc:docMk/>
           <pc:sldMk cId="433227676" sldId="274"/>
@@ -368,11 +408,27 @@
         </pc:spChg>
       </pc:sldChg>
       <pc:sldChg chg="addSp modSp mod">
-        <pc:chgData name="Hsia, Cheehong" userId="6bc27941-0d5a-4c11-8dfb-8bbe9da0911b" providerId="ADAL" clId="{5BE5096F-7F8C-496A-A13C-FF7D0CA7A6B4}" dt="2024-02-03T15:43:49.397" v="820" actId="20577"/>
+        <pc:chgData name="Hsia, Cheehong" userId="6bc27941-0d5a-4c11-8dfb-8bbe9da0911b" providerId="ADAL" clId="{5BE5096F-7F8C-496A-A13C-FF7D0CA7A6B4}" dt="2024-02-14T15:19:18.918" v="1046" actId="20577"/>
         <pc:sldMkLst>
           <pc:docMk/>
           <pc:sldMk cId="1492287320" sldId="275"/>
         </pc:sldMkLst>
+        <pc:spChg chg="mod">
+          <ac:chgData name="Hsia, Cheehong" userId="6bc27941-0d5a-4c11-8dfb-8bbe9da0911b" providerId="ADAL" clId="{5BE5096F-7F8C-496A-A13C-FF7D0CA7A6B4}" dt="2024-02-14T15:19:18.918" v="1046" actId="20577"/>
+          <ac:spMkLst>
+            <pc:docMk/>
+            <pc:sldMk cId="1492287320" sldId="275"/>
+            <ac:spMk id="2" creationId="{509F87C3-07A1-0EDC-D899-CD15F645C37F}"/>
+          </ac:spMkLst>
+        </pc:spChg>
+        <pc:spChg chg="mod">
+          <ac:chgData name="Hsia, Cheehong" userId="6bc27941-0d5a-4c11-8dfb-8bbe9da0911b" providerId="ADAL" clId="{5BE5096F-7F8C-496A-A13C-FF7D0CA7A6B4}" dt="2024-02-14T15:19:14.972" v="1045" actId="2711"/>
+          <ac:spMkLst>
+            <pc:docMk/>
+            <pc:sldMk cId="1492287320" sldId="275"/>
+            <ac:spMk id="4" creationId="{AA1D8D56-7997-9149-E3C2-4243BC163909}"/>
+          </ac:spMkLst>
+        </pc:spChg>
         <pc:spChg chg="add mod">
           <ac:chgData name="Hsia, Cheehong" userId="6bc27941-0d5a-4c11-8dfb-8bbe9da0911b" providerId="ADAL" clId="{5BE5096F-7F8C-496A-A13C-FF7D0CA7A6B4}" dt="2024-02-03T15:43:49.397" v="820" actId="20577"/>
           <ac:spMkLst>
@@ -382,8 +438,8 @@
           </ac:spMkLst>
         </pc:spChg>
       </pc:sldChg>
-      <pc:sldChg chg="addSp modSp">
-        <pc:chgData name="Hsia, Cheehong" userId="6bc27941-0d5a-4c11-8dfb-8bbe9da0911b" providerId="ADAL" clId="{5BE5096F-7F8C-496A-A13C-FF7D0CA7A6B4}" dt="2024-02-03T15:43:55.173" v="821"/>
+      <pc:sldChg chg="addSp modSp del">
+        <pc:chgData name="Hsia, Cheehong" userId="6bc27941-0d5a-4c11-8dfb-8bbe9da0911b" providerId="ADAL" clId="{5BE5096F-7F8C-496A-A13C-FF7D0CA7A6B4}" dt="2024-02-14T15:19:24.465" v="1047" actId="47"/>
         <pc:sldMkLst>
           <pc:docMk/>
           <pc:sldMk cId="1970583200" sldId="276"/>
@@ -398,11 +454,27 @@
         </pc:spChg>
       </pc:sldChg>
       <pc:sldChg chg="addSp modSp mod">
-        <pc:chgData name="Hsia, Cheehong" userId="6bc27941-0d5a-4c11-8dfb-8bbe9da0911b" providerId="ADAL" clId="{5BE5096F-7F8C-496A-A13C-FF7D0CA7A6B4}" dt="2024-02-03T15:44:05.210" v="823" actId="20577"/>
+        <pc:chgData name="Hsia, Cheehong" userId="6bc27941-0d5a-4c11-8dfb-8bbe9da0911b" providerId="ADAL" clId="{5BE5096F-7F8C-496A-A13C-FF7D0CA7A6B4}" dt="2024-02-14T15:19:55.972" v="1056" actId="20577"/>
         <pc:sldMkLst>
           <pc:docMk/>
           <pc:sldMk cId="161617201" sldId="278"/>
         </pc:sldMkLst>
+        <pc:spChg chg="mod">
+          <ac:chgData name="Hsia, Cheehong" userId="6bc27941-0d5a-4c11-8dfb-8bbe9da0911b" providerId="ADAL" clId="{5BE5096F-7F8C-496A-A13C-FF7D0CA7A6B4}" dt="2024-02-14T15:19:36.821" v="1051" actId="255"/>
+          <ac:spMkLst>
+            <pc:docMk/>
+            <pc:sldMk cId="161617201" sldId="278"/>
+            <ac:spMk id="2" creationId="{509F87C3-07A1-0EDC-D899-CD15F645C37F}"/>
+          </ac:spMkLst>
+        </pc:spChg>
+        <pc:spChg chg="mod">
+          <ac:chgData name="Hsia, Cheehong" userId="6bc27941-0d5a-4c11-8dfb-8bbe9da0911b" providerId="ADAL" clId="{5BE5096F-7F8C-496A-A13C-FF7D0CA7A6B4}" dt="2024-02-14T15:19:55.972" v="1056" actId="20577"/>
+          <ac:spMkLst>
+            <pc:docMk/>
+            <pc:sldMk cId="161617201" sldId="278"/>
+            <ac:spMk id="4" creationId="{AA1D8D56-7997-9149-E3C2-4243BC163909}"/>
+          </ac:spMkLst>
+        </pc:spChg>
         <pc:spChg chg="add mod">
           <ac:chgData name="Hsia, Cheehong" userId="6bc27941-0d5a-4c11-8dfb-8bbe9da0911b" providerId="ADAL" clId="{5BE5096F-7F8C-496A-A13C-FF7D0CA7A6B4}" dt="2024-02-03T15:44:05.210" v="823" actId="20577"/>
           <ac:spMkLst>
@@ -412,8 +484,8 @@
           </ac:spMkLst>
         </pc:spChg>
       </pc:sldChg>
-      <pc:sldChg chg="addSp modSp">
-        <pc:chgData name="Hsia, Cheehong" userId="6bc27941-0d5a-4c11-8dfb-8bbe9da0911b" providerId="ADAL" clId="{5BE5096F-7F8C-496A-A13C-FF7D0CA7A6B4}" dt="2024-02-03T15:44:10.377" v="824"/>
+      <pc:sldChg chg="addSp modSp del">
+        <pc:chgData name="Hsia, Cheehong" userId="6bc27941-0d5a-4c11-8dfb-8bbe9da0911b" providerId="ADAL" clId="{5BE5096F-7F8C-496A-A13C-FF7D0CA7A6B4}" dt="2024-02-14T15:20:01.083" v="1057" actId="47"/>
         <pc:sldMkLst>
           <pc:docMk/>
           <pc:sldMk cId="596055484" sldId="279"/>
@@ -428,11 +500,27 @@
         </pc:spChg>
       </pc:sldChg>
       <pc:sldChg chg="addSp modSp mod">
-        <pc:chgData name="Hsia, Cheehong" userId="6bc27941-0d5a-4c11-8dfb-8bbe9da0911b" providerId="ADAL" clId="{5BE5096F-7F8C-496A-A13C-FF7D0CA7A6B4}" dt="2024-02-03T15:44:25.731" v="826" actId="20577"/>
+        <pc:chgData name="Hsia, Cheehong" userId="6bc27941-0d5a-4c11-8dfb-8bbe9da0911b" providerId="ADAL" clId="{5BE5096F-7F8C-496A-A13C-FF7D0CA7A6B4}" dt="2024-02-14T15:20:23.544" v="1064" actId="255"/>
         <pc:sldMkLst>
           <pc:docMk/>
           <pc:sldMk cId="2564199674" sldId="280"/>
         </pc:sldMkLst>
+        <pc:spChg chg="mod">
+          <ac:chgData name="Hsia, Cheehong" userId="6bc27941-0d5a-4c11-8dfb-8bbe9da0911b" providerId="ADAL" clId="{5BE5096F-7F8C-496A-A13C-FF7D0CA7A6B4}" dt="2024-02-14T15:20:18.129" v="1062" actId="20577"/>
+          <ac:spMkLst>
+            <pc:docMk/>
+            <pc:sldMk cId="2564199674" sldId="280"/>
+            <ac:spMk id="2" creationId="{509F87C3-07A1-0EDC-D899-CD15F645C37F}"/>
+          </ac:spMkLst>
+        </pc:spChg>
+        <pc:spChg chg="mod">
+          <ac:chgData name="Hsia, Cheehong" userId="6bc27941-0d5a-4c11-8dfb-8bbe9da0911b" providerId="ADAL" clId="{5BE5096F-7F8C-496A-A13C-FF7D0CA7A6B4}" dt="2024-02-14T15:20:23.544" v="1064" actId="255"/>
+          <ac:spMkLst>
+            <pc:docMk/>
+            <pc:sldMk cId="2564199674" sldId="280"/>
+            <ac:spMk id="4" creationId="{AA1D8D56-7997-9149-E3C2-4243BC163909}"/>
+          </ac:spMkLst>
+        </pc:spChg>
         <pc:spChg chg="add mod">
           <ac:chgData name="Hsia, Cheehong" userId="6bc27941-0d5a-4c11-8dfb-8bbe9da0911b" providerId="ADAL" clId="{5BE5096F-7F8C-496A-A13C-FF7D0CA7A6B4}" dt="2024-02-03T15:44:25.731" v="826" actId="20577"/>
           <ac:spMkLst>
@@ -442,8 +530,8 @@
           </ac:spMkLst>
         </pc:spChg>
       </pc:sldChg>
-      <pc:sldChg chg="addSp modSp">
-        <pc:chgData name="Hsia, Cheehong" userId="6bc27941-0d5a-4c11-8dfb-8bbe9da0911b" providerId="ADAL" clId="{5BE5096F-7F8C-496A-A13C-FF7D0CA7A6B4}" dt="2024-02-03T15:44:29.892" v="827"/>
+      <pc:sldChg chg="addSp modSp del">
+        <pc:chgData name="Hsia, Cheehong" userId="6bc27941-0d5a-4c11-8dfb-8bbe9da0911b" providerId="ADAL" clId="{5BE5096F-7F8C-496A-A13C-FF7D0CA7A6B4}" dt="2024-02-14T15:20:28.551" v="1065" actId="47"/>
         <pc:sldMkLst>
           <pc:docMk/>
           <pc:sldMk cId="3282675112" sldId="281"/>
@@ -585,11 +673,27 @@
         </pc:picChg>
       </pc:sldChg>
       <pc:sldChg chg="addSp modSp mod">
-        <pc:chgData name="Hsia, Cheehong" userId="6bc27941-0d5a-4c11-8dfb-8bbe9da0911b" providerId="ADAL" clId="{5BE5096F-7F8C-496A-A13C-FF7D0CA7A6B4}" dt="2024-02-03T15:46:47.779" v="829" actId="20577"/>
+        <pc:chgData name="Hsia, Cheehong" userId="6bc27941-0d5a-4c11-8dfb-8bbe9da0911b" providerId="ADAL" clId="{5BE5096F-7F8C-496A-A13C-FF7D0CA7A6B4}" dt="2024-02-14T15:21:01.204" v="1076" actId="255"/>
         <pc:sldMkLst>
           <pc:docMk/>
           <pc:sldMk cId="1962898729" sldId="283"/>
         </pc:sldMkLst>
+        <pc:spChg chg="mod">
+          <ac:chgData name="Hsia, Cheehong" userId="6bc27941-0d5a-4c11-8dfb-8bbe9da0911b" providerId="ADAL" clId="{5BE5096F-7F8C-496A-A13C-FF7D0CA7A6B4}" dt="2024-02-14T15:20:54.979" v="1074" actId="20577"/>
+          <ac:spMkLst>
+            <pc:docMk/>
+            <pc:sldMk cId="1962898729" sldId="283"/>
+            <ac:spMk id="2" creationId="{66890E70-EDB5-4D8C-2B4F-029FA9E51D4E}"/>
+          </ac:spMkLst>
+        </pc:spChg>
+        <pc:spChg chg="mod">
+          <ac:chgData name="Hsia, Cheehong" userId="6bc27941-0d5a-4c11-8dfb-8bbe9da0911b" providerId="ADAL" clId="{5BE5096F-7F8C-496A-A13C-FF7D0CA7A6B4}" dt="2024-02-14T15:21:01.204" v="1076" actId="255"/>
+          <ac:spMkLst>
+            <pc:docMk/>
+            <pc:sldMk cId="1962898729" sldId="283"/>
+            <ac:spMk id="4" creationId="{F978620C-B722-98CC-0FA2-E22F5047512F}"/>
+          </ac:spMkLst>
+        </pc:spChg>
         <pc:spChg chg="add mod">
           <ac:chgData name="Hsia, Cheehong" userId="6bc27941-0d5a-4c11-8dfb-8bbe9da0911b" providerId="ADAL" clId="{5BE5096F-7F8C-496A-A13C-FF7D0CA7A6B4}" dt="2024-02-03T15:46:47.779" v="829" actId="20577"/>
           <ac:spMkLst>
@@ -599,8 +703,8 @@
           </ac:spMkLst>
         </pc:spChg>
       </pc:sldChg>
-      <pc:sldChg chg="addSp modSp">
-        <pc:chgData name="Hsia, Cheehong" userId="6bc27941-0d5a-4c11-8dfb-8bbe9da0911b" providerId="ADAL" clId="{5BE5096F-7F8C-496A-A13C-FF7D0CA7A6B4}" dt="2024-02-03T15:46:52.802" v="830"/>
+      <pc:sldChg chg="addSp modSp del">
+        <pc:chgData name="Hsia, Cheehong" userId="6bc27941-0d5a-4c11-8dfb-8bbe9da0911b" providerId="ADAL" clId="{5BE5096F-7F8C-496A-A13C-FF7D0CA7A6B4}" dt="2024-02-14T15:21:05.503" v="1077" actId="47"/>
         <pc:sldMkLst>
           <pc:docMk/>
           <pc:sldMk cId="1386201035" sldId="285"/>
@@ -615,11 +719,27 @@
         </pc:spChg>
       </pc:sldChg>
       <pc:sldChg chg="addSp modSp mod">
-        <pc:chgData name="Hsia, Cheehong" userId="6bc27941-0d5a-4c11-8dfb-8bbe9da0911b" providerId="ADAL" clId="{5BE5096F-7F8C-496A-A13C-FF7D0CA7A6B4}" dt="2024-02-03T15:47:01.223" v="832" actId="20577"/>
+        <pc:chgData name="Hsia, Cheehong" userId="6bc27941-0d5a-4c11-8dfb-8bbe9da0911b" providerId="ADAL" clId="{5BE5096F-7F8C-496A-A13C-FF7D0CA7A6B4}" dt="2024-02-14T15:21:33.516" v="1087" actId="20577"/>
         <pc:sldMkLst>
           <pc:docMk/>
           <pc:sldMk cId="3741328940" sldId="286"/>
         </pc:sldMkLst>
+        <pc:spChg chg="mod">
+          <ac:chgData name="Hsia, Cheehong" userId="6bc27941-0d5a-4c11-8dfb-8bbe9da0911b" providerId="ADAL" clId="{5BE5096F-7F8C-496A-A13C-FF7D0CA7A6B4}" dt="2024-02-14T15:21:23.173" v="1084" actId="20577"/>
+          <ac:spMkLst>
+            <pc:docMk/>
+            <pc:sldMk cId="3741328940" sldId="286"/>
+            <ac:spMk id="2" creationId="{66890E70-EDB5-4D8C-2B4F-029FA9E51D4E}"/>
+          </ac:spMkLst>
+        </pc:spChg>
+        <pc:spChg chg="mod">
+          <ac:chgData name="Hsia, Cheehong" userId="6bc27941-0d5a-4c11-8dfb-8bbe9da0911b" providerId="ADAL" clId="{5BE5096F-7F8C-496A-A13C-FF7D0CA7A6B4}" dt="2024-02-14T15:21:33.516" v="1087" actId="20577"/>
+          <ac:spMkLst>
+            <pc:docMk/>
+            <pc:sldMk cId="3741328940" sldId="286"/>
+            <ac:spMk id="4" creationId="{F978620C-B722-98CC-0FA2-E22F5047512F}"/>
+          </ac:spMkLst>
+        </pc:spChg>
         <pc:spChg chg="add mod">
           <ac:chgData name="Hsia, Cheehong" userId="6bc27941-0d5a-4c11-8dfb-8bbe9da0911b" providerId="ADAL" clId="{5BE5096F-7F8C-496A-A13C-FF7D0CA7A6B4}" dt="2024-02-03T15:47:01.223" v="832" actId="20577"/>
           <ac:spMkLst>
@@ -629,8 +749,8 @@
           </ac:spMkLst>
         </pc:spChg>
       </pc:sldChg>
-      <pc:sldChg chg="addSp modSp">
-        <pc:chgData name="Hsia, Cheehong" userId="6bc27941-0d5a-4c11-8dfb-8bbe9da0911b" providerId="ADAL" clId="{5BE5096F-7F8C-496A-A13C-FF7D0CA7A6B4}" dt="2024-02-03T15:47:04.644" v="833"/>
+      <pc:sldChg chg="addSp modSp del">
+        <pc:chgData name="Hsia, Cheehong" userId="6bc27941-0d5a-4c11-8dfb-8bbe9da0911b" providerId="ADAL" clId="{5BE5096F-7F8C-496A-A13C-FF7D0CA7A6B4}" dt="2024-02-14T15:21:38.274" v="1088" actId="47"/>
         <pc:sldMkLst>
           <pc:docMk/>
           <pc:sldMk cId="3471392720" sldId="287"/>
@@ -645,11 +765,27 @@
         </pc:spChg>
       </pc:sldChg>
       <pc:sldChg chg="addSp modSp mod">
-        <pc:chgData name="Hsia, Cheehong" userId="6bc27941-0d5a-4c11-8dfb-8bbe9da0911b" providerId="ADAL" clId="{5BE5096F-7F8C-496A-A13C-FF7D0CA7A6B4}" dt="2024-02-03T15:47:10.059" v="835" actId="20577"/>
+        <pc:chgData name="Hsia, Cheehong" userId="6bc27941-0d5a-4c11-8dfb-8bbe9da0911b" providerId="ADAL" clId="{5BE5096F-7F8C-496A-A13C-FF7D0CA7A6B4}" dt="2024-02-14T15:22:03.481" v="1095" actId="20577"/>
         <pc:sldMkLst>
           <pc:docMk/>
           <pc:sldMk cId="3337217698" sldId="288"/>
         </pc:sldMkLst>
+        <pc:spChg chg="mod">
+          <ac:chgData name="Hsia, Cheehong" userId="6bc27941-0d5a-4c11-8dfb-8bbe9da0911b" providerId="ADAL" clId="{5BE5096F-7F8C-496A-A13C-FF7D0CA7A6B4}" dt="2024-02-14T15:21:51.734" v="1092" actId="255"/>
+          <ac:spMkLst>
+            <pc:docMk/>
+            <pc:sldMk cId="3337217698" sldId="288"/>
+            <ac:spMk id="2" creationId="{66890E70-EDB5-4D8C-2B4F-029FA9E51D4E}"/>
+          </ac:spMkLst>
+        </pc:spChg>
+        <pc:spChg chg="mod">
+          <ac:chgData name="Hsia, Cheehong" userId="6bc27941-0d5a-4c11-8dfb-8bbe9da0911b" providerId="ADAL" clId="{5BE5096F-7F8C-496A-A13C-FF7D0CA7A6B4}" dt="2024-02-14T15:22:03.481" v="1095" actId="20577"/>
+          <ac:spMkLst>
+            <pc:docMk/>
+            <pc:sldMk cId="3337217698" sldId="288"/>
+            <ac:spMk id="4" creationId="{F978620C-B722-98CC-0FA2-E22F5047512F}"/>
+          </ac:spMkLst>
+        </pc:spChg>
         <pc:spChg chg="add mod">
           <ac:chgData name="Hsia, Cheehong" userId="6bc27941-0d5a-4c11-8dfb-8bbe9da0911b" providerId="ADAL" clId="{5BE5096F-7F8C-496A-A13C-FF7D0CA7A6B4}" dt="2024-02-03T15:47:10.059" v="835" actId="20577"/>
           <ac:spMkLst>
@@ -659,8 +795,8 @@
           </ac:spMkLst>
         </pc:spChg>
       </pc:sldChg>
-      <pc:sldChg chg="addSp modSp">
-        <pc:chgData name="Hsia, Cheehong" userId="6bc27941-0d5a-4c11-8dfb-8bbe9da0911b" providerId="ADAL" clId="{5BE5096F-7F8C-496A-A13C-FF7D0CA7A6B4}" dt="2024-02-03T15:47:12.570" v="836"/>
+      <pc:sldChg chg="addSp modSp del">
+        <pc:chgData name="Hsia, Cheehong" userId="6bc27941-0d5a-4c11-8dfb-8bbe9da0911b" providerId="ADAL" clId="{5BE5096F-7F8C-496A-A13C-FF7D0CA7A6B4}" dt="2024-02-14T15:22:08.970" v="1096" actId="47"/>
         <pc:sldMkLst>
           <pc:docMk/>
           <pc:sldMk cId="1734131973" sldId="289"/>
@@ -675,11 +811,27 @@
         </pc:spChg>
       </pc:sldChg>
       <pc:sldChg chg="addSp modSp mod">
-        <pc:chgData name="Hsia, Cheehong" userId="6bc27941-0d5a-4c11-8dfb-8bbe9da0911b" providerId="ADAL" clId="{5BE5096F-7F8C-496A-A13C-FF7D0CA7A6B4}" dt="2024-02-03T15:47:20.656" v="839" actId="20577"/>
+        <pc:chgData name="Hsia, Cheehong" userId="6bc27941-0d5a-4c11-8dfb-8bbe9da0911b" providerId="ADAL" clId="{5BE5096F-7F8C-496A-A13C-FF7D0CA7A6B4}" dt="2024-02-14T15:22:38.841" v="1103" actId="20577"/>
         <pc:sldMkLst>
           <pc:docMk/>
           <pc:sldMk cId="539056256" sldId="290"/>
         </pc:sldMkLst>
+        <pc:spChg chg="mod">
+          <ac:chgData name="Hsia, Cheehong" userId="6bc27941-0d5a-4c11-8dfb-8bbe9da0911b" providerId="ADAL" clId="{5BE5096F-7F8C-496A-A13C-FF7D0CA7A6B4}" dt="2024-02-14T15:22:25.294" v="1100" actId="255"/>
+          <ac:spMkLst>
+            <pc:docMk/>
+            <pc:sldMk cId="539056256" sldId="290"/>
+            <ac:spMk id="2" creationId="{66890E70-EDB5-4D8C-2B4F-029FA9E51D4E}"/>
+          </ac:spMkLst>
+        </pc:spChg>
+        <pc:spChg chg="mod">
+          <ac:chgData name="Hsia, Cheehong" userId="6bc27941-0d5a-4c11-8dfb-8bbe9da0911b" providerId="ADAL" clId="{5BE5096F-7F8C-496A-A13C-FF7D0CA7A6B4}" dt="2024-02-14T15:22:38.841" v="1103" actId="20577"/>
+          <ac:spMkLst>
+            <pc:docMk/>
+            <pc:sldMk cId="539056256" sldId="290"/>
+            <ac:spMk id="4" creationId="{F978620C-B722-98CC-0FA2-E22F5047512F}"/>
+          </ac:spMkLst>
+        </pc:spChg>
         <pc:spChg chg="add mod">
           <ac:chgData name="Hsia, Cheehong" userId="6bc27941-0d5a-4c11-8dfb-8bbe9da0911b" providerId="ADAL" clId="{5BE5096F-7F8C-496A-A13C-FF7D0CA7A6B4}" dt="2024-02-03T15:47:20.656" v="839" actId="20577"/>
           <ac:spMkLst>
@@ -689,8 +841,8 @@
           </ac:spMkLst>
         </pc:spChg>
       </pc:sldChg>
-      <pc:sldChg chg="addSp modSp">
-        <pc:chgData name="Hsia, Cheehong" userId="6bc27941-0d5a-4c11-8dfb-8bbe9da0911b" providerId="ADAL" clId="{5BE5096F-7F8C-496A-A13C-FF7D0CA7A6B4}" dt="2024-02-03T15:47:23.609" v="840"/>
+      <pc:sldChg chg="addSp modSp del">
+        <pc:chgData name="Hsia, Cheehong" userId="6bc27941-0d5a-4c11-8dfb-8bbe9da0911b" providerId="ADAL" clId="{5BE5096F-7F8C-496A-A13C-FF7D0CA7A6B4}" dt="2024-02-14T15:22:44.977" v="1105" actId="47"/>
         <pc:sldMkLst>
           <pc:docMk/>
           <pc:sldMk cId="1292218336" sldId="291"/>
@@ -705,11 +857,27 @@
         </pc:spChg>
       </pc:sldChg>
       <pc:sldChg chg="addSp modSp mod">
-        <pc:chgData name="Hsia, Cheehong" userId="6bc27941-0d5a-4c11-8dfb-8bbe9da0911b" providerId="ADAL" clId="{5BE5096F-7F8C-496A-A13C-FF7D0CA7A6B4}" dt="2024-02-03T15:47:34.543" v="842" actId="20577"/>
+        <pc:chgData name="Hsia, Cheehong" userId="6bc27941-0d5a-4c11-8dfb-8bbe9da0911b" providerId="ADAL" clId="{5BE5096F-7F8C-496A-A13C-FF7D0CA7A6B4}" dt="2024-02-14T15:23:01.262" v="1110" actId="255"/>
         <pc:sldMkLst>
           <pc:docMk/>
           <pc:sldMk cId="2261043360" sldId="292"/>
         </pc:sldMkLst>
+        <pc:spChg chg="mod">
+          <ac:chgData name="Hsia, Cheehong" userId="6bc27941-0d5a-4c11-8dfb-8bbe9da0911b" providerId="ADAL" clId="{5BE5096F-7F8C-496A-A13C-FF7D0CA7A6B4}" dt="2024-02-14T15:22:55.702" v="1108" actId="255"/>
+          <ac:spMkLst>
+            <pc:docMk/>
+            <pc:sldMk cId="2261043360" sldId="292"/>
+            <ac:spMk id="2" creationId="{66890E70-EDB5-4D8C-2B4F-029FA9E51D4E}"/>
+          </ac:spMkLst>
+        </pc:spChg>
+        <pc:spChg chg="mod">
+          <ac:chgData name="Hsia, Cheehong" userId="6bc27941-0d5a-4c11-8dfb-8bbe9da0911b" providerId="ADAL" clId="{5BE5096F-7F8C-496A-A13C-FF7D0CA7A6B4}" dt="2024-02-14T15:23:01.262" v="1110" actId="255"/>
+          <ac:spMkLst>
+            <pc:docMk/>
+            <pc:sldMk cId="2261043360" sldId="292"/>
+            <ac:spMk id="4" creationId="{F978620C-B722-98CC-0FA2-E22F5047512F}"/>
+          </ac:spMkLst>
+        </pc:spChg>
         <pc:spChg chg="add mod">
           <ac:chgData name="Hsia, Cheehong" userId="6bc27941-0d5a-4c11-8dfb-8bbe9da0911b" providerId="ADAL" clId="{5BE5096F-7F8C-496A-A13C-FF7D0CA7A6B4}" dt="2024-02-03T15:47:34.543" v="842" actId="20577"/>
           <ac:spMkLst>
@@ -719,8 +887,8 @@
           </ac:spMkLst>
         </pc:spChg>
       </pc:sldChg>
-      <pc:sldChg chg="addSp modSp">
-        <pc:chgData name="Hsia, Cheehong" userId="6bc27941-0d5a-4c11-8dfb-8bbe9da0911b" providerId="ADAL" clId="{5BE5096F-7F8C-496A-A13C-FF7D0CA7A6B4}" dt="2024-02-03T15:47:40.382" v="843"/>
+      <pc:sldChg chg="addSp modSp del">
+        <pc:chgData name="Hsia, Cheehong" userId="6bc27941-0d5a-4c11-8dfb-8bbe9da0911b" providerId="ADAL" clId="{5BE5096F-7F8C-496A-A13C-FF7D0CA7A6B4}" dt="2024-02-14T15:23:07.102" v="1111" actId="47"/>
         <pc:sldMkLst>
           <pc:docMk/>
           <pc:sldMk cId="2951154706" sldId="293"/>
@@ -798,11 +966,27 @@
         </pc:picChg>
       </pc:sldChg>
       <pc:sldChg chg="addSp modSp mod">
-        <pc:chgData name="Hsia, Cheehong" userId="6bc27941-0d5a-4c11-8dfb-8bbe9da0911b" providerId="ADAL" clId="{5BE5096F-7F8C-496A-A13C-FF7D0CA7A6B4}" dt="2024-02-03T15:48:33.891" v="845" actId="20577"/>
+        <pc:chgData name="Hsia, Cheehong" userId="6bc27941-0d5a-4c11-8dfb-8bbe9da0911b" providerId="ADAL" clId="{5BE5096F-7F8C-496A-A13C-FF7D0CA7A6B4}" dt="2024-02-14T15:23:49.503" v="1121" actId="20577"/>
         <pc:sldMkLst>
           <pc:docMk/>
           <pc:sldMk cId="3190214858" sldId="296"/>
         </pc:sldMkLst>
+        <pc:spChg chg="mod">
+          <ac:chgData name="Hsia, Cheehong" userId="6bc27941-0d5a-4c11-8dfb-8bbe9da0911b" providerId="ADAL" clId="{5BE5096F-7F8C-496A-A13C-FF7D0CA7A6B4}" dt="2024-02-14T15:23:25.803" v="1117" actId="20577"/>
+          <ac:spMkLst>
+            <pc:docMk/>
+            <pc:sldMk cId="3190214858" sldId="296"/>
+            <ac:spMk id="2" creationId="{AD90CEB0-783B-5FA4-1028-D4B692C5B2CE}"/>
+          </ac:spMkLst>
+        </pc:spChg>
+        <pc:spChg chg="mod">
+          <ac:chgData name="Hsia, Cheehong" userId="6bc27941-0d5a-4c11-8dfb-8bbe9da0911b" providerId="ADAL" clId="{5BE5096F-7F8C-496A-A13C-FF7D0CA7A6B4}" dt="2024-02-14T15:23:49.503" v="1121" actId="20577"/>
+          <ac:spMkLst>
+            <pc:docMk/>
+            <pc:sldMk cId="3190214858" sldId="296"/>
+            <ac:spMk id="4" creationId="{3859056E-FEDA-2D8C-90B8-7DB995ECB8A4}"/>
+          </ac:spMkLst>
+        </pc:spChg>
         <pc:spChg chg="add mod">
           <ac:chgData name="Hsia, Cheehong" userId="6bc27941-0d5a-4c11-8dfb-8bbe9da0911b" providerId="ADAL" clId="{5BE5096F-7F8C-496A-A13C-FF7D0CA7A6B4}" dt="2024-02-03T15:48:33.891" v="845" actId="20577"/>
           <ac:spMkLst>
@@ -812,8 +996,8 @@
           </ac:spMkLst>
         </pc:spChg>
       </pc:sldChg>
-      <pc:sldChg chg="addSp modSp">
-        <pc:chgData name="Hsia, Cheehong" userId="6bc27941-0d5a-4c11-8dfb-8bbe9da0911b" providerId="ADAL" clId="{5BE5096F-7F8C-496A-A13C-FF7D0CA7A6B4}" dt="2024-02-03T15:48:35.964" v="846"/>
+      <pc:sldChg chg="addSp modSp del">
+        <pc:chgData name="Hsia, Cheehong" userId="6bc27941-0d5a-4c11-8dfb-8bbe9da0911b" providerId="ADAL" clId="{5BE5096F-7F8C-496A-A13C-FF7D0CA7A6B4}" dt="2024-02-14T15:23:58.099" v="1122" actId="47"/>
         <pc:sldMkLst>
           <pc:docMk/>
           <pc:sldMk cId="826171372" sldId="297"/>
@@ -828,11 +1012,27 @@
         </pc:spChg>
       </pc:sldChg>
       <pc:sldChg chg="addSp modSp mod">
-        <pc:chgData name="Hsia, Cheehong" userId="6bc27941-0d5a-4c11-8dfb-8bbe9da0911b" providerId="ADAL" clId="{5BE5096F-7F8C-496A-A13C-FF7D0CA7A6B4}" dt="2024-02-03T15:48:40.876" v="849" actId="20577"/>
+        <pc:chgData name="Hsia, Cheehong" userId="6bc27941-0d5a-4c11-8dfb-8bbe9da0911b" providerId="ADAL" clId="{5BE5096F-7F8C-496A-A13C-FF7D0CA7A6B4}" dt="2024-02-14T15:24:23.724" v="1131" actId="20577"/>
         <pc:sldMkLst>
           <pc:docMk/>
           <pc:sldMk cId="2752436879" sldId="298"/>
         </pc:sldMkLst>
+        <pc:spChg chg="mod">
+          <ac:chgData name="Hsia, Cheehong" userId="6bc27941-0d5a-4c11-8dfb-8bbe9da0911b" providerId="ADAL" clId="{5BE5096F-7F8C-496A-A13C-FF7D0CA7A6B4}" dt="2024-02-14T15:24:16.544" v="1128" actId="20577"/>
+          <ac:spMkLst>
+            <pc:docMk/>
+            <pc:sldMk cId="2752436879" sldId="298"/>
+            <ac:spMk id="2" creationId="{AD90CEB0-783B-5FA4-1028-D4B692C5B2CE}"/>
+          </ac:spMkLst>
+        </pc:spChg>
+        <pc:spChg chg="mod">
+          <ac:chgData name="Hsia, Cheehong" userId="6bc27941-0d5a-4c11-8dfb-8bbe9da0911b" providerId="ADAL" clId="{5BE5096F-7F8C-496A-A13C-FF7D0CA7A6B4}" dt="2024-02-14T15:24:23.724" v="1131" actId="20577"/>
+          <ac:spMkLst>
+            <pc:docMk/>
+            <pc:sldMk cId="2752436879" sldId="298"/>
+            <ac:spMk id="4" creationId="{3859056E-FEDA-2D8C-90B8-7DB995ECB8A4}"/>
+          </ac:spMkLst>
+        </pc:spChg>
         <pc:spChg chg="add mod">
           <ac:chgData name="Hsia, Cheehong" userId="6bc27941-0d5a-4c11-8dfb-8bbe9da0911b" providerId="ADAL" clId="{5BE5096F-7F8C-496A-A13C-FF7D0CA7A6B4}" dt="2024-02-03T15:48:40.876" v="849" actId="20577"/>
           <ac:spMkLst>
@@ -842,8 +1042,8 @@
           </ac:spMkLst>
         </pc:spChg>
       </pc:sldChg>
-      <pc:sldChg chg="addSp modSp">
-        <pc:chgData name="Hsia, Cheehong" userId="6bc27941-0d5a-4c11-8dfb-8bbe9da0911b" providerId="ADAL" clId="{5BE5096F-7F8C-496A-A13C-FF7D0CA7A6B4}" dt="2024-02-03T15:48:46.723" v="850"/>
+      <pc:sldChg chg="addSp modSp del">
+        <pc:chgData name="Hsia, Cheehong" userId="6bc27941-0d5a-4c11-8dfb-8bbe9da0911b" providerId="ADAL" clId="{5BE5096F-7F8C-496A-A13C-FF7D0CA7A6B4}" dt="2024-02-14T15:24:27.336" v="1132" actId="47"/>
         <pc:sldMkLst>
           <pc:docMk/>
           <pc:sldMk cId="217489594" sldId="299"/>
@@ -858,11 +1058,27 @@
         </pc:spChg>
       </pc:sldChg>
       <pc:sldChg chg="addSp modSp mod">
-        <pc:chgData name="Hsia, Cheehong" userId="6bc27941-0d5a-4c11-8dfb-8bbe9da0911b" providerId="ADAL" clId="{5BE5096F-7F8C-496A-A13C-FF7D0CA7A6B4}" dt="2024-02-03T15:48:56.170" v="853" actId="20577"/>
+        <pc:chgData name="Hsia, Cheehong" userId="6bc27941-0d5a-4c11-8dfb-8bbe9da0911b" providerId="ADAL" clId="{5BE5096F-7F8C-496A-A13C-FF7D0CA7A6B4}" dt="2024-02-14T15:24:52.407" v="1141" actId="20577"/>
         <pc:sldMkLst>
           <pc:docMk/>
           <pc:sldMk cId="2193924565" sldId="300"/>
         </pc:sldMkLst>
+        <pc:spChg chg="mod">
+          <ac:chgData name="Hsia, Cheehong" userId="6bc27941-0d5a-4c11-8dfb-8bbe9da0911b" providerId="ADAL" clId="{5BE5096F-7F8C-496A-A13C-FF7D0CA7A6B4}" dt="2024-02-14T15:24:42.813" v="1138" actId="20577"/>
+          <ac:spMkLst>
+            <pc:docMk/>
+            <pc:sldMk cId="2193924565" sldId="300"/>
+            <ac:spMk id="2" creationId="{AD90CEB0-783B-5FA4-1028-D4B692C5B2CE}"/>
+          </ac:spMkLst>
+        </pc:spChg>
+        <pc:spChg chg="mod">
+          <ac:chgData name="Hsia, Cheehong" userId="6bc27941-0d5a-4c11-8dfb-8bbe9da0911b" providerId="ADAL" clId="{5BE5096F-7F8C-496A-A13C-FF7D0CA7A6B4}" dt="2024-02-14T15:24:52.407" v="1141" actId="20577"/>
+          <ac:spMkLst>
+            <pc:docMk/>
+            <pc:sldMk cId="2193924565" sldId="300"/>
+            <ac:spMk id="4" creationId="{3859056E-FEDA-2D8C-90B8-7DB995ECB8A4}"/>
+          </ac:spMkLst>
+        </pc:spChg>
         <pc:spChg chg="add mod">
           <ac:chgData name="Hsia, Cheehong" userId="6bc27941-0d5a-4c11-8dfb-8bbe9da0911b" providerId="ADAL" clId="{5BE5096F-7F8C-496A-A13C-FF7D0CA7A6B4}" dt="2024-02-03T15:48:56.170" v="853" actId="20577"/>
           <ac:spMkLst>
@@ -872,8 +1088,8 @@
           </ac:spMkLst>
         </pc:spChg>
       </pc:sldChg>
-      <pc:sldChg chg="addSp modSp">
-        <pc:chgData name="Hsia, Cheehong" userId="6bc27941-0d5a-4c11-8dfb-8bbe9da0911b" providerId="ADAL" clId="{5BE5096F-7F8C-496A-A13C-FF7D0CA7A6B4}" dt="2024-02-03T15:48:58.780" v="854"/>
+      <pc:sldChg chg="addSp modSp del">
+        <pc:chgData name="Hsia, Cheehong" userId="6bc27941-0d5a-4c11-8dfb-8bbe9da0911b" providerId="ADAL" clId="{5BE5096F-7F8C-496A-A13C-FF7D0CA7A6B4}" dt="2024-02-14T15:24:57.186" v="1142" actId="47"/>
         <pc:sldMkLst>
           <pc:docMk/>
           <pc:sldMk cId="2693914518" sldId="301"/>
@@ -888,11 +1104,27 @@
         </pc:spChg>
       </pc:sldChg>
       <pc:sldChg chg="addSp modSp mod">
-        <pc:chgData name="Hsia, Cheehong" userId="6bc27941-0d5a-4c11-8dfb-8bbe9da0911b" providerId="ADAL" clId="{5BE5096F-7F8C-496A-A13C-FF7D0CA7A6B4}" dt="2024-02-03T15:49:05.730" v="857" actId="20577"/>
+        <pc:chgData name="Hsia, Cheehong" userId="6bc27941-0d5a-4c11-8dfb-8bbe9da0911b" providerId="ADAL" clId="{5BE5096F-7F8C-496A-A13C-FF7D0CA7A6B4}" dt="2024-02-14T15:25:14.635" v="1148" actId="255"/>
         <pc:sldMkLst>
           <pc:docMk/>
           <pc:sldMk cId="155960899" sldId="302"/>
         </pc:sldMkLst>
+        <pc:spChg chg="mod">
+          <ac:chgData name="Hsia, Cheehong" userId="6bc27941-0d5a-4c11-8dfb-8bbe9da0911b" providerId="ADAL" clId="{5BE5096F-7F8C-496A-A13C-FF7D0CA7A6B4}" dt="2024-02-14T15:25:09.006" v="1146" actId="255"/>
+          <ac:spMkLst>
+            <pc:docMk/>
+            <pc:sldMk cId="155960899" sldId="302"/>
+            <ac:spMk id="2" creationId="{AD90CEB0-783B-5FA4-1028-D4B692C5B2CE}"/>
+          </ac:spMkLst>
+        </pc:spChg>
+        <pc:spChg chg="mod">
+          <ac:chgData name="Hsia, Cheehong" userId="6bc27941-0d5a-4c11-8dfb-8bbe9da0911b" providerId="ADAL" clId="{5BE5096F-7F8C-496A-A13C-FF7D0CA7A6B4}" dt="2024-02-14T15:25:14.635" v="1148" actId="255"/>
+          <ac:spMkLst>
+            <pc:docMk/>
+            <pc:sldMk cId="155960899" sldId="302"/>
+            <ac:spMk id="4" creationId="{3859056E-FEDA-2D8C-90B8-7DB995ECB8A4}"/>
+          </ac:spMkLst>
+        </pc:spChg>
         <pc:spChg chg="add mod">
           <ac:chgData name="Hsia, Cheehong" userId="6bc27941-0d5a-4c11-8dfb-8bbe9da0911b" providerId="ADAL" clId="{5BE5096F-7F8C-496A-A13C-FF7D0CA7A6B4}" dt="2024-02-03T15:49:05.730" v="857" actId="20577"/>
           <ac:spMkLst>
@@ -902,8 +1134,8 @@
           </ac:spMkLst>
         </pc:spChg>
       </pc:sldChg>
-      <pc:sldChg chg="addSp modSp">
-        <pc:chgData name="Hsia, Cheehong" userId="6bc27941-0d5a-4c11-8dfb-8bbe9da0911b" providerId="ADAL" clId="{5BE5096F-7F8C-496A-A13C-FF7D0CA7A6B4}" dt="2024-02-03T15:49:08.951" v="858"/>
+      <pc:sldChg chg="addSp modSp del">
+        <pc:chgData name="Hsia, Cheehong" userId="6bc27941-0d5a-4c11-8dfb-8bbe9da0911b" providerId="ADAL" clId="{5BE5096F-7F8C-496A-A13C-FF7D0CA7A6B4}" dt="2024-02-14T15:25:18.004" v="1149" actId="47"/>
         <pc:sldMkLst>
           <pc:docMk/>
           <pc:sldMk cId="4239895058" sldId="303"/>
@@ -918,11 +1150,27 @@
         </pc:spChg>
       </pc:sldChg>
       <pc:sldChg chg="addSp modSp mod">
-        <pc:chgData name="Hsia, Cheehong" userId="6bc27941-0d5a-4c11-8dfb-8bbe9da0911b" providerId="ADAL" clId="{5BE5096F-7F8C-496A-A13C-FF7D0CA7A6B4}" dt="2024-02-03T15:49:13.900" v="861" actId="20577"/>
+        <pc:chgData name="Hsia, Cheehong" userId="6bc27941-0d5a-4c11-8dfb-8bbe9da0911b" providerId="ADAL" clId="{5BE5096F-7F8C-496A-A13C-FF7D0CA7A6B4}" dt="2024-02-14T15:25:39.039" v="1156" actId="255"/>
         <pc:sldMkLst>
           <pc:docMk/>
           <pc:sldMk cId="1487932769" sldId="304"/>
         </pc:sldMkLst>
+        <pc:spChg chg="mod">
+          <ac:chgData name="Hsia, Cheehong" userId="6bc27941-0d5a-4c11-8dfb-8bbe9da0911b" providerId="ADAL" clId="{5BE5096F-7F8C-496A-A13C-FF7D0CA7A6B4}" dt="2024-02-14T15:25:33.114" v="1154" actId="20577"/>
+          <ac:spMkLst>
+            <pc:docMk/>
+            <pc:sldMk cId="1487932769" sldId="304"/>
+            <ac:spMk id="2" creationId="{AD90CEB0-783B-5FA4-1028-D4B692C5B2CE}"/>
+          </ac:spMkLst>
+        </pc:spChg>
+        <pc:spChg chg="mod">
+          <ac:chgData name="Hsia, Cheehong" userId="6bc27941-0d5a-4c11-8dfb-8bbe9da0911b" providerId="ADAL" clId="{5BE5096F-7F8C-496A-A13C-FF7D0CA7A6B4}" dt="2024-02-14T15:25:39.039" v="1156" actId="255"/>
+          <ac:spMkLst>
+            <pc:docMk/>
+            <pc:sldMk cId="1487932769" sldId="304"/>
+            <ac:spMk id="4" creationId="{3859056E-FEDA-2D8C-90B8-7DB995ECB8A4}"/>
+          </ac:spMkLst>
+        </pc:spChg>
         <pc:spChg chg="add mod">
           <ac:chgData name="Hsia, Cheehong" userId="6bc27941-0d5a-4c11-8dfb-8bbe9da0911b" providerId="ADAL" clId="{5BE5096F-7F8C-496A-A13C-FF7D0CA7A6B4}" dt="2024-02-03T15:49:13.900" v="861" actId="20577"/>
           <ac:spMkLst>
@@ -932,8 +1180,8 @@
           </ac:spMkLst>
         </pc:spChg>
       </pc:sldChg>
-      <pc:sldChg chg="addSp modSp">
-        <pc:chgData name="Hsia, Cheehong" userId="6bc27941-0d5a-4c11-8dfb-8bbe9da0911b" providerId="ADAL" clId="{5BE5096F-7F8C-496A-A13C-FF7D0CA7A6B4}" dt="2024-02-03T15:49:18.534" v="862"/>
+      <pc:sldChg chg="addSp modSp del">
+        <pc:chgData name="Hsia, Cheehong" userId="6bc27941-0d5a-4c11-8dfb-8bbe9da0911b" providerId="ADAL" clId="{5BE5096F-7F8C-496A-A13C-FF7D0CA7A6B4}" dt="2024-02-14T15:25:43.086" v="1157" actId="47"/>
         <pc:sldMkLst>
           <pc:docMk/>
           <pc:sldMk cId="178219345" sldId="305"/>
@@ -948,11 +1196,27 @@
         </pc:spChg>
       </pc:sldChg>
       <pc:sldChg chg="addSp modSp mod">
-        <pc:chgData name="Hsia, Cheehong" userId="6bc27941-0d5a-4c11-8dfb-8bbe9da0911b" providerId="ADAL" clId="{5BE5096F-7F8C-496A-A13C-FF7D0CA7A6B4}" dt="2024-02-03T15:49:31.273" v="865" actId="20577"/>
+        <pc:chgData name="Hsia, Cheehong" userId="6bc27941-0d5a-4c11-8dfb-8bbe9da0911b" providerId="ADAL" clId="{5BE5096F-7F8C-496A-A13C-FF7D0CA7A6B4}" dt="2024-02-14T15:26:14.343" v="1166" actId="20577"/>
         <pc:sldMkLst>
           <pc:docMk/>
           <pc:sldMk cId="961020213" sldId="308"/>
         </pc:sldMkLst>
+        <pc:spChg chg="mod">
+          <ac:chgData name="Hsia, Cheehong" userId="6bc27941-0d5a-4c11-8dfb-8bbe9da0911b" providerId="ADAL" clId="{5BE5096F-7F8C-496A-A13C-FF7D0CA7A6B4}" dt="2024-02-14T15:26:03.778" v="1161" actId="255"/>
+          <ac:spMkLst>
+            <pc:docMk/>
+            <pc:sldMk cId="961020213" sldId="308"/>
+            <ac:spMk id="2" creationId="{9024BA51-C630-BA2A-58B6-69F9BB6816A0}"/>
+          </ac:spMkLst>
+        </pc:spChg>
+        <pc:spChg chg="mod">
+          <ac:chgData name="Hsia, Cheehong" userId="6bc27941-0d5a-4c11-8dfb-8bbe9da0911b" providerId="ADAL" clId="{5BE5096F-7F8C-496A-A13C-FF7D0CA7A6B4}" dt="2024-02-14T15:26:14.343" v="1166" actId="20577"/>
+          <ac:spMkLst>
+            <pc:docMk/>
+            <pc:sldMk cId="961020213" sldId="308"/>
+            <ac:spMk id="4" creationId="{8946D5DF-DDC9-DF42-4883-DA9549CF8DE5}"/>
+          </ac:spMkLst>
+        </pc:spChg>
         <pc:spChg chg="add mod">
           <ac:chgData name="Hsia, Cheehong" userId="6bc27941-0d5a-4c11-8dfb-8bbe9da0911b" providerId="ADAL" clId="{5BE5096F-7F8C-496A-A13C-FF7D0CA7A6B4}" dt="2024-02-03T15:49:31.273" v="865" actId="20577"/>
           <ac:spMkLst>
@@ -962,8 +1226,8 @@
           </ac:spMkLst>
         </pc:spChg>
       </pc:sldChg>
-      <pc:sldChg chg="addSp modSp">
-        <pc:chgData name="Hsia, Cheehong" userId="6bc27941-0d5a-4c11-8dfb-8bbe9da0911b" providerId="ADAL" clId="{5BE5096F-7F8C-496A-A13C-FF7D0CA7A6B4}" dt="2024-02-03T15:49:33.609" v="866"/>
+      <pc:sldChg chg="addSp modSp del">
+        <pc:chgData name="Hsia, Cheehong" userId="6bc27941-0d5a-4c11-8dfb-8bbe9da0911b" providerId="ADAL" clId="{5BE5096F-7F8C-496A-A13C-FF7D0CA7A6B4}" dt="2024-02-14T15:26:17.372" v="1167" actId="47"/>
         <pc:sldMkLst>
           <pc:docMk/>
           <pc:sldMk cId="415980821" sldId="309"/>
@@ -978,11 +1242,27 @@
         </pc:spChg>
       </pc:sldChg>
       <pc:sldChg chg="addSp modSp mod">
-        <pc:chgData name="Hsia, Cheehong" userId="6bc27941-0d5a-4c11-8dfb-8bbe9da0911b" providerId="ADAL" clId="{5BE5096F-7F8C-496A-A13C-FF7D0CA7A6B4}" dt="2024-02-03T15:49:39.036" v="868" actId="20577"/>
+        <pc:chgData name="Hsia, Cheehong" userId="6bc27941-0d5a-4c11-8dfb-8bbe9da0911b" providerId="ADAL" clId="{5BE5096F-7F8C-496A-A13C-FF7D0CA7A6B4}" dt="2024-02-14T15:26:34.448" v="1175" actId="20577"/>
         <pc:sldMkLst>
           <pc:docMk/>
           <pc:sldMk cId="1482915617" sldId="310"/>
         </pc:sldMkLst>
+        <pc:spChg chg="mod">
+          <ac:chgData name="Hsia, Cheehong" userId="6bc27941-0d5a-4c11-8dfb-8bbe9da0911b" providerId="ADAL" clId="{5BE5096F-7F8C-496A-A13C-FF7D0CA7A6B4}" dt="2024-02-14T15:26:26.946" v="1171" actId="255"/>
+          <ac:spMkLst>
+            <pc:docMk/>
+            <pc:sldMk cId="1482915617" sldId="310"/>
+            <ac:spMk id="2" creationId="{9024BA51-C630-BA2A-58B6-69F9BB6816A0}"/>
+          </ac:spMkLst>
+        </pc:spChg>
+        <pc:spChg chg="mod">
+          <ac:chgData name="Hsia, Cheehong" userId="6bc27941-0d5a-4c11-8dfb-8bbe9da0911b" providerId="ADAL" clId="{5BE5096F-7F8C-496A-A13C-FF7D0CA7A6B4}" dt="2024-02-14T15:26:34.448" v="1175" actId="20577"/>
+          <ac:spMkLst>
+            <pc:docMk/>
+            <pc:sldMk cId="1482915617" sldId="310"/>
+            <ac:spMk id="4" creationId="{8946D5DF-DDC9-DF42-4883-DA9549CF8DE5}"/>
+          </ac:spMkLst>
+        </pc:spChg>
         <pc:spChg chg="add mod">
           <ac:chgData name="Hsia, Cheehong" userId="6bc27941-0d5a-4c11-8dfb-8bbe9da0911b" providerId="ADAL" clId="{5BE5096F-7F8C-496A-A13C-FF7D0CA7A6B4}" dt="2024-02-03T15:49:39.036" v="868" actId="20577"/>
           <ac:spMkLst>
@@ -992,8 +1272,8 @@
           </ac:spMkLst>
         </pc:spChg>
       </pc:sldChg>
-      <pc:sldChg chg="addSp modSp">
-        <pc:chgData name="Hsia, Cheehong" userId="6bc27941-0d5a-4c11-8dfb-8bbe9da0911b" providerId="ADAL" clId="{5BE5096F-7F8C-496A-A13C-FF7D0CA7A6B4}" dt="2024-02-03T15:49:41.631" v="869"/>
+      <pc:sldChg chg="addSp modSp del">
+        <pc:chgData name="Hsia, Cheehong" userId="6bc27941-0d5a-4c11-8dfb-8bbe9da0911b" providerId="ADAL" clId="{5BE5096F-7F8C-496A-A13C-FF7D0CA7A6B4}" dt="2024-02-14T15:26:38.983" v="1176" actId="47"/>
         <pc:sldMkLst>
           <pc:docMk/>
           <pc:sldMk cId="1467359079" sldId="311"/>
@@ -1008,11 +1288,27 @@
         </pc:spChg>
       </pc:sldChg>
       <pc:sldChg chg="addSp modSp mod">
-        <pc:chgData name="Hsia, Cheehong" userId="6bc27941-0d5a-4c11-8dfb-8bbe9da0911b" providerId="ADAL" clId="{5BE5096F-7F8C-496A-A13C-FF7D0CA7A6B4}" dt="2024-02-03T15:49:48.203" v="872" actId="20577"/>
+        <pc:chgData name="Hsia, Cheehong" userId="6bc27941-0d5a-4c11-8dfb-8bbe9da0911b" providerId="ADAL" clId="{5BE5096F-7F8C-496A-A13C-FF7D0CA7A6B4}" dt="2024-02-14T15:27:53.942" v="1326" actId="20577"/>
         <pc:sldMkLst>
           <pc:docMk/>
           <pc:sldMk cId="3790017242" sldId="312"/>
         </pc:sldMkLst>
+        <pc:spChg chg="mod">
+          <ac:chgData name="Hsia, Cheehong" userId="6bc27941-0d5a-4c11-8dfb-8bbe9da0911b" providerId="ADAL" clId="{5BE5096F-7F8C-496A-A13C-FF7D0CA7A6B4}" dt="2024-02-14T15:27:12.206" v="1227" actId="20577"/>
+          <ac:spMkLst>
+            <pc:docMk/>
+            <pc:sldMk cId="3790017242" sldId="312"/>
+            <ac:spMk id="2" creationId="{9024BA51-C630-BA2A-58B6-69F9BB6816A0}"/>
+          </ac:spMkLst>
+        </pc:spChg>
+        <pc:spChg chg="mod">
+          <ac:chgData name="Hsia, Cheehong" userId="6bc27941-0d5a-4c11-8dfb-8bbe9da0911b" providerId="ADAL" clId="{5BE5096F-7F8C-496A-A13C-FF7D0CA7A6B4}" dt="2024-02-14T15:27:53.942" v="1326" actId="20577"/>
+          <ac:spMkLst>
+            <pc:docMk/>
+            <pc:sldMk cId="3790017242" sldId="312"/>
+            <ac:spMk id="4" creationId="{8946D5DF-DDC9-DF42-4883-DA9549CF8DE5}"/>
+          </ac:spMkLst>
+        </pc:spChg>
         <pc:spChg chg="add mod">
           <ac:chgData name="Hsia, Cheehong" userId="6bc27941-0d5a-4c11-8dfb-8bbe9da0911b" providerId="ADAL" clId="{5BE5096F-7F8C-496A-A13C-FF7D0CA7A6B4}" dt="2024-02-03T15:49:48.203" v="872" actId="20577"/>
           <ac:spMkLst>
@@ -1022,8 +1318,8 @@
           </ac:spMkLst>
         </pc:spChg>
       </pc:sldChg>
-      <pc:sldChg chg="addSp modSp">
-        <pc:chgData name="Hsia, Cheehong" userId="6bc27941-0d5a-4c11-8dfb-8bbe9da0911b" providerId="ADAL" clId="{5BE5096F-7F8C-496A-A13C-FF7D0CA7A6B4}" dt="2024-02-03T15:49:51.097" v="873"/>
+      <pc:sldChg chg="addSp modSp del">
+        <pc:chgData name="Hsia, Cheehong" userId="6bc27941-0d5a-4c11-8dfb-8bbe9da0911b" providerId="ADAL" clId="{5BE5096F-7F8C-496A-A13C-FF7D0CA7A6B4}" dt="2024-02-14T15:28:00.058" v="1327" actId="47"/>
         <pc:sldMkLst>
           <pc:docMk/>
           <pc:sldMk cId="2313812796" sldId="313"/>
@@ -1038,11 +1334,27 @@
         </pc:spChg>
       </pc:sldChg>
       <pc:sldChg chg="addSp modSp mod">
-        <pc:chgData name="Hsia, Cheehong" userId="6bc27941-0d5a-4c11-8dfb-8bbe9da0911b" providerId="ADAL" clId="{5BE5096F-7F8C-496A-A13C-FF7D0CA7A6B4}" dt="2024-02-03T15:50:01.487" v="875" actId="20577"/>
+        <pc:chgData name="Hsia, Cheehong" userId="6bc27941-0d5a-4c11-8dfb-8bbe9da0911b" providerId="ADAL" clId="{5BE5096F-7F8C-496A-A13C-FF7D0CA7A6B4}" dt="2024-02-14T15:29:07.335" v="1483" actId="20577"/>
         <pc:sldMkLst>
           <pc:docMk/>
           <pc:sldMk cId="2198057494" sldId="314"/>
         </pc:sldMkLst>
+        <pc:spChg chg="mod">
+          <ac:chgData name="Hsia, Cheehong" userId="6bc27941-0d5a-4c11-8dfb-8bbe9da0911b" providerId="ADAL" clId="{5BE5096F-7F8C-496A-A13C-FF7D0CA7A6B4}" dt="2024-02-14T15:28:35.051" v="1395" actId="20577"/>
+          <ac:spMkLst>
+            <pc:docMk/>
+            <pc:sldMk cId="2198057494" sldId="314"/>
+            <ac:spMk id="2" creationId="{9024BA51-C630-BA2A-58B6-69F9BB6816A0}"/>
+          </ac:spMkLst>
+        </pc:spChg>
+        <pc:spChg chg="mod">
+          <ac:chgData name="Hsia, Cheehong" userId="6bc27941-0d5a-4c11-8dfb-8bbe9da0911b" providerId="ADAL" clId="{5BE5096F-7F8C-496A-A13C-FF7D0CA7A6B4}" dt="2024-02-14T15:29:07.335" v="1483" actId="20577"/>
+          <ac:spMkLst>
+            <pc:docMk/>
+            <pc:sldMk cId="2198057494" sldId="314"/>
+            <ac:spMk id="4" creationId="{8946D5DF-DDC9-DF42-4883-DA9549CF8DE5}"/>
+          </ac:spMkLst>
+        </pc:spChg>
         <pc:spChg chg="add mod">
           <ac:chgData name="Hsia, Cheehong" userId="6bc27941-0d5a-4c11-8dfb-8bbe9da0911b" providerId="ADAL" clId="{5BE5096F-7F8C-496A-A13C-FF7D0CA7A6B4}" dt="2024-02-03T15:50:01.487" v="875" actId="20577"/>
           <ac:spMkLst>
@@ -1052,8 +1364,8 @@
           </ac:spMkLst>
         </pc:spChg>
       </pc:sldChg>
-      <pc:sldChg chg="addSp modSp">
-        <pc:chgData name="Hsia, Cheehong" userId="6bc27941-0d5a-4c11-8dfb-8bbe9da0911b" providerId="ADAL" clId="{5BE5096F-7F8C-496A-A13C-FF7D0CA7A6B4}" dt="2024-02-03T15:50:04.971" v="876"/>
+      <pc:sldChg chg="addSp modSp del">
+        <pc:chgData name="Hsia, Cheehong" userId="6bc27941-0d5a-4c11-8dfb-8bbe9da0911b" providerId="ADAL" clId="{5BE5096F-7F8C-496A-A13C-FF7D0CA7A6B4}" dt="2024-02-14T15:29:13.288" v="1484" actId="47"/>
         <pc:sldMkLst>
           <pc:docMk/>
           <pc:sldMk cId="2393475525" sldId="315"/>
@@ -1068,11 +1380,27 @@
         </pc:spChg>
       </pc:sldChg>
       <pc:sldChg chg="addSp modSp mod">
-        <pc:chgData name="Hsia, Cheehong" userId="6bc27941-0d5a-4c11-8dfb-8bbe9da0911b" providerId="ADAL" clId="{5BE5096F-7F8C-496A-A13C-FF7D0CA7A6B4}" dt="2024-02-03T15:50:15.430" v="879" actId="20577"/>
+        <pc:chgData name="Hsia, Cheehong" userId="6bc27941-0d5a-4c11-8dfb-8bbe9da0911b" providerId="ADAL" clId="{5BE5096F-7F8C-496A-A13C-FF7D0CA7A6B4}" dt="2024-02-14T15:30:20.423" v="1621" actId="20577"/>
         <pc:sldMkLst>
           <pc:docMk/>
           <pc:sldMk cId="1870647430" sldId="316"/>
         </pc:sldMkLst>
+        <pc:spChg chg="mod">
+          <ac:chgData name="Hsia, Cheehong" userId="6bc27941-0d5a-4c11-8dfb-8bbe9da0911b" providerId="ADAL" clId="{5BE5096F-7F8C-496A-A13C-FF7D0CA7A6B4}" dt="2024-02-14T15:29:45.483" v="1536" actId="20577"/>
+          <ac:spMkLst>
+            <pc:docMk/>
+            <pc:sldMk cId="1870647430" sldId="316"/>
+            <ac:spMk id="2" creationId="{9024BA51-C630-BA2A-58B6-69F9BB6816A0}"/>
+          </ac:spMkLst>
+        </pc:spChg>
+        <pc:spChg chg="mod">
+          <ac:chgData name="Hsia, Cheehong" userId="6bc27941-0d5a-4c11-8dfb-8bbe9da0911b" providerId="ADAL" clId="{5BE5096F-7F8C-496A-A13C-FF7D0CA7A6B4}" dt="2024-02-14T15:30:20.423" v="1621" actId="20577"/>
+          <ac:spMkLst>
+            <pc:docMk/>
+            <pc:sldMk cId="1870647430" sldId="316"/>
+            <ac:spMk id="4" creationId="{8946D5DF-DDC9-DF42-4883-DA9549CF8DE5}"/>
+          </ac:spMkLst>
+        </pc:spChg>
         <pc:spChg chg="add mod">
           <ac:chgData name="Hsia, Cheehong" userId="6bc27941-0d5a-4c11-8dfb-8bbe9da0911b" providerId="ADAL" clId="{5BE5096F-7F8C-496A-A13C-FF7D0CA7A6B4}" dt="2024-02-03T15:50:15.430" v="879" actId="20577"/>
           <ac:spMkLst>
@@ -1082,8 +1410,8 @@
           </ac:spMkLst>
         </pc:spChg>
       </pc:sldChg>
-      <pc:sldChg chg="addSp modSp">
-        <pc:chgData name="Hsia, Cheehong" userId="6bc27941-0d5a-4c11-8dfb-8bbe9da0911b" providerId="ADAL" clId="{5BE5096F-7F8C-496A-A13C-FF7D0CA7A6B4}" dt="2024-02-03T15:50:17.421" v="880"/>
+      <pc:sldChg chg="addSp modSp del">
+        <pc:chgData name="Hsia, Cheehong" userId="6bc27941-0d5a-4c11-8dfb-8bbe9da0911b" providerId="ADAL" clId="{5BE5096F-7F8C-496A-A13C-FF7D0CA7A6B4}" dt="2024-02-14T15:30:25.141" v="1622" actId="47"/>
         <pc:sldMkLst>
           <pc:docMk/>
           <pc:sldMk cId="1520640515" sldId="317"/>
@@ -1371,6 +1699,786 @@
           <pc:docMk/>
           <pc:sldMk cId="2178182827" sldId="320"/>
         </pc:sldMkLst>
+      </pc:sldChg>
+      <pc:sldChg chg="modSp add mod modClrScheme chgLayout">
+        <pc:chgData name="Hsia, Cheehong" userId="6bc27941-0d5a-4c11-8dfb-8bbe9da0911b" providerId="ADAL" clId="{5BE5096F-7F8C-496A-A13C-FF7D0CA7A6B4}" dt="2024-02-14T15:18:42.673" v="1037" actId="20577"/>
+        <pc:sldMkLst>
+          <pc:docMk/>
+          <pc:sldMk cId="2830884995" sldId="321"/>
+        </pc:sldMkLst>
+        <pc:spChg chg="mod ord">
+          <ac:chgData name="Hsia, Cheehong" userId="6bc27941-0d5a-4c11-8dfb-8bbe9da0911b" providerId="ADAL" clId="{5BE5096F-7F8C-496A-A13C-FF7D0CA7A6B4}" dt="2024-02-14T15:18:42.673" v="1037" actId="20577"/>
+          <ac:spMkLst>
+            <pc:docMk/>
+            <pc:sldMk cId="2830884995" sldId="321"/>
+            <ac:spMk id="2" creationId="{700D1D6A-607B-8919-A042-BCCDC9CF0CF0}"/>
+          </ac:spMkLst>
+        </pc:spChg>
+        <pc:spChg chg="mod ord">
+          <ac:chgData name="Hsia, Cheehong" userId="6bc27941-0d5a-4c11-8dfb-8bbe9da0911b" providerId="ADAL" clId="{5BE5096F-7F8C-496A-A13C-FF7D0CA7A6B4}" dt="2024-02-14T15:17:41.464" v="1030" actId="700"/>
+          <ac:spMkLst>
+            <pc:docMk/>
+            <pc:sldMk cId="2830884995" sldId="321"/>
+            <ac:spMk id="3" creationId="{DB4E66FB-476A-BB21-1B46-4C8125462E5C}"/>
+          </ac:spMkLst>
+        </pc:spChg>
+        <pc:spChg chg="mod ord">
+          <ac:chgData name="Hsia, Cheehong" userId="6bc27941-0d5a-4c11-8dfb-8bbe9da0911b" providerId="ADAL" clId="{5BE5096F-7F8C-496A-A13C-FF7D0CA7A6B4}" dt="2024-02-14T15:17:41.464" v="1030" actId="700"/>
+          <ac:spMkLst>
+            <pc:docMk/>
+            <pc:sldMk cId="2830884995" sldId="321"/>
+            <ac:spMk id="4" creationId="{101FB840-DD80-334A-87FD-81DC71AD8A57}"/>
+          </ac:spMkLst>
+        </pc:spChg>
+        <pc:spChg chg="mod ord">
+          <ac:chgData name="Hsia, Cheehong" userId="6bc27941-0d5a-4c11-8dfb-8bbe9da0911b" providerId="ADAL" clId="{5BE5096F-7F8C-496A-A13C-FF7D0CA7A6B4}" dt="2024-02-14T15:17:41.464" v="1030" actId="700"/>
+          <ac:spMkLst>
+            <pc:docMk/>
+            <pc:sldMk cId="2830884995" sldId="321"/>
+            <ac:spMk id="5" creationId="{3994DC0B-F72F-6BFF-C694-00CBF68920C1}"/>
+          </ac:spMkLst>
+        </pc:spChg>
+      </pc:sldChg>
+      <pc:sldChg chg="modSp add mod modClrScheme chgLayout">
+        <pc:chgData name="Hsia, Cheehong" userId="6bc27941-0d5a-4c11-8dfb-8bbe9da0911b" providerId="ADAL" clId="{5BE5096F-7F8C-496A-A13C-FF7D0CA7A6B4}" dt="2024-02-14T15:18:58.663" v="1040" actId="700"/>
+        <pc:sldMkLst>
+          <pc:docMk/>
+          <pc:sldMk cId="393363697" sldId="322"/>
+        </pc:sldMkLst>
+        <pc:spChg chg="mod ord">
+          <ac:chgData name="Hsia, Cheehong" userId="6bc27941-0d5a-4c11-8dfb-8bbe9da0911b" providerId="ADAL" clId="{5BE5096F-7F8C-496A-A13C-FF7D0CA7A6B4}" dt="2024-02-14T15:18:58.663" v="1040" actId="700"/>
+          <ac:spMkLst>
+            <pc:docMk/>
+            <pc:sldMk cId="393363697" sldId="322"/>
+            <ac:spMk id="2" creationId="{509F87C3-07A1-0EDC-D899-CD15F645C37F}"/>
+          </ac:spMkLst>
+        </pc:spChg>
+        <pc:spChg chg="mod ord">
+          <ac:chgData name="Hsia, Cheehong" userId="6bc27941-0d5a-4c11-8dfb-8bbe9da0911b" providerId="ADAL" clId="{5BE5096F-7F8C-496A-A13C-FF7D0CA7A6B4}" dt="2024-02-14T15:18:58.663" v="1040" actId="700"/>
+          <ac:spMkLst>
+            <pc:docMk/>
+            <pc:sldMk cId="393363697" sldId="322"/>
+            <ac:spMk id="3" creationId="{9B42B0F5-1A67-8C70-FDCF-4C93DB02E94F}"/>
+          </ac:spMkLst>
+        </pc:spChg>
+        <pc:spChg chg="mod ord">
+          <ac:chgData name="Hsia, Cheehong" userId="6bc27941-0d5a-4c11-8dfb-8bbe9da0911b" providerId="ADAL" clId="{5BE5096F-7F8C-496A-A13C-FF7D0CA7A6B4}" dt="2024-02-14T15:18:58.663" v="1040" actId="700"/>
+          <ac:spMkLst>
+            <pc:docMk/>
+            <pc:sldMk cId="393363697" sldId="322"/>
+            <ac:spMk id="4" creationId="{AA1D8D56-7997-9149-E3C2-4243BC163909}"/>
+          </ac:spMkLst>
+        </pc:spChg>
+        <pc:spChg chg="mod ord">
+          <ac:chgData name="Hsia, Cheehong" userId="6bc27941-0d5a-4c11-8dfb-8bbe9da0911b" providerId="ADAL" clId="{5BE5096F-7F8C-496A-A13C-FF7D0CA7A6B4}" dt="2024-02-14T15:18:58.663" v="1040" actId="700"/>
+          <ac:spMkLst>
+            <pc:docMk/>
+            <pc:sldMk cId="393363697" sldId="322"/>
+            <ac:spMk id="5" creationId="{B975B983-7343-8A2D-4201-2198F0BCF4D0}"/>
+          </ac:spMkLst>
+        </pc:spChg>
+      </pc:sldChg>
+      <pc:sldChg chg="modSp add mod modClrScheme chgLayout">
+        <pc:chgData name="Hsia, Cheehong" userId="6bc27941-0d5a-4c11-8dfb-8bbe9da0911b" providerId="ADAL" clId="{5BE5096F-7F8C-496A-A13C-FF7D0CA7A6B4}" dt="2024-02-14T15:19:29.177" v="1049" actId="700"/>
+        <pc:sldMkLst>
+          <pc:docMk/>
+          <pc:sldMk cId="3631058862" sldId="323"/>
+        </pc:sldMkLst>
+        <pc:spChg chg="mod ord">
+          <ac:chgData name="Hsia, Cheehong" userId="6bc27941-0d5a-4c11-8dfb-8bbe9da0911b" providerId="ADAL" clId="{5BE5096F-7F8C-496A-A13C-FF7D0CA7A6B4}" dt="2024-02-14T15:19:29.177" v="1049" actId="700"/>
+          <ac:spMkLst>
+            <pc:docMk/>
+            <pc:sldMk cId="3631058862" sldId="323"/>
+            <ac:spMk id="2" creationId="{509F87C3-07A1-0EDC-D899-CD15F645C37F}"/>
+          </ac:spMkLst>
+        </pc:spChg>
+        <pc:spChg chg="mod ord">
+          <ac:chgData name="Hsia, Cheehong" userId="6bc27941-0d5a-4c11-8dfb-8bbe9da0911b" providerId="ADAL" clId="{5BE5096F-7F8C-496A-A13C-FF7D0CA7A6B4}" dt="2024-02-14T15:19:29.177" v="1049" actId="700"/>
+          <ac:spMkLst>
+            <pc:docMk/>
+            <pc:sldMk cId="3631058862" sldId="323"/>
+            <ac:spMk id="3" creationId="{9B42B0F5-1A67-8C70-FDCF-4C93DB02E94F}"/>
+          </ac:spMkLst>
+        </pc:spChg>
+        <pc:spChg chg="mod ord">
+          <ac:chgData name="Hsia, Cheehong" userId="6bc27941-0d5a-4c11-8dfb-8bbe9da0911b" providerId="ADAL" clId="{5BE5096F-7F8C-496A-A13C-FF7D0CA7A6B4}" dt="2024-02-14T15:19:29.177" v="1049" actId="700"/>
+          <ac:spMkLst>
+            <pc:docMk/>
+            <pc:sldMk cId="3631058862" sldId="323"/>
+            <ac:spMk id="4" creationId="{AA1D8D56-7997-9149-E3C2-4243BC163909}"/>
+          </ac:spMkLst>
+        </pc:spChg>
+        <pc:spChg chg="mod ord">
+          <ac:chgData name="Hsia, Cheehong" userId="6bc27941-0d5a-4c11-8dfb-8bbe9da0911b" providerId="ADAL" clId="{5BE5096F-7F8C-496A-A13C-FF7D0CA7A6B4}" dt="2024-02-14T15:19:29.177" v="1049" actId="700"/>
+          <ac:spMkLst>
+            <pc:docMk/>
+            <pc:sldMk cId="3631058862" sldId="323"/>
+            <ac:spMk id="5" creationId="{B975B983-7343-8A2D-4201-2198F0BCF4D0}"/>
+          </ac:spMkLst>
+        </pc:spChg>
+      </pc:sldChg>
+      <pc:sldChg chg="modSp add mod modClrScheme chgLayout">
+        <pc:chgData name="Hsia, Cheehong" userId="6bc27941-0d5a-4c11-8dfb-8bbe9da0911b" providerId="ADAL" clId="{5BE5096F-7F8C-496A-A13C-FF7D0CA7A6B4}" dt="2024-02-14T15:20:05.467" v="1059" actId="700"/>
+        <pc:sldMkLst>
+          <pc:docMk/>
+          <pc:sldMk cId="1252257208" sldId="324"/>
+        </pc:sldMkLst>
+        <pc:spChg chg="mod ord">
+          <ac:chgData name="Hsia, Cheehong" userId="6bc27941-0d5a-4c11-8dfb-8bbe9da0911b" providerId="ADAL" clId="{5BE5096F-7F8C-496A-A13C-FF7D0CA7A6B4}" dt="2024-02-14T15:20:05.467" v="1059" actId="700"/>
+          <ac:spMkLst>
+            <pc:docMk/>
+            <pc:sldMk cId="1252257208" sldId="324"/>
+            <ac:spMk id="2" creationId="{509F87C3-07A1-0EDC-D899-CD15F645C37F}"/>
+          </ac:spMkLst>
+        </pc:spChg>
+        <pc:spChg chg="mod ord">
+          <ac:chgData name="Hsia, Cheehong" userId="6bc27941-0d5a-4c11-8dfb-8bbe9da0911b" providerId="ADAL" clId="{5BE5096F-7F8C-496A-A13C-FF7D0CA7A6B4}" dt="2024-02-14T15:20:05.467" v="1059" actId="700"/>
+          <ac:spMkLst>
+            <pc:docMk/>
+            <pc:sldMk cId="1252257208" sldId="324"/>
+            <ac:spMk id="3" creationId="{9B42B0F5-1A67-8C70-FDCF-4C93DB02E94F}"/>
+          </ac:spMkLst>
+        </pc:spChg>
+        <pc:spChg chg="mod ord">
+          <ac:chgData name="Hsia, Cheehong" userId="6bc27941-0d5a-4c11-8dfb-8bbe9da0911b" providerId="ADAL" clId="{5BE5096F-7F8C-496A-A13C-FF7D0CA7A6B4}" dt="2024-02-14T15:20:05.467" v="1059" actId="700"/>
+          <ac:spMkLst>
+            <pc:docMk/>
+            <pc:sldMk cId="1252257208" sldId="324"/>
+            <ac:spMk id="4" creationId="{AA1D8D56-7997-9149-E3C2-4243BC163909}"/>
+          </ac:spMkLst>
+        </pc:spChg>
+        <pc:spChg chg="mod ord">
+          <ac:chgData name="Hsia, Cheehong" userId="6bc27941-0d5a-4c11-8dfb-8bbe9da0911b" providerId="ADAL" clId="{5BE5096F-7F8C-496A-A13C-FF7D0CA7A6B4}" dt="2024-02-14T15:20:05.467" v="1059" actId="700"/>
+          <ac:spMkLst>
+            <pc:docMk/>
+            <pc:sldMk cId="1252257208" sldId="324"/>
+            <ac:spMk id="5" creationId="{B975B983-7343-8A2D-4201-2198F0BCF4D0}"/>
+          </ac:spMkLst>
+        </pc:spChg>
+      </pc:sldChg>
+      <pc:sldChg chg="modSp add mod modClrScheme chgLayout">
+        <pc:chgData name="Hsia, Cheehong" userId="6bc27941-0d5a-4c11-8dfb-8bbe9da0911b" providerId="ADAL" clId="{5BE5096F-7F8C-496A-A13C-FF7D0CA7A6B4}" dt="2024-02-14T15:20:33.361" v="1067" actId="700"/>
+        <pc:sldMkLst>
+          <pc:docMk/>
+          <pc:sldMk cId="1151322812" sldId="325"/>
+        </pc:sldMkLst>
+        <pc:spChg chg="mod ord">
+          <ac:chgData name="Hsia, Cheehong" userId="6bc27941-0d5a-4c11-8dfb-8bbe9da0911b" providerId="ADAL" clId="{5BE5096F-7F8C-496A-A13C-FF7D0CA7A6B4}" dt="2024-02-14T15:20:33.361" v="1067" actId="700"/>
+          <ac:spMkLst>
+            <pc:docMk/>
+            <pc:sldMk cId="1151322812" sldId="325"/>
+            <ac:spMk id="2" creationId="{509F87C3-07A1-0EDC-D899-CD15F645C37F}"/>
+          </ac:spMkLst>
+        </pc:spChg>
+        <pc:spChg chg="mod ord">
+          <ac:chgData name="Hsia, Cheehong" userId="6bc27941-0d5a-4c11-8dfb-8bbe9da0911b" providerId="ADAL" clId="{5BE5096F-7F8C-496A-A13C-FF7D0CA7A6B4}" dt="2024-02-14T15:20:33.361" v="1067" actId="700"/>
+          <ac:spMkLst>
+            <pc:docMk/>
+            <pc:sldMk cId="1151322812" sldId="325"/>
+            <ac:spMk id="3" creationId="{9B42B0F5-1A67-8C70-FDCF-4C93DB02E94F}"/>
+          </ac:spMkLst>
+        </pc:spChg>
+        <pc:spChg chg="mod ord">
+          <ac:chgData name="Hsia, Cheehong" userId="6bc27941-0d5a-4c11-8dfb-8bbe9da0911b" providerId="ADAL" clId="{5BE5096F-7F8C-496A-A13C-FF7D0CA7A6B4}" dt="2024-02-14T15:20:33.361" v="1067" actId="700"/>
+          <ac:spMkLst>
+            <pc:docMk/>
+            <pc:sldMk cId="1151322812" sldId="325"/>
+            <ac:spMk id="4" creationId="{AA1D8D56-7997-9149-E3C2-4243BC163909}"/>
+          </ac:spMkLst>
+        </pc:spChg>
+        <pc:spChg chg="mod ord">
+          <ac:chgData name="Hsia, Cheehong" userId="6bc27941-0d5a-4c11-8dfb-8bbe9da0911b" providerId="ADAL" clId="{5BE5096F-7F8C-496A-A13C-FF7D0CA7A6B4}" dt="2024-02-14T15:20:33.361" v="1067" actId="700"/>
+          <ac:spMkLst>
+            <pc:docMk/>
+            <pc:sldMk cId="1151322812" sldId="325"/>
+            <ac:spMk id="5" creationId="{B975B983-7343-8A2D-4201-2198F0BCF4D0}"/>
+          </ac:spMkLst>
+        </pc:spChg>
+      </pc:sldChg>
+      <pc:sldChg chg="modSp add mod modClrScheme chgLayout">
+        <pc:chgData name="Hsia, Cheehong" userId="6bc27941-0d5a-4c11-8dfb-8bbe9da0911b" providerId="ADAL" clId="{5BE5096F-7F8C-496A-A13C-FF7D0CA7A6B4}" dt="2024-02-14T15:21:09.600" v="1079" actId="700"/>
+        <pc:sldMkLst>
+          <pc:docMk/>
+          <pc:sldMk cId="2954588375" sldId="326"/>
+        </pc:sldMkLst>
+        <pc:spChg chg="mod ord">
+          <ac:chgData name="Hsia, Cheehong" userId="6bc27941-0d5a-4c11-8dfb-8bbe9da0911b" providerId="ADAL" clId="{5BE5096F-7F8C-496A-A13C-FF7D0CA7A6B4}" dt="2024-02-14T15:21:09.600" v="1079" actId="700"/>
+          <ac:spMkLst>
+            <pc:docMk/>
+            <pc:sldMk cId="2954588375" sldId="326"/>
+            <ac:spMk id="2" creationId="{66890E70-EDB5-4D8C-2B4F-029FA9E51D4E}"/>
+          </ac:spMkLst>
+        </pc:spChg>
+        <pc:spChg chg="mod ord">
+          <ac:chgData name="Hsia, Cheehong" userId="6bc27941-0d5a-4c11-8dfb-8bbe9da0911b" providerId="ADAL" clId="{5BE5096F-7F8C-496A-A13C-FF7D0CA7A6B4}" dt="2024-02-14T15:21:09.600" v="1079" actId="700"/>
+          <ac:spMkLst>
+            <pc:docMk/>
+            <pc:sldMk cId="2954588375" sldId="326"/>
+            <ac:spMk id="3" creationId="{0E733FD9-82CF-FCB7-F012-0EAA939C393E}"/>
+          </ac:spMkLst>
+        </pc:spChg>
+        <pc:spChg chg="mod ord">
+          <ac:chgData name="Hsia, Cheehong" userId="6bc27941-0d5a-4c11-8dfb-8bbe9da0911b" providerId="ADAL" clId="{5BE5096F-7F8C-496A-A13C-FF7D0CA7A6B4}" dt="2024-02-14T15:21:09.600" v="1079" actId="700"/>
+          <ac:spMkLst>
+            <pc:docMk/>
+            <pc:sldMk cId="2954588375" sldId="326"/>
+            <ac:spMk id="4" creationId="{F978620C-B722-98CC-0FA2-E22F5047512F}"/>
+          </ac:spMkLst>
+        </pc:spChg>
+        <pc:spChg chg="mod ord">
+          <ac:chgData name="Hsia, Cheehong" userId="6bc27941-0d5a-4c11-8dfb-8bbe9da0911b" providerId="ADAL" clId="{5BE5096F-7F8C-496A-A13C-FF7D0CA7A6B4}" dt="2024-02-14T15:21:09.600" v="1079" actId="700"/>
+          <ac:spMkLst>
+            <pc:docMk/>
+            <pc:sldMk cId="2954588375" sldId="326"/>
+            <ac:spMk id="5" creationId="{CC5FDBA6-3880-4279-5835-037270B656BC}"/>
+          </ac:spMkLst>
+        </pc:spChg>
+      </pc:sldChg>
+      <pc:sldChg chg="modSp add mod modClrScheme chgLayout">
+        <pc:chgData name="Hsia, Cheehong" userId="6bc27941-0d5a-4c11-8dfb-8bbe9da0911b" providerId="ADAL" clId="{5BE5096F-7F8C-496A-A13C-FF7D0CA7A6B4}" dt="2024-02-14T15:21:44.233" v="1090" actId="700"/>
+        <pc:sldMkLst>
+          <pc:docMk/>
+          <pc:sldMk cId="397487342" sldId="327"/>
+        </pc:sldMkLst>
+        <pc:spChg chg="mod ord">
+          <ac:chgData name="Hsia, Cheehong" userId="6bc27941-0d5a-4c11-8dfb-8bbe9da0911b" providerId="ADAL" clId="{5BE5096F-7F8C-496A-A13C-FF7D0CA7A6B4}" dt="2024-02-14T15:21:44.233" v="1090" actId="700"/>
+          <ac:spMkLst>
+            <pc:docMk/>
+            <pc:sldMk cId="397487342" sldId="327"/>
+            <ac:spMk id="2" creationId="{66890E70-EDB5-4D8C-2B4F-029FA9E51D4E}"/>
+          </ac:spMkLst>
+        </pc:spChg>
+        <pc:spChg chg="mod ord">
+          <ac:chgData name="Hsia, Cheehong" userId="6bc27941-0d5a-4c11-8dfb-8bbe9da0911b" providerId="ADAL" clId="{5BE5096F-7F8C-496A-A13C-FF7D0CA7A6B4}" dt="2024-02-14T15:21:44.233" v="1090" actId="700"/>
+          <ac:spMkLst>
+            <pc:docMk/>
+            <pc:sldMk cId="397487342" sldId="327"/>
+            <ac:spMk id="3" creationId="{0E733FD9-82CF-FCB7-F012-0EAA939C393E}"/>
+          </ac:spMkLst>
+        </pc:spChg>
+        <pc:spChg chg="mod ord">
+          <ac:chgData name="Hsia, Cheehong" userId="6bc27941-0d5a-4c11-8dfb-8bbe9da0911b" providerId="ADAL" clId="{5BE5096F-7F8C-496A-A13C-FF7D0CA7A6B4}" dt="2024-02-14T15:21:44.233" v="1090" actId="700"/>
+          <ac:spMkLst>
+            <pc:docMk/>
+            <pc:sldMk cId="397487342" sldId="327"/>
+            <ac:spMk id="4" creationId="{F978620C-B722-98CC-0FA2-E22F5047512F}"/>
+          </ac:spMkLst>
+        </pc:spChg>
+        <pc:spChg chg="mod ord">
+          <ac:chgData name="Hsia, Cheehong" userId="6bc27941-0d5a-4c11-8dfb-8bbe9da0911b" providerId="ADAL" clId="{5BE5096F-7F8C-496A-A13C-FF7D0CA7A6B4}" dt="2024-02-14T15:21:44.233" v="1090" actId="700"/>
+          <ac:spMkLst>
+            <pc:docMk/>
+            <pc:sldMk cId="397487342" sldId="327"/>
+            <ac:spMk id="5" creationId="{CC5FDBA6-3880-4279-5835-037270B656BC}"/>
+          </ac:spMkLst>
+        </pc:spChg>
+      </pc:sldChg>
+      <pc:sldChg chg="modSp add mod modClrScheme chgLayout">
+        <pc:chgData name="Hsia, Cheehong" userId="6bc27941-0d5a-4c11-8dfb-8bbe9da0911b" providerId="ADAL" clId="{5BE5096F-7F8C-496A-A13C-FF7D0CA7A6B4}" dt="2024-02-14T15:22:13.964" v="1098" actId="700"/>
+        <pc:sldMkLst>
+          <pc:docMk/>
+          <pc:sldMk cId="3775546726" sldId="328"/>
+        </pc:sldMkLst>
+        <pc:spChg chg="mod ord">
+          <ac:chgData name="Hsia, Cheehong" userId="6bc27941-0d5a-4c11-8dfb-8bbe9da0911b" providerId="ADAL" clId="{5BE5096F-7F8C-496A-A13C-FF7D0CA7A6B4}" dt="2024-02-14T15:22:13.964" v="1098" actId="700"/>
+          <ac:spMkLst>
+            <pc:docMk/>
+            <pc:sldMk cId="3775546726" sldId="328"/>
+            <ac:spMk id="2" creationId="{66890E70-EDB5-4D8C-2B4F-029FA9E51D4E}"/>
+          </ac:spMkLst>
+        </pc:spChg>
+        <pc:spChg chg="mod ord">
+          <ac:chgData name="Hsia, Cheehong" userId="6bc27941-0d5a-4c11-8dfb-8bbe9da0911b" providerId="ADAL" clId="{5BE5096F-7F8C-496A-A13C-FF7D0CA7A6B4}" dt="2024-02-14T15:22:13.964" v="1098" actId="700"/>
+          <ac:spMkLst>
+            <pc:docMk/>
+            <pc:sldMk cId="3775546726" sldId="328"/>
+            <ac:spMk id="3" creationId="{0E733FD9-82CF-FCB7-F012-0EAA939C393E}"/>
+          </ac:spMkLst>
+        </pc:spChg>
+        <pc:spChg chg="mod ord">
+          <ac:chgData name="Hsia, Cheehong" userId="6bc27941-0d5a-4c11-8dfb-8bbe9da0911b" providerId="ADAL" clId="{5BE5096F-7F8C-496A-A13C-FF7D0CA7A6B4}" dt="2024-02-14T15:22:13.964" v="1098" actId="700"/>
+          <ac:spMkLst>
+            <pc:docMk/>
+            <pc:sldMk cId="3775546726" sldId="328"/>
+            <ac:spMk id="4" creationId="{F978620C-B722-98CC-0FA2-E22F5047512F}"/>
+          </ac:spMkLst>
+        </pc:spChg>
+        <pc:spChg chg="mod ord">
+          <ac:chgData name="Hsia, Cheehong" userId="6bc27941-0d5a-4c11-8dfb-8bbe9da0911b" providerId="ADAL" clId="{5BE5096F-7F8C-496A-A13C-FF7D0CA7A6B4}" dt="2024-02-14T15:22:13.964" v="1098" actId="700"/>
+          <ac:spMkLst>
+            <pc:docMk/>
+            <pc:sldMk cId="3775546726" sldId="328"/>
+            <ac:spMk id="5" creationId="{CC5FDBA6-3880-4279-5835-037270B656BC}"/>
+          </ac:spMkLst>
+        </pc:spChg>
+      </pc:sldChg>
+      <pc:sldChg chg="modSp add mod modClrScheme chgLayout">
+        <pc:chgData name="Hsia, Cheehong" userId="6bc27941-0d5a-4c11-8dfb-8bbe9da0911b" providerId="ADAL" clId="{5BE5096F-7F8C-496A-A13C-FF7D0CA7A6B4}" dt="2024-02-14T15:22:48.747" v="1106" actId="700"/>
+        <pc:sldMkLst>
+          <pc:docMk/>
+          <pc:sldMk cId="192906094" sldId="329"/>
+        </pc:sldMkLst>
+        <pc:spChg chg="mod ord">
+          <ac:chgData name="Hsia, Cheehong" userId="6bc27941-0d5a-4c11-8dfb-8bbe9da0911b" providerId="ADAL" clId="{5BE5096F-7F8C-496A-A13C-FF7D0CA7A6B4}" dt="2024-02-14T15:22:48.747" v="1106" actId="700"/>
+          <ac:spMkLst>
+            <pc:docMk/>
+            <pc:sldMk cId="192906094" sldId="329"/>
+            <ac:spMk id="2" creationId="{66890E70-EDB5-4D8C-2B4F-029FA9E51D4E}"/>
+          </ac:spMkLst>
+        </pc:spChg>
+        <pc:spChg chg="mod ord">
+          <ac:chgData name="Hsia, Cheehong" userId="6bc27941-0d5a-4c11-8dfb-8bbe9da0911b" providerId="ADAL" clId="{5BE5096F-7F8C-496A-A13C-FF7D0CA7A6B4}" dt="2024-02-14T15:22:48.747" v="1106" actId="700"/>
+          <ac:spMkLst>
+            <pc:docMk/>
+            <pc:sldMk cId="192906094" sldId="329"/>
+            <ac:spMk id="3" creationId="{0E733FD9-82CF-FCB7-F012-0EAA939C393E}"/>
+          </ac:spMkLst>
+        </pc:spChg>
+        <pc:spChg chg="mod ord">
+          <ac:chgData name="Hsia, Cheehong" userId="6bc27941-0d5a-4c11-8dfb-8bbe9da0911b" providerId="ADAL" clId="{5BE5096F-7F8C-496A-A13C-FF7D0CA7A6B4}" dt="2024-02-14T15:22:48.747" v="1106" actId="700"/>
+          <ac:spMkLst>
+            <pc:docMk/>
+            <pc:sldMk cId="192906094" sldId="329"/>
+            <ac:spMk id="4" creationId="{F978620C-B722-98CC-0FA2-E22F5047512F}"/>
+          </ac:spMkLst>
+        </pc:spChg>
+        <pc:spChg chg="mod ord">
+          <ac:chgData name="Hsia, Cheehong" userId="6bc27941-0d5a-4c11-8dfb-8bbe9da0911b" providerId="ADAL" clId="{5BE5096F-7F8C-496A-A13C-FF7D0CA7A6B4}" dt="2024-02-14T15:22:48.747" v="1106" actId="700"/>
+          <ac:spMkLst>
+            <pc:docMk/>
+            <pc:sldMk cId="192906094" sldId="329"/>
+            <ac:spMk id="5" creationId="{CC5FDBA6-3880-4279-5835-037270B656BC}"/>
+          </ac:spMkLst>
+        </pc:spChg>
+      </pc:sldChg>
+      <pc:sldChg chg="modSp add mod modClrScheme chgLayout">
+        <pc:chgData name="Hsia, Cheehong" userId="6bc27941-0d5a-4c11-8dfb-8bbe9da0911b" providerId="ADAL" clId="{5BE5096F-7F8C-496A-A13C-FF7D0CA7A6B4}" dt="2024-02-14T15:23:11.155" v="1113" actId="700"/>
+        <pc:sldMkLst>
+          <pc:docMk/>
+          <pc:sldMk cId="727514259" sldId="330"/>
+        </pc:sldMkLst>
+        <pc:spChg chg="mod ord">
+          <ac:chgData name="Hsia, Cheehong" userId="6bc27941-0d5a-4c11-8dfb-8bbe9da0911b" providerId="ADAL" clId="{5BE5096F-7F8C-496A-A13C-FF7D0CA7A6B4}" dt="2024-02-14T15:23:11.155" v="1113" actId="700"/>
+          <ac:spMkLst>
+            <pc:docMk/>
+            <pc:sldMk cId="727514259" sldId="330"/>
+            <ac:spMk id="2" creationId="{66890E70-EDB5-4D8C-2B4F-029FA9E51D4E}"/>
+          </ac:spMkLst>
+        </pc:spChg>
+        <pc:spChg chg="mod ord">
+          <ac:chgData name="Hsia, Cheehong" userId="6bc27941-0d5a-4c11-8dfb-8bbe9da0911b" providerId="ADAL" clId="{5BE5096F-7F8C-496A-A13C-FF7D0CA7A6B4}" dt="2024-02-14T15:23:11.155" v="1113" actId="700"/>
+          <ac:spMkLst>
+            <pc:docMk/>
+            <pc:sldMk cId="727514259" sldId="330"/>
+            <ac:spMk id="3" creationId="{0E733FD9-82CF-FCB7-F012-0EAA939C393E}"/>
+          </ac:spMkLst>
+        </pc:spChg>
+        <pc:spChg chg="mod ord">
+          <ac:chgData name="Hsia, Cheehong" userId="6bc27941-0d5a-4c11-8dfb-8bbe9da0911b" providerId="ADAL" clId="{5BE5096F-7F8C-496A-A13C-FF7D0CA7A6B4}" dt="2024-02-14T15:23:11.155" v="1113" actId="700"/>
+          <ac:spMkLst>
+            <pc:docMk/>
+            <pc:sldMk cId="727514259" sldId="330"/>
+            <ac:spMk id="4" creationId="{F978620C-B722-98CC-0FA2-E22F5047512F}"/>
+          </ac:spMkLst>
+        </pc:spChg>
+        <pc:spChg chg="mod ord">
+          <ac:chgData name="Hsia, Cheehong" userId="6bc27941-0d5a-4c11-8dfb-8bbe9da0911b" providerId="ADAL" clId="{5BE5096F-7F8C-496A-A13C-FF7D0CA7A6B4}" dt="2024-02-14T15:23:11.155" v="1113" actId="700"/>
+          <ac:spMkLst>
+            <pc:docMk/>
+            <pc:sldMk cId="727514259" sldId="330"/>
+            <ac:spMk id="5" creationId="{CC5FDBA6-3880-4279-5835-037270B656BC}"/>
+          </ac:spMkLst>
+        </pc:spChg>
+      </pc:sldChg>
+      <pc:sldChg chg="modSp add mod modClrScheme chgLayout">
+        <pc:chgData name="Hsia, Cheehong" userId="6bc27941-0d5a-4c11-8dfb-8bbe9da0911b" providerId="ADAL" clId="{5BE5096F-7F8C-496A-A13C-FF7D0CA7A6B4}" dt="2024-02-14T15:24:02.325" v="1124" actId="700"/>
+        <pc:sldMkLst>
+          <pc:docMk/>
+          <pc:sldMk cId="3785406611" sldId="331"/>
+        </pc:sldMkLst>
+        <pc:spChg chg="mod ord">
+          <ac:chgData name="Hsia, Cheehong" userId="6bc27941-0d5a-4c11-8dfb-8bbe9da0911b" providerId="ADAL" clId="{5BE5096F-7F8C-496A-A13C-FF7D0CA7A6B4}" dt="2024-02-14T15:24:02.325" v="1124" actId="700"/>
+          <ac:spMkLst>
+            <pc:docMk/>
+            <pc:sldMk cId="3785406611" sldId="331"/>
+            <ac:spMk id="2" creationId="{AD90CEB0-783B-5FA4-1028-D4B692C5B2CE}"/>
+          </ac:spMkLst>
+        </pc:spChg>
+        <pc:spChg chg="mod ord">
+          <ac:chgData name="Hsia, Cheehong" userId="6bc27941-0d5a-4c11-8dfb-8bbe9da0911b" providerId="ADAL" clId="{5BE5096F-7F8C-496A-A13C-FF7D0CA7A6B4}" dt="2024-02-14T15:24:02.325" v="1124" actId="700"/>
+          <ac:spMkLst>
+            <pc:docMk/>
+            <pc:sldMk cId="3785406611" sldId="331"/>
+            <ac:spMk id="3" creationId="{11925C94-7DB2-3EEF-C390-EA8A563BE132}"/>
+          </ac:spMkLst>
+        </pc:spChg>
+        <pc:spChg chg="mod ord">
+          <ac:chgData name="Hsia, Cheehong" userId="6bc27941-0d5a-4c11-8dfb-8bbe9da0911b" providerId="ADAL" clId="{5BE5096F-7F8C-496A-A13C-FF7D0CA7A6B4}" dt="2024-02-14T15:24:02.325" v="1124" actId="700"/>
+          <ac:spMkLst>
+            <pc:docMk/>
+            <pc:sldMk cId="3785406611" sldId="331"/>
+            <ac:spMk id="4" creationId="{3859056E-FEDA-2D8C-90B8-7DB995ECB8A4}"/>
+          </ac:spMkLst>
+        </pc:spChg>
+        <pc:spChg chg="mod ord">
+          <ac:chgData name="Hsia, Cheehong" userId="6bc27941-0d5a-4c11-8dfb-8bbe9da0911b" providerId="ADAL" clId="{5BE5096F-7F8C-496A-A13C-FF7D0CA7A6B4}" dt="2024-02-14T15:24:02.325" v="1124" actId="700"/>
+          <ac:spMkLst>
+            <pc:docMk/>
+            <pc:sldMk cId="3785406611" sldId="331"/>
+            <ac:spMk id="5" creationId="{1D8E0DE9-59C5-51BC-C26E-CD16F2ECED89}"/>
+          </ac:spMkLst>
+        </pc:spChg>
+      </pc:sldChg>
+      <pc:sldChg chg="modSp add mod modClrScheme chgLayout">
+        <pc:chgData name="Hsia, Cheehong" userId="6bc27941-0d5a-4c11-8dfb-8bbe9da0911b" providerId="ADAL" clId="{5BE5096F-7F8C-496A-A13C-FF7D0CA7A6B4}" dt="2024-02-14T15:24:31.123" v="1134" actId="700"/>
+        <pc:sldMkLst>
+          <pc:docMk/>
+          <pc:sldMk cId="3728195757" sldId="332"/>
+        </pc:sldMkLst>
+        <pc:spChg chg="mod ord">
+          <ac:chgData name="Hsia, Cheehong" userId="6bc27941-0d5a-4c11-8dfb-8bbe9da0911b" providerId="ADAL" clId="{5BE5096F-7F8C-496A-A13C-FF7D0CA7A6B4}" dt="2024-02-14T15:24:31.123" v="1134" actId="700"/>
+          <ac:spMkLst>
+            <pc:docMk/>
+            <pc:sldMk cId="3728195757" sldId="332"/>
+            <ac:spMk id="2" creationId="{AD90CEB0-783B-5FA4-1028-D4B692C5B2CE}"/>
+          </ac:spMkLst>
+        </pc:spChg>
+        <pc:spChg chg="mod ord">
+          <ac:chgData name="Hsia, Cheehong" userId="6bc27941-0d5a-4c11-8dfb-8bbe9da0911b" providerId="ADAL" clId="{5BE5096F-7F8C-496A-A13C-FF7D0CA7A6B4}" dt="2024-02-14T15:24:31.123" v="1134" actId="700"/>
+          <ac:spMkLst>
+            <pc:docMk/>
+            <pc:sldMk cId="3728195757" sldId="332"/>
+            <ac:spMk id="3" creationId="{11925C94-7DB2-3EEF-C390-EA8A563BE132}"/>
+          </ac:spMkLst>
+        </pc:spChg>
+        <pc:spChg chg="mod ord">
+          <ac:chgData name="Hsia, Cheehong" userId="6bc27941-0d5a-4c11-8dfb-8bbe9da0911b" providerId="ADAL" clId="{5BE5096F-7F8C-496A-A13C-FF7D0CA7A6B4}" dt="2024-02-14T15:24:31.123" v="1134" actId="700"/>
+          <ac:spMkLst>
+            <pc:docMk/>
+            <pc:sldMk cId="3728195757" sldId="332"/>
+            <ac:spMk id="4" creationId="{3859056E-FEDA-2D8C-90B8-7DB995ECB8A4}"/>
+          </ac:spMkLst>
+        </pc:spChg>
+        <pc:spChg chg="mod ord">
+          <ac:chgData name="Hsia, Cheehong" userId="6bc27941-0d5a-4c11-8dfb-8bbe9da0911b" providerId="ADAL" clId="{5BE5096F-7F8C-496A-A13C-FF7D0CA7A6B4}" dt="2024-02-14T15:24:31.123" v="1134" actId="700"/>
+          <ac:spMkLst>
+            <pc:docMk/>
+            <pc:sldMk cId="3728195757" sldId="332"/>
+            <ac:spMk id="5" creationId="{1D8E0DE9-59C5-51BC-C26E-CD16F2ECED89}"/>
+          </ac:spMkLst>
+        </pc:spChg>
+      </pc:sldChg>
+      <pc:sldChg chg="modSp add mod modClrScheme chgLayout">
+        <pc:chgData name="Hsia, Cheehong" userId="6bc27941-0d5a-4c11-8dfb-8bbe9da0911b" providerId="ADAL" clId="{5BE5096F-7F8C-496A-A13C-FF7D0CA7A6B4}" dt="2024-02-14T15:25:03.031" v="1144" actId="700"/>
+        <pc:sldMkLst>
+          <pc:docMk/>
+          <pc:sldMk cId="1070377419" sldId="333"/>
+        </pc:sldMkLst>
+        <pc:spChg chg="mod ord">
+          <ac:chgData name="Hsia, Cheehong" userId="6bc27941-0d5a-4c11-8dfb-8bbe9da0911b" providerId="ADAL" clId="{5BE5096F-7F8C-496A-A13C-FF7D0CA7A6B4}" dt="2024-02-14T15:25:03.031" v="1144" actId="700"/>
+          <ac:spMkLst>
+            <pc:docMk/>
+            <pc:sldMk cId="1070377419" sldId="333"/>
+            <ac:spMk id="2" creationId="{AD90CEB0-783B-5FA4-1028-D4B692C5B2CE}"/>
+          </ac:spMkLst>
+        </pc:spChg>
+        <pc:spChg chg="mod ord">
+          <ac:chgData name="Hsia, Cheehong" userId="6bc27941-0d5a-4c11-8dfb-8bbe9da0911b" providerId="ADAL" clId="{5BE5096F-7F8C-496A-A13C-FF7D0CA7A6B4}" dt="2024-02-14T15:25:03.031" v="1144" actId="700"/>
+          <ac:spMkLst>
+            <pc:docMk/>
+            <pc:sldMk cId="1070377419" sldId="333"/>
+            <ac:spMk id="3" creationId="{11925C94-7DB2-3EEF-C390-EA8A563BE132}"/>
+          </ac:spMkLst>
+        </pc:spChg>
+        <pc:spChg chg="mod ord">
+          <ac:chgData name="Hsia, Cheehong" userId="6bc27941-0d5a-4c11-8dfb-8bbe9da0911b" providerId="ADAL" clId="{5BE5096F-7F8C-496A-A13C-FF7D0CA7A6B4}" dt="2024-02-14T15:25:03.031" v="1144" actId="700"/>
+          <ac:spMkLst>
+            <pc:docMk/>
+            <pc:sldMk cId="1070377419" sldId="333"/>
+            <ac:spMk id="4" creationId="{3859056E-FEDA-2D8C-90B8-7DB995ECB8A4}"/>
+          </ac:spMkLst>
+        </pc:spChg>
+        <pc:spChg chg="mod ord">
+          <ac:chgData name="Hsia, Cheehong" userId="6bc27941-0d5a-4c11-8dfb-8bbe9da0911b" providerId="ADAL" clId="{5BE5096F-7F8C-496A-A13C-FF7D0CA7A6B4}" dt="2024-02-14T15:25:03.031" v="1144" actId="700"/>
+          <ac:spMkLst>
+            <pc:docMk/>
+            <pc:sldMk cId="1070377419" sldId="333"/>
+            <ac:spMk id="5" creationId="{1D8E0DE9-59C5-51BC-C26E-CD16F2ECED89}"/>
+          </ac:spMkLst>
+        </pc:spChg>
+      </pc:sldChg>
+      <pc:sldChg chg="modSp add mod modClrScheme chgLayout">
+        <pc:chgData name="Hsia, Cheehong" userId="6bc27941-0d5a-4c11-8dfb-8bbe9da0911b" providerId="ADAL" clId="{5BE5096F-7F8C-496A-A13C-FF7D0CA7A6B4}" dt="2024-02-14T15:25:22.883" v="1151" actId="700"/>
+        <pc:sldMkLst>
+          <pc:docMk/>
+          <pc:sldMk cId="3134009850" sldId="334"/>
+        </pc:sldMkLst>
+        <pc:spChg chg="mod ord">
+          <ac:chgData name="Hsia, Cheehong" userId="6bc27941-0d5a-4c11-8dfb-8bbe9da0911b" providerId="ADAL" clId="{5BE5096F-7F8C-496A-A13C-FF7D0CA7A6B4}" dt="2024-02-14T15:25:22.883" v="1151" actId="700"/>
+          <ac:spMkLst>
+            <pc:docMk/>
+            <pc:sldMk cId="3134009850" sldId="334"/>
+            <ac:spMk id="2" creationId="{AD90CEB0-783B-5FA4-1028-D4B692C5B2CE}"/>
+          </ac:spMkLst>
+        </pc:spChg>
+        <pc:spChg chg="mod ord">
+          <ac:chgData name="Hsia, Cheehong" userId="6bc27941-0d5a-4c11-8dfb-8bbe9da0911b" providerId="ADAL" clId="{5BE5096F-7F8C-496A-A13C-FF7D0CA7A6B4}" dt="2024-02-14T15:25:22.883" v="1151" actId="700"/>
+          <ac:spMkLst>
+            <pc:docMk/>
+            <pc:sldMk cId="3134009850" sldId="334"/>
+            <ac:spMk id="3" creationId="{11925C94-7DB2-3EEF-C390-EA8A563BE132}"/>
+          </ac:spMkLst>
+        </pc:spChg>
+        <pc:spChg chg="mod ord">
+          <ac:chgData name="Hsia, Cheehong" userId="6bc27941-0d5a-4c11-8dfb-8bbe9da0911b" providerId="ADAL" clId="{5BE5096F-7F8C-496A-A13C-FF7D0CA7A6B4}" dt="2024-02-14T15:25:22.883" v="1151" actId="700"/>
+          <ac:spMkLst>
+            <pc:docMk/>
+            <pc:sldMk cId="3134009850" sldId="334"/>
+            <ac:spMk id="4" creationId="{3859056E-FEDA-2D8C-90B8-7DB995ECB8A4}"/>
+          </ac:spMkLst>
+        </pc:spChg>
+        <pc:spChg chg="mod ord">
+          <ac:chgData name="Hsia, Cheehong" userId="6bc27941-0d5a-4c11-8dfb-8bbe9da0911b" providerId="ADAL" clId="{5BE5096F-7F8C-496A-A13C-FF7D0CA7A6B4}" dt="2024-02-14T15:25:22.883" v="1151" actId="700"/>
+          <ac:spMkLst>
+            <pc:docMk/>
+            <pc:sldMk cId="3134009850" sldId="334"/>
+            <ac:spMk id="5" creationId="{1D8E0DE9-59C5-51BC-C26E-CD16F2ECED89}"/>
+          </ac:spMkLst>
+        </pc:spChg>
+      </pc:sldChg>
+      <pc:sldChg chg="modSp add mod modClrScheme chgLayout">
+        <pc:chgData name="Hsia, Cheehong" userId="6bc27941-0d5a-4c11-8dfb-8bbe9da0911b" providerId="ADAL" clId="{5BE5096F-7F8C-496A-A13C-FF7D0CA7A6B4}" dt="2024-02-14T15:25:46.858" v="1159" actId="700"/>
+        <pc:sldMkLst>
+          <pc:docMk/>
+          <pc:sldMk cId="2446414719" sldId="335"/>
+        </pc:sldMkLst>
+        <pc:spChg chg="mod ord">
+          <ac:chgData name="Hsia, Cheehong" userId="6bc27941-0d5a-4c11-8dfb-8bbe9da0911b" providerId="ADAL" clId="{5BE5096F-7F8C-496A-A13C-FF7D0CA7A6B4}" dt="2024-02-14T15:25:46.858" v="1159" actId="700"/>
+          <ac:spMkLst>
+            <pc:docMk/>
+            <pc:sldMk cId="2446414719" sldId="335"/>
+            <ac:spMk id="2" creationId="{AD90CEB0-783B-5FA4-1028-D4B692C5B2CE}"/>
+          </ac:spMkLst>
+        </pc:spChg>
+        <pc:spChg chg="mod ord">
+          <ac:chgData name="Hsia, Cheehong" userId="6bc27941-0d5a-4c11-8dfb-8bbe9da0911b" providerId="ADAL" clId="{5BE5096F-7F8C-496A-A13C-FF7D0CA7A6B4}" dt="2024-02-14T15:25:46.858" v="1159" actId="700"/>
+          <ac:spMkLst>
+            <pc:docMk/>
+            <pc:sldMk cId="2446414719" sldId="335"/>
+            <ac:spMk id="3" creationId="{11925C94-7DB2-3EEF-C390-EA8A563BE132}"/>
+          </ac:spMkLst>
+        </pc:spChg>
+        <pc:spChg chg="mod ord">
+          <ac:chgData name="Hsia, Cheehong" userId="6bc27941-0d5a-4c11-8dfb-8bbe9da0911b" providerId="ADAL" clId="{5BE5096F-7F8C-496A-A13C-FF7D0CA7A6B4}" dt="2024-02-14T15:25:46.858" v="1159" actId="700"/>
+          <ac:spMkLst>
+            <pc:docMk/>
+            <pc:sldMk cId="2446414719" sldId="335"/>
+            <ac:spMk id="4" creationId="{3859056E-FEDA-2D8C-90B8-7DB995ECB8A4}"/>
+          </ac:spMkLst>
+        </pc:spChg>
+        <pc:spChg chg="mod ord">
+          <ac:chgData name="Hsia, Cheehong" userId="6bc27941-0d5a-4c11-8dfb-8bbe9da0911b" providerId="ADAL" clId="{5BE5096F-7F8C-496A-A13C-FF7D0CA7A6B4}" dt="2024-02-14T15:25:46.858" v="1159" actId="700"/>
+          <ac:spMkLst>
+            <pc:docMk/>
+            <pc:sldMk cId="2446414719" sldId="335"/>
+            <ac:spMk id="5" creationId="{1D8E0DE9-59C5-51BC-C26E-CD16F2ECED89}"/>
+          </ac:spMkLst>
+        </pc:spChg>
+      </pc:sldChg>
+      <pc:sldChg chg="modSp add mod modClrScheme chgLayout">
+        <pc:chgData name="Hsia, Cheehong" userId="6bc27941-0d5a-4c11-8dfb-8bbe9da0911b" providerId="ADAL" clId="{5BE5096F-7F8C-496A-A13C-FF7D0CA7A6B4}" dt="2024-02-14T15:26:21.452" v="1169" actId="700"/>
+        <pc:sldMkLst>
+          <pc:docMk/>
+          <pc:sldMk cId="2718256781" sldId="336"/>
+        </pc:sldMkLst>
+        <pc:spChg chg="mod ord">
+          <ac:chgData name="Hsia, Cheehong" userId="6bc27941-0d5a-4c11-8dfb-8bbe9da0911b" providerId="ADAL" clId="{5BE5096F-7F8C-496A-A13C-FF7D0CA7A6B4}" dt="2024-02-14T15:26:21.452" v="1169" actId="700"/>
+          <ac:spMkLst>
+            <pc:docMk/>
+            <pc:sldMk cId="2718256781" sldId="336"/>
+            <ac:spMk id="2" creationId="{9024BA51-C630-BA2A-58B6-69F9BB6816A0}"/>
+          </ac:spMkLst>
+        </pc:spChg>
+        <pc:spChg chg="mod ord">
+          <ac:chgData name="Hsia, Cheehong" userId="6bc27941-0d5a-4c11-8dfb-8bbe9da0911b" providerId="ADAL" clId="{5BE5096F-7F8C-496A-A13C-FF7D0CA7A6B4}" dt="2024-02-14T15:26:21.452" v="1169" actId="700"/>
+          <ac:spMkLst>
+            <pc:docMk/>
+            <pc:sldMk cId="2718256781" sldId="336"/>
+            <ac:spMk id="3" creationId="{2077BF95-1F9E-AA05-3D0B-83E184AA9C48}"/>
+          </ac:spMkLst>
+        </pc:spChg>
+        <pc:spChg chg="mod ord">
+          <ac:chgData name="Hsia, Cheehong" userId="6bc27941-0d5a-4c11-8dfb-8bbe9da0911b" providerId="ADAL" clId="{5BE5096F-7F8C-496A-A13C-FF7D0CA7A6B4}" dt="2024-02-14T15:26:21.452" v="1169" actId="700"/>
+          <ac:spMkLst>
+            <pc:docMk/>
+            <pc:sldMk cId="2718256781" sldId="336"/>
+            <ac:spMk id="4" creationId="{8946D5DF-DDC9-DF42-4883-DA9549CF8DE5}"/>
+          </ac:spMkLst>
+        </pc:spChg>
+        <pc:spChg chg="mod ord">
+          <ac:chgData name="Hsia, Cheehong" userId="6bc27941-0d5a-4c11-8dfb-8bbe9da0911b" providerId="ADAL" clId="{5BE5096F-7F8C-496A-A13C-FF7D0CA7A6B4}" dt="2024-02-14T15:26:21.452" v="1169" actId="700"/>
+          <ac:spMkLst>
+            <pc:docMk/>
+            <pc:sldMk cId="2718256781" sldId="336"/>
+            <ac:spMk id="5" creationId="{860EF69F-79FC-8315-A261-A0DDABAAA234}"/>
+          </ac:spMkLst>
+        </pc:spChg>
+      </pc:sldChg>
+      <pc:sldChg chg="modSp add mod modClrScheme chgLayout">
+        <pc:chgData name="Hsia, Cheehong" userId="6bc27941-0d5a-4c11-8dfb-8bbe9da0911b" providerId="ADAL" clId="{5BE5096F-7F8C-496A-A13C-FF7D0CA7A6B4}" dt="2024-02-14T15:26:43.457" v="1178" actId="700"/>
+        <pc:sldMkLst>
+          <pc:docMk/>
+          <pc:sldMk cId="116660721" sldId="337"/>
+        </pc:sldMkLst>
+        <pc:spChg chg="mod ord">
+          <ac:chgData name="Hsia, Cheehong" userId="6bc27941-0d5a-4c11-8dfb-8bbe9da0911b" providerId="ADAL" clId="{5BE5096F-7F8C-496A-A13C-FF7D0CA7A6B4}" dt="2024-02-14T15:26:43.457" v="1178" actId="700"/>
+          <ac:spMkLst>
+            <pc:docMk/>
+            <pc:sldMk cId="116660721" sldId="337"/>
+            <ac:spMk id="2" creationId="{9024BA51-C630-BA2A-58B6-69F9BB6816A0}"/>
+          </ac:spMkLst>
+        </pc:spChg>
+        <pc:spChg chg="mod ord">
+          <ac:chgData name="Hsia, Cheehong" userId="6bc27941-0d5a-4c11-8dfb-8bbe9da0911b" providerId="ADAL" clId="{5BE5096F-7F8C-496A-A13C-FF7D0CA7A6B4}" dt="2024-02-14T15:26:43.457" v="1178" actId="700"/>
+          <ac:spMkLst>
+            <pc:docMk/>
+            <pc:sldMk cId="116660721" sldId="337"/>
+            <ac:spMk id="3" creationId="{2077BF95-1F9E-AA05-3D0B-83E184AA9C48}"/>
+          </ac:spMkLst>
+        </pc:spChg>
+        <pc:spChg chg="mod ord">
+          <ac:chgData name="Hsia, Cheehong" userId="6bc27941-0d5a-4c11-8dfb-8bbe9da0911b" providerId="ADAL" clId="{5BE5096F-7F8C-496A-A13C-FF7D0CA7A6B4}" dt="2024-02-14T15:26:43.457" v="1178" actId="700"/>
+          <ac:spMkLst>
+            <pc:docMk/>
+            <pc:sldMk cId="116660721" sldId="337"/>
+            <ac:spMk id="4" creationId="{8946D5DF-DDC9-DF42-4883-DA9549CF8DE5}"/>
+          </ac:spMkLst>
+        </pc:spChg>
+        <pc:spChg chg="mod ord">
+          <ac:chgData name="Hsia, Cheehong" userId="6bc27941-0d5a-4c11-8dfb-8bbe9da0911b" providerId="ADAL" clId="{5BE5096F-7F8C-496A-A13C-FF7D0CA7A6B4}" dt="2024-02-14T15:26:43.457" v="1178" actId="700"/>
+          <ac:spMkLst>
+            <pc:docMk/>
+            <pc:sldMk cId="116660721" sldId="337"/>
+            <ac:spMk id="5" creationId="{860EF69F-79FC-8315-A261-A0DDABAAA234}"/>
+          </ac:spMkLst>
+        </pc:spChg>
+      </pc:sldChg>
+      <pc:sldChg chg="modSp add mod modClrScheme chgLayout">
+        <pc:chgData name="Hsia, Cheehong" userId="6bc27941-0d5a-4c11-8dfb-8bbe9da0911b" providerId="ADAL" clId="{5BE5096F-7F8C-496A-A13C-FF7D0CA7A6B4}" dt="2024-02-14T15:28:03.924" v="1329" actId="700"/>
+        <pc:sldMkLst>
+          <pc:docMk/>
+          <pc:sldMk cId="781062866" sldId="338"/>
+        </pc:sldMkLst>
+        <pc:spChg chg="mod ord">
+          <ac:chgData name="Hsia, Cheehong" userId="6bc27941-0d5a-4c11-8dfb-8bbe9da0911b" providerId="ADAL" clId="{5BE5096F-7F8C-496A-A13C-FF7D0CA7A6B4}" dt="2024-02-14T15:28:03.924" v="1329" actId="700"/>
+          <ac:spMkLst>
+            <pc:docMk/>
+            <pc:sldMk cId="781062866" sldId="338"/>
+            <ac:spMk id="2" creationId="{9024BA51-C630-BA2A-58B6-69F9BB6816A0}"/>
+          </ac:spMkLst>
+        </pc:spChg>
+        <pc:spChg chg="mod ord">
+          <ac:chgData name="Hsia, Cheehong" userId="6bc27941-0d5a-4c11-8dfb-8bbe9da0911b" providerId="ADAL" clId="{5BE5096F-7F8C-496A-A13C-FF7D0CA7A6B4}" dt="2024-02-14T15:28:03.924" v="1329" actId="700"/>
+          <ac:spMkLst>
+            <pc:docMk/>
+            <pc:sldMk cId="781062866" sldId="338"/>
+            <ac:spMk id="3" creationId="{2077BF95-1F9E-AA05-3D0B-83E184AA9C48}"/>
+          </ac:spMkLst>
+        </pc:spChg>
+        <pc:spChg chg="mod ord">
+          <ac:chgData name="Hsia, Cheehong" userId="6bc27941-0d5a-4c11-8dfb-8bbe9da0911b" providerId="ADAL" clId="{5BE5096F-7F8C-496A-A13C-FF7D0CA7A6B4}" dt="2024-02-14T15:28:03.924" v="1329" actId="700"/>
+          <ac:spMkLst>
+            <pc:docMk/>
+            <pc:sldMk cId="781062866" sldId="338"/>
+            <ac:spMk id="4" creationId="{8946D5DF-DDC9-DF42-4883-DA9549CF8DE5}"/>
+          </ac:spMkLst>
+        </pc:spChg>
+        <pc:spChg chg="mod ord">
+          <ac:chgData name="Hsia, Cheehong" userId="6bc27941-0d5a-4c11-8dfb-8bbe9da0911b" providerId="ADAL" clId="{5BE5096F-7F8C-496A-A13C-FF7D0CA7A6B4}" dt="2024-02-14T15:28:03.924" v="1329" actId="700"/>
+          <ac:spMkLst>
+            <pc:docMk/>
+            <pc:sldMk cId="781062866" sldId="338"/>
+            <ac:spMk id="5" creationId="{860EF69F-79FC-8315-A261-A0DDABAAA234}"/>
+          </ac:spMkLst>
+        </pc:spChg>
+      </pc:sldChg>
+      <pc:sldChg chg="modSp add mod modClrScheme chgLayout">
+        <pc:chgData name="Hsia, Cheehong" userId="6bc27941-0d5a-4c11-8dfb-8bbe9da0911b" providerId="ADAL" clId="{5BE5096F-7F8C-496A-A13C-FF7D0CA7A6B4}" dt="2024-02-14T15:29:17.156" v="1486" actId="700"/>
+        <pc:sldMkLst>
+          <pc:docMk/>
+          <pc:sldMk cId="3259217527" sldId="339"/>
+        </pc:sldMkLst>
+        <pc:spChg chg="mod ord">
+          <ac:chgData name="Hsia, Cheehong" userId="6bc27941-0d5a-4c11-8dfb-8bbe9da0911b" providerId="ADAL" clId="{5BE5096F-7F8C-496A-A13C-FF7D0CA7A6B4}" dt="2024-02-14T15:29:17.156" v="1486" actId="700"/>
+          <ac:spMkLst>
+            <pc:docMk/>
+            <pc:sldMk cId="3259217527" sldId="339"/>
+            <ac:spMk id="2" creationId="{9024BA51-C630-BA2A-58B6-69F9BB6816A0}"/>
+          </ac:spMkLst>
+        </pc:spChg>
+        <pc:spChg chg="mod ord">
+          <ac:chgData name="Hsia, Cheehong" userId="6bc27941-0d5a-4c11-8dfb-8bbe9da0911b" providerId="ADAL" clId="{5BE5096F-7F8C-496A-A13C-FF7D0CA7A6B4}" dt="2024-02-14T15:29:17.156" v="1486" actId="700"/>
+          <ac:spMkLst>
+            <pc:docMk/>
+            <pc:sldMk cId="3259217527" sldId="339"/>
+            <ac:spMk id="3" creationId="{2077BF95-1F9E-AA05-3D0B-83E184AA9C48}"/>
+          </ac:spMkLst>
+        </pc:spChg>
+        <pc:spChg chg="mod ord">
+          <ac:chgData name="Hsia, Cheehong" userId="6bc27941-0d5a-4c11-8dfb-8bbe9da0911b" providerId="ADAL" clId="{5BE5096F-7F8C-496A-A13C-FF7D0CA7A6B4}" dt="2024-02-14T15:29:17.156" v="1486" actId="700"/>
+          <ac:spMkLst>
+            <pc:docMk/>
+            <pc:sldMk cId="3259217527" sldId="339"/>
+            <ac:spMk id="4" creationId="{8946D5DF-DDC9-DF42-4883-DA9549CF8DE5}"/>
+          </ac:spMkLst>
+        </pc:spChg>
+        <pc:spChg chg="mod ord">
+          <ac:chgData name="Hsia, Cheehong" userId="6bc27941-0d5a-4c11-8dfb-8bbe9da0911b" providerId="ADAL" clId="{5BE5096F-7F8C-496A-A13C-FF7D0CA7A6B4}" dt="2024-02-14T15:29:17.156" v="1486" actId="700"/>
+          <ac:spMkLst>
+            <pc:docMk/>
+            <pc:sldMk cId="3259217527" sldId="339"/>
+            <ac:spMk id="5" creationId="{860EF69F-79FC-8315-A261-A0DDABAAA234}"/>
+          </ac:spMkLst>
+        </pc:spChg>
+      </pc:sldChg>
+      <pc:sldChg chg="modSp add mod modClrScheme chgLayout">
+        <pc:chgData name="Hsia, Cheehong" userId="6bc27941-0d5a-4c11-8dfb-8bbe9da0911b" providerId="ADAL" clId="{5BE5096F-7F8C-496A-A13C-FF7D0CA7A6B4}" dt="2024-02-14T15:30:29.053" v="1624" actId="700"/>
+        <pc:sldMkLst>
+          <pc:docMk/>
+          <pc:sldMk cId="2466321810" sldId="340"/>
+        </pc:sldMkLst>
+        <pc:spChg chg="mod ord">
+          <ac:chgData name="Hsia, Cheehong" userId="6bc27941-0d5a-4c11-8dfb-8bbe9da0911b" providerId="ADAL" clId="{5BE5096F-7F8C-496A-A13C-FF7D0CA7A6B4}" dt="2024-02-14T15:30:29.053" v="1624" actId="700"/>
+          <ac:spMkLst>
+            <pc:docMk/>
+            <pc:sldMk cId="2466321810" sldId="340"/>
+            <ac:spMk id="2" creationId="{9024BA51-C630-BA2A-58B6-69F9BB6816A0}"/>
+          </ac:spMkLst>
+        </pc:spChg>
+        <pc:spChg chg="mod ord">
+          <ac:chgData name="Hsia, Cheehong" userId="6bc27941-0d5a-4c11-8dfb-8bbe9da0911b" providerId="ADAL" clId="{5BE5096F-7F8C-496A-A13C-FF7D0CA7A6B4}" dt="2024-02-14T15:30:29.053" v="1624" actId="700"/>
+          <ac:spMkLst>
+            <pc:docMk/>
+            <pc:sldMk cId="2466321810" sldId="340"/>
+            <ac:spMk id="3" creationId="{2077BF95-1F9E-AA05-3D0B-83E184AA9C48}"/>
+          </ac:spMkLst>
+        </pc:spChg>
+        <pc:spChg chg="mod ord">
+          <ac:chgData name="Hsia, Cheehong" userId="6bc27941-0d5a-4c11-8dfb-8bbe9da0911b" providerId="ADAL" clId="{5BE5096F-7F8C-496A-A13C-FF7D0CA7A6B4}" dt="2024-02-14T15:30:29.053" v="1624" actId="700"/>
+          <ac:spMkLst>
+            <pc:docMk/>
+            <pc:sldMk cId="2466321810" sldId="340"/>
+            <ac:spMk id="4" creationId="{8946D5DF-DDC9-DF42-4883-DA9549CF8DE5}"/>
+          </ac:spMkLst>
+        </pc:spChg>
+        <pc:spChg chg="mod ord">
+          <ac:chgData name="Hsia, Cheehong" userId="6bc27941-0d5a-4c11-8dfb-8bbe9da0911b" providerId="ADAL" clId="{5BE5096F-7F8C-496A-A13C-FF7D0CA7A6B4}" dt="2024-02-14T15:30:29.053" v="1624" actId="700"/>
+          <ac:spMkLst>
+            <pc:docMk/>
+            <pc:sldMk cId="2466321810" sldId="340"/>
+            <ac:spMk id="5" creationId="{860EF69F-79FC-8315-A261-A0DDABAAA234}"/>
+          </ac:spMkLst>
+        </pc:spChg>
       </pc:sldChg>
       <pc:sldMasterChg chg="modSldLayout">
         <pc:chgData name="Hsia, Cheehong" userId="6bc27941-0d5a-4c11-8dfb-8bbe9da0911b" providerId="ADAL" clId="{5BE5096F-7F8C-496A-A13C-FF7D0CA7A6B4}" dt="2024-01-31T20:12:39.319" v="46" actId="11529"/>
@@ -3247,7 +4355,7 @@
           <a:p>
             <a:fld id="{0739BF60-9B09-42B3-AD3C-449FED2CBA10}" type="datetimeFigureOut">
               <a:rPr lang="en-NL" smtClean="0"/>
-              <a:t>03/02/2024</a:t>
+              <a:t>14/02/2024</a:t>
             </a:fld>
             <a:endParaRPr lang="en-NL"/>
           </a:p>
@@ -21515,8 +22623,10 @@
           <a:lstStyle/>
           <a:p>
             <a:r>
-              <a:rPr lang="en-US" sz="4000" dirty="0"/>
-              <a:t>Plan &amp; facilitates all scrum events</a:t>
+              <a:rPr lang="en-US" sz="3000" dirty="0">
+                <a:latin typeface="Ubuntu" panose="020B0504030602030204" pitchFamily="34" charset="0"/>
+              </a:rPr>
+              <a:t>Plan &amp; facilitates all Scrum events</a:t>
             </a:r>
           </a:p>
         </p:txBody>
@@ -21572,12 +22682,16 @@
           <a:lstStyle/>
           <a:p>
             <a:r>
-              <a:rPr lang="en-US" sz="4000" dirty="0"/>
+              <a:rPr lang="en-US" sz="3000" dirty="0">
+                <a:latin typeface="Ubuntu" panose="020B0504030602030204" pitchFamily="34" charset="0"/>
+              </a:rPr>
               <a:t>Track progress &amp; visualizes work</a:t>
             </a:r>
           </a:p>
           <a:p>
-            <a:endParaRPr lang="en-NL" dirty="0"/>
+            <a:endParaRPr lang="en-NL" sz="3000" dirty="0">
+              <a:latin typeface="Ubuntu" panose="020B0504030602030204" pitchFamily="34" charset="0"/>
+            </a:endParaRPr>
           </a:p>
         </p:txBody>
       </p:sp>
@@ -21842,7 +22956,7 @@
           <p:cNvPr id="2" name="Text Placeholder 1">
             <a:extLst>
               <a:ext uri="{FF2B5EF4-FFF2-40B4-BE49-F238E27FC236}">
-                <a16:creationId xmlns:a16="http://schemas.microsoft.com/office/drawing/2014/main" id="{94189FDF-7B80-50D5-3AD1-CB96FAC44E6D}"/>
+                <a16:creationId xmlns:a16="http://schemas.microsoft.com/office/drawing/2014/main" id="{700D1D6A-607B-8919-A042-BCCDC9CF0CF0}"/>
               </a:ext>
             </a:extLst>
           </p:cNvPr>
@@ -21859,8 +22973,10 @@
           <a:lstStyle/>
           <a:p>
             <a:r>
-              <a:rPr lang="en-US" sz="4000" dirty="0"/>
-              <a:t>Plan &amp; facilitates all scrum events</a:t>
+              <a:rPr lang="en-US" sz="3000" dirty="0">
+                <a:latin typeface="Ubuntu" panose="020B0504030602030204" pitchFamily="34" charset="0"/>
+              </a:rPr>
+              <a:t>Plan &amp; facilitates all Scrum events</a:t>
             </a:r>
           </a:p>
         </p:txBody>
@@ -21870,7 +22986,7 @@
           <p:cNvPr id="3" name="Content Placeholder 2">
             <a:extLst>
               <a:ext uri="{FF2B5EF4-FFF2-40B4-BE49-F238E27FC236}">
-                <a16:creationId xmlns:a16="http://schemas.microsoft.com/office/drawing/2014/main" id="{6D5D3A66-6B08-9C79-C4F4-E89BA6813204}"/>
+                <a16:creationId xmlns:a16="http://schemas.microsoft.com/office/drawing/2014/main" id="{DB4E66FB-476A-BB21-1B46-4C8125462E5C}"/>
               </a:ext>
             </a:extLst>
           </p:cNvPr>
@@ -21899,7 +23015,7 @@
           <p:cNvPr id="4" name="Text Placeholder 3">
             <a:extLst>
               <a:ext uri="{FF2B5EF4-FFF2-40B4-BE49-F238E27FC236}">
-                <a16:creationId xmlns:a16="http://schemas.microsoft.com/office/drawing/2014/main" id="{BAAAF6E7-F37F-1543-6120-55C0EE119F6E}"/>
+                <a16:creationId xmlns:a16="http://schemas.microsoft.com/office/drawing/2014/main" id="{101FB840-DD80-334A-87FD-81DC71AD8A57}"/>
               </a:ext>
             </a:extLst>
           </p:cNvPr>
@@ -21916,9 +23032,16 @@
           <a:lstStyle/>
           <a:p>
             <a:r>
-              <a:rPr lang="en-US" sz="4000" dirty="0"/>
+              <a:rPr lang="en-US" sz="3000" dirty="0">
+                <a:latin typeface="Ubuntu" panose="020B0504030602030204" pitchFamily="34" charset="0"/>
+              </a:rPr>
               <a:t>Track progress &amp; visualizes work</a:t>
             </a:r>
+          </a:p>
+          <a:p>
+            <a:endParaRPr lang="en-NL" sz="3000" dirty="0">
+              <a:latin typeface="Ubuntu" panose="020B0504030602030204" pitchFamily="34" charset="0"/>
+            </a:endParaRPr>
           </a:p>
         </p:txBody>
       </p:sp>
@@ -21927,7 +23050,7 @@
           <p:cNvPr id="5" name="Content Placeholder 4">
             <a:extLst>
               <a:ext uri="{FF2B5EF4-FFF2-40B4-BE49-F238E27FC236}">
-                <a16:creationId xmlns:a16="http://schemas.microsoft.com/office/drawing/2014/main" id="{BF99AF0D-A600-46B8-4778-8413DABABEFB}"/>
+                <a16:creationId xmlns:a16="http://schemas.microsoft.com/office/drawing/2014/main" id="{3994DC0B-F72F-6BFF-C694-00CBF68920C1}"/>
               </a:ext>
             </a:extLst>
           </p:cNvPr>
@@ -21956,7 +23079,7 @@
           <p:cNvPr id="6" name="Text Placeholder 1">
             <a:extLst>
               <a:ext uri="{FF2B5EF4-FFF2-40B4-BE49-F238E27FC236}">
-                <a16:creationId xmlns:a16="http://schemas.microsoft.com/office/drawing/2014/main" id="{46EB0A5B-8321-F4D4-A1D8-FF92E744308A}"/>
+                <a16:creationId xmlns:a16="http://schemas.microsoft.com/office/drawing/2014/main" id="{973DC34E-6561-45C7-EF65-6ED303617764}"/>
               </a:ext>
             </a:extLst>
           </p:cNvPr>
@@ -22151,7 +23274,7 @@
     </p:spTree>
     <p:extLst>
       <p:ext uri="{BB962C8B-B14F-4D97-AF65-F5344CB8AC3E}">
-        <p14:creationId xmlns:p14="http://schemas.microsoft.com/office/powerpoint/2010/main" val="106282829"/>
+        <p14:creationId xmlns:p14="http://schemas.microsoft.com/office/powerpoint/2010/main" val="2830884995"/>
       </p:ext>
     </p:extLst>
   </p:cSld>
@@ -22200,8 +23323,10 @@
           <a:lstStyle/>
           <a:p>
             <a:r>
-              <a:rPr lang="en-US" sz="4000" dirty="0"/>
-              <a:t>facilitates the scrum events</a:t>
+              <a:rPr lang="en-US" sz="3000" dirty="0">
+                <a:latin typeface="Ubuntu" panose="020B0504030602030204" pitchFamily="34" charset="0"/>
+              </a:rPr>
+              <a:t>Facilitates the scrum events</a:t>
             </a:r>
           </a:p>
         </p:txBody>
@@ -22257,7 +23382,9 @@
           <a:lstStyle/>
           <a:p>
             <a:r>
-              <a:rPr lang="en-US" sz="4000" dirty="0"/>
+              <a:rPr lang="en-US" sz="3000" dirty="0">
+                <a:latin typeface="Ubuntu" panose="020B0504030602030204" pitchFamily="34" charset="0"/>
+              </a:rPr>
               <a:t>Enables the Developers to track &amp; visualizes work</a:t>
             </a:r>
           </a:p>
@@ -22541,8 +23668,10 @@
           <a:lstStyle/>
           <a:p>
             <a:r>
-              <a:rPr lang="en-US" sz="4000" dirty="0"/>
-              <a:t>facilitates the scrum events</a:t>
+              <a:rPr lang="en-US" sz="3000" dirty="0">
+                <a:latin typeface="Ubuntu" panose="020B0504030602030204" pitchFamily="34" charset="0"/>
+              </a:rPr>
+              <a:t>Facilitates the scrum events</a:t>
             </a:r>
           </a:p>
         </p:txBody>
@@ -22598,7 +23727,9 @@
           <a:lstStyle/>
           <a:p>
             <a:r>
-              <a:rPr lang="en-US" sz="4000" dirty="0"/>
+              <a:rPr lang="en-US" sz="3000" dirty="0">
+                <a:latin typeface="Ubuntu" panose="020B0504030602030204" pitchFamily="34" charset="0"/>
+              </a:rPr>
               <a:t>Enables the Developers to track &amp; visualizes work</a:t>
             </a:r>
           </a:p>
@@ -22638,7 +23769,7 @@
           <p:cNvPr id="6" name="Text Placeholder 1">
             <a:extLst>
               <a:ext uri="{FF2B5EF4-FFF2-40B4-BE49-F238E27FC236}">
-                <a16:creationId xmlns:a16="http://schemas.microsoft.com/office/drawing/2014/main" id="{CCA63276-EDC3-D604-4F00-B405F28D19A4}"/>
+                <a16:creationId xmlns:a16="http://schemas.microsoft.com/office/drawing/2014/main" id="{D1E185FA-1FC9-E9CF-807A-D1563F37C59A}"/>
               </a:ext>
             </a:extLst>
           </p:cNvPr>
@@ -22833,7 +23964,7 @@
     </p:spTree>
     <p:extLst>
       <p:ext uri="{BB962C8B-B14F-4D97-AF65-F5344CB8AC3E}">
-        <p14:creationId xmlns:p14="http://schemas.microsoft.com/office/powerpoint/2010/main" val="433227676"/>
+        <p14:creationId xmlns:p14="http://schemas.microsoft.com/office/powerpoint/2010/main" val="393363697"/>
       </p:ext>
     </p:extLst>
   </p:cSld>
@@ -22882,8 +24013,10 @@
           <a:lstStyle/>
           <a:p>
             <a:r>
-              <a:rPr lang="en-US" sz="4000" dirty="0"/>
-              <a:t>Help scrum team by facilitating transparency, inspection &amp; adaptation</a:t>
+              <a:rPr lang="en-US" sz="3000" dirty="0">
+                <a:latin typeface="Ubuntu" panose="020B0504030602030204" pitchFamily="34" charset="0"/>
+              </a:rPr>
+              <a:t>Help Scrum team by facilitating transparency, inspection &amp; adaptation</a:t>
             </a:r>
           </a:p>
         </p:txBody>
@@ -22939,7 +24072,9 @@
           <a:lstStyle/>
           <a:p>
             <a:r>
-              <a:rPr lang="en-US" sz="4000" dirty="0"/>
+              <a:rPr lang="en-US" sz="3000" dirty="0">
+                <a:latin typeface="Ubuntu" panose="020B0504030602030204" pitchFamily="34" charset="0"/>
+              </a:rPr>
               <a:t>Enables Product Owner to focus on value delivery</a:t>
             </a:r>
           </a:p>
@@ -23422,8 +24557,10 @@
           <a:lstStyle/>
           <a:p>
             <a:r>
-              <a:rPr lang="en-US" sz="4000" dirty="0"/>
-              <a:t>Help scrum team by facilitating transparency, inspection &amp; adaptation</a:t>
+              <a:rPr lang="en-US" sz="3000" dirty="0">
+                <a:latin typeface="Ubuntu" panose="020B0504030602030204" pitchFamily="34" charset="0"/>
+              </a:rPr>
+              <a:t>Help Scrum team by facilitating transparency, inspection &amp; adaptation</a:t>
             </a:r>
           </a:p>
         </p:txBody>
@@ -23479,7 +24616,9 @@
           <a:lstStyle/>
           <a:p>
             <a:r>
-              <a:rPr lang="en-US" sz="4000" dirty="0"/>
+              <a:rPr lang="en-US" sz="3000" dirty="0">
+                <a:latin typeface="Ubuntu" panose="020B0504030602030204" pitchFamily="34" charset="0"/>
+              </a:rPr>
               <a:t>Enables Product Owner to focus on value delivery</a:t>
             </a:r>
           </a:p>
@@ -23519,7 +24658,7 @@
           <p:cNvPr id="6" name="Text Placeholder 1">
             <a:extLst>
               <a:ext uri="{FF2B5EF4-FFF2-40B4-BE49-F238E27FC236}">
-                <a16:creationId xmlns:a16="http://schemas.microsoft.com/office/drawing/2014/main" id="{BDFF8CC1-719D-8EFA-797B-7194698D8FA9}"/>
+                <a16:creationId xmlns:a16="http://schemas.microsoft.com/office/drawing/2014/main" id="{E465B4E2-6EB9-48B1-02D0-538A233218DB}"/>
               </a:ext>
             </a:extLst>
           </p:cNvPr>
@@ -23714,7 +24853,7 @@
     </p:spTree>
     <p:extLst>
       <p:ext uri="{BB962C8B-B14F-4D97-AF65-F5344CB8AC3E}">
-        <p14:creationId xmlns:p14="http://schemas.microsoft.com/office/powerpoint/2010/main" val="1970583200"/>
+        <p14:creationId xmlns:p14="http://schemas.microsoft.com/office/powerpoint/2010/main" val="3631058862"/>
       </p:ext>
     </p:extLst>
   </p:cSld>
@@ -23763,7 +24902,9 @@
           <a:lstStyle/>
           <a:p>
             <a:r>
-              <a:rPr lang="en-US" sz="4000" dirty="0"/>
+              <a:rPr lang="en-US" sz="3000" dirty="0">
+                <a:latin typeface="Ubuntu" panose="020B0504030602030204" pitchFamily="34" charset="0"/>
+              </a:rPr>
               <a:t>Help stakeholders understand &amp; apply Agile principles</a:t>
             </a:r>
           </a:p>
@@ -23820,8 +24961,10 @@
           <a:lstStyle/>
           <a:p>
             <a:r>
-              <a:rPr lang="en-US" sz="4000" dirty="0"/>
-              <a:t>Focus on continuous Improvements in the value chain</a:t>
+              <a:rPr lang="en-US" sz="3000" dirty="0">
+                <a:latin typeface="Ubuntu" panose="020B0504030602030204" pitchFamily="34" charset="0"/>
+              </a:rPr>
+              <a:t>Focus on continuous improvements in the value chain</a:t>
             </a:r>
           </a:p>
         </p:txBody>
@@ -24104,7 +25247,9 @@
           <a:lstStyle/>
           <a:p>
             <a:r>
-              <a:rPr lang="en-US" sz="4000" dirty="0"/>
+              <a:rPr lang="en-US" sz="3000" dirty="0">
+                <a:latin typeface="Ubuntu" panose="020B0504030602030204" pitchFamily="34" charset="0"/>
+              </a:rPr>
               <a:t>Help stakeholders understand &amp; apply Agile principles</a:t>
             </a:r>
           </a:p>
@@ -24161,8 +25306,10 @@
           <a:lstStyle/>
           <a:p>
             <a:r>
-              <a:rPr lang="en-US" sz="4000" dirty="0"/>
-              <a:t>Focus on continuous Improvements in the value chain</a:t>
+              <a:rPr lang="en-US" sz="3000" dirty="0">
+                <a:latin typeface="Ubuntu" panose="020B0504030602030204" pitchFamily="34" charset="0"/>
+              </a:rPr>
+              <a:t>Focus on continuous improvements in the value chain</a:t>
             </a:r>
           </a:p>
         </p:txBody>
@@ -24201,7 +25348,7 @@
           <p:cNvPr id="6" name="Text Placeholder 1">
             <a:extLst>
               <a:ext uri="{FF2B5EF4-FFF2-40B4-BE49-F238E27FC236}">
-                <a16:creationId xmlns:a16="http://schemas.microsoft.com/office/drawing/2014/main" id="{0AC00613-D4A6-7303-7DBE-D611CDB22F95}"/>
+                <a16:creationId xmlns:a16="http://schemas.microsoft.com/office/drawing/2014/main" id="{D10F6304-FA83-2181-CF93-41489AC119C9}"/>
               </a:ext>
             </a:extLst>
           </p:cNvPr>
@@ -24396,7 +25543,7 @@
     </p:spTree>
     <p:extLst>
       <p:ext uri="{BB962C8B-B14F-4D97-AF65-F5344CB8AC3E}">
-        <p14:creationId xmlns:p14="http://schemas.microsoft.com/office/powerpoint/2010/main" val="596055484"/>
+        <p14:creationId xmlns:p14="http://schemas.microsoft.com/office/powerpoint/2010/main" val="1252257208"/>
       </p:ext>
     </p:extLst>
   </p:cSld>
@@ -24445,12 +25592,11 @@
           <a:lstStyle/>
           <a:p>
             <a:r>
-              <a:rPr lang="en-US" sz="4000" dirty="0"/>
-              <a:t>Help the organization to understand &amp; apply agile principles</a:t>
+              <a:rPr lang="en-US" sz="3000" dirty="0">
+                <a:latin typeface="Ubuntu" panose="020B0504030602030204" pitchFamily="34" charset="0"/>
+              </a:rPr>
+              <a:t>Help the organization to understand &amp; apply Agile principles</a:t>
             </a:r>
-            <a:endParaRPr lang="en-US" sz="1050" dirty="0">
-              <a:latin typeface="Manrope" pitchFamily="2" charset="0"/>
-            </a:endParaRPr>
           </a:p>
         </p:txBody>
       </p:sp>
@@ -24505,7 +25651,9 @@
           <a:lstStyle/>
           <a:p>
             <a:r>
-              <a:rPr lang="en-US" sz="4000" dirty="0"/>
+              <a:rPr lang="en-US" sz="3000" dirty="0">
+                <a:latin typeface="Ubuntu" panose="020B0504030602030204" pitchFamily="34" charset="0"/>
+              </a:rPr>
               <a:t>Enables the organization to continuously have impact on customers</a:t>
             </a:r>
           </a:p>
@@ -24789,12 +25937,11 @@
           <a:lstStyle/>
           <a:p>
             <a:r>
-              <a:rPr lang="en-US" sz="4000" dirty="0"/>
-              <a:t>Help the organization to understand &amp; apply agile principles</a:t>
+              <a:rPr lang="en-US" sz="3000" dirty="0">
+                <a:latin typeface="Ubuntu" panose="020B0504030602030204" pitchFamily="34" charset="0"/>
+              </a:rPr>
+              <a:t>Help the organization to understand &amp; apply Agile principles</a:t>
             </a:r>
-            <a:endParaRPr lang="en-US" sz="1050" dirty="0">
-              <a:latin typeface="Manrope" pitchFamily="2" charset="0"/>
-            </a:endParaRPr>
           </a:p>
         </p:txBody>
       </p:sp>
@@ -24849,7 +25996,9 @@
           <a:lstStyle/>
           <a:p>
             <a:r>
-              <a:rPr lang="en-US" sz="4000" dirty="0"/>
+              <a:rPr lang="en-US" sz="3000" dirty="0">
+                <a:latin typeface="Ubuntu" panose="020B0504030602030204" pitchFamily="34" charset="0"/>
+              </a:rPr>
               <a:t>Enables the organization to continuously have impact on customers</a:t>
             </a:r>
           </a:p>
@@ -24889,7 +26038,7 @@
           <p:cNvPr id="6" name="Text Placeholder 1">
             <a:extLst>
               <a:ext uri="{FF2B5EF4-FFF2-40B4-BE49-F238E27FC236}">
-                <a16:creationId xmlns:a16="http://schemas.microsoft.com/office/drawing/2014/main" id="{E0EF5841-980D-CFB1-9AE2-83ECCF432CE6}"/>
+                <a16:creationId xmlns:a16="http://schemas.microsoft.com/office/drawing/2014/main" id="{ED5B7504-6185-5EDE-5BF5-A64E95E63231}"/>
               </a:ext>
             </a:extLst>
           </p:cNvPr>
@@ -25084,7 +26233,7 @@
     </p:spTree>
     <p:extLst>
       <p:ext uri="{BB962C8B-B14F-4D97-AF65-F5344CB8AC3E}">
-        <p14:creationId xmlns:p14="http://schemas.microsoft.com/office/powerpoint/2010/main" val="3282675112"/>
+        <p14:creationId xmlns:p14="http://schemas.microsoft.com/office/powerpoint/2010/main" val="1151322812"/>
       </p:ext>
     </p:extLst>
   </p:cSld>
@@ -25257,12 +26406,11 @@
           <a:lstStyle/>
           <a:p>
             <a:r>
-              <a:rPr lang="en-US" sz="4000" dirty="0"/>
-              <a:t>Focus on creating requirements &amp; product backlog items</a:t>
+              <a:rPr lang="en-US" sz="3000" dirty="0">
+                <a:latin typeface="Ubuntu" panose="020B0504030602030204" pitchFamily="34" charset="0"/>
+              </a:rPr>
+              <a:t>Focus on creating requirements &amp; Product Backlog Items</a:t>
             </a:r>
-            <a:endParaRPr lang="en-US" sz="1050" dirty="0">
-              <a:latin typeface="Manrope" pitchFamily="2" charset="0"/>
-            </a:endParaRPr>
           </a:p>
         </p:txBody>
       </p:sp>
@@ -25317,7 +26465,9 @@
           <a:lstStyle/>
           <a:p>
             <a:r>
-              <a:rPr lang="en-US" sz="4000" dirty="0"/>
+              <a:rPr lang="en-US" sz="3000" dirty="0">
+                <a:latin typeface="Ubuntu" panose="020B0504030602030204" pitchFamily="34" charset="0"/>
+              </a:rPr>
               <a:t>Executes plans &amp; decisions made by stakeholders</a:t>
             </a:r>
           </a:p>
@@ -25601,12 +26751,11 @@
           <a:lstStyle/>
           <a:p>
             <a:r>
-              <a:rPr lang="en-US" sz="4000" dirty="0"/>
-              <a:t>Focus on creating requirements &amp; product backlog items</a:t>
+              <a:rPr lang="en-US" sz="3000" dirty="0">
+                <a:latin typeface="Ubuntu" panose="020B0504030602030204" pitchFamily="34" charset="0"/>
+              </a:rPr>
+              <a:t>Focus on creating requirements &amp; Product Backlog Items</a:t>
             </a:r>
-            <a:endParaRPr lang="en-US" sz="1050" dirty="0">
-              <a:latin typeface="Manrope" pitchFamily="2" charset="0"/>
-            </a:endParaRPr>
           </a:p>
         </p:txBody>
       </p:sp>
@@ -25661,7 +26810,9 @@
           <a:lstStyle/>
           <a:p>
             <a:r>
-              <a:rPr lang="en-US" sz="4000" dirty="0"/>
+              <a:rPr lang="en-US" sz="3000" dirty="0">
+                <a:latin typeface="Ubuntu" panose="020B0504030602030204" pitchFamily="34" charset="0"/>
+              </a:rPr>
               <a:t>Executes plans &amp; decisions made by stakeholders</a:t>
             </a:r>
           </a:p>
@@ -25701,7 +26852,7 @@
           <p:cNvPr id="6" name="Text Placeholder 1">
             <a:extLst>
               <a:ext uri="{FF2B5EF4-FFF2-40B4-BE49-F238E27FC236}">
-                <a16:creationId xmlns:a16="http://schemas.microsoft.com/office/drawing/2014/main" id="{1B178722-AB77-ADD4-F984-1FEF568FB3FF}"/>
+                <a16:creationId xmlns:a16="http://schemas.microsoft.com/office/drawing/2014/main" id="{0053F6A2-9CE5-1161-4CE8-79A7313E43CB}"/>
               </a:ext>
             </a:extLst>
           </p:cNvPr>
@@ -25896,7 +27047,7 @@
     </p:spTree>
     <p:extLst>
       <p:ext uri="{BB962C8B-B14F-4D97-AF65-F5344CB8AC3E}">
-        <p14:creationId xmlns:p14="http://schemas.microsoft.com/office/powerpoint/2010/main" val="1386201035"/>
+        <p14:creationId xmlns:p14="http://schemas.microsoft.com/office/powerpoint/2010/main" val="2954588375"/>
       </p:ext>
     </p:extLst>
   </p:cSld>
@@ -25945,12 +27096,11 @@
           <a:lstStyle/>
           <a:p>
             <a:r>
-              <a:rPr lang="en-US" sz="4000" dirty="0"/>
-              <a:t>Focus on creating Sprint goals &amp; product increments</a:t>
+              <a:rPr lang="en-US" sz="3000" dirty="0">
+                <a:latin typeface="Ubuntu" panose="020B0504030602030204" pitchFamily="34" charset="0"/>
+              </a:rPr>
+              <a:t>Focus on creating Sprint Goals &amp; Product Increments</a:t>
             </a:r>
-            <a:endParaRPr lang="en-US" sz="1050" dirty="0">
-              <a:latin typeface="Manrope" pitchFamily="2" charset="0"/>
-            </a:endParaRPr>
           </a:p>
         </p:txBody>
       </p:sp>
@@ -26005,8 +27155,10 @@
           <a:lstStyle/>
           <a:p>
             <a:r>
-              <a:rPr lang="en-US" sz="4000" dirty="0"/>
-              <a:t>Has influence on stakeholders in making plans &amp; product related decisions</a:t>
+              <a:rPr lang="en-US" sz="3000" dirty="0">
+                <a:latin typeface="Ubuntu" panose="020B0504030602030204" pitchFamily="34" charset="0"/>
+              </a:rPr>
+              <a:t>Has influence on stakeholders in making plans &amp; Product related decisions</a:t>
             </a:r>
           </a:p>
         </p:txBody>
@@ -26348,12 +27500,11 @@
           <a:lstStyle/>
           <a:p>
             <a:r>
-              <a:rPr lang="en-US" sz="4000" dirty="0"/>
-              <a:t>Focus on creating Sprint goals &amp; product increments</a:t>
+              <a:rPr lang="en-US" sz="3000" dirty="0">
+                <a:latin typeface="Ubuntu" panose="020B0504030602030204" pitchFamily="34" charset="0"/>
+              </a:rPr>
+              <a:t>Focus on creating Sprint Goals &amp; Product Increments</a:t>
             </a:r>
-            <a:endParaRPr lang="en-US" sz="1050" dirty="0">
-              <a:latin typeface="Manrope" pitchFamily="2" charset="0"/>
-            </a:endParaRPr>
           </a:p>
         </p:txBody>
       </p:sp>
@@ -26408,8 +27559,10 @@
           <a:lstStyle/>
           <a:p>
             <a:r>
-              <a:rPr lang="en-US" sz="4000" dirty="0"/>
-              <a:t>Has influence on stakeholders in making plans &amp; product related decisions</a:t>
+              <a:rPr lang="en-US" sz="3000" dirty="0">
+                <a:latin typeface="Ubuntu" panose="020B0504030602030204" pitchFamily="34" charset="0"/>
+              </a:rPr>
+              <a:t>Has influence on stakeholders in making plans &amp; Product related decisions</a:t>
             </a:r>
           </a:p>
         </p:txBody>
@@ -26448,7 +27601,7 @@
           <p:cNvPr id="6" name="Text Placeholder 1">
             <a:extLst>
               <a:ext uri="{FF2B5EF4-FFF2-40B4-BE49-F238E27FC236}">
-                <a16:creationId xmlns:a16="http://schemas.microsoft.com/office/drawing/2014/main" id="{C86B6B4E-62E9-7F97-892C-CC962139E3F7}"/>
+                <a16:creationId xmlns:a16="http://schemas.microsoft.com/office/drawing/2014/main" id="{785CE489-A858-784D-5923-57B8923E5C1C}"/>
               </a:ext>
             </a:extLst>
           </p:cNvPr>
@@ -26643,7 +27796,7 @@
     </p:spTree>
     <p:extLst>
       <p:ext uri="{BB962C8B-B14F-4D97-AF65-F5344CB8AC3E}">
-        <p14:creationId xmlns:p14="http://schemas.microsoft.com/office/powerpoint/2010/main" val="3471392720"/>
+        <p14:creationId xmlns:p14="http://schemas.microsoft.com/office/powerpoint/2010/main" val="397487342"/>
       </p:ext>
     </p:extLst>
   </p:cSld>
@@ -26692,12 +27845,11 @@
           <a:lstStyle/>
           <a:p>
             <a:r>
-              <a:rPr lang="en-US" sz="4000" dirty="0"/>
+              <a:rPr lang="en-US" sz="3000" dirty="0">
+                <a:latin typeface="Ubuntu" panose="020B0504030602030204" pitchFamily="34" charset="0"/>
+              </a:rPr>
               <a:t>Focus on creating value &amp; continuously validate assumptions</a:t>
             </a:r>
-            <a:endParaRPr lang="en-US" sz="1050" dirty="0">
-              <a:latin typeface="Manrope" pitchFamily="2" charset="0"/>
-            </a:endParaRPr>
           </a:p>
         </p:txBody>
       </p:sp>
@@ -26752,8 +27904,10 @@
           <a:lstStyle/>
           <a:p>
             <a:r>
-              <a:rPr lang="en-US" sz="4000" dirty="0"/>
-              <a:t>Collaborate with stakeholders to make plans &amp; product related decisions</a:t>
+              <a:rPr lang="en-US" sz="3000" dirty="0">
+                <a:latin typeface="Ubuntu" panose="020B0504030602030204" pitchFamily="34" charset="0"/>
+              </a:rPr>
+              <a:t>Collaborate with stakeholders to make plans &amp; Product related decisions</a:t>
             </a:r>
           </a:p>
         </p:txBody>
@@ -27036,12 +28190,11 @@
           <a:lstStyle/>
           <a:p>
             <a:r>
-              <a:rPr lang="en-US" sz="4000" dirty="0"/>
+              <a:rPr lang="en-US" sz="3000" dirty="0">
+                <a:latin typeface="Ubuntu" panose="020B0504030602030204" pitchFamily="34" charset="0"/>
+              </a:rPr>
               <a:t>Focus on creating value &amp; continuously validate assumptions</a:t>
             </a:r>
-            <a:endParaRPr lang="en-US" sz="1050" dirty="0">
-              <a:latin typeface="Manrope" pitchFamily="2" charset="0"/>
-            </a:endParaRPr>
           </a:p>
         </p:txBody>
       </p:sp>
@@ -27096,8 +28249,10 @@
           <a:lstStyle/>
           <a:p>
             <a:r>
-              <a:rPr lang="en-US" sz="4000" dirty="0"/>
-              <a:t>Collaborate with stakeholders to make plans &amp; product related decisions</a:t>
+              <a:rPr lang="en-US" sz="3000" dirty="0">
+                <a:latin typeface="Ubuntu" panose="020B0504030602030204" pitchFamily="34" charset="0"/>
+              </a:rPr>
+              <a:t>Collaborate with stakeholders to make plans &amp; Product related decisions</a:t>
             </a:r>
           </a:p>
         </p:txBody>
@@ -27136,7 +28291,7 @@
           <p:cNvPr id="6" name="Text Placeholder 1">
             <a:extLst>
               <a:ext uri="{FF2B5EF4-FFF2-40B4-BE49-F238E27FC236}">
-                <a16:creationId xmlns:a16="http://schemas.microsoft.com/office/drawing/2014/main" id="{D04BA9A7-079E-1C5C-4768-57AF3A15C8BD}"/>
+                <a16:creationId xmlns:a16="http://schemas.microsoft.com/office/drawing/2014/main" id="{BA244130-E98C-1723-C038-309240C3E6ED}"/>
               </a:ext>
             </a:extLst>
           </p:cNvPr>
@@ -27331,7 +28486,7 @@
     </p:spTree>
     <p:extLst>
       <p:ext uri="{BB962C8B-B14F-4D97-AF65-F5344CB8AC3E}">
-        <p14:creationId xmlns:p14="http://schemas.microsoft.com/office/powerpoint/2010/main" val="1734131973"/>
+        <p14:creationId xmlns:p14="http://schemas.microsoft.com/office/powerpoint/2010/main" val="3775546726"/>
       </p:ext>
     </p:extLst>
   </p:cSld>
@@ -27380,12 +28535,11 @@
           <a:lstStyle/>
           <a:p>
             <a:r>
-              <a:rPr lang="en-US" sz="4000" dirty="0"/>
+              <a:rPr lang="en-US" sz="3000" dirty="0">
+                <a:latin typeface="Ubuntu" panose="020B0504030602030204" pitchFamily="34" charset="0"/>
+              </a:rPr>
               <a:t>Focus on continuous value creation &amp; stakeholder collaboration</a:t>
             </a:r>
-            <a:endParaRPr lang="en-US" sz="1050" dirty="0">
-              <a:latin typeface="Manrope" pitchFamily="2" charset="0"/>
-            </a:endParaRPr>
           </a:p>
         </p:txBody>
       </p:sp>
@@ -27440,8 +28594,10 @@
           <a:lstStyle/>
           <a:p>
             <a:r>
-              <a:rPr lang="en-US" sz="4000" dirty="0"/>
-              <a:t>Has mandate to make product related decisions &amp; release plans</a:t>
+              <a:rPr lang="en-US" sz="3000" dirty="0">
+                <a:latin typeface="Ubuntu" panose="020B0504030602030204" pitchFamily="34" charset="0"/>
+              </a:rPr>
+              <a:t>Has mandate to make Product related decisions &amp; release plans</a:t>
             </a:r>
           </a:p>
         </p:txBody>
@@ -27724,12 +28880,11 @@
           <a:lstStyle/>
           <a:p>
             <a:r>
-              <a:rPr lang="en-US" sz="4000" dirty="0"/>
+              <a:rPr lang="en-US" sz="3000" dirty="0">
+                <a:latin typeface="Ubuntu" panose="020B0504030602030204" pitchFamily="34" charset="0"/>
+              </a:rPr>
               <a:t>Focus on continuous value creation &amp; stakeholder collaboration</a:t>
             </a:r>
-            <a:endParaRPr lang="en-US" sz="1050" dirty="0">
-              <a:latin typeface="Manrope" pitchFamily="2" charset="0"/>
-            </a:endParaRPr>
           </a:p>
         </p:txBody>
       </p:sp>
@@ -27784,8 +28939,10 @@
           <a:lstStyle/>
           <a:p>
             <a:r>
-              <a:rPr lang="en-US" sz="4000" dirty="0"/>
-              <a:t>Has mandate to make product related decisions &amp; release plans</a:t>
+              <a:rPr lang="en-US" sz="3000" dirty="0">
+                <a:latin typeface="Ubuntu" panose="020B0504030602030204" pitchFamily="34" charset="0"/>
+              </a:rPr>
+              <a:t>Has mandate to make Product related decisions &amp; release plans</a:t>
             </a:r>
           </a:p>
         </p:txBody>
@@ -27824,7 +28981,7 @@
           <p:cNvPr id="6" name="Text Placeholder 1">
             <a:extLst>
               <a:ext uri="{FF2B5EF4-FFF2-40B4-BE49-F238E27FC236}">
-                <a16:creationId xmlns:a16="http://schemas.microsoft.com/office/drawing/2014/main" id="{82E8965E-D376-8AAF-2C21-7244AA581A2A}"/>
+                <a16:creationId xmlns:a16="http://schemas.microsoft.com/office/drawing/2014/main" id="{14273908-59D9-940C-9E72-950C9177D7BD}"/>
               </a:ext>
             </a:extLst>
           </p:cNvPr>
@@ -28019,7 +29176,7 @@
     </p:spTree>
     <p:extLst>
       <p:ext uri="{BB962C8B-B14F-4D97-AF65-F5344CB8AC3E}">
-        <p14:creationId xmlns:p14="http://schemas.microsoft.com/office/powerpoint/2010/main" val="1292218336"/>
+        <p14:creationId xmlns:p14="http://schemas.microsoft.com/office/powerpoint/2010/main" val="192906094"/>
       </p:ext>
     </p:extLst>
   </p:cSld>
@@ -28068,12 +29225,11 @@
           <a:lstStyle/>
           <a:p>
             <a:r>
-              <a:rPr lang="en-US" sz="4000" dirty="0"/>
+              <a:rPr lang="en-US" sz="3000" dirty="0">
+                <a:latin typeface="Ubuntu" panose="020B0504030602030204" pitchFamily="34" charset="0"/>
+              </a:rPr>
               <a:t>Focus on continuous value optimizing &amp; customer collaboration</a:t>
             </a:r>
-            <a:endParaRPr lang="en-US" sz="1050" dirty="0">
-              <a:latin typeface="Manrope" pitchFamily="2" charset="0"/>
-            </a:endParaRPr>
           </a:p>
         </p:txBody>
       </p:sp>
@@ -28128,7 +29284,9 @@
           <a:lstStyle/>
           <a:p>
             <a:r>
-              <a:rPr lang="en-US" sz="3500" dirty="0"/>
+              <a:rPr lang="en-US" sz="3000" dirty="0">
+                <a:latin typeface="Ubuntu" panose="020B0504030602030204" pitchFamily="34" charset="0"/>
+              </a:rPr>
               <a:t>Is responsible for planning, budget, profits &amp; loss of the products’ value chain</a:t>
             </a:r>
           </a:p>
@@ -28412,12 +29570,11 @@
           <a:lstStyle/>
           <a:p>
             <a:r>
-              <a:rPr lang="en-US" sz="4000" dirty="0"/>
+              <a:rPr lang="en-US" sz="3000" dirty="0">
+                <a:latin typeface="Ubuntu" panose="020B0504030602030204" pitchFamily="34" charset="0"/>
+              </a:rPr>
               <a:t>Focus on continuous value optimizing &amp; customer collaboration</a:t>
             </a:r>
-            <a:endParaRPr lang="en-US" sz="1050" dirty="0">
-              <a:latin typeface="Manrope" pitchFamily="2" charset="0"/>
-            </a:endParaRPr>
           </a:p>
         </p:txBody>
       </p:sp>
@@ -28472,7 +29629,9 @@
           <a:lstStyle/>
           <a:p>
             <a:r>
-              <a:rPr lang="en-US" sz="3500" dirty="0"/>
+              <a:rPr lang="en-US" sz="3000" dirty="0">
+                <a:latin typeface="Ubuntu" panose="020B0504030602030204" pitchFamily="34" charset="0"/>
+              </a:rPr>
               <a:t>Is responsible for planning, budget, profits &amp; loss of the products’ value chain</a:t>
             </a:r>
           </a:p>
@@ -28512,7 +29671,7 @@
           <p:cNvPr id="6" name="Text Placeholder 1">
             <a:extLst>
               <a:ext uri="{FF2B5EF4-FFF2-40B4-BE49-F238E27FC236}">
-                <a16:creationId xmlns:a16="http://schemas.microsoft.com/office/drawing/2014/main" id="{F9BCBE14-7BE1-AE3D-BCD7-F6EF173F845C}"/>
+                <a16:creationId xmlns:a16="http://schemas.microsoft.com/office/drawing/2014/main" id="{1206E5F5-5C4F-4016-C424-D33847996D39}"/>
               </a:ext>
             </a:extLst>
           </p:cNvPr>
@@ -28707,7 +29866,7 @@
     </p:spTree>
     <p:extLst>
       <p:ext uri="{BB962C8B-B14F-4D97-AF65-F5344CB8AC3E}">
-        <p14:creationId xmlns:p14="http://schemas.microsoft.com/office/powerpoint/2010/main" val="2951154706"/>
+        <p14:creationId xmlns:p14="http://schemas.microsoft.com/office/powerpoint/2010/main" val="727514259"/>
       </p:ext>
     </p:extLst>
   </p:cSld>
@@ -28874,12 +30033,11 @@
           <a:lstStyle/>
           <a:p>
             <a:r>
-              <a:rPr lang="en-US" sz="4000" dirty="0"/>
-              <a:t>Relying on the Scrum master to facilitate them</a:t>
+              <a:rPr lang="en-US" sz="3000" dirty="0">
+                <a:latin typeface="Ubuntu" panose="020B0504030602030204" pitchFamily="34" charset="0"/>
+              </a:rPr>
+              <a:t>Relying on the Scrum Master to facilitate them</a:t>
             </a:r>
-            <a:endParaRPr lang="en-US" sz="1050" dirty="0">
-              <a:latin typeface="Manrope" pitchFamily="2" charset="0"/>
-            </a:endParaRPr>
           </a:p>
         </p:txBody>
       </p:sp>
@@ -28934,12 +30092,16 @@
           <a:lstStyle/>
           <a:p>
             <a:r>
-              <a:rPr lang="en-US" sz="3500" dirty="0"/>
-              <a:t>Avoiding conflict/  Pursuing individual targets/ generating outputs</a:t>
+              <a:rPr lang="en-US" sz="3000" dirty="0">
+                <a:latin typeface="Ubuntu" panose="020B0504030602030204" pitchFamily="34" charset="0"/>
+              </a:rPr>
+              <a:t>Avoiding conflict /  Pursuing individual targets / generating outputs</a:t>
             </a:r>
           </a:p>
           <a:p>
-            <a:endParaRPr lang="en-NL" sz="3500" dirty="0"/>
+            <a:endParaRPr lang="en-NL" sz="3000" dirty="0">
+              <a:latin typeface="Ubuntu" panose="020B0504030602030204" pitchFamily="34" charset="0"/>
+            </a:endParaRPr>
           </a:p>
         </p:txBody>
       </p:sp>
@@ -29280,12 +30442,11 @@
           <a:lstStyle/>
           <a:p>
             <a:r>
-              <a:rPr lang="en-US" sz="4000" dirty="0"/>
-              <a:t>Relying on the Scrum master to facilitate them</a:t>
+              <a:rPr lang="en-US" sz="3000" dirty="0">
+                <a:latin typeface="Ubuntu" panose="020B0504030602030204" pitchFamily="34" charset="0"/>
+              </a:rPr>
+              <a:t>Relying on the Scrum Master to facilitate them</a:t>
             </a:r>
-            <a:endParaRPr lang="en-US" sz="1050" dirty="0">
-              <a:latin typeface="Manrope" pitchFamily="2" charset="0"/>
-            </a:endParaRPr>
           </a:p>
         </p:txBody>
       </p:sp>
@@ -29340,12 +30501,16 @@
           <a:lstStyle/>
           <a:p>
             <a:r>
-              <a:rPr lang="en-US" sz="3500" dirty="0"/>
-              <a:t>Avoiding conflict/  Pursuing individual targets/ generating outputs</a:t>
+              <a:rPr lang="en-US" sz="3000" dirty="0">
+                <a:latin typeface="Ubuntu" panose="020B0504030602030204" pitchFamily="34" charset="0"/>
+              </a:rPr>
+              <a:t>Avoiding conflict /  Pursuing individual targets / generating outputs</a:t>
             </a:r>
           </a:p>
           <a:p>
-            <a:endParaRPr lang="en-NL" sz="3500" dirty="0"/>
+            <a:endParaRPr lang="en-NL" sz="3000" dirty="0">
+              <a:latin typeface="Ubuntu" panose="020B0504030602030204" pitchFamily="34" charset="0"/>
+            </a:endParaRPr>
           </a:p>
         </p:txBody>
       </p:sp>
@@ -29383,7 +30548,7 @@
           <p:cNvPr id="6" name="Text Placeholder 1">
             <a:extLst>
               <a:ext uri="{FF2B5EF4-FFF2-40B4-BE49-F238E27FC236}">
-                <a16:creationId xmlns:a16="http://schemas.microsoft.com/office/drawing/2014/main" id="{E1192895-10ED-219A-5A7D-A9EC7BF9AB95}"/>
+                <a16:creationId xmlns:a16="http://schemas.microsoft.com/office/drawing/2014/main" id="{10226E01-C3C9-A7B1-D098-706D305EB80E}"/>
               </a:ext>
             </a:extLst>
           </p:cNvPr>
@@ -29578,7 +30743,7 @@
     </p:spTree>
     <p:extLst>
       <p:ext uri="{BB962C8B-B14F-4D97-AF65-F5344CB8AC3E}">
-        <p14:creationId xmlns:p14="http://schemas.microsoft.com/office/powerpoint/2010/main" val="826171372"/>
+        <p14:creationId xmlns:p14="http://schemas.microsoft.com/office/powerpoint/2010/main" val="3785406611"/>
       </p:ext>
     </p:extLst>
   </p:cSld>
@@ -29627,12 +30792,11 @@
           <a:lstStyle/>
           <a:p>
             <a:r>
-              <a:rPr lang="en-US" sz="4000" dirty="0"/>
-              <a:t>Ensuring the outcome of all events &amp; learning the scrum values</a:t>
+              <a:rPr lang="en-US" sz="3000" dirty="0">
+                <a:latin typeface="Ubuntu" panose="020B0504030602030204" pitchFamily="34" charset="0"/>
+              </a:rPr>
+              <a:t>Ensuring the outcome of all events &amp; learning the Scrum Values</a:t>
             </a:r>
-            <a:endParaRPr lang="en-US" sz="1050" dirty="0">
-              <a:latin typeface="Manrope" pitchFamily="2" charset="0"/>
-            </a:endParaRPr>
           </a:p>
         </p:txBody>
       </p:sp>
@@ -29687,8 +30851,10 @@
           <a:lstStyle/>
           <a:p>
             <a:r>
-              <a:rPr lang="en-US" dirty="0"/>
-              <a:t>Discovering differences/ conflicts/ shared values</a:t>
+              <a:rPr lang="en-US" sz="3000" dirty="0">
+                <a:latin typeface="Ubuntu" panose="020B0504030602030204" pitchFamily="34" charset="0"/>
+              </a:rPr>
+              <a:t>Discovering differences/ conflicts / shared values</a:t>
             </a:r>
           </a:p>
         </p:txBody>
@@ -29971,12 +31137,11 @@
           <a:lstStyle/>
           <a:p>
             <a:r>
-              <a:rPr lang="en-US" sz="4000" dirty="0"/>
-              <a:t>Ensuring the outcome of all events &amp; learning the scrum values</a:t>
+              <a:rPr lang="en-US" sz="3000" dirty="0">
+                <a:latin typeface="Ubuntu" panose="020B0504030602030204" pitchFamily="34" charset="0"/>
+              </a:rPr>
+              <a:t>Ensuring the outcome of all events &amp; learning the Scrum Values</a:t>
             </a:r>
-            <a:endParaRPr lang="en-US" sz="1050" dirty="0">
-              <a:latin typeface="Manrope" pitchFamily="2" charset="0"/>
-            </a:endParaRPr>
           </a:p>
         </p:txBody>
       </p:sp>
@@ -30031,8 +31196,10 @@
           <a:lstStyle/>
           <a:p>
             <a:r>
-              <a:rPr lang="en-US" dirty="0"/>
-              <a:t>Discovering differences/ conflicts/ shared values</a:t>
+              <a:rPr lang="en-US" sz="3000" dirty="0">
+                <a:latin typeface="Ubuntu" panose="020B0504030602030204" pitchFamily="34" charset="0"/>
+              </a:rPr>
+              <a:t>Discovering differences/ conflicts / shared values</a:t>
             </a:r>
           </a:p>
         </p:txBody>
@@ -30071,7 +31238,7 @@
           <p:cNvPr id="6" name="Text Placeholder 1">
             <a:extLst>
               <a:ext uri="{FF2B5EF4-FFF2-40B4-BE49-F238E27FC236}">
-                <a16:creationId xmlns:a16="http://schemas.microsoft.com/office/drawing/2014/main" id="{4AD64D31-6963-B999-2E9B-EEC0241A77B3}"/>
+                <a16:creationId xmlns:a16="http://schemas.microsoft.com/office/drawing/2014/main" id="{F004852F-27A1-2D1A-7A2B-526B8399434B}"/>
               </a:ext>
             </a:extLst>
           </p:cNvPr>
@@ -30266,7 +31433,7 @@
     </p:spTree>
     <p:extLst>
       <p:ext uri="{BB962C8B-B14F-4D97-AF65-F5344CB8AC3E}">
-        <p14:creationId xmlns:p14="http://schemas.microsoft.com/office/powerpoint/2010/main" val="217489594"/>
+        <p14:creationId xmlns:p14="http://schemas.microsoft.com/office/powerpoint/2010/main" val="3728195757"/>
       </p:ext>
     </p:extLst>
   </p:cSld>
@@ -30315,12 +31482,11 @@
           <a:lstStyle/>
           <a:p>
             <a:r>
-              <a:rPr lang="en-US" sz="4000" dirty="0"/>
-              <a:t>Focused on reaching sprint goals &amp; improving quality </a:t>
+              <a:rPr lang="en-US" sz="3000" dirty="0">
+                <a:latin typeface="Ubuntu" panose="020B0504030602030204" pitchFamily="34" charset="0"/>
+              </a:rPr>
+              <a:t>Focused on reaching Sprint Goals &amp; improving quality </a:t>
             </a:r>
-            <a:endParaRPr lang="en-US" sz="1050" dirty="0">
-              <a:latin typeface="Manrope" pitchFamily="2" charset="0"/>
-            </a:endParaRPr>
           </a:p>
         </p:txBody>
       </p:sp>
@@ -30375,8 +31541,10 @@
           <a:lstStyle/>
           <a:p>
             <a:r>
-              <a:rPr lang="en-US" sz="4000" dirty="0"/>
-              <a:t>Using Scrum &amp; agile principles as a guideline for all interactions</a:t>
+              <a:rPr lang="en-US" sz="3000" dirty="0">
+                <a:latin typeface="Ubuntu" panose="020B0504030602030204" pitchFamily="34" charset="0"/>
+              </a:rPr>
+              <a:t>Using Scrum &amp; Agile principles as a guideline for all interactions</a:t>
             </a:r>
           </a:p>
         </p:txBody>
@@ -30659,12 +31827,11 @@
           <a:lstStyle/>
           <a:p>
             <a:r>
-              <a:rPr lang="en-US" sz="4000" dirty="0"/>
-              <a:t>Focused on reaching sprint goals &amp; improving quality </a:t>
+              <a:rPr lang="en-US" sz="3000" dirty="0">
+                <a:latin typeface="Ubuntu" panose="020B0504030602030204" pitchFamily="34" charset="0"/>
+              </a:rPr>
+              <a:t>Focused on reaching Sprint Goals &amp; improving quality </a:t>
             </a:r>
-            <a:endParaRPr lang="en-US" sz="1050" dirty="0">
-              <a:latin typeface="Manrope" pitchFamily="2" charset="0"/>
-            </a:endParaRPr>
           </a:p>
         </p:txBody>
       </p:sp>
@@ -30719,8 +31886,10 @@
           <a:lstStyle/>
           <a:p>
             <a:r>
-              <a:rPr lang="en-US" sz="4000" dirty="0"/>
-              <a:t>Using Scrum &amp; agile principles as a guideline for all interactions</a:t>
+              <a:rPr lang="en-US" sz="3000" dirty="0">
+                <a:latin typeface="Ubuntu" panose="020B0504030602030204" pitchFamily="34" charset="0"/>
+              </a:rPr>
+              <a:t>Using Scrum &amp; Agile principles as a guideline for all interactions</a:t>
             </a:r>
           </a:p>
         </p:txBody>
@@ -30759,7 +31928,7 @@
           <p:cNvPr id="6" name="Text Placeholder 1">
             <a:extLst>
               <a:ext uri="{FF2B5EF4-FFF2-40B4-BE49-F238E27FC236}">
-                <a16:creationId xmlns:a16="http://schemas.microsoft.com/office/drawing/2014/main" id="{6B6D2E77-90B1-EB40-8A23-ABBC4704C6AC}"/>
+                <a16:creationId xmlns:a16="http://schemas.microsoft.com/office/drawing/2014/main" id="{BCB5172D-C8FC-D98E-87DD-C0822EAE47F0}"/>
               </a:ext>
             </a:extLst>
           </p:cNvPr>
@@ -30954,7 +32123,7 @@
     </p:spTree>
     <p:extLst>
       <p:ext uri="{BB962C8B-B14F-4D97-AF65-F5344CB8AC3E}">
-        <p14:creationId xmlns:p14="http://schemas.microsoft.com/office/powerpoint/2010/main" val="2693914518"/>
+        <p14:creationId xmlns:p14="http://schemas.microsoft.com/office/powerpoint/2010/main" val="1070377419"/>
       </p:ext>
     </p:extLst>
   </p:cSld>
@@ -31003,12 +32172,11 @@
           <a:lstStyle/>
           <a:p>
             <a:r>
-              <a:rPr lang="en-US" sz="4000" dirty="0"/>
+              <a:rPr lang="en-US" sz="3000" dirty="0">
+                <a:latin typeface="Ubuntu" panose="020B0504030602030204" pitchFamily="34" charset="0"/>
+              </a:rPr>
               <a:t>Responsible &amp; committed to continuously deliver valuable outcome</a:t>
             </a:r>
-            <a:endParaRPr lang="en-US" sz="1050" dirty="0">
-              <a:latin typeface="Manrope" pitchFamily="2" charset="0"/>
-            </a:endParaRPr>
           </a:p>
         </p:txBody>
       </p:sp>
@@ -31063,7 +32231,9 @@
           <a:lstStyle/>
           <a:p>
             <a:r>
-              <a:rPr lang="en-US" sz="4000" dirty="0"/>
+              <a:rPr lang="en-US" sz="3000" dirty="0">
+                <a:latin typeface="Ubuntu" panose="020B0504030602030204" pitchFamily="34" charset="0"/>
+              </a:rPr>
               <a:t>Collaborating with stakeholders to continuously adapt</a:t>
             </a:r>
           </a:p>
@@ -31347,12 +32517,11 @@
           <a:lstStyle/>
           <a:p>
             <a:r>
-              <a:rPr lang="en-US" sz="4000" dirty="0"/>
+              <a:rPr lang="en-US" sz="3000" dirty="0">
+                <a:latin typeface="Ubuntu" panose="020B0504030602030204" pitchFamily="34" charset="0"/>
+              </a:rPr>
               <a:t>Responsible &amp; committed to continuously deliver valuable outcome</a:t>
             </a:r>
-            <a:endParaRPr lang="en-US" sz="1050" dirty="0">
-              <a:latin typeface="Manrope" pitchFamily="2" charset="0"/>
-            </a:endParaRPr>
           </a:p>
         </p:txBody>
       </p:sp>
@@ -31407,7 +32576,9 @@
           <a:lstStyle/>
           <a:p>
             <a:r>
-              <a:rPr lang="en-US" sz="4000" dirty="0"/>
+              <a:rPr lang="en-US" sz="3000" dirty="0">
+                <a:latin typeface="Ubuntu" panose="020B0504030602030204" pitchFamily="34" charset="0"/>
+              </a:rPr>
               <a:t>Collaborating with stakeholders to continuously adapt</a:t>
             </a:r>
           </a:p>
@@ -31447,7 +32618,7 @@
           <p:cNvPr id="6" name="Text Placeholder 1">
             <a:extLst>
               <a:ext uri="{FF2B5EF4-FFF2-40B4-BE49-F238E27FC236}">
-                <a16:creationId xmlns:a16="http://schemas.microsoft.com/office/drawing/2014/main" id="{B6E8D1CB-527B-6AED-F2BA-071B9C9B78E9}"/>
+                <a16:creationId xmlns:a16="http://schemas.microsoft.com/office/drawing/2014/main" id="{D8E98A5A-46BD-B309-379D-9FA98DEF33FC}"/>
               </a:ext>
             </a:extLst>
           </p:cNvPr>
@@ -31642,7 +32813,7 @@
     </p:spTree>
     <p:extLst>
       <p:ext uri="{BB962C8B-B14F-4D97-AF65-F5344CB8AC3E}">
-        <p14:creationId xmlns:p14="http://schemas.microsoft.com/office/powerpoint/2010/main" val="4239895058"/>
+        <p14:creationId xmlns:p14="http://schemas.microsoft.com/office/powerpoint/2010/main" val="3134009850"/>
       </p:ext>
     </p:extLst>
   </p:cSld>
@@ -31691,12 +32862,11 @@
           <a:lstStyle/>
           <a:p>
             <a:r>
-              <a:rPr lang="en-US" sz="4000" dirty="0"/>
-              <a:t>Accountable or creating high quality products</a:t>
+              <a:rPr lang="en-US" sz="3000" dirty="0">
+                <a:latin typeface="Ubuntu" panose="020B0504030602030204" pitchFamily="34" charset="0"/>
+              </a:rPr>
+              <a:t>Accountable or creating high quality Products</a:t>
             </a:r>
-            <a:endParaRPr lang="en-US" sz="1050" dirty="0">
-              <a:latin typeface="Manrope" pitchFamily="2" charset="0"/>
-            </a:endParaRPr>
           </a:p>
         </p:txBody>
       </p:sp>
@@ -31751,7 +32921,9 @@
           <a:lstStyle/>
           <a:p>
             <a:r>
-              <a:rPr lang="en-US" sz="4000" dirty="0"/>
+              <a:rPr lang="en-US" sz="3000" dirty="0">
+                <a:latin typeface="Ubuntu" panose="020B0504030602030204" pitchFamily="34" charset="0"/>
+              </a:rPr>
               <a:t>Collaborating with everyone to participate in sharing feedback &amp; learning</a:t>
             </a:r>
           </a:p>
@@ -32035,12 +33207,11 @@
           <a:lstStyle/>
           <a:p>
             <a:r>
-              <a:rPr lang="en-US" sz="4000" dirty="0"/>
-              <a:t>Accountable or creating high quality products</a:t>
+              <a:rPr lang="en-US" sz="3000" dirty="0">
+                <a:latin typeface="Ubuntu" panose="020B0504030602030204" pitchFamily="34" charset="0"/>
+              </a:rPr>
+              <a:t>Accountable or creating high quality Products</a:t>
             </a:r>
-            <a:endParaRPr lang="en-US" sz="1050" dirty="0">
-              <a:latin typeface="Manrope" pitchFamily="2" charset="0"/>
-            </a:endParaRPr>
           </a:p>
         </p:txBody>
       </p:sp>
@@ -32095,7 +33266,9 @@
           <a:lstStyle/>
           <a:p>
             <a:r>
-              <a:rPr lang="en-US" sz="4000" dirty="0"/>
+              <a:rPr lang="en-US" sz="3000" dirty="0">
+                <a:latin typeface="Ubuntu" panose="020B0504030602030204" pitchFamily="34" charset="0"/>
+              </a:rPr>
               <a:t>Collaborating with everyone to participate in sharing feedback &amp; learning</a:t>
             </a:r>
           </a:p>
@@ -32135,7 +33308,7 @@
           <p:cNvPr id="6" name="Text Placeholder 1">
             <a:extLst>
               <a:ext uri="{FF2B5EF4-FFF2-40B4-BE49-F238E27FC236}">
-                <a16:creationId xmlns:a16="http://schemas.microsoft.com/office/drawing/2014/main" id="{A6CFE622-B8F9-400E-7940-DC1B1916F743}"/>
+                <a16:creationId xmlns:a16="http://schemas.microsoft.com/office/drawing/2014/main" id="{D93CADC4-D2B9-3874-59F9-1690AA15F907}"/>
               </a:ext>
             </a:extLst>
           </p:cNvPr>
@@ -32330,7 +33503,7 @@
     </p:spTree>
     <p:extLst>
       <p:ext uri="{BB962C8B-B14F-4D97-AF65-F5344CB8AC3E}">
-        <p14:creationId xmlns:p14="http://schemas.microsoft.com/office/powerpoint/2010/main" val="178219345"/>
+        <p14:creationId xmlns:p14="http://schemas.microsoft.com/office/powerpoint/2010/main" val="2446414719"/>
       </p:ext>
     </p:extLst>
   </p:cSld>
@@ -32556,12 +33729,11 @@
           <a:lstStyle/>
           <a:p>
             <a:r>
-              <a:rPr lang="en-US" sz="4000" dirty="0"/>
+              <a:rPr lang="en-US" sz="3000" dirty="0">
+                <a:latin typeface="Ubuntu" panose="020B0504030602030204" pitchFamily="34" charset="0"/>
+              </a:rPr>
               <a:t>Wants full control &amp; has a directive communication style</a:t>
             </a:r>
-            <a:endParaRPr lang="en-US" sz="1050" dirty="0">
-              <a:latin typeface="Manrope" pitchFamily="2" charset="0"/>
-            </a:endParaRPr>
           </a:p>
         </p:txBody>
       </p:sp>
@@ -32616,8 +33788,10 @@
           <a:lstStyle/>
           <a:p>
             <a:r>
-              <a:rPr lang="en-US" sz="3500" dirty="0"/>
-              <a:t>Gives individual targets and on progress/ efficiency/ quality &amp; outcomes</a:t>
+              <a:rPr lang="en-US" sz="3000" dirty="0">
+                <a:latin typeface="Ubuntu" panose="020B0504030602030204" pitchFamily="34" charset="0"/>
+              </a:rPr>
+              <a:t>Gives individual targets and on progress / efficiency/ quality &amp; outcomes</a:t>
             </a:r>
           </a:p>
         </p:txBody>
@@ -32900,12 +34074,11 @@
           <a:lstStyle/>
           <a:p>
             <a:r>
-              <a:rPr lang="en-US" sz="4000" dirty="0"/>
+              <a:rPr lang="en-US" sz="3000" dirty="0">
+                <a:latin typeface="Ubuntu" panose="020B0504030602030204" pitchFamily="34" charset="0"/>
+              </a:rPr>
               <a:t>Wants full control &amp; has a directive communication style</a:t>
             </a:r>
-            <a:endParaRPr lang="en-US" sz="1050" dirty="0">
-              <a:latin typeface="Manrope" pitchFamily="2" charset="0"/>
-            </a:endParaRPr>
           </a:p>
         </p:txBody>
       </p:sp>
@@ -32960,8 +34133,10 @@
           <a:lstStyle/>
           <a:p>
             <a:r>
-              <a:rPr lang="en-US" sz="3500" dirty="0"/>
-              <a:t>Gives individual targets and on progress/ efficiency/ quality &amp; outcomes</a:t>
+              <a:rPr lang="en-US" sz="3000" dirty="0">
+                <a:latin typeface="Ubuntu" panose="020B0504030602030204" pitchFamily="34" charset="0"/>
+              </a:rPr>
+              <a:t>Gives individual targets and on progress / efficiency/ quality &amp; outcomes</a:t>
             </a:r>
           </a:p>
         </p:txBody>
@@ -33000,7 +34175,7 @@
           <p:cNvPr id="6" name="Text Placeholder 1">
             <a:extLst>
               <a:ext uri="{FF2B5EF4-FFF2-40B4-BE49-F238E27FC236}">
-                <a16:creationId xmlns:a16="http://schemas.microsoft.com/office/drawing/2014/main" id="{EE640219-8CF2-52AD-77AE-27EBB52B6CAD}"/>
+                <a16:creationId xmlns:a16="http://schemas.microsoft.com/office/drawing/2014/main" id="{30EB7D6E-0473-1CF2-0312-219FF0DBC038}"/>
               </a:ext>
             </a:extLst>
           </p:cNvPr>
@@ -33195,7 +34370,7 @@
     </p:spTree>
     <p:extLst>
       <p:ext uri="{BB962C8B-B14F-4D97-AF65-F5344CB8AC3E}">
-        <p14:creationId xmlns:p14="http://schemas.microsoft.com/office/powerpoint/2010/main" val="415980821"/>
+        <p14:creationId xmlns:p14="http://schemas.microsoft.com/office/powerpoint/2010/main" val="2718256781"/>
       </p:ext>
     </p:extLst>
   </p:cSld>
@@ -33244,12 +34419,11 @@
           <a:lstStyle/>
           <a:p>
             <a:r>
-              <a:rPr lang="en-US" sz="4000" dirty="0"/>
+              <a:rPr lang="en-US" sz="3000" dirty="0">
+                <a:latin typeface="Ubuntu" panose="020B0504030602030204" pitchFamily="34" charset="0"/>
+              </a:rPr>
               <a:t>Wants to be in control &amp; delegates less critical responsibilities</a:t>
             </a:r>
-            <a:endParaRPr lang="en-US" sz="1050" dirty="0">
-              <a:latin typeface="Manrope" pitchFamily="2" charset="0"/>
-            </a:endParaRPr>
           </a:p>
         </p:txBody>
       </p:sp>
@@ -33304,8 +34478,10 @@
           <a:lstStyle/>
           <a:p>
             <a:r>
-              <a:rPr lang="en-US" sz="3500" dirty="0"/>
-              <a:t>Gives team(s) targets and on progress/ efficiency/ quality &amp; outcomes</a:t>
+              <a:rPr lang="en-US" sz="3000" dirty="0">
+                <a:latin typeface="Ubuntu" panose="020B0504030602030204" pitchFamily="34" charset="0"/>
+              </a:rPr>
+              <a:t>Gives team(s) targets and on progress / efficiency / quality &amp; outcomes</a:t>
             </a:r>
           </a:p>
         </p:txBody>
@@ -33588,12 +34764,11 @@
           <a:lstStyle/>
           <a:p>
             <a:r>
-              <a:rPr lang="en-US" sz="4000" dirty="0"/>
+              <a:rPr lang="en-US" sz="3000" dirty="0">
+                <a:latin typeface="Ubuntu" panose="020B0504030602030204" pitchFamily="34" charset="0"/>
+              </a:rPr>
               <a:t>Wants to be in control &amp; delegates less critical responsibilities</a:t>
             </a:r>
-            <a:endParaRPr lang="en-US" sz="1050" dirty="0">
-              <a:latin typeface="Manrope" pitchFamily="2" charset="0"/>
-            </a:endParaRPr>
           </a:p>
         </p:txBody>
       </p:sp>
@@ -33648,8 +34823,10 @@
           <a:lstStyle/>
           <a:p>
             <a:r>
-              <a:rPr lang="en-US" sz="3500" dirty="0"/>
-              <a:t>Gives team(s) targets and on progress/ efficiency/ quality &amp; outcomes</a:t>
+              <a:rPr lang="en-US" sz="3000" dirty="0">
+                <a:latin typeface="Ubuntu" panose="020B0504030602030204" pitchFamily="34" charset="0"/>
+              </a:rPr>
+              <a:t>Gives team(s) targets and on progress / efficiency / quality &amp; outcomes</a:t>
             </a:r>
           </a:p>
         </p:txBody>
@@ -33688,7 +34865,7 @@
           <p:cNvPr id="6" name="Text Placeholder 1">
             <a:extLst>
               <a:ext uri="{FF2B5EF4-FFF2-40B4-BE49-F238E27FC236}">
-                <a16:creationId xmlns:a16="http://schemas.microsoft.com/office/drawing/2014/main" id="{C829B1EB-3C9B-D14D-49B7-C01C1DD40CE3}"/>
+                <a16:creationId xmlns:a16="http://schemas.microsoft.com/office/drawing/2014/main" id="{4468637D-9389-3D43-7766-53E64610CED3}"/>
               </a:ext>
             </a:extLst>
           </p:cNvPr>
@@ -33883,7 +35060,7 @@
     </p:spTree>
     <p:extLst>
       <p:ext uri="{BB962C8B-B14F-4D97-AF65-F5344CB8AC3E}">
-        <p14:creationId xmlns:p14="http://schemas.microsoft.com/office/powerpoint/2010/main" val="1467359079"/>
+        <p14:creationId xmlns:p14="http://schemas.microsoft.com/office/powerpoint/2010/main" val="116660721"/>
       </p:ext>
     </p:extLst>
   </p:cSld>
@@ -33932,12 +35109,11 @@
           <a:lstStyle/>
           <a:p>
             <a:r>
-              <a:rPr lang="en-US" sz="4000" dirty="0"/>
-              <a:t>DELEGATES MORE IMPORTANT RESPONSIBILITIES</a:t>
+              <a:rPr lang="en-US" sz="3000" dirty="0">
+                <a:latin typeface="Ubuntu" panose="020B0504030602030204" pitchFamily="34" charset="0"/>
+              </a:rPr>
+              <a:t>Delegates more important responsibilities</a:t>
             </a:r>
-            <a:endParaRPr lang="en-US" sz="1050" dirty="0">
-              <a:latin typeface="Manrope" pitchFamily="2" charset="0"/>
-            </a:endParaRPr>
           </a:p>
         </p:txBody>
       </p:sp>
@@ -33992,8 +35168,10 @@
           <a:lstStyle/>
           <a:p>
             <a:r>
-              <a:rPr lang="en-US" sz="3500" dirty="0"/>
-              <a:t>PROVIDES BOUNDARY CONDITIONS FOR TEAMS TO SET THEIR OWN TARGETS</a:t>
+              <a:rPr lang="en-US" sz="3000" dirty="0">
+                <a:latin typeface="Ubuntu" panose="020B0504030602030204" pitchFamily="34" charset="0"/>
+              </a:rPr>
+              <a:t>Provides boundary conditions for teams to set  their own targets</a:t>
             </a:r>
           </a:p>
         </p:txBody>
@@ -34276,12 +35454,11 @@
           <a:lstStyle/>
           <a:p>
             <a:r>
-              <a:rPr lang="en-US" sz="4000" dirty="0"/>
-              <a:t>DELEGATES MORE IMPORTANT RESPONSIBILITIES</a:t>
+              <a:rPr lang="en-US" sz="3000" dirty="0">
+                <a:latin typeface="Ubuntu" panose="020B0504030602030204" pitchFamily="34" charset="0"/>
+              </a:rPr>
+              <a:t>Delegates more important responsibilities</a:t>
             </a:r>
-            <a:endParaRPr lang="en-US" sz="1050" dirty="0">
-              <a:latin typeface="Manrope" pitchFamily="2" charset="0"/>
-            </a:endParaRPr>
           </a:p>
         </p:txBody>
       </p:sp>
@@ -34336,8 +35513,10 @@
           <a:lstStyle/>
           <a:p>
             <a:r>
-              <a:rPr lang="en-US" sz="3500" dirty="0"/>
-              <a:t>PROVIDES BOUNDARY CONDITIONS FOR TEAMS TO SET THEIR OWN TARGETS</a:t>
+              <a:rPr lang="en-US" sz="3000" dirty="0">
+                <a:latin typeface="Ubuntu" panose="020B0504030602030204" pitchFamily="34" charset="0"/>
+              </a:rPr>
+              <a:t>Provides boundary conditions for teams to set  their own targets</a:t>
             </a:r>
           </a:p>
         </p:txBody>
@@ -34376,7 +35555,7 @@
           <p:cNvPr id="6" name="Text Placeholder 1">
             <a:extLst>
               <a:ext uri="{FF2B5EF4-FFF2-40B4-BE49-F238E27FC236}">
-                <a16:creationId xmlns:a16="http://schemas.microsoft.com/office/drawing/2014/main" id="{6F8856BA-9EA8-97AD-E583-646C0191130C}"/>
+                <a16:creationId xmlns:a16="http://schemas.microsoft.com/office/drawing/2014/main" id="{BA430EAE-37CA-BDC6-7261-6924ACB82ECC}"/>
               </a:ext>
             </a:extLst>
           </p:cNvPr>
@@ -34571,7 +35750,7 @@
     </p:spTree>
     <p:extLst>
       <p:ext uri="{BB962C8B-B14F-4D97-AF65-F5344CB8AC3E}">
-        <p14:creationId xmlns:p14="http://schemas.microsoft.com/office/powerpoint/2010/main" val="2313812796"/>
+        <p14:creationId xmlns:p14="http://schemas.microsoft.com/office/powerpoint/2010/main" val="781062866"/>
       </p:ext>
     </p:extLst>
   </p:cSld>
@@ -34620,12 +35799,11 @@
           <a:lstStyle/>
           <a:p>
             <a:r>
-              <a:rPr lang="en-US" sz="4000" dirty="0"/>
-              <a:t>DELEGATES ALL BUT CRITICAL DECISIONS &amp; RESPONSIBILITIES</a:t>
+              <a:rPr lang="en-US" sz="3000" dirty="0">
+                <a:latin typeface="Ubuntu" panose="020B0504030602030204" pitchFamily="34" charset="0"/>
+              </a:rPr>
+              <a:t>Delegates all but critical decisions &amp; responsibilities</a:t>
             </a:r>
-            <a:endParaRPr lang="en-US" sz="1050" dirty="0">
-              <a:latin typeface="Manrope" pitchFamily="2" charset="0"/>
-            </a:endParaRPr>
           </a:p>
         </p:txBody>
       </p:sp>
@@ -34680,8 +35858,10 @@
           <a:lstStyle/>
           <a:p>
             <a:r>
-              <a:rPr lang="en-US" dirty="0"/>
-              <a:t>CREATES AN ENVIRONMENT WHERE TEAMS CAN SELF-MANAGE &amp; CREATE VALUE</a:t>
+              <a:rPr lang="en-US" sz="3000" dirty="0">
+                <a:latin typeface="Ubuntu" panose="020B0504030602030204" pitchFamily="34" charset="0"/>
+              </a:rPr>
+              <a:t>Creates an environment where teams can self-manage &amp; create value</a:t>
             </a:r>
           </a:p>
         </p:txBody>
@@ -34964,12 +36144,11 @@
           <a:lstStyle/>
           <a:p>
             <a:r>
-              <a:rPr lang="en-US" sz="4000" dirty="0"/>
-              <a:t>DELEGATES ALL BUT CRITICAL DECISIONS &amp; RESPONSIBILITIES</a:t>
+              <a:rPr lang="en-US" sz="3000" dirty="0">
+                <a:latin typeface="Ubuntu" panose="020B0504030602030204" pitchFamily="34" charset="0"/>
+              </a:rPr>
+              <a:t>Delegates all but critical decisions &amp; responsibilities</a:t>
             </a:r>
-            <a:endParaRPr lang="en-US" sz="1050" dirty="0">
-              <a:latin typeface="Manrope" pitchFamily="2" charset="0"/>
-            </a:endParaRPr>
           </a:p>
         </p:txBody>
       </p:sp>
@@ -35024,8 +36203,10 @@
           <a:lstStyle/>
           <a:p>
             <a:r>
-              <a:rPr lang="en-US" dirty="0"/>
-              <a:t>CREATES AN ENVIRONMENT WHERE TEAMS CAN SELF-MANAGE &amp; CREATE VALUE</a:t>
+              <a:rPr lang="en-US" sz="3000" dirty="0">
+                <a:latin typeface="Ubuntu" panose="020B0504030602030204" pitchFamily="34" charset="0"/>
+              </a:rPr>
+              <a:t>Creates an environment where teams can self-manage &amp; create value</a:t>
             </a:r>
           </a:p>
         </p:txBody>
@@ -35064,7 +36245,7 @@
           <p:cNvPr id="6" name="Text Placeholder 1">
             <a:extLst>
               <a:ext uri="{FF2B5EF4-FFF2-40B4-BE49-F238E27FC236}">
-                <a16:creationId xmlns:a16="http://schemas.microsoft.com/office/drawing/2014/main" id="{C6EF0E42-794A-4C32-B57E-C28AD4330158}"/>
+                <a16:creationId xmlns:a16="http://schemas.microsoft.com/office/drawing/2014/main" id="{D869DEFD-FAD9-D801-FF67-E2AA59254600}"/>
               </a:ext>
             </a:extLst>
           </p:cNvPr>
@@ -35259,7 +36440,7 @@
     </p:spTree>
     <p:extLst>
       <p:ext uri="{BB962C8B-B14F-4D97-AF65-F5344CB8AC3E}">
-        <p14:creationId xmlns:p14="http://schemas.microsoft.com/office/powerpoint/2010/main" val="2393475525"/>
+        <p14:creationId xmlns:p14="http://schemas.microsoft.com/office/powerpoint/2010/main" val="3259217527"/>
       </p:ext>
     </p:extLst>
   </p:cSld>
@@ -35308,12 +36489,11 @@
           <a:lstStyle/>
           <a:p>
             <a:r>
-              <a:rPr lang="en-US" sz="4000" dirty="0"/>
-              <a:t>DELEGATE ALL DECISIONS &amp; RESPONSIBILITIES</a:t>
+              <a:rPr lang="en-US" sz="3000" dirty="0">
+                <a:latin typeface="Ubuntu" panose="020B0504030602030204" pitchFamily="34" charset="0"/>
+              </a:rPr>
+              <a:t>Delegate all decisions &amp; responsibilities</a:t>
             </a:r>
-            <a:endParaRPr lang="en-US" sz="1050" dirty="0">
-              <a:latin typeface="Manrope" pitchFamily="2" charset="0"/>
-            </a:endParaRPr>
           </a:p>
         </p:txBody>
       </p:sp>
@@ -35368,8 +36548,10 @@
           <a:lstStyle/>
           <a:p>
             <a:r>
-              <a:rPr lang="en-US" sz="3500" dirty="0"/>
-              <a:t>FACILITATES ENTREPRENEURSHIP &amp; GROWTH FOR EVERY EMPLOYEE</a:t>
+              <a:rPr lang="en-US" sz="3000" dirty="0">
+                <a:latin typeface="Ubuntu" panose="020B0504030602030204" pitchFamily="34" charset="0"/>
+              </a:rPr>
+              <a:t>Facilitates entrepreneurship &amp; growth for every employee</a:t>
             </a:r>
           </a:p>
         </p:txBody>
@@ -35711,12 +36893,11 @@
           <a:lstStyle/>
           <a:p>
             <a:r>
-              <a:rPr lang="en-US" sz="4000" dirty="0"/>
-              <a:t>DELEGATE ALL DECISIONS &amp; RESPONSIBILITIES</a:t>
+              <a:rPr lang="en-US" sz="3000" dirty="0">
+                <a:latin typeface="Ubuntu" panose="020B0504030602030204" pitchFamily="34" charset="0"/>
+              </a:rPr>
+              <a:t>Delegate all decisions &amp; responsibilities</a:t>
             </a:r>
-            <a:endParaRPr lang="en-US" sz="1050" dirty="0">
-              <a:latin typeface="Manrope" pitchFamily="2" charset="0"/>
-            </a:endParaRPr>
           </a:p>
         </p:txBody>
       </p:sp>
@@ -35771,8 +36952,10 @@
           <a:lstStyle/>
           <a:p>
             <a:r>
-              <a:rPr lang="en-US" sz="3500" dirty="0"/>
-              <a:t>FACILITATES ENTREPRENEURSHIP &amp; GROWTH FOR EVERY EMPLOYEE</a:t>
+              <a:rPr lang="en-US" sz="3000" dirty="0">
+                <a:latin typeface="Ubuntu" panose="020B0504030602030204" pitchFamily="34" charset="0"/>
+              </a:rPr>
+              <a:t>Facilitates entrepreneurship &amp; growth for every employee</a:t>
             </a:r>
           </a:p>
         </p:txBody>
@@ -35811,7 +36994,7 @@
           <p:cNvPr id="6" name="Text Placeholder 1">
             <a:extLst>
               <a:ext uri="{FF2B5EF4-FFF2-40B4-BE49-F238E27FC236}">
-                <a16:creationId xmlns:a16="http://schemas.microsoft.com/office/drawing/2014/main" id="{22EAF0F9-9274-6C7B-3037-6FBA51710A18}"/>
+                <a16:creationId xmlns:a16="http://schemas.microsoft.com/office/drawing/2014/main" id="{0A756B05-B252-E3EA-B220-4ABEC0201AE9}"/>
               </a:ext>
             </a:extLst>
           </p:cNvPr>
@@ -36006,7 +37189,7 @@
     </p:spTree>
     <p:extLst>
       <p:ext uri="{BB962C8B-B14F-4D97-AF65-F5344CB8AC3E}">
-        <p14:creationId xmlns:p14="http://schemas.microsoft.com/office/powerpoint/2010/main" val="1520640515"/>
+        <p14:creationId xmlns:p14="http://schemas.microsoft.com/office/powerpoint/2010/main" val="2466321810"/>
       </p:ext>
     </p:extLst>
   </p:cSld>

</xml_diff>

<commit_message>
Revert "Changed the font of the main text to the Ubuntu font to improve readibility. This should Fixes #3"
This reverts commit 4a922bc2d52b7cc705828e0670c7e5d3955a4b34.
</commit_message>
<xml_diff>
--- a/Exploring Self-Management.pptx
+++ b/Exploring Self-Management.pptx
@@ -26,51 +26,51 @@
     <p:sldId id="318" r:id="rId17"/>
     <p:sldId id="269" r:id="rId18"/>
     <p:sldId id="270" r:id="rId19"/>
-    <p:sldId id="321" r:id="rId20"/>
+    <p:sldId id="273" r:id="rId20"/>
     <p:sldId id="271" r:id="rId21"/>
-    <p:sldId id="322" r:id="rId22"/>
+    <p:sldId id="274" r:id="rId22"/>
     <p:sldId id="275" r:id="rId23"/>
-    <p:sldId id="323" r:id="rId24"/>
+    <p:sldId id="276" r:id="rId24"/>
     <p:sldId id="278" r:id="rId25"/>
-    <p:sldId id="324" r:id="rId26"/>
+    <p:sldId id="279" r:id="rId26"/>
     <p:sldId id="280" r:id="rId27"/>
-    <p:sldId id="325" r:id="rId28"/>
+    <p:sldId id="281" r:id="rId28"/>
     <p:sldId id="282" r:id="rId29"/>
     <p:sldId id="284" r:id="rId30"/>
     <p:sldId id="283" r:id="rId31"/>
-    <p:sldId id="326" r:id="rId32"/>
+    <p:sldId id="285" r:id="rId32"/>
     <p:sldId id="286" r:id="rId33"/>
-    <p:sldId id="327" r:id="rId34"/>
+    <p:sldId id="287" r:id="rId34"/>
     <p:sldId id="288" r:id="rId35"/>
-    <p:sldId id="328" r:id="rId36"/>
+    <p:sldId id="289" r:id="rId36"/>
     <p:sldId id="290" r:id="rId37"/>
-    <p:sldId id="329" r:id="rId38"/>
+    <p:sldId id="291" r:id="rId38"/>
     <p:sldId id="292" r:id="rId39"/>
-    <p:sldId id="330" r:id="rId40"/>
+    <p:sldId id="293" r:id="rId40"/>
     <p:sldId id="294" r:id="rId41"/>
     <p:sldId id="295" r:id="rId42"/>
     <p:sldId id="296" r:id="rId43"/>
-    <p:sldId id="331" r:id="rId44"/>
+    <p:sldId id="297" r:id="rId44"/>
     <p:sldId id="298" r:id="rId45"/>
-    <p:sldId id="332" r:id="rId46"/>
+    <p:sldId id="299" r:id="rId46"/>
     <p:sldId id="300" r:id="rId47"/>
-    <p:sldId id="333" r:id="rId48"/>
+    <p:sldId id="301" r:id="rId48"/>
     <p:sldId id="302" r:id="rId49"/>
-    <p:sldId id="334" r:id="rId50"/>
+    <p:sldId id="303" r:id="rId50"/>
     <p:sldId id="304" r:id="rId51"/>
-    <p:sldId id="335" r:id="rId52"/>
+    <p:sldId id="305" r:id="rId52"/>
     <p:sldId id="306" r:id="rId53"/>
     <p:sldId id="307" r:id="rId54"/>
     <p:sldId id="308" r:id="rId55"/>
-    <p:sldId id="336" r:id="rId56"/>
+    <p:sldId id="309" r:id="rId56"/>
     <p:sldId id="310" r:id="rId57"/>
-    <p:sldId id="337" r:id="rId58"/>
+    <p:sldId id="311" r:id="rId58"/>
     <p:sldId id="312" r:id="rId59"/>
-    <p:sldId id="338" r:id="rId60"/>
+    <p:sldId id="313" r:id="rId60"/>
     <p:sldId id="314" r:id="rId61"/>
-    <p:sldId id="339" r:id="rId62"/>
+    <p:sldId id="315" r:id="rId62"/>
     <p:sldId id="316" r:id="rId63"/>
-    <p:sldId id="340" r:id="rId64"/>
+    <p:sldId id="317" r:id="rId64"/>
     <p:sldId id="319" r:id="rId65"/>
     <p:sldId id="320" r:id="rId66"/>
   </p:sldIdLst>
@@ -192,7 +192,7 @@
   <pc:docChgLst>
     <pc:chgData name="Hsia, Cheehong" userId="6bc27941-0d5a-4c11-8dfb-8bbe9da0911b" providerId="ADAL" clId="{5BE5096F-7F8C-496A-A13C-FF7D0CA7A6B4}"/>
     <pc:docChg chg="undo custSel addSld delSld modSld modMainMaster">
-      <pc:chgData name="Hsia, Cheehong" userId="6bc27941-0d5a-4c11-8dfb-8bbe9da0911b" providerId="ADAL" clId="{5BE5096F-7F8C-496A-A13C-FF7D0CA7A6B4}" dt="2024-02-14T15:30:29.053" v="1624" actId="700"/>
+      <pc:chgData name="Hsia, Cheehong" userId="6bc27941-0d5a-4c11-8dfb-8bbe9da0911b" providerId="ADAL" clId="{5BE5096F-7F8C-496A-A13C-FF7D0CA7A6B4}" dt="2024-02-03T16:00:29.879" v="1021" actId="680"/>
       <pc:docMkLst>
         <pc:docMk/>
       </pc:docMkLst>
@@ -308,27 +308,11 @@
         </pc:picChg>
       </pc:sldChg>
       <pc:sldChg chg="addSp modSp mod">
-        <pc:chgData name="Hsia, Cheehong" userId="6bc27941-0d5a-4c11-8dfb-8bbe9da0911b" providerId="ADAL" clId="{5BE5096F-7F8C-496A-A13C-FF7D0CA7A6B4}" dt="2024-02-14T15:18:37.824" v="1036" actId="20577"/>
+        <pc:chgData name="Hsia, Cheehong" userId="6bc27941-0d5a-4c11-8dfb-8bbe9da0911b" providerId="ADAL" clId="{5BE5096F-7F8C-496A-A13C-FF7D0CA7A6B4}" dt="2024-02-03T15:43:14.771" v="812" actId="255"/>
         <pc:sldMkLst>
           <pc:docMk/>
           <pc:sldMk cId="1496529656" sldId="270"/>
         </pc:sldMkLst>
-        <pc:spChg chg="mod">
-          <ac:chgData name="Hsia, Cheehong" userId="6bc27941-0d5a-4c11-8dfb-8bbe9da0911b" providerId="ADAL" clId="{5BE5096F-7F8C-496A-A13C-FF7D0CA7A6B4}" dt="2024-02-14T15:18:37.824" v="1036" actId="20577"/>
-          <ac:spMkLst>
-            <pc:docMk/>
-            <pc:sldMk cId="1496529656" sldId="270"/>
-            <ac:spMk id="2" creationId="{700D1D6A-607B-8919-A042-BCCDC9CF0CF0}"/>
-          </ac:spMkLst>
-        </pc:spChg>
-        <pc:spChg chg="mod">
-          <ac:chgData name="Hsia, Cheehong" userId="6bc27941-0d5a-4c11-8dfb-8bbe9da0911b" providerId="ADAL" clId="{5BE5096F-7F8C-496A-A13C-FF7D0CA7A6B4}" dt="2024-02-14T15:17:03.412" v="1025" actId="255"/>
-          <ac:spMkLst>
-            <pc:docMk/>
-            <pc:sldMk cId="1496529656" sldId="270"/>
-            <ac:spMk id="4" creationId="{101FB840-DD80-334A-87FD-81DC71AD8A57}"/>
-          </ac:spMkLst>
-        </pc:spChg>
         <pc:spChg chg="add mod">
           <ac:chgData name="Hsia, Cheehong" userId="6bc27941-0d5a-4c11-8dfb-8bbe9da0911b" providerId="ADAL" clId="{5BE5096F-7F8C-496A-A13C-FF7D0CA7A6B4}" dt="2024-02-03T15:43:14.771" v="812" actId="255"/>
           <ac:spMkLst>
@@ -339,27 +323,11 @@
         </pc:spChg>
       </pc:sldChg>
       <pc:sldChg chg="addSp modSp mod">
-        <pc:chgData name="Hsia, Cheehong" userId="6bc27941-0d5a-4c11-8dfb-8bbe9da0911b" providerId="ADAL" clId="{5BE5096F-7F8C-496A-A13C-FF7D0CA7A6B4}" dt="2024-02-14T15:18:31.948" v="1035" actId="20577"/>
+        <pc:chgData name="Hsia, Cheehong" userId="6bc27941-0d5a-4c11-8dfb-8bbe9da0911b" providerId="ADAL" clId="{5BE5096F-7F8C-496A-A13C-FF7D0CA7A6B4}" dt="2024-02-03T15:43:33.700" v="816" actId="20577"/>
         <pc:sldMkLst>
           <pc:docMk/>
           <pc:sldMk cId="2685147449" sldId="271"/>
         </pc:sldMkLst>
-        <pc:spChg chg="mod">
-          <ac:chgData name="Hsia, Cheehong" userId="6bc27941-0d5a-4c11-8dfb-8bbe9da0911b" providerId="ADAL" clId="{5BE5096F-7F8C-496A-A13C-FF7D0CA7A6B4}" dt="2024-02-14T15:18:31.948" v="1035" actId="20577"/>
-          <ac:spMkLst>
-            <pc:docMk/>
-            <pc:sldMk cId="2685147449" sldId="271"/>
-            <ac:spMk id="2" creationId="{509F87C3-07A1-0EDC-D899-CD15F645C37F}"/>
-          </ac:spMkLst>
-        </pc:spChg>
-        <pc:spChg chg="mod">
-          <ac:chgData name="Hsia, Cheehong" userId="6bc27941-0d5a-4c11-8dfb-8bbe9da0911b" providerId="ADAL" clId="{5BE5096F-7F8C-496A-A13C-FF7D0CA7A6B4}" dt="2024-02-14T15:18:28.898" v="1034" actId="2711"/>
-          <ac:spMkLst>
-            <pc:docMk/>
-            <pc:sldMk cId="2685147449" sldId="271"/>
-            <ac:spMk id="4" creationId="{AA1D8D56-7997-9149-E3C2-4243BC163909}"/>
-          </ac:spMkLst>
-        </pc:spChg>
         <pc:spChg chg="add mod">
           <ac:chgData name="Hsia, Cheehong" userId="6bc27941-0d5a-4c11-8dfb-8bbe9da0911b" providerId="ADAL" clId="{5BE5096F-7F8C-496A-A13C-FF7D0CA7A6B4}" dt="2024-02-03T15:43:33.700" v="816" actId="20577"/>
           <ac:spMkLst>
@@ -369,20 +337,12 @@
           </ac:spMkLst>
         </pc:spChg>
       </pc:sldChg>
-      <pc:sldChg chg="addSp modSp del mod">
-        <pc:chgData name="Hsia, Cheehong" userId="6bc27941-0d5a-4c11-8dfb-8bbe9da0911b" providerId="ADAL" clId="{5BE5096F-7F8C-496A-A13C-FF7D0CA7A6B4}" dt="2024-02-14T15:17:28.919" v="1028" actId="47"/>
+      <pc:sldChg chg="addSp modSp">
+        <pc:chgData name="Hsia, Cheehong" userId="6bc27941-0d5a-4c11-8dfb-8bbe9da0911b" providerId="ADAL" clId="{5BE5096F-7F8C-496A-A13C-FF7D0CA7A6B4}" dt="2024-02-03T15:43:19.831" v="813"/>
         <pc:sldMkLst>
           <pc:docMk/>
           <pc:sldMk cId="106282829" sldId="273"/>
         </pc:sldMkLst>
-        <pc:spChg chg="mod">
-          <ac:chgData name="Hsia, Cheehong" userId="6bc27941-0d5a-4c11-8dfb-8bbe9da0911b" providerId="ADAL" clId="{5BE5096F-7F8C-496A-A13C-FF7D0CA7A6B4}" dt="2024-02-14T15:17:22.994" v="1027" actId="255"/>
-          <ac:spMkLst>
-            <pc:docMk/>
-            <pc:sldMk cId="106282829" sldId="273"/>
-            <ac:spMk id="2" creationId="{94189FDF-7B80-50D5-3AD1-CB96FAC44E6D}"/>
-          </ac:spMkLst>
-        </pc:spChg>
         <pc:spChg chg="add mod">
           <ac:chgData name="Hsia, Cheehong" userId="6bc27941-0d5a-4c11-8dfb-8bbe9da0911b" providerId="ADAL" clId="{5BE5096F-7F8C-496A-A13C-FF7D0CA7A6B4}" dt="2024-02-03T15:43:19.831" v="813"/>
           <ac:spMkLst>
@@ -392,8 +352,8 @@
           </ac:spMkLst>
         </pc:spChg>
       </pc:sldChg>
-      <pc:sldChg chg="addSp modSp del">
-        <pc:chgData name="Hsia, Cheehong" userId="6bc27941-0d5a-4c11-8dfb-8bbe9da0911b" providerId="ADAL" clId="{5BE5096F-7F8C-496A-A13C-FF7D0CA7A6B4}" dt="2024-02-14T15:18:52.358" v="1038" actId="47"/>
+      <pc:sldChg chg="addSp modSp">
+        <pc:chgData name="Hsia, Cheehong" userId="6bc27941-0d5a-4c11-8dfb-8bbe9da0911b" providerId="ADAL" clId="{5BE5096F-7F8C-496A-A13C-FF7D0CA7A6B4}" dt="2024-02-03T15:43:37.989" v="817"/>
         <pc:sldMkLst>
           <pc:docMk/>
           <pc:sldMk cId="433227676" sldId="274"/>
@@ -408,27 +368,11 @@
         </pc:spChg>
       </pc:sldChg>
       <pc:sldChg chg="addSp modSp mod">
-        <pc:chgData name="Hsia, Cheehong" userId="6bc27941-0d5a-4c11-8dfb-8bbe9da0911b" providerId="ADAL" clId="{5BE5096F-7F8C-496A-A13C-FF7D0CA7A6B4}" dt="2024-02-14T15:19:18.918" v="1046" actId="20577"/>
+        <pc:chgData name="Hsia, Cheehong" userId="6bc27941-0d5a-4c11-8dfb-8bbe9da0911b" providerId="ADAL" clId="{5BE5096F-7F8C-496A-A13C-FF7D0CA7A6B4}" dt="2024-02-03T15:43:49.397" v="820" actId="20577"/>
         <pc:sldMkLst>
           <pc:docMk/>
           <pc:sldMk cId="1492287320" sldId="275"/>
         </pc:sldMkLst>
-        <pc:spChg chg="mod">
-          <ac:chgData name="Hsia, Cheehong" userId="6bc27941-0d5a-4c11-8dfb-8bbe9da0911b" providerId="ADAL" clId="{5BE5096F-7F8C-496A-A13C-FF7D0CA7A6B4}" dt="2024-02-14T15:19:18.918" v="1046" actId="20577"/>
-          <ac:spMkLst>
-            <pc:docMk/>
-            <pc:sldMk cId="1492287320" sldId="275"/>
-            <ac:spMk id="2" creationId="{509F87C3-07A1-0EDC-D899-CD15F645C37F}"/>
-          </ac:spMkLst>
-        </pc:spChg>
-        <pc:spChg chg="mod">
-          <ac:chgData name="Hsia, Cheehong" userId="6bc27941-0d5a-4c11-8dfb-8bbe9da0911b" providerId="ADAL" clId="{5BE5096F-7F8C-496A-A13C-FF7D0CA7A6B4}" dt="2024-02-14T15:19:14.972" v="1045" actId="2711"/>
-          <ac:spMkLst>
-            <pc:docMk/>
-            <pc:sldMk cId="1492287320" sldId="275"/>
-            <ac:spMk id="4" creationId="{AA1D8D56-7997-9149-E3C2-4243BC163909}"/>
-          </ac:spMkLst>
-        </pc:spChg>
         <pc:spChg chg="add mod">
           <ac:chgData name="Hsia, Cheehong" userId="6bc27941-0d5a-4c11-8dfb-8bbe9da0911b" providerId="ADAL" clId="{5BE5096F-7F8C-496A-A13C-FF7D0CA7A6B4}" dt="2024-02-03T15:43:49.397" v="820" actId="20577"/>
           <ac:spMkLst>
@@ -438,8 +382,8 @@
           </ac:spMkLst>
         </pc:spChg>
       </pc:sldChg>
-      <pc:sldChg chg="addSp modSp del">
-        <pc:chgData name="Hsia, Cheehong" userId="6bc27941-0d5a-4c11-8dfb-8bbe9da0911b" providerId="ADAL" clId="{5BE5096F-7F8C-496A-A13C-FF7D0CA7A6B4}" dt="2024-02-14T15:19:24.465" v="1047" actId="47"/>
+      <pc:sldChg chg="addSp modSp">
+        <pc:chgData name="Hsia, Cheehong" userId="6bc27941-0d5a-4c11-8dfb-8bbe9da0911b" providerId="ADAL" clId="{5BE5096F-7F8C-496A-A13C-FF7D0CA7A6B4}" dt="2024-02-03T15:43:55.173" v="821"/>
         <pc:sldMkLst>
           <pc:docMk/>
           <pc:sldMk cId="1970583200" sldId="276"/>
@@ -454,27 +398,11 @@
         </pc:spChg>
       </pc:sldChg>
       <pc:sldChg chg="addSp modSp mod">
-        <pc:chgData name="Hsia, Cheehong" userId="6bc27941-0d5a-4c11-8dfb-8bbe9da0911b" providerId="ADAL" clId="{5BE5096F-7F8C-496A-A13C-FF7D0CA7A6B4}" dt="2024-02-14T15:19:55.972" v="1056" actId="20577"/>
+        <pc:chgData name="Hsia, Cheehong" userId="6bc27941-0d5a-4c11-8dfb-8bbe9da0911b" providerId="ADAL" clId="{5BE5096F-7F8C-496A-A13C-FF7D0CA7A6B4}" dt="2024-02-03T15:44:05.210" v="823" actId="20577"/>
         <pc:sldMkLst>
           <pc:docMk/>
           <pc:sldMk cId="161617201" sldId="278"/>
         </pc:sldMkLst>
-        <pc:spChg chg="mod">
-          <ac:chgData name="Hsia, Cheehong" userId="6bc27941-0d5a-4c11-8dfb-8bbe9da0911b" providerId="ADAL" clId="{5BE5096F-7F8C-496A-A13C-FF7D0CA7A6B4}" dt="2024-02-14T15:19:36.821" v="1051" actId="255"/>
-          <ac:spMkLst>
-            <pc:docMk/>
-            <pc:sldMk cId="161617201" sldId="278"/>
-            <ac:spMk id="2" creationId="{509F87C3-07A1-0EDC-D899-CD15F645C37F}"/>
-          </ac:spMkLst>
-        </pc:spChg>
-        <pc:spChg chg="mod">
-          <ac:chgData name="Hsia, Cheehong" userId="6bc27941-0d5a-4c11-8dfb-8bbe9da0911b" providerId="ADAL" clId="{5BE5096F-7F8C-496A-A13C-FF7D0CA7A6B4}" dt="2024-02-14T15:19:55.972" v="1056" actId="20577"/>
-          <ac:spMkLst>
-            <pc:docMk/>
-            <pc:sldMk cId="161617201" sldId="278"/>
-            <ac:spMk id="4" creationId="{AA1D8D56-7997-9149-E3C2-4243BC163909}"/>
-          </ac:spMkLst>
-        </pc:spChg>
         <pc:spChg chg="add mod">
           <ac:chgData name="Hsia, Cheehong" userId="6bc27941-0d5a-4c11-8dfb-8bbe9da0911b" providerId="ADAL" clId="{5BE5096F-7F8C-496A-A13C-FF7D0CA7A6B4}" dt="2024-02-03T15:44:05.210" v="823" actId="20577"/>
           <ac:spMkLst>
@@ -484,8 +412,8 @@
           </ac:spMkLst>
         </pc:spChg>
       </pc:sldChg>
-      <pc:sldChg chg="addSp modSp del">
-        <pc:chgData name="Hsia, Cheehong" userId="6bc27941-0d5a-4c11-8dfb-8bbe9da0911b" providerId="ADAL" clId="{5BE5096F-7F8C-496A-A13C-FF7D0CA7A6B4}" dt="2024-02-14T15:20:01.083" v="1057" actId="47"/>
+      <pc:sldChg chg="addSp modSp">
+        <pc:chgData name="Hsia, Cheehong" userId="6bc27941-0d5a-4c11-8dfb-8bbe9da0911b" providerId="ADAL" clId="{5BE5096F-7F8C-496A-A13C-FF7D0CA7A6B4}" dt="2024-02-03T15:44:10.377" v="824"/>
         <pc:sldMkLst>
           <pc:docMk/>
           <pc:sldMk cId="596055484" sldId="279"/>
@@ -500,27 +428,11 @@
         </pc:spChg>
       </pc:sldChg>
       <pc:sldChg chg="addSp modSp mod">
-        <pc:chgData name="Hsia, Cheehong" userId="6bc27941-0d5a-4c11-8dfb-8bbe9da0911b" providerId="ADAL" clId="{5BE5096F-7F8C-496A-A13C-FF7D0CA7A6B4}" dt="2024-02-14T15:20:23.544" v="1064" actId="255"/>
+        <pc:chgData name="Hsia, Cheehong" userId="6bc27941-0d5a-4c11-8dfb-8bbe9da0911b" providerId="ADAL" clId="{5BE5096F-7F8C-496A-A13C-FF7D0CA7A6B4}" dt="2024-02-03T15:44:25.731" v="826" actId="20577"/>
         <pc:sldMkLst>
           <pc:docMk/>
           <pc:sldMk cId="2564199674" sldId="280"/>
         </pc:sldMkLst>
-        <pc:spChg chg="mod">
-          <ac:chgData name="Hsia, Cheehong" userId="6bc27941-0d5a-4c11-8dfb-8bbe9da0911b" providerId="ADAL" clId="{5BE5096F-7F8C-496A-A13C-FF7D0CA7A6B4}" dt="2024-02-14T15:20:18.129" v="1062" actId="20577"/>
-          <ac:spMkLst>
-            <pc:docMk/>
-            <pc:sldMk cId="2564199674" sldId="280"/>
-            <ac:spMk id="2" creationId="{509F87C3-07A1-0EDC-D899-CD15F645C37F}"/>
-          </ac:spMkLst>
-        </pc:spChg>
-        <pc:spChg chg="mod">
-          <ac:chgData name="Hsia, Cheehong" userId="6bc27941-0d5a-4c11-8dfb-8bbe9da0911b" providerId="ADAL" clId="{5BE5096F-7F8C-496A-A13C-FF7D0CA7A6B4}" dt="2024-02-14T15:20:23.544" v="1064" actId="255"/>
-          <ac:spMkLst>
-            <pc:docMk/>
-            <pc:sldMk cId="2564199674" sldId="280"/>
-            <ac:spMk id="4" creationId="{AA1D8D56-7997-9149-E3C2-4243BC163909}"/>
-          </ac:spMkLst>
-        </pc:spChg>
         <pc:spChg chg="add mod">
           <ac:chgData name="Hsia, Cheehong" userId="6bc27941-0d5a-4c11-8dfb-8bbe9da0911b" providerId="ADAL" clId="{5BE5096F-7F8C-496A-A13C-FF7D0CA7A6B4}" dt="2024-02-03T15:44:25.731" v="826" actId="20577"/>
           <ac:spMkLst>
@@ -530,8 +442,8 @@
           </ac:spMkLst>
         </pc:spChg>
       </pc:sldChg>
-      <pc:sldChg chg="addSp modSp del">
-        <pc:chgData name="Hsia, Cheehong" userId="6bc27941-0d5a-4c11-8dfb-8bbe9da0911b" providerId="ADAL" clId="{5BE5096F-7F8C-496A-A13C-FF7D0CA7A6B4}" dt="2024-02-14T15:20:28.551" v="1065" actId="47"/>
+      <pc:sldChg chg="addSp modSp">
+        <pc:chgData name="Hsia, Cheehong" userId="6bc27941-0d5a-4c11-8dfb-8bbe9da0911b" providerId="ADAL" clId="{5BE5096F-7F8C-496A-A13C-FF7D0CA7A6B4}" dt="2024-02-03T15:44:29.892" v="827"/>
         <pc:sldMkLst>
           <pc:docMk/>
           <pc:sldMk cId="3282675112" sldId="281"/>
@@ -673,27 +585,11 @@
         </pc:picChg>
       </pc:sldChg>
       <pc:sldChg chg="addSp modSp mod">
-        <pc:chgData name="Hsia, Cheehong" userId="6bc27941-0d5a-4c11-8dfb-8bbe9da0911b" providerId="ADAL" clId="{5BE5096F-7F8C-496A-A13C-FF7D0CA7A6B4}" dt="2024-02-14T15:21:01.204" v="1076" actId="255"/>
+        <pc:chgData name="Hsia, Cheehong" userId="6bc27941-0d5a-4c11-8dfb-8bbe9da0911b" providerId="ADAL" clId="{5BE5096F-7F8C-496A-A13C-FF7D0CA7A6B4}" dt="2024-02-03T15:46:47.779" v="829" actId="20577"/>
         <pc:sldMkLst>
           <pc:docMk/>
           <pc:sldMk cId="1962898729" sldId="283"/>
         </pc:sldMkLst>
-        <pc:spChg chg="mod">
-          <ac:chgData name="Hsia, Cheehong" userId="6bc27941-0d5a-4c11-8dfb-8bbe9da0911b" providerId="ADAL" clId="{5BE5096F-7F8C-496A-A13C-FF7D0CA7A6B4}" dt="2024-02-14T15:20:54.979" v="1074" actId="20577"/>
-          <ac:spMkLst>
-            <pc:docMk/>
-            <pc:sldMk cId="1962898729" sldId="283"/>
-            <ac:spMk id="2" creationId="{66890E70-EDB5-4D8C-2B4F-029FA9E51D4E}"/>
-          </ac:spMkLst>
-        </pc:spChg>
-        <pc:spChg chg="mod">
-          <ac:chgData name="Hsia, Cheehong" userId="6bc27941-0d5a-4c11-8dfb-8bbe9da0911b" providerId="ADAL" clId="{5BE5096F-7F8C-496A-A13C-FF7D0CA7A6B4}" dt="2024-02-14T15:21:01.204" v="1076" actId="255"/>
-          <ac:spMkLst>
-            <pc:docMk/>
-            <pc:sldMk cId="1962898729" sldId="283"/>
-            <ac:spMk id="4" creationId="{F978620C-B722-98CC-0FA2-E22F5047512F}"/>
-          </ac:spMkLst>
-        </pc:spChg>
         <pc:spChg chg="add mod">
           <ac:chgData name="Hsia, Cheehong" userId="6bc27941-0d5a-4c11-8dfb-8bbe9da0911b" providerId="ADAL" clId="{5BE5096F-7F8C-496A-A13C-FF7D0CA7A6B4}" dt="2024-02-03T15:46:47.779" v="829" actId="20577"/>
           <ac:spMkLst>
@@ -703,8 +599,8 @@
           </ac:spMkLst>
         </pc:spChg>
       </pc:sldChg>
-      <pc:sldChg chg="addSp modSp del">
-        <pc:chgData name="Hsia, Cheehong" userId="6bc27941-0d5a-4c11-8dfb-8bbe9da0911b" providerId="ADAL" clId="{5BE5096F-7F8C-496A-A13C-FF7D0CA7A6B4}" dt="2024-02-14T15:21:05.503" v="1077" actId="47"/>
+      <pc:sldChg chg="addSp modSp">
+        <pc:chgData name="Hsia, Cheehong" userId="6bc27941-0d5a-4c11-8dfb-8bbe9da0911b" providerId="ADAL" clId="{5BE5096F-7F8C-496A-A13C-FF7D0CA7A6B4}" dt="2024-02-03T15:46:52.802" v="830"/>
         <pc:sldMkLst>
           <pc:docMk/>
           <pc:sldMk cId="1386201035" sldId="285"/>
@@ -719,27 +615,11 @@
         </pc:spChg>
       </pc:sldChg>
       <pc:sldChg chg="addSp modSp mod">
-        <pc:chgData name="Hsia, Cheehong" userId="6bc27941-0d5a-4c11-8dfb-8bbe9da0911b" providerId="ADAL" clId="{5BE5096F-7F8C-496A-A13C-FF7D0CA7A6B4}" dt="2024-02-14T15:21:33.516" v="1087" actId="20577"/>
+        <pc:chgData name="Hsia, Cheehong" userId="6bc27941-0d5a-4c11-8dfb-8bbe9da0911b" providerId="ADAL" clId="{5BE5096F-7F8C-496A-A13C-FF7D0CA7A6B4}" dt="2024-02-03T15:47:01.223" v="832" actId="20577"/>
         <pc:sldMkLst>
           <pc:docMk/>
           <pc:sldMk cId="3741328940" sldId="286"/>
         </pc:sldMkLst>
-        <pc:spChg chg="mod">
-          <ac:chgData name="Hsia, Cheehong" userId="6bc27941-0d5a-4c11-8dfb-8bbe9da0911b" providerId="ADAL" clId="{5BE5096F-7F8C-496A-A13C-FF7D0CA7A6B4}" dt="2024-02-14T15:21:23.173" v="1084" actId="20577"/>
-          <ac:spMkLst>
-            <pc:docMk/>
-            <pc:sldMk cId="3741328940" sldId="286"/>
-            <ac:spMk id="2" creationId="{66890E70-EDB5-4D8C-2B4F-029FA9E51D4E}"/>
-          </ac:spMkLst>
-        </pc:spChg>
-        <pc:spChg chg="mod">
-          <ac:chgData name="Hsia, Cheehong" userId="6bc27941-0d5a-4c11-8dfb-8bbe9da0911b" providerId="ADAL" clId="{5BE5096F-7F8C-496A-A13C-FF7D0CA7A6B4}" dt="2024-02-14T15:21:33.516" v="1087" actId="20577"/>
-          <ac:spMkLst>
-            <pc:docMk/>
-            <pc:sldMk cId="3741328940" sldId="286"/>
-            <ac:spMk id="4" creationId="{F978620C-B722-98CC-0FA2-E22F5047512F}"/>
-          </ac:spMkLst>
-        </pc:spChg>
         <pc:spChg chg="add mod">
           <ac:chgData name="Hsia, Cheehong" userId="6bc27941-0d5a-4c11-8dfb-8bbe9da0911b" providerId="ADAL" clId="{5BE5096F-7F8C-496A-A13C-FF7D0CA7A6B4}" dt="2024-02-03T15:47:01.223" v="832" actId="20577"/>
           <ac:spMkLst>
@@ -749,8 +629,8 @@
           </ac:spMkLst>
         </pc:spChg>
       </pc:sldChg>
-      <pc:sldChg chg="addSp modSp del">
-        <pc:chgData name="Hsia, Cheehong" userId="6bc27941-0d5a-4c11-8dfb-8bbe9da0911b" providerId="ADAL" clId="{5BE5096F-7F8C-496A-A13C-FF7D0CA7A6B4}" dt="2024-02-14T15:21:38.274" v="1088" actId="47"/>
+      <pc:sldChg chg="addSp modSp">
+        <pc:chgData name="Hsia, Cheehong" userId="6bc27941-0d5a-4c11-8dfb-8bbe9da0911b" providerId="ADAL" clId="{5BE5096F-7F8C-496A-A13C-FF7D0CA7A6B4}" dt="2024-02-03T15:47:04.644" v="833"/>
         <pc:sldMkLst>
           <pc:docMk/>
           <pc:sldMk cId="3471392720" sldId="287"/>
@@ -765,27 +645,11 @@
         </pc:spChg>
       </pc:sldChg>
       <pc:sldChg chg="addSp modSp mod">
-        <pc:chgData name="Hsia, Cheehong" userId="6bc27941-0d5a-4c11-8dfb-8bbe9da0911b" providerId="ADAL" clId="{5BE5096F-7F8C-496A-A13C-FF7D0CA7A6B4}" dt="2024-02-14T15:22:03.481" v="1095" actId="20577"/>
+        <pc:chgData name="Hsia, Cheehong" userId="6bc27941-0d5a-4c11-8dfb-8bbe9da0911b" providerId="ADAL" clId="{5BE5096F-7F8C-496A-A13C-FF7D0CA7A6B4}" dt="2024-02-03T15:47:10.059" v="835" actId="20577"/>
         <pc:sldMkLst>
           <pc:docMk/>
           <pc:sldMk cId="3337217698" sldId="288"/>
         </pc:sldMkLst>
-        <pc:spChg chg="mod">
-          <ac:chgData name="Hsia, Cheehong" userId="6bc27941-0d5a-4c11-8dfb-8bbe9da0911b" providerId="ADAL" clId="{5BE5096F-7F8C-496A-A13C-FF7D0CA7A6B4}" dt="2024-02-14T15:21:51.734" v="1092" actId="255"/>
-          <ac:spMkLst>
-            <pc:docMk/>
-            <pc:sldMk cId="3337217698" sldId="288"/>
-            <ac:spMk id="2" creationId="{66890E70-EDB5-4D8C-2B4F-029FA9E51D4E}"/>
-          </ac:spMkLst>
-        </pc:spChg>
-        <pc:spChg chg="mod">
-          <ac:chgData name="Hsia, Cheehong" userId="6bc27941-0d5a-4c11-8dfb-8bbe9da0911b" providerId="ADAL" clId="{5BE5096F-7F8C-496A-A13C-FF7D0CA7A6B4}" dt="2024-02-14T15:22:03.481" v="1095" actId="20577"/>
-          <ac:spMkLst>
-            <pc:docMk/>
-            <pc:sldMk cId="3337217698" sldId="288"/>
-            <ac:spMk id="4" creationId="{F978620C-B722-98CC-0FA2-E22F5047512F}"/>
-          </ac:spMkLst>
-        </pc:spChg>
         <pc:spChg chg="add mod">
           <ac:chgData name="Hsia, Cheehong" userId="6bc27941-0d5a-4c11-8dfb-8bbe9da0911b" providerId="ADAL" clId="{5BE5096F-7F8C-496A-A13C-FF7D0CA7A6B4}" dt="2024-02-03T15:47:10.059" v="835" actId="20577"/>
           <ac:spMkLst>
@@ -795,8 +659,8 @@
           </ac:spMkLst>
         </pc:spChg>
       </pc:sldChg>
-      <pc:sldChg chg="addSp modSp del">
-        <pc:chgData name="Hsia, Cheehong" userId="6bc27941-0d5a-4c11-8dfb-8bbe9da0911b" providerId="ADAL" clId="{5BE5096F-7F8C-496A-A13C-FF7D0CA7A6B4}" dt="2024-02-14T15:22:08.970" v="1096" actId="47"/>
+      <pc:sldChg chg="addSp modSp">
+        <pc:chgData name="Hsia, Cheehong" userId="6bc27941-0d5a-4c11-8dfb-8bbe9da0911b" providerId="ADAL" clId="{5BE5096F-7F8C-496A-A13C-FF7D0CA7A6B4}" dt="2024-02-03T15:47:12.570" v="836"/>
         <pc:sldMkLst>
           <pc:docMk/>
           <pc:sldMk cId="1734131973" sldId="289"/>
@@ -811,27 +675,11 @@
         </pc:spChg>
       </pc:sldChg>
       <pc:sldChg chg="addSp modSp mod">
-        <pc:chgData name="Hsia, Cheehong" userId="6bc27941-0d5a-4c11-8dfb-8bbe9da0911b" providerId="ADAL" clId="{5BE5096F-7F8C-496A-A13C-FF7D0CA7A6B4}" dt="2024-02-14T15:22:38.841" v="1103" actId="20577"/>
+        <pc:chgData name="Hsia, Cheehong" userId="6bc27941-0d5a-4c11-8dfb-8bbe9da0911b" providerId="ADAL" clId="{5BE5096F-7F8C-496A-A13C-FF7D0CA7A6B4}" dt="2024-02-03T15:47:20.656" v="839" actId="20577"/>
         <pc:sldMkLst>
           <pc:docMk/>
           <pc:sldMk cId="539056256" sldId="290"/>
         </pc:sldMkLst>
-        <pc:spChg chg="mod">
-          <ac:chgData name="Hsia, Cheehong" userId="6bc27941-0d5a-4c11-8dfb-8bbe9da0911b" providerId="ADAL" clId="{5BE5096F-7F8C-496A-A13C-FF7D0CA7A6B4}" dt="2024-02-14T15:22:25.294" v="1100" actId="255"/>
-          <ac:spMkLst>
-            <pc:docMk/>
-            <pc:sldMk cId="539056256" sldId="290"/>
-            <ac:spMk id="2" creationId="{66890E70-EDB5-4D8C-2B4F-029FA9E51D4E}"/>
-          </ac:spMkLst>
-        </pc:spChg>
-        <pc:spChg chg="mod">
-          <ac:chgData name="Hsia, Cheehong" userId="6bc27941-0d5a-4c11-8dfb-8bbe9da0911b" providerId="ADAL" clId="{5BE5096F-7F8C-496A-A13C-FF7D0CA7A6B4}" dt="2024-02-14T15:22:38.841" v="1103" actId="20577"/>
-          <ac:spMkLst>
-            <pc:docMk/>
-            <pc:sldMk cId="539056256" sldId="290"/>
-            <ac:spMk id="4" creationId="{F978620C-B722-98CC-0FA2-E22F5047512F}"/>
-          </ac:spMkLst>
-        </pc:spChg>
         <pc:spChg chg="add mod">
           <ac:chgData name="Hsia, Cheehong" userId="6bc27941-0d5a-4c11-8dfb-8bbe9da0911b" providerId="ADAL" clId="{5BE5096F-7F8C-496A-A13C-FF7D0CA7A6B4}" dt="2024-02-03T15:47:20.656" v="839" actId="20577"/>
           <ac:spMkLst>
@@ -841,8 +689,8 @@
           </ac:spMkLst>
         </pc:spChg>
       </pc:sldChg>
-      <pc:sldChg chg="addSp modSp del">
-        <pc:chgData name="Hsia, Cheehong" userId="6bc27941-0d5a-4c11-8dfb-8bbe9da0911b" providerId="ADAL" clId="{5BE5096F-7F8C-496A-A13C-FF7D0CA7A6B4}" dt="2024-02-14T15:22:44.977" v="1105" actId="47"/>
+      <pc:sldChg chg="addSp modSp">
+        <pc:chgData name="Hsia, Cheehong" userId="6bc27941-0d5a-4c11-8dfb-8bbe9da0911b" providerId="ADAL" clId="{5BE5096F-7F8C-496A-A13C-FF7D0CA7A6B4}" dt="2024-02-03T15:47:23.609" v="840"/>
         <pc:sldMkLst>
           <pc:docMk/>
           <pc:sldMk cId="1292218336" sldId="291"/>
@@ -857,27 +705,11 @@
         </pc:spChg>
       </pc:sldChg>
       <pc:sldChg chg="addSp modSp mod">
-        <pc:chgData name="Hsia, Cheehong" userId="6bc27941-0d5a-4c11-8dfb-8bbe9da0911b" providerId="ADAL" clId="{5BE5096F-7F8C-496A-A13C-FF7D0CA7A6B4}" dt="2024-02-14T15:23:01.262" v="1110" actId="255"/>
+        <pc:chgData name="Hsia, Cheehong" userId="6bc27941-0d5a-4c11-8dfb-8bbe9da0911b" providerId="ADAL" clId="{5BE5096F-7F8C-496A-A13C-FF7D0CA7A6B4}" dt="2024-02-03T15:47:34.543" v="842" actId="20577"/>
         <pc:sldMkLst>
           <pc:docMk/>
           <pc:sldMk cId="2261043360" sldId="292"/>
         </pc:sldMkLst>
-        <pc:spChg chg="mod">
-          <ac:chgData name="Hsia, Cheehong" userId="6bc27941-0d5a-4c11-8dfb-8bbe9da0911b" providerId="ADAL" clId="{5BE5096F-7F8C-496A-A13C-FF7D0CA7A6B4}" dt="2024-02-14T15:22:55.702" v="1108" actId="255"/>
-          <ac:spMkLst>
-            <pc:docMk/>
-            <pc:sldMk cId="2261043360" sldId="292"/>
-            <ac:spMk id="2" creationId="{66890E70-EDB5-4D8C-2B4F-029FA9E51D4E}"/>
-          </ac:spMkLst>
-        </pc:spChg>
-        <pc:spChg chg="mod">
-          <ac:chgData name="Hsia, Cheehong" userId="6bc27941-0d5a-4c11-8dfb-8bbe9da0911b" providerId="ADAL" clId="{5BE5096F-7F8C-496A-A13C-FF7D0CA7A6B4}" dt="2024-02-14T15:23:01.262" v="1110" actId="255"/>
-          <ac:spMkLst>
-            <pc:docMk/>
-            <pc:sldMk cId="2261043360" sldId="292"/>
-            <ac:spMk id="4" creationId="{F978620C-B722-98CC-0FA2-E22F5047512F}"/>
-          </ac:spMkLst>
-        </pc:spChg>
         <pc:spChg chg="add mod">
           <ac:chgData name="Hsia, Cheehong" userId="6bc27941-0d5a-4c11-8dfb-8bbe9da0911b" providerId="ADAL" clId="{5BE5096F-7F8C-496A-A13C-FF7D0CA7A6B4}" dt="2024-02-03T15:47:34.543" v="842" actId="20577"/>
           <ac:spMkLst>
@@ -887,8 +719,8 @@
           </ac:spMkLst>
         </pc:spChg>
       </pc:sldChg>
-      <pc:sldChg chg="addSp modSp del">
-        <pc:chgData name="Hsia, Cheehong" userId="6bc27941-0d5a-4c11-8dfb-8bbe9da0911b" providerId="ADAL" clId="{5BE5096F-7F8C-496A-A13C-FF7D0CA7A6B4}" dt="2024-02-14T15:23:07.102" v="1111" actId="47"/>
+      <pc:sldChg chg="addSp modSp">
+        <pc:chgData name="Hsia, Cheehong" userId="6bc27941-0d5a-4c11-8dfb-8bbe9da0911b" providerId="ADAL" clId="{5BE5096F-7F8C-496A-A13C-FF7D0CA7A6B4}" dt="2024-02-03T15:47:40.382" v="843"/>
         <pc:sldMkLst>
           <pc:docMk/>
           <pc:sldMk cId="2951154706" sldId="293"/>
@@ -966,27 +798,11 @@
         </pc:picChg>
       </pc:sldChg>
       <pc:sldChg chg="addSp modSp mod">
-        <pc:chgData name="Hsia, Cheehong" userId="6bc27941-0d5a-4c11-8dfb-8bbe9da0911b" providerId="ADAL" clId="{5BE5096F-7F8C-496A-A13C-FF7D0CA7A6B4}" dt="2024-02-14T15:23:49.503" v="1121" actId="20577"/>
+        <pc:chgData name="Hsia, Cheehong" userId="6bc27941-0d5a-4c11-8dfb-8bbe9da0911b" providerId="ADAL" clId="{5BE5096F-7F8C-496A-A13C-FF7D0CA7A6B4}" dt="2024-02-03T15:48:33.891" v="845" actId="20577"/>
         <pc:sldMkLst>
           <pc:docMk/>
           <pc:sldMk cId="3190214858" sldId="296"/>
         </pc:sldMkLst>
-        <pc:spChg chg="mod">
-          <ac:chgData name="Hsia, Cheehong" userId="6bc27941-0d5a-4c11-8dfb-8bbe9da0911b" providerId="ADAL" clId="{5BE5096F-7F8C-496A-A13C-FF7D0CA7A6B4}" dt="2024-02-14T15:23:25.803" v="1117" actId="20577"/>
-          <ac:spMkLst>
-            <pc:docMk/>
-            <pc:sldMk cId="3190214858" sldId="296"/>
-            <ac:spMk id="2" creationId="{AD90CEB0-783B-5FA4-1028-D4B692C5B2CE}"/>
-          </ac:spMkLst>
-        </pc:spChg>
-        <pc:spChg chg="mod">
-          <ac:chgData name="Hsia, Cheehong" userId="6bc27941-0d5a-4c11-8dfb-8bbe9da0911b" providerId="ADAL" clId="{5BE5096F-7F8C-496A-A13C-FF7D0CA7A6B4}" dt="2024-02-14T15:23:49.503" v="1121" actId="20577"/>
-          <ac:spMkLst>
-            <pc:docMk/>
-            <pc:sldMk cId="3190214858" sldId="296"/>
-            <ac:spMk id="4" creationId="{3859056E-FEDA-2D8C-90B8-7DB995ECB8A4}"/>
-          </ac:spMkLst>
-        </pc:spChg>
         <pc:spChg chg="add mod">
           <ac:chgData name="Hsia, Cheehong" userId="6bc27941-0d5a-4c11-8dfb-8bbe9da0911b" providerId="ADAL" clId="{5BE5096F-7F8C-496A-A13C-FF7D0CA7A6B4}" dt="2024-02-03T15:48:33.891" v="845" actId="20577"/>
           <ac:spMkLst>
@@ -996,8 +812,8 @@
           </ac:spMkLst>
         </pc:spChg>
       </pc:sldChg>
-      <pc:sldChg chg="addSp modSp del">
-        <pc:chgData name="Hsia, Cheehong" userId="6bc27941-0d5a-4c11-8dfb-8bbe9da0911b" providerId="ADAL" clId="{5BE5096F-7F8C-496A-A13C-FF7D0CA7A6B4}" dt="2024-02-14T15:23:58.099" v="1122" actId="47"/>
+      <pc:sldChg chg="addSp modSp">
+        <pc:chgData name="Hsia, Cheehong" userId="6bc27941-0d5a-4c11-8dfb-8bbe9da0911b" providerId="ADAL" clId="{5BE5096F-7F8C-496A-A13C-FF7D0CA7A6B4}" dt="2024-02-03T15:48:35.964" v="846"/>
         <pc:sldMkLst>
           <pc:docMk/>
           <pc:sldMk cId="826171372" sldId="297"/>
@@ -1012,27 +828,11 @@
         </pc:spChg>
       </pc:sldChg>
       <pc:sldChg chg="addSp modSp mod">
-        <pc:chgData name="Hsia, Cheehong" userId="6bc27941-0d5a-4c11-8dfb-8bbe9da0911b" providerId="ADAL" clId="{5BE5096F-7F8C-496A-A13C-FF7D0CA7A6B4}" dt="2024-02-14T15:24:23.724" v="1131" actId="20577"/>
+        <pc:chgData name="Hsia, Cheehong" userId="6bc27941-0d5a-4c11-8dfb-8bbe9da0911b" providerId="ADAL" clId="{5BE5096F-7F8C-496A-A13C-FF7D0CA7A6B4}" dt="2024-02-03T15:48:40.876" v="849" actId="20577"/>
         <pc:sldMkLst>
           <pc:docMk/>
           <pc:sldMk cId="2752436879" sldId="298"/>
         </pc:sldMkLst>
-        <pc:spChg chg="mod">
-          <ac:chgData name="Hsia, Cheehong" userId="6bc27941-0d5a-4c11-8dfb-8bbe9da0911b" providerId="ADAL" clId="{5BE5096F-7F8C-496A-A13C-FF7D0CA7A6B4}" dt="2024-02-14T15:24:16.544" v="1128" actId="20577"/>
-          <ac:spMkLst>
-            <pc:docMk/>
-            <pc:sldMk cId="2752436879" sldId="298"/>
-            <ac:spMk id="2" creationId="{AD90CEB0-783B-5FA4-1028-D4B692C5B2CE}"/>
-          </ac:spMkLst>
-        </pc:spChg>
-        <pc:spChg chg="mod">
-          <ac:chgData name="Hsia, Cheehong" userId="6bc27941-0d5a-4c11-8dfb-8bbe9da0911b" providerId="ADAL" clId="{5BE5096F-7F8C-496A-A13C-FF7D0CA7A6B4}" dt="2024-02-14T15:24:23.724" v="1131" actId="20577"/>
-          <ac:spMkLst>
-            <pc:docMk/>
-            <pc:sldMk cId="2752436879" sldId="298"/>
-            <ac:spMk id="4" creationId="{3859056E-FEDA-2D8C-90B8-7DB995ECB8A4}"/>
-          </ac:spMkLst>
-        </pc:spChg>
         <pc:spChg chg="add mod">
           <ac:chgData name="Hsia, Cheehong" userId="6bc27941-0d5a-4c11-8dfb-8bbe9da0911b" providerId="ADAL" clId="{5BE5096F-7F8C-496A-A13C-FF7D0CA7A6B4}" dt="2024-02-03T15:48:40.876" v="849" actId="20577"/>
           <ac:spMkLst>
@@ -1042,8 +842,8 @@
           </ac:spMkLst>
         </pc:spChg>
       </pc:sldChg>
-      <pc:sldChg chg="addSp modSp del">
-        <pc:chgData name="Hsia, Cheehong" userId="6bc27941-0d5a-4c11-8dfb-8bbe9da0911b" providerId="ADAL" clId="{5BE5096F-7F8C-496A-A13C-FF7D0CA7A6B4}" dt="2024-02-14T15:24:27.336" v="1132" actId="47"/>
+      <pc:sldChg chg="addSp modSp">
+        <pc:chgData name="Hsia, Cheehong" userId="6bc27941-0d5a-4c11-8dfb-8bbe9da0911b" providerId="ADAL" clId="{5BE5096F-7F8C-496A-A13C-FF7D0CA7A6B4}" dt="2024-02-03T15:48:46.723" v="850"/>
         <pc:sldMkLst>
           <pc:docMk/>
           <pc:sldMk cId="217489594" sldId="299"/>
@@ -1058,27 +858,11 @@
         </pc:spChg>
       </pc:sldChg>
       <pc:sldChg chg="addSp modSp mod">
-        <pc:chgData name="Hsia, Cheehong" userId="6bc27941-0d5a-4c11-8dfb-8bbe9da0911b" providerId="ADAL" clId="{5BE5096F-7F8C-496A-A13C-FF7D0CA7A6B4}" dt="2024-02-14T15:24:52.407" v="1141" actId="20577"/>
+        <pc:chgData name="Hsia, Cheehong" userId="6bc27941-0d5a-4c11-8dfb-8bbe9da0911b" providerId="ADAL" clId="{5BE5096F-7F8C-496A-A13C-FF7D0CA7A6B4}" dt="2024-02-03T15:48:56.170" v="853" actId="20577"/>
         <pc:sldMkLst>
           <pc:docMk/>
           <pc:sldMk cId="2193924565" sldId="300"/>
         </pc:sldMkLst>
-        <pc:spChg chg="mod">
-          <ac:chgData name="Hsia, Cheehong" userId="6bc27941-0d5a-4c11-8dfb-8bbe9da0911b" providerId="ADAL" clId="{5BE5096F-7F8C-496A-A13C-FF7D0CA7A6B4}" dt="2024-02-14T15:24:42.813" v="1138" actId="20577"/>
-          <ac:spMkLst>
-            <pc:docMk/>
-            <pc:sldMk cId="2193924565" sldId="300"/>
-            <ac:spMk id="2" creationId="{AD90CEB0-783B-5FA4-1028-D4B692C5B2CE}"/>
-          </ac:spMkLst>
-        </pc:spChg>
-        <pc:spChg chg="mod">
-          <ac:chgData name="Hsia, Cheehong" userId="6bc27941-0d5a-4c11-8dfb-8bbe9da0911b" providerId="ADAL" clId="{5BE5096F-7F8C-496A-A13C-FF7D0CA7A6B4}" dt="2024-02-14T15:24:52.407" v="1141" actId="20577"/>
-          <ac:spMkLst>
-            <pc:docMk/>
-            <pc:sldMk cId="2193924565" sldId="300"/>
-            <ac:spMk id="4" creationId="{3859056E-FEDA-2D8C-90B8-7DB995ECB8A4}"/>
-          </ac:spMkLst>
-        </pc:spChg>
         <pc:spChg chg="add mod">
           <ac:chgData name="Hsia, Cheehong" userId="6bc27941-0d5a-4c11-8dfb-8bbe9da0911b" providerId="ADAL" clId="{5BE5096F-7F8C-496A-A13C-FF7D0CA7A6B4}" dt="2024-02-03T15:48:56.170" v="853" actId="20577"/>
           <ac:spMkLst>
@@ -1088,8 +872,8 @@
           </ac:spMkLst>
         </pc:spChg>
       </pc:sldChg>
-      <pc:sldChg chg="addSp modSp del">
-        <pc:chgData name="Hsia, Cheehong" userId="6bc27941-0d5a-4c11-8dfb-8bbe9da0911b" providerId="ADAL" clId="{5BE5096F-7F8C-496A-A13C-FF7D0CA7A6B4}" dt="2024-02-14T15:24:57.186" v="1142" actId="47"/>
+      <pc:sldChg chg="addSp modSp">
+        <pc:chgData name="Hsia, Cheehong" userId="6bc27941-0d5a-4c11-8dfb-8bbe9da0911b" providerId="ADAL" clId="{5BE5096F-7F8C-496A-A13C-FF7D0CA7A6B4}" dt="2024-02-03T15:48:58.780" v="854"/>
         <pc:sldMkLst>
           <pc:docMk/>
           <pc:sldMk cId="2693914518" sldId="301"/>
@@ -1104,27 +888,11 @@
         </pc:spChg>
       </pc:sldChg>
       <pc:sldChg chg="addSp modSp mod">
-        <pc:chgData name="Hsia, Cheehong" userId="6bc27941-0d5a-4c11-8dfb-8bbe9da0911b" providerId="ADAL" clId="{5BE5096F-7F8C-496A-A13C-FF7D0CA7A6B4}" dt="2024-02-14T15:25:14.635" v="1148" actId="255"/>
+        <pc:chgData name="Hsia, Cheehong" userId="6bc27941-0d5a-4c11-8dfb-8bbe9da0911b" providerId="ADAL" clId="{5BE5096F-7F8C-496A-A13C-FF7D0CA7A6B4}" dt="2024-02-03T15:49:05.730" v="857" actId="20577"/>
         <pc:sldMkLst>
           <pc:docMk/>
           <pc:sldMk cId="155960899" sldId="302"/>
         </pc:sldMkLst>
-        <pc:spChg chg="mod">
-          <ac:chgData name="Hsia, Cheehong" userId="6bc27941-0d5a-4c11-8dfb-8bbe9da0911b" providerId="ADAL" clId="{5BE5096F-7F8C-496A-A13C-FF7D0CA7A6B4}" dt="2024-02-14T15:25:09.006" v="1146" actId="255"/>
-          <ac:spMkLst>
-            <pc:docMk/>
-            <pc:sldMk cId="155960899" sldId="302"/>
-            <ac:spMk id="2" creationId="{AD90CEB0-783B-5FA4-1028-D4B692C5B2CE}"/>
-          </ac:spMkLst>
-        </pc:spChg>
-        <pc:spChg chg="mod">
-          <ac:chgData name="Hsia, Cheehong" userId="6bc27941-0d5a-4c11-8dfb-8bbe9da0911b" providerId="ADAL" clId="{5BE5096F-7F8C-496A-A13C-FF7D0CA7A6B4}" dt="2024-02-14T15:25:14.635" v="1148" actId="255"/>
-          <ac:spMkLst>
-            <pc:docMk/>
-            <pc:sldMk cId="155960899" sldId="302"/>
-            <ac:spMk id="4" creationId="{3859056E-FEDA-2D8C-90B8-7DB995ECB8A4}"/>
-          </ac:spMkLst>
-        </pc:spChg>
         <pc:spChg chg="add mod">
           <ac:chgData name="Hsia, Cheehong" userId="6bc27941-0d5a-4c11-8dfb-8bbe9da0911b" providerId="ADAL" clId="{5BE5096F-7F8C-496A-A13C-FF7D0CA7A6B4}" dt="2024-02-03T15:49:05.730" v="857" actId="20577"/>
           <ac:spMkLst>
@@ -1134,8 +902,8 @@
           </ac:spMkLst>
         </pc:spChg>
       </pc:sldChg>
-      <pc:sldChg chg="addSp modSp del">
-        <pc:chgData name="Hsia, Cheehong" userId="6bc27941-0d5a-4c11-8dfb-8bbe9da0911b" providerId="ADAL" clId="{5BE5096F-7F8C-496A-A13C-FF7D0CA7A6B4}" dt="2024-02-14T15:25:18.004" v="1149" actId="47"/>
+      <pc:sldChg chg="addSp modSp">
+        <pc:chgData name="Hsia, Cheehong" userId="6bc27941-0d5a-4c11-8dfb-8bbe9da0911b" providerId="ADAL" clId="{5BE5096F-7F8C-496A-A13C-FF7D0CA7A6B4}" dt="2024-02-03T15:49:08.951" v="858"/>
         <pc:sldMkLst>
           <pc:docMk/>
           <pc:sldMk cId="4239895058" sldId="303"/>
@@ -1150,27 +918,11 @@
         </pc:spChg>
       </pc:sldChg>
       <pc:sldChg chg="addSp modSp mod">
-        <pc:chgData name="Hsia, Cheehong" userId="6bc27941-0d5a-4c11-8dfb-8bbe9da0911b" providerId="ADAL" clId="{5BE5096F-7F8C-496A-A13C-FF7D0CA7A6B4}" dt="2024-02-14T15:25:39.039" v="1156" actId="255"/>
+        <pc:chgData name="Hsia, Cheehong" userId="6bc27941-0d5a-4c11-8dfb-8bbe9da0911b" providerId="ADAL" clId="{5BE5096F-7F8C-496A-A13C-FF7D0CA7A6B4}" dt="2024-02-03T15:49:13.900" v="861" actId="20577"/>
         <pc:sldMkLst>
           <pc:docMk/>
           <pc:sldMk cId="1487932769" sldId="304"/>
         </pc:sldMkLst>
-        <pc:spChg chg="mod">
-          <ac:chgData name="Hsia, Cheehong" userId="6bc27941-0d5a-4c11-8dfb-8bbe9da0911b" providerId="ADAL" clId="{5BE5096F-7F8C-496A-A13C-FF7D0CA7A6B4}" dt="2024-02-14T15:25:33.114" v="1154" actId="20577"/>
-          <ac:spMkLst>
-            <pc:docMk/>
-            <pc:sldMk cId="1487932769" sldId="304"/>
-            <ac:spMk id="2" creationId="{AD90CEB0-783B-5FA4-1028-D4B692C5B2CE}"/>
-          </ac:spMkLst>
-        </pc:spChg>
-        <pc:spChg chg="mod">
-          <ac:chgData name="Hsia, Cheehong" userId="6bc27941-0d5a-4c11-8dfb-8bbe9da0911b" providerId="ADAL" clId="{5BE5096F-7F8C-496A-A13C-FF7D0CA7A6B4}" dt="2024-02-14T15:25:39.039" v="1156" actId="255"/>
-          <ac:spMkLst>
-            <pc:docMk/>
-            <pc:sldMk cId="1487932769" sldId="304"/>
-            <ac:spMk id="4" creationId="{3859056E-FEDA-2D8C-90B8-7DB995ECB8A4}"/>
-          </ac:spMkLst>
-        </pc:spChg>
         <pc:spChg chg="add mod">
           <ac:chgData name="Hsia, Cheehong" userId="6bc27941-0d5a-4c11-8dfb-8bbe9da0911b" providerId="ADAL" clId="{5BE5096F-7F8C-496A-A13C-FF7D0CA7A6B4}" dt="2024-02-03T15:49:13.900" v="861" actId="20577"/>
           <ac:spMkLst>
@@ -1180,8 +932,8 @@
           </ac:spMkLst>
         </pc:spChg>
       </pc:sldChg>
-      <pc:sldChg chg="addSp modSp del">
-        <pc:chgData name="Hsia, Cheehong" userId="6bc27941-0d5a-4c11-8dfb-8bbe9da0911b" providerId="ADAL" clId="{5BE5096F-7F8C-496A-A13C-FF7D0CA7A6B4}" dt="2024-02-14T15:25:43.086" v="1157" actId="47"/>
+      <pc:sldChg chg="addSp modSp">
+        <pc:chgData name="Hsia, Cheehong" userId="6bc27941-0d5a-4c11-8dfb-8bbe9da0911b" providerId="ADAL" clId="{5BE5096F-7F8C-496A-A13C-FF7D0CA7A6B4}" dt="2024-02-03T15:49:18.534" v="862"/>
         <pc:sldMkLst>
           <pc:docMk/>
           <pc:sldMk cId="178219345" sldId="305"/>
@@ -1196,27 +948,11 @@
         </pc:spChg>
       </pc:sldChg>
       <pc:sldChg chg="addSp modSp mod">
-        <pc:chgData name="Hsia, Cheehong" userId="6bc27941-0d5a-4c11-8dfb-8bbe9da0911b" providerId="ADAL" clId="{5BE5096F-7F8C-496A-A13C-FF7D0CA7A6B4}" dt="2024-02-14T15:26:14.343" v="1166" actId="20577"/>
+        <pc:chgData name="Hsia, Cheehong" userId="6bc27941-0d5a-4c11-8dfb-8bbe9da0911b" providerId="ADAL" clId="{5BE5096F-7F8C-496A-A13C-FF7D0CA7A6B4}" dt="2024-02-03T15:49:31.273" v="865" actId="20577"/>
         <pc:sldMkLst>
           <pc:docMk/>
           <pc:sldMk cId="961020213" sldId="308"/>
         </pc:sldMkLst>
-        <pc:spChg chg="mod">
-          <ac:chgData name="Hsia, Cheehong" userId="6bc27941-0d5a-4c11-8dfb-8bbe9da0911b" providerId="ADAL" clId="{5BE5096F-7F8C-496A-A13C-FF7D0CA7A6B4}" dt="2024-02-14T15:26:03.778" v="1161" actId="255"/>
-          <ac:spMkLst>
-            <pc:docMk/>
-            <pc:sldMk cId="961020213" sldId="308"/>
-            <ac:spMk id="2" creationId="{9024BA51-C630-BA2A-58B6-69F9BB6816A0}"/>
-          </ac:spMkLst>
-        </pc:spChg>
-        <pc:spChg chg="mod">
-          <ac:chgData name="Hsia, Cheehong" userId="6bc27941-0d5a-4c11-8dfb-8bbe9da0911b" providerId="ADAL" clId="{5BE5096F-7F8C-496A-A13C-FF7D0CA7A6B4}" dt="2024-02-14T15:26:14.343" v="1166" actId="20577"/>
-          <ac:spMkLst>
-            <pc:docMk/>
-            <pc:sldMk cId="961020213" sldId="308"/>
-            <ac:spMk id="4" creationId="{8946D5DF-DDC9-DF42-4883-DA9549CF8DE5}"/>
-          </ac:spMkLst>
-        </pc:spChg>
         <pc:spChg chg="add mod">
           <ac:chgData name="Hsia, Cheehong" userId="6bc27941-0d5a-4c11-8dfb-8bbe9da0911b" providerId="ADAL" clId="{5BE5096F-7F8C-496A-A13C-FF7D0CA7A6B4}" dt="2024-02-03T15:49:31.273" v="865" actId="20577"/>
           <ac:spMkLst>
@@ -1226,8 +962,8 @@
           </ac:spMkLst>
         </pc:spChg>
       </pc:sldChg>
-      <pc:sldChg chg="addSp modSp del">
-        <pc:chgData name="Hsia, Cheehong" userId="6bc27941-0d5a-4c11-8dfb-8bbe9da0911b" providerId="ADAL" clId="{5BE5096F-7F8C-496A-A13C-FF7D0CA7A6B4}" dt="2024-02-14T15:26:17.372" v="1167" actId="47"/>
+      <pc:sldChg chg="addSp modSp">
+        <pc:chgData name="Hsia, Cheehong" userId="6bc27941-0d5a-4c11-8dfb-8bbe9da0911b" providerId="ADAL" clId="{5BE5096F-7F8C-496A-A13C-FF7D0CA7A6B4}" dt="2024-02-03T15:49:33.609" v="866"/>
         <pc:sldMkLst>
           <pc:docMk/>
           <pc:sldMk cId="415980821" sldId="309"/>
@@ -1242,27 +978,11 @@
         </pc:spChg>
       </pc:sldChg>
       <pc:sldChg chg="addSp modSp mod">
-        <pc:chgData name="Hsia, Cheehong" userId="6bc27941-0d5a-4c11-8dfb-8bbe9da0911b" providerId="ADAL" clId="{5BE5096F-7F8C-496A-A13C-FF7D0CA7A6B4}" dt="2024-02-14T15:26:34.448" v="1175" actId="20577"/>
+        <pc:chgData name="Hsia, Cheehong" userId="6bc27941-0d5a-4c11-8dfb-8bbe9da0911b" providerId="ADAL" clId="{5BE5096F-7F8C-496A-A13C-FF7D0CA7A6B4}" dt="2024-02-03T15:49:39.036" v="868" actId="20577"/>
         <pc:sldMkLst>
           <pc:docMk/>
           <pc:sldMk cId="1482915617" sldId="310"/>
         </pc:sldMkLst>
-        <pc:spChg chg="mod">
-          <ac:chgData name="Hsia, Cheehong" userId="6bc27941-0d5a-4c11-8dfb-8bbe9da0911b" providerId="ADAL" clId="{5BE5096F-7F8C-496A-A13C-FF7D0CA7A6B4}" dt="2024-02-14T15:26:26.946" v="1171" actId="255"/>
-          <ac:spMkLst>
-            <pc:docMk/>
-            <pc:sldMk cId="1482915617" sldId="310"/>
-            <ac:spMk id="2" creationId="{9024BA51-C630-BA2A-58B6-69F9BB6816A0}"/>
-          </ac:spMkLst>
-        </pc:spChg>
-        <pc:spChg chg="mod">
-          <ac:chgData name="Hsia, Cheehong" userId="6bc27941-0d5a-4c11-8dfb-8bbe9da0911b" providerId="ADAL" clId="{5BE5096F-7F8C-496A-A13C-FF7D0CA7A6B4}" dt="2024-02-14T15:26:34.448" v="1175" actId="20577"/>
-          <ac:spMkLst>
-            <pc:docMk/>
-            <pc:sldMk cId="1482915617" sldId="310"/>
-            <ac:spMk id="4" creationId="{8946D5DF-DDC9-DF42-4883-DA9549CF8DE5}"/>
-          </ac:spMkLst>
-        </pc:spChg>
         <pc:spChg chg="add mod">
           <ac:chgData name="Hsia, Cheehong" userId="6bc27941-0d5a-4c11-8dfb-8bbe9da0911b" providerId="ADAL" clId="{5BE5096F-7F8C-496A-A13C-FF7D0CA7A6B4}" dt="2024-02-03T15:49:39.036" v="868" actId="20577"/>
           <ac:spMkLst>
@@ -1272,8 +992,8 @@
           </ac:spMkLst>
         </pc:spChg>
       </pc:sldChg>
-      <pc:sldChg chg="addSp modSp del">
-        <pc:chgData name="Hsia, Cheehong" userId="6bc27941-0d5a-4c11-8dfb-8bbe9da0911b" providerId="ADAL" clId="{5BE5096F-7F8C-496A-A13C-FF7D0CA7A6B4}" dt="2024-02-14T15:26:38.983" v="1176" actId="47"/>
+      <pc:sldChg chg="addSp modSp">
+        <pc:chgData name="Hsia, Cheehong" userId="6bc27941-0d5a-4c11-8dfb-8bbe9da0911b" providerId="ADAL" clId="{5BE5096F-7F8C-496A-A13C-FF7D0CA7A6B4}" dt="2024-02-03T15:49:41.631" v="869"/>
         <pc:sldMkLst>
           <pc:docMk/>
           <pc:sldMk cId="1467359079" sldId="311"/>
@@ -1288,27 +1008,11 @@
         </pc:spChg>
       </pc:sldChg>
       <pc:sldChg chg="addSp modSp mod">
-        <pc:chgData name="Hsia, Cheehong" userId="6bc27941-0d5a-4c11-8dfb-8bbe9da0911b" providerId="ADAL" clId="{5BE5096F-7F8C-496A-A13C-FF7D0CA7A6B4}" dt="2024-02-14T15:27:53.942" v="1326" actId="20577"/>
+        <pc:chgData name="Hsia, Cheehong" userId="6bc27941-0d5a-4c11-8dfb-8bbe9da0911b" providerId="ADAL" clId="{5BE5096F-7F8C-496A-A13C-FF7D0CA7A6B4}" dt="2024-02-03T15:49:48.203" v="872" actId="20577"/>
         <pc:sldMkLst>
           <pc:docMk/>
           <pc:sldMk cId="3790017242" sldId="312"/>
         </pc:sldMkLst>
-        <pc:spChg chg="mod">
-          <ac:chgData name="Hsia, Cheehong" userId="6bc27941-0d5a-4c11-8dfb-8bbe9da0911b" providerId="ADAL" clId="{5BE5096F-7F8C-496A-A13C-FF7D0CA7A6B4}" dt="2024-02-14T15:27:12.206" v="1227" actId="20577"/>
-          <ac:spMkLst>
-            <pc:docMk/>
-            <pc:sldMk cId="3790017242" sldId="312"/>
-            <ac:spMk id="2" creationId="{9024BA51-C630-BA2A-58B6-69F9BB6816A0}"/>
-          </ac:spMkLst>
-        </pc:spChg>
-        <pc:spChg chg="mod">
-          <ac:chgData name="Hsia, Cheehong" userId="6bc27941-0d5a-4c11-8dfb-8bbe9da0911b" providerId="ADAL" clId="{5BE5096F-7F8C-496A-A13C-FF7D0CA7A6B4}" dt="2024-02-14T15:27:53.942" v="1326" actId="20577"/>
-          <ac:spMkLst>
-            <pc:docMk/>
-            <pc:sldMk cId="3790017242" sldId="312"/>
-            <ac:spMk id="4" creationId="{8946D5DF-DDC9-DF42-4883-DA9549CF8DE5}"/>
-          </ac:spMkLst>
-        </pc:spChg>
         <pc:spChg chg="add mod">
           <ac:chgData name="Hsia, Cheehong" userId="6bc27941-0d5a-4c11-8dfb-8bbe9da0911b" providerId="ADAL" clId="{5BE5096F-7F8C-496A-A13C-FF7D0CA7A6B4}" dt="2024-02-03T15:49:48.203" v="872" actId="20577"/>
           <ac:spMkLst>
@@ -1318,8 +1022,8 @@
           </ac:spMkLst>
         </pc:spChg>
       </pc:sldChg>
-      <pc:sldChg chg="addSp modSp del">
-        <pc:chgData name="Hsia, Cheehong" userId="6bc27941-0d5a-4c11-8dfb-8bbe9da0911b" providerId="ADAL" clId="{5BE5096F-7F8C-496A-A13C-FF7D0CA7A6B4}" dt="2024-02-14T15:28:00.058" v="1327" actId="47"/>
+      <pc:sldChg chg="addSp modSp">
+        <pc:chgData name="Hsia, Cheehong" userId="6bc27941-0d5a-4c11-8dfb-8bbe9da0911b" providerId="ADAL" clId="{5BE5096F-7F8C-496A-A13C-FF7D0CA7A6B4}" dt="2024-02-03T15:49:51.097" v="873"/>
         <pc:sldMkLst>
           <pc:docMk/>
           <pc:sldMk cId="2313812796" sldId="313"/>
@@ -1334,27 +1038,11 @@
         </pc:spChg>
       </pc:sldChg>
       <pc:sldChg chg="addSp modSp mod">
-        <pc:chgData name="Hsia, Cheehong" userId="6bc27941-0d5a-4c11-8dfb-8bbe9da0911b" providerId="ADAL" clId="{5BE5096F-7F8C-496A-A13C-FF7D0CA7A6B4}" dt="2024-02-14T15:29:07.335" v="1483" actId="20577"/>
+        <pc:chgData name="Hsia, Cheehong" userId="6bc27941-0d5a-4c11-8dfb-8bbe9da0911b" providerId="ADAL" clId="{5BE5096F-7F8C-496A-A13C-FF7D0CA7A6B4}" dt="2024-02-03T15:50:01.487" v="875" actId="20577"/>
         <pc:sldMkLst>
           <pc:docMk/>
           <pc:sldMk cId="2198057494" sldId="314"/>
         </pc:sldMkLst>
-        <pc:spChg chg="mod">
-          <ac:chgData name="Hsia, Cheehong" userId="6bc27941-0d5a-4c11-8dfb-8bbe9da0911b" providerId="ADAL" clId="{5BE5096F-7F8C-496A-A13C-FF7D0CA7A6B4}" dt="2024-02-14T15:28:35.051" v="1395" actId="20577"/>
-          <ac:spMkLst>
-            <pc:docMk/>
-            <pc:sldMk cId="2198057494" sldId="314"/>
-            <ac:spMk id="2" creationId="{9024BA51-C630-BA2A-58B6-69F9BB6816A0}"/>
-          </ac:spMkLst>
-        </pc:spChg>
-        <pc:spChg chg="mod">
-          <ac:chgData name="Hsia, Cheehong" userId="6bc27941-0d5a-4c11-8dfb-8bbe9da0911b" providerId="ADAL" clId="{5BE5096F-7F8C-496A-A13C-FF7D0CA7A6B4}" dt="2024-02-14T15:29:07.335" v="1483" actId="20577"/>
-          <ac:spMkLst>
-            <pc:docMk/>
-            <pc:sldMk cId="2198057494" sldId="314"/>
-            <ac:spMk id="4" creationId="{8946D5DF-DDC9-DF42-4883-DA9549CF8DE5}"/>
-          </ac:spMkLst>
-        </pc:spChg>
         <pc:spChg chg="add mod">
           <ac:chgData name="Hsia, Cheehong" userId="6bc27941-0d5a-4c11-8dfb-8bbe9da0911b" providerId="ADAL" clId="{5BE5096F-7F8C-496A-A13C-FF7D0CA7A6B4}" dt="2024-02-03T15:50:01.487" v="875" actId="20577"/>
           <ac:spMkLst>
@@ -1364,8 +1052,8 @@
           </ac:spMkLst>
         </pc:spChg>
       </pc:sldChg>
-      <pc:sldChg chg="addSp modSp del">
-        <pc:chgData name="Hsia, Cheehong" userId="6bc27941-0d5a-4c11-8dfb-8bbe9da0911b" providerId="ADAL" clId="{5BE5096F-7F8C-496A-A13C-FF7D0CA7A6B4}" dt="2024-02-14T15:29:13.288" v="1484" actId="47"/>
+      <pc:sldChg chg="addSp modSp">
+        <pc:chgData name="Hsia, Cheehong" userId="6bc27941-0d5a-4c11-8dfb-8bbe9da0911b" providerId="ADAL" clId="{5BE5096F-7F8C-496A-A13C-FF7D0CA7A6B4}" dt="2024-02-03T15:50:04.971" v="876"/>
         <pc:sldMkLst>
           <pc:docMk/>
           <pc:sldMk cId="2393475525" sldId="315"/>
@@ -1380,27 +1068,11 @@
         </pc:spChg>
       </pc:sldChg>
       <pc:sldChg chg="addSp modSp mod">
-        <pc:chgData name="Hsia, Cheehong" userId="6bc27941-0d5a-4c11-8dfb-8bbe9da0911b" providerId="ADAL" clId="{5BE5096F-7F8C-496A-A13C-FF7D0CA7A6B4}" dt="2024-02-14T15:30:20.423" v="1621" actId="20577"/>
+        <pc:chgData name="Hsia, Cheehong" userId="6bc27941-0d5a-4c11-8dfb-8bbe9da0911b" providerId="ADAL" clId="{5BE5096F-7F8C-496A-A13C-FF7D0CA7A6B4}" dt="2024-02-03T15:50:15.430" v="879" actId="20577"/>
         <pc:sldMkLst>
           <pc:docMk/>
           <pc:sldMk cId="1870647430" sldId="316"/>
         </pc:sldMkLst>
-        <pc:spChg chg="mod">
-          <ac:chgData name="Hsia, Cheehong" userId="6bc27941-0d5a-4c11-8dfb-8bbe9da0911b" providerId="ADAL" clId="{5BE5096F-7F8C-496A-A13C-FF7D0CA7A6B4}" dt="2024-02-14T15:29:45.483" v="1536" actId="20577"/>
-          <ac:spMkLst>
-            <pc:docMk/>
-            <pc:sldMk cId="1870647430" sldId="316"/>
-            <ac:spMk id="2" creationId="{9024BA51-C630-BA2A-58B6-69F9BB6816A0}"/>
-          </ac:spMkLst>
-        </pc:spChg>
-        <pc:spChg chg="mod">
-          <ac:chgData name="Hsia, Cheehong" userId="6bc27941-0d5a-4c11-8dfb-8bbe9da0911b" providerId="ADAL" clId="{5BE5096F-7F8C-496A-A13C-FF7D0CA7A6B4}" dt="2024-02-14T15:30:20.423" v="1621" actId="20577"/>
-          <ac:spMkLst>
-            <pc:docMk/>
-            <pc:sldMk cId="1870647430" sldId="316"/>
-            <ac:spMk id="4" creationId="{8946D5DF-DDC9-DF42-4883-DA9549CF8DE5}"/>
-          </ac:spMkLst>
-        </pc:spChg>
         <pc:spChg chg="add mod">
           <ac:chgData name="Hsia, Cheehong" userId="6bc27941-0d5a-4c11-8dfb-8bbe9da0911b" providerId="ADAL" clId="{5BE5096F-7F8C-496A-A13C-FF7D0CA7A6B4}" dt="2024-02-03T15:50:15.430" v="879" actId="20577"/>
           <ac:spMkLst>
@@ -1410,8 +1082,8 @@
           </ac:spMkLst>
         </pc:spChg>
       </pc:sldChg>
-      <pc:sldChg chg="addSp modSp del">
-        <pc:chgData name="Hsia, Cheehong" userId="6bc27941-0d5a-4c11-8dfb-8bbe9da0911b" providerId="ADAL" clId="{5BE5096F-7F8C-496A-A13C-FF7D0CA7A6B4}" dt="2024-02-14T15:30:25.141" v="1622" actId="47"/>
+      <pc:sldChg chg="addSp modSp">
+        <pc:chgData name="Hsia, Cheehong" userId="6bc27941-0d5a-4c11-8dfb-8bbe9da0911b" providerId="ADAL" clId="{5BE5096F-7F8C-496A-A13C-FF7D0CA7A6B4}" dt="2024-02-03T15:50:17.421" v="880"/>
         <pc:sldMkLst>
           <pc:docMk/>
           <pc:sldMk cId="1520640515" sldId="317"/>
@@ -1699,786 +1371,6 @@
           <pc:docMk/>
           <pc:sldMk cId="2178182827" sldId="320"/>
         </pc:sldMkLst>
-      </pc:sldChg>
-      <pc:sldChg chg="modSp add mod modClrScheme chgLayout">
-        <pc:chgData name="Hsia, Cheehong" userId="6bc27941-0d5a-4c11-8dfb-8bbe9da0911b" providerId="ADAL" clId="{5BE5096F-7F8C-496A-A13C-FF7D0CA7A6B4}" dt="2024-02-14T15:18:42.673" v="1037" actId="20577"/>
-        <pc:sldMkLst>
-          <pc:docMk/>
-          <pc:sldMk cId="2830884995" sldId="321"/>
-        </pc:sldMkLst>
-        <pc:spChg chg="mod ord">
-          <ac:chgData name="Hsia, Cheehong" userId="6bc27941-0d5a-4c11-8dfb-8bbe9da0911b" providerId="ADAL" clId="{5BE5096F-7F8C-496A-A13C-FF7D0CA7A6B4}" dt="2024-02-14T15:18:42.673" v="1037" actId="20577"/>
-          <ac:spMkLst>
-            <pc:docMk/>
-            <pc:sldMk cId="2830884995" sldId="321"/>
-            <ac:spMk id="2" creationId="{700D1D6A-607B-8919-A042-BCCDC9CF0CF0}"/>
-          </ac:spMkLst>
-        </pc:spChg>
-        <pc:spChg chg="mod ord">
-          <ac:chgData name="Hsia, Cheehong" userId="6bc27941-0d5a-4c11-8dfb-8bbe9da0911b" providerId="ADAL" clId="{5BE5096F-7F8C-496A-A13C-FF7D0CA7A6B4}" dt="2024-02-14T15:17:41.464" v="1030" actId="700"/>
-          <ac:spMkLst>
-            <pc:docMk/>
-            <pc:sldMk cId="2830884995" sldId="321"/>
-            <ac:spMk id="3" creationId="{DB4E66FB-476A-BB21-1B46-4C8125462E5C}"/>
-          </ac:spMkLst>
-        </pc:spChg>
-        <pc:spChg chg="mod ord">
-          <ac:chgData name="Hsia, Cheehong" userId="6bc27941-0d5a-4c11-8dfb-8bbe9da0911b" providerId="ADAL" clId="{5BE5096F-7F8C-496A-A13C-FF7D0CA7A6B4}" dt="2024-02-14T15:17:41.464" v="1030" actId="700"/>
-          <ac:spMkLst>
-            <pc:docMk/>
-            <pc:sldMk cId="2830884995" sldId="321"/>
-            <ac:spMk id="4" creationId="{101FB840-DD80-334A-87FD-81DC71AD8A57}"/>
-          </ac:spMkLst>
-        </pc:spChg>
-        <pc:spChg chg="mod ord">
-          <ac:chgData name="Hsia, Cheehong" userId="6bc27941-0d5a-4c11-8dfb-8bbe9da0911b" providerId="ADAL" clId="{5BE5096F-7F8C-496A-A13C-FF7D0CA7A6B4}" dt="2024-02-14T15:17:41.464" v="1030" actId="700"/>
-          <ac:spMkLst>
-            <pc:docMk/>
-            <pc:sldMk cId="2830884995" sldId="321"/>
-            <ac:spMk id="5" creationId="{3994DC0B-F72F-6BFF-C694-00CBF68920C1}"/>
-          </ac:spMkLst>
-        </pc:spChg>
-      </pc:sldChg>
-      <pc:sldChg chg="modSp add mod modClrScheme chgLayout">
-        <pc:chgData name="Hsia, Cheehong" userId="6bc27941-0d5a-4c11-8dfb-8bbe9da0911b" providerId="ADAL" clId="{5BE5096F-7F8C-496A-A13C-FF7D0CA7A6B4}" dt="2024-02-14T15:18:58.663" v="1040" actId="700"/>
-        <pc:sldMkLst>
-          <pc:docMk/>
-          <pc:sldMk cId="393363697" sldId="322"/>
-        </pc:sldMkLst>
-        <pc:spChg chg="mod ord">
-          <ac:chgData name="Hsia, Cheehong" userId="6bc27941-0d5a-4c11-8dfb-8bbe9da0911b" providerId="ADAL" clId="{5BE5096F-7F8C-496A-A13C-FF7D0CA7A6B4}" dt="2024-02-14T15:18:58.663" v="1040" actId="700"/>
-          <ac:spMkLst>
-            <pc:docMk/>
-            <pc:sldMk cId="393363697" sldId="322"/>
-            <ac:spMk id="2" creationId="{509F87C3-07A1-0EDC-D899-CD15F645C37F}"/>
-          </ac:spMkLst>
-        </pc:spChg>
-        <pc:spChg chg="mod ord">
-          <ac:chgData name="Hsia, Cheehong" userId="6bc27941-0d5a-4c11-8dfb-8bbe9da0911b" providerId="ADAL" clId="{5BE5096F-7F8C-496A-A13C-FF7D0CA7A6B4}" dt="2024-02-14T15:18:58.663" v="1040" actId="700"/>
-          <ac:spMkLst>
-            <pc:docMk/>
-            <pc:sldMk cId="393363697" sldId="322"/>
-            <ac:spMk id="3" creationId="{9B42B0F5-1A67-8C70-FDCF-4C93DB02E94F}"/>
-          </ac:spMkLst>
-        </pc:spChg>
-        <pc:spChg chg="mod ord">
-          <ac:chgData name="Hsia, Cheehong" userId="6bc27941-0d5a-4c11-8dfb-8bbe9da0911b" providerId="ADAL" clId="{5BE5096F-7F8C-496A-A13C-FF7D0CA7A6B4}" dt="2024-02-14T15:18:58.663" v="1040" actId="700"/>
-          <ac:spMkLst>
-            <pc:docMk/>
-            <pc:sldMk cId="393363697" sldId="322"/>
-            <ac:spMk id="4" creationId="{AA1D8D56-7997-9149-E3C2-4243BC163909}"/>
-          </ac:spMkLst>
-        </pc:spChg>
-        <pc:spChg chg="mod ord">
-          <ac:chgData name="Hsia, Cheehong" userId="6bc27941-0d5a-4c11-8dfb-8bbe9da0911b" providerId="ADAL" clId="{5BE5096F-7F8C-496A-A13C-FF7D0CA7A6B4}" dt="2024-02-14T15:18:58.663" v="1040" actId="700"/>
-          <ac:spMkLst>
-            <pc:docMk/>
-            <pc:sldMk cId="393363697" sldId="322"/>
-            <ac:spMk id="5" creationId="{B975B983-7343-8A2D-4201-2198F0BCF4D0}"/>
-          </ac:spMkLst>
-        </pc:spChg>
-      </pc:sldChg>
-      <pc:sldChg chg="modSp add mod modClrScheme chgLayout">
-        <pc:chgData name="Hsia, Cheehong" userId="6bc27941-0d5a-4c11-8dfb-8bbe9da0911b" providerId="ADAL" clId="{5BE5096F-7F8C-496A-A13C-FF7D0CA7A6B4}" dt="2024-02-14T15:19:29.177" v="1049" actId="700"/>
-        <pc:sldMkLst>
-          <pc:docMk/>
-          <pc:sldMk cId="3631058862" sldId="323"/>
-        </pc:sldMkLst>
-        <pc:spChg chg="mod ord">
-          <ac:chgData name="Hsia, Cheehong" userId="6bc27941-0d5a-4c11-8dfb-8bbe9da0911b" providerId="ADAL" clId="{5BE5096F-7F8C-496A-A13C-FF7D0CA7A6B4}" dt="2024-02-14T15:19:29.177" v="1049" actId="700"/>
-          <ac:spMkLst>
-            <pc:docMk/>
-            <pc:sldMk cId="3631058862" sldId="323"/>
-            <ac:spMk id="2" creationId="{509F87C3-07A1-0EDC-D899-CD15F645C37F}"/>
-          </ac:spMkLst>
-        </pc:spChg>
-        <pc:spChg chg="mod ord">
-          <ac:chgData name="Hsia, Cheehong" userId="6bc27941-0d5a-4c11-8dfb-8bbe9da0911b" providerId="ADAL" clId="{5BE5096F-7F8C-496A-A13C-FF7D0CA7A6B4}" dt="2024-02-14T15:19:29.177" v="1049" actId="700"/>
-          <ac:spMkLst>
-            <pc:docMk/>
-            <pc:sldMk cId="3631058862" sldId="323"/>
-            <ac:spMk id="3" creationId="{9B42B0F5-1A67-8C70-FDCF-4C93DB02E94F}"/>
-          </ac:spMkLst>
-        </pc:spChg>
-        <pc:spChg chg="mod ord">
-          <ac:chgData name="Hsia, Cheehong" userId="6bc27941-0d5a-4c11-8dfb-8bbe9da0911b" providerId="ADAL" clId="{5BE5096F-7F8C-496A-A13C-FF7D0CA7A6B4}" dt="2024-02-14T15:19:29.177" v="1049" actId="700"/>
-          <ac:spMkLst>
-            <pc:docMk/>
-            <pc:sldMk cId="3631058862" sldId="323"/>
-            <ac:spMk id="4" creationId="{AA1D8D56-7997-9149-E3C2-4243BC163909}"/>
-          </ac:spMkLst>
-        </pc:spChg>
-        <pc:spChg chg="mod ord">
-          <ac:chgData name="Hsia, Cheehong" userId="6bc27941-0d5a-4c11-8dfb-8bbe9da0911b" providerId="ADAL" clId="{5BE5096F-7F8C-496A-A13C-FF7D0CA7A6B4}" dt="2024-02-14T15:19:29.177" v="1049" actId="700"/>
-          <ac:spMkLst>
-            <pc:docMk/>
-            <pc:sldMk cId="3631058862" sldId="323"/>
-            <ac:spMk id="5" creationId="{B975B983-7343-8A2D-4201-2198F0BCF4D0}"/>
-          </ac:spMkLst>
-        </pc:spChg>
-      </pc:sldChg>
-      <pc:sldChg chg="modSp add mod modClrScheme chgLayout">
-        <pc:chgData name="Hsia, Cheehong" userId="6bc27941-0d5a-4c11-8dfb-8bbe9da0911b" providerId="ADAL" clId="{5BE5096F-7F8C-496A-A13C-FF7D0CA7A6B4}" dt="2024-02-14T15:20:05.467" v="1059" actId="700"/>
-        <pc:sldMkLst>
-          <pc:docMk/>
-          <pc:sldMk cId="1252257208" sldId="324"/>
-        </pc:sldMkLst>
-        <pc:spChg chg="mod ord">
-          <ac:chgData name="Hsia, Cheehong" userId="6bc27941-0d5a-4c11-8dfb-8bbe9da0911b" providerId="ADAL" clId="{5BE5096F-7F8C-496A-A13C-FF7D0CA7A6B4}" dt="2024-02-14T15:20:05.467" v="1059" actId="700"/>
-          <ac:spMkLst>
-            <pc:docMk/>
-            <pc:sldMk cId="1252257208" sldId="324"/>
-            <ac:spMk id="2" creationId="{509F87C3-07A1-0EDC-D899-CD15F645C37F}"/>
-          </ac:spMkLst>
-        </pc:spChg>
-        <pc:spChg chg="mod ord">
-          <ac:chgData name="Hsia, Cheehong" userId="6bc27941-0d5a-4c11-8dfb-8bbe9da0911b" providerId="ADAL" clId="{5BE5096F-7F8C-496A-A13C-FF7D0CA7A6B4}" dt="2024-02-14T15:20:05.467" v="1059" actId="700"/>
-          <ac:spMkLst>
-            <pc:docMk/>
-            <pc:sldMk cId="1252257208" sldId="324"/>
-            <ac:spMk id="3" creationId="{9B42B0F5-1A67-8C70-FDCF-4C93DB02E94F}"/>
-          </ac:spMkLst>
-        </pc:spChg>
-        <pc:spChg chg="mod ord">
-          <ac:chgData name="Hsia, Cheehong" userId="6bc27941-0d5a-4c11-8dfb-8bbe9da0911b" providerId="ADAL" clId="{5BE5096F-7F8C-496A-A13C-FF7D0CA7A6B4}" dt="2024-02-14T15:20:05.467" v="1059" actId="700"/>
-          <ac:spMkLst>
-            <pc:docMk/>
-            <pc:sldMk cId="1252257208" sldId="324"/>
-            <ac:spMk id="4" creationId="{AA1D8D56-7997-9149-E3C2-4243BC163909}"/>
-          </ac:spMkLst>
-        </pc:spChg>
-        <pc:spChg chg="mod ord">
-          <ac:chgData name="Hsia, Cheehong" userId="6bc27941-0d5a-4c11-8dfb-8bbe9da0911b" providerId="ADAL" clId="{5BE5096F-7F8C-496A-A13C-FF7D0CA7A6B4}" dt="2024-02-14T15:20:05.467" v="1059" actId="700"/>
-          <ac:spMkLst>
-            <pc:docMk/>
-            <pc:sldMk cId="1252257208" sldId="324"/>
-            <ac:spMk id="5" creationId="{B975B983-7343-8A2D-4201-2198F0BCF4D0}"/>
-          </ac:spMkLst>
-        </pc:spChg>
-      </pc:sldChg>
-      <pc:sldChg chg="modSp add mod modClrScheme chgLayout">
-        <pc:chgData name="Hsia, Cheehong" userId="6bc27941-0d5a-4c11-8dfb-8bbe9da0911b" providerId="ADAL" clId="{5BE5096F-7F8C-496A-A13C-FF7D0CA7A6B4}" dt="2024-02-14T15:20:33.361" v="1067" actId="700"/>
-        <pc:sldMkLst>
-          <pc:docMk/>
-          <pc:sldMk cId="1151322812" sldId="325"/>
-        </pc:sldMkLst>
-        <pc:spChg chg="mod ord">
-          <ac:chgData name="Hsia, Cheehong" userId="6bc27941-0d5a-4c11-8dfb-8bbe9da0911b" providerId="ADAL" clId="{5BE5096F-7F8C-496A-A13C-FF7D0CA7A6B4}" dt="2024-02-14T15:20:33.361" v="1067" actId="700"/>
-          <ac:spMkLst>
-            <pc:docMk/>
-            <pc:sldMk cId="1151322812" sldId="325"/>
-            <ac:spMk id="2" creationId="{509F87C3-07A1-0EDC-D899-CD15F645C37F}"/>
-          </ac:spMkLst>
-        </pc:spChg>
-        <pc:spChg chg="mod ord">
-          <ac:chgData name="Hsia, Cheehong" userId="6bc27941-0d5a-4c11-8dfb-8bbe9da0911b" providerId="ADAL" clId="{5BE5096F-7F8C-496A-A13C-FF7D0CA7A6B4}" dt="2024-02-14T15:20:33.361" v="1067" actId="700"/>
-          <ac:spMkLst>
-            <pc:docMk/>
-            <pc:sldMk cId="1151322812" sldId="325"/>
-            <ac:spMk id="3" creationId="{9B42B0F5-1A67-8C70-FDCF-4C93DB02E94F}"/>
-          </ac:spMkLst>
-        </pc:spChg>
-        <pc:spChg chg="mod ord">
-          <ac:chgData name="Hsia, Cheehong" userId="6bc27941-0d5a-4c11-8dfb-8bbe9da0911b" providerId="ADAL" clId="{5BE5096F-7F8C-496A-A13C-FF7D0CA7A6B4}" dt="2024-02-14T15:20:33.361" v="1067" actId="700"/>
-          <ac:spMkLst>
-            <pc:docMk/>
-            <pc:sldMk cId="1151322812" sldId="325"/>
-            <ac:spMk id="4" creationId="{AA1D8D56-7997-9149-E3C2-4243BC163909}"/>
-          </ac:spMkLst>
-        </pc:spChg>
-        <pc:spChg chg="mod ord">
-          <ac:chgData name="Hsia, Cheehong" userId="6bc27941-0d5a-4c11-8dfb-8bbe9da0911b" providerId="ADAL" clId="{5BE5096F-7F8C-496A-A13C-FF7D0CA7A6B4}" dt="2024-02-14T15:20:33.361" v="1067" actId="700"/>
-          <ac:spMkLst>
-            <pc:docMk/>
-            <pc:sldMk cId="1151322812" sldId="325"/>
-            <ac:spMk id="5" creationId="{B975B983-7343-8A2D-4201-2198F0BCF4D0}"/>
-          </ac:spMkLst>
-        </pc:spChg>
-      </pc:sldChg>
-      <pc:sldChg chg="modSp add mod modClrScheme chgLayout">
-        <pc:chgData name="Hsia, Cheehong" userId="6bc27941-0d5a-4c11-8dfb-8bbe9da0911b" providerId="ADAL" clId="{5BE5096F-7F8C-496A-A13C-FF7D0CA7A6B4}" dt="2024-02-14T15:21:09.600" v="1079" actId="700"/>
-        <pc:sldMkLst>
-          <pc:docMk/>
-          <pc:sldMk cId="2954588375" sldId="326"/>
-        </pc:sldMkLst>
-        <pc:spChg chg="mod ord">
-          <ac:chgData name="Hsia, Cheehong" userId="6bc27941-0d5a-4c11-8dfb-8bbe9da0911b" providerId="ADAL" clId="{5BE5096F-7F8C-496A-A13C-FF7D0CA7A6B4}" dt="2024-02-14T15:21:09.600" v="1079" actId="700"/>
-          <ac:spMkLst>
-            <pc:docMk/>
-            <pc:sldMk cId="2954588375" sldId="326"/>
-            <ac:spMk id="2" creationId="{66890E70-EDB5-4D8C-2B4F-029FA9E51D4E}"/>
-          </ac:spMkLst>
-        </pc:spChg>
-        <pc:spChg chg="mod ord">
-          <ac:chgData name="Hsia, Cheehong" userId="6bc27941-0d5a-4c11-8dfb-8bbe9da0911b" providerId="ADAL" clId="{5BE5096F-7F8C-496A-A13C-FF7D0CA7A6B4}" dt="2024-02-14T15:21:09.600" v="1079" actId="700"/>
-          <ac:spMkLst>
-            <pc:docMk/>
-            <pc:sldMk cId="2954588375" sldId="326"/>
-            <ac:spMk id="3" creationId="{0E733FD9-82CF-FCB7-F012-0EAA939C393E}"/>
-          </ac:spMkLst>
-        </pc:spChg>
-        <pc:spChg chg="mod ord">
-          <ac:chgData name="Hsia, Cheehong" userId="6bc27941-0d5a-4c11-8dfb-8bbe9da0911b" providerId="ADAL" clId="{5BE5096F-7F8C-496A-A13C-FF7D0CA7A6B4}" dt="2024-02-14T15:21:09.600" v="1079" actId="700"/>
-          <ac:spMkLst>
-            <pc:docMk/>
-            <pc:sldMk cId="2954588375" sldId="326"/>
-            <ac:spMk id="4" creationId="{F978620C-B722-98CC-0FA2-E22F5047512F}"/>
-          </ac:spMkLst>
-        </pc:spChg>
-        <pc:spChg chg="mod ord">
-          <ac:chgData name="Hsia, Cheehong" userId="6bc27941-0d5a-4c11-8dfb-8bbe9da0911b" providerId="ADAL" clId="{5BE5096F-7F8C-496A-A13C-FF7D0CA7A6B4}" dt="2024-02-14T15:21:09.600" v="1079" actId="700"/>
-          <ac:spMkLst>
-            <pc:docMk/>
-            <pc:sldMk cId="2954588375" sldId="326"/>
-            <ac:spMk id="5" creationId="{CC5FDBA6-3880-4279-5835-037270B656BC}"/>
-          </ac:spMkLst>
-        </pc:spChg>
-      </pc:sldChg>
-      <pc:sldChg chg="modSp add mod modClrScheme chgLayout">
-        <pc:chgData name="Hsia, Cheehong" userId="6bc27941-0d5a-4c11-8dfb-8bbe9da0911b" providerId="ADAL" clId="{5BE5096F-7F8C-496A-A13C-FF7D0CA7A6B4}" dt="2024-02-14T15:21:44.233" v="1090" actId="700"/>
-        <pc:sldMkLst>
-          <pc:docMk/>
-          <pc:sldMk cId="397487342" sldId="327"/>
-        </pc:sldMkLst>
-        <pc:spChg chg="mod ord">
-          <ac:chgData name="Hsia, Cheehong" userId="6bc27941-0d5a-4c11-8dfb-8bbe9da0911b" providerId="ADAL" clId="{5BE5096F-7F8C-496A-A13C-FF7D0CA7A6B4}" dt="2024-02-14T15:21:44.233" v="1090" actId="700"/>
-          <ac:spMkLst>
-            <pc:docMk/>
-            <pc:sldMk cId="397487342" sldId="327"/>
-            <ac:spMk id="2" creationId="{66890E70-EDB5-4D8C-2B4F-029FA9E51D4E}"/>
-          </ac:spMkLst>
-        </pc:spChg>
-        <pc:spChg chg="mod ord">
-          <ac:chgData name="Hsia, Cheehong" userId="6bc27941-0d5a-4c11-8dfb-8bbe9da0911b" providerId="ADAL" clId="{5BE5096F-7F8C-496A-A13C-FF7D0CA7A6B4}" dt="2024-02-14T15:21:44.233" v="1090" actId="700"/>
-          <ac:spMkLst>
-            <pc:docMk/>
-            <pc:sldMk cId="397487342" sldId="327"/>
-            <ac:spMk id="3" creationId="{0E733FD9-82CF-FCB7-F012-0EAA939C393E}"/>
-          </ac:spMkLst>
-        </pc:spChg>
-        <pc:spChg chg="mod ord">
-          <ac:chgData name="Hsia, Cheehong" userId="6bc27941-0d5a-4c11-8dfb-8bbe9da0911b" providerId="ADAL" clId="{5BE5096F-7F8C-496A-A13C-FF7D0CA7A6B4}" dt="2024-02-14T15:21:44.233" v="1090" actId="700"/>
-          <ac:spMkLst>
-            <pc:docMk/>
-            <pc:sldMk cId="397487342" sldId="327"/>
-            <ac:spMk id="4" creationId="{F978620C-B722-98CC-0FA2-E22F5047512F}"/>
-          </ac:spMkLst>
-        </pc:spChg>
-        <pc:spChg chg="mod ord">
-          <ac:chgData name="Hsia, Cheehong" userId="6bc27941-0d5a-4c11-8dfb-8bbe9da0911b" providerId="ADAL" clId="{5BE5096F-7F8C-496A-A13C-FF7D0CA7A6B4}" dt="2024-02-14T15:21:44.233" v="1090" actId="700"/>
-          <ac:spMkLst>
-            <pc:docMk/>
-            <pc:sldMk cId="397487342" sldId="327"/>
-            <ac:spMk id="5" creationId="{CC5FDBA6-3880-4279-5835-037270B656BC}"/>
-          </ac:spMkLst>
-        </pc:spChg>
-      </pc:sldChg>
-      <pc:sldChg chg="modSp add mod modClrScheme chgLayout">
-        <pc:chgData name="Hsia, Cheehong" userId="6bc27941-0d5a-4c11-8dfb-8bbe9da0911b" providerId="ADAL" clId="{5BE5096F-7F8C-496A-A13C-FF7D0CA7A6B4}" dt="2024-02-14T15:22:13.964" v="1098" actId="700"/>
-        <pc:sldMkLst>
-          <pc:docMk/>
-          <pc:sldMk cId="3775546726" sldId="328"/>
-        </pc:sldMkLst>
-        <pc:spChg chg="mod ord">
-          <ac:chgData name="Hsia, Cheehong" userId="6bc27941-0d5a-4c11-8dfb-8bbe9da0911b" providerId="ADAL" clId="{5BE5096F-7F8C-496A-A13C-FF7D0CA7A6B4}" dt="2024-02-14T15:22:13.964" v="1098" actId="700"/>
-          <ac:spMkLst>
-            <pc:docMk/>
-            <pc:sldMk cId="3775546726" sldId="328"/>
-            <ac:spMk id="2" creationId="{66890E70-EDB5-4D8C-2B4F-029FA9E51D4E}"/>
-          </ac:spMkLst>
-        </pc:spChg>
-        <pc:spChg chg="mod ord">
-          <ac:chgData name="Hsia, Cheehong" userId="6bc27941-0d5a-4c11-8dfb-8bbe9da0911b" providerId="ADAL" clId="{5BE5096F-7F8C-496A-A13C-FF7D0CA7A6B4}" dt="2024-02-14T15:22:13.964" v="1098" actId="700"/>
-          <ac:spMkLst>
-            <pc:docMk/>
-            <pc:sldMk cId="3775546726" sldId="328"/>
-            <ac:spMk id="3" creationId="{0E733FD9-82CF-FCB7-F012-0EAA939C393E}"/>
-          </ac:spMkLst>
-        </pc:spChg>
-        <pc:spChg chg="mod ord">
-          <ac:chgData name="Hsia, Cheehong" userId="6bc27941-0d5a-4c11-8dfb-8bbe9da0911b" providerId="ADAL" clId="{5BE5096F-7F8C-496A-A13C-FF7D0CA7A6B4}" dt="2024-02-14T15:22:13.964" v="1098" actId="700"/>
-          <ac:spMkLst>
-            <pc:docMk/>
-            <pc:sldMk cId="3775546726" sldId="328"/>
-            <ac:spMk id="4" creationId="{F978620C-B722-98CC-0FA2-E22F5047512F}"/>
-          </ac:spMkLst>
-        </pc:spChg>
-        <pc:spChg chg="mod ord">
-          <ac:chgData name="Hsia, Cheehong" userId="6bc27941-0d5a-4c11-8dfb-8bbe9da0911b" providerId="ADAL" clId="{5BE5096F-7F8C-496A-A13C-FF7D0CA7A6B4}" dt="2024-02-14T15:22:13.964" v="1098" actId="700"/>
-          <ac:spMkLst>
-            <pc:docMk/>
-            <pc:sldMk cId="3775546726" sldId="328"/>
-            <ac:spMk id="5" creationId="{CC5FDBA6-3880-4279-5835-037270B656BC}"/>
-          </ac:spMkLst>
-        </pc:spChg>
-      </pc:sldChg>
-      <pc:sldChg chg="modSp add mod modClrScheme chgLayout">
-        <pc:chgData name="Hsia, Cheehong" userId="6bc27941-0d5a-4c11-8dfb-8bbe9da0911b" providerId="ADAL" clId="{5BE5096F-7F8C-496A-A13C-FF7D0CA7A6B4}" dt="2024-02-14T15:22:48.747" v="1106" actId="700"/>
-        <pc:sldMkLst>
-          <pc:docMk/>
-          <pc:sldMk cId="192906094" sldId="329"/>
-        </pc:sldMkLst>
-        <pc:spChg chg="mod ord">
-          <ac:chgData name="Hsia, Cheehong" userId="6bc27941-0d5a-4c11-8dfb-8bbe9da0911b" providerId="ADAL" clId="{5BE5096F-7F8C-496A-A13C-FF7D0CA7A6B4}" dt="2024-02-14T15:22:48.747" v="1106" actId="700"/>
-          <ac:spMkLst>
-            <pc:docMk/>
-            <pc:sldMk cId="192906094" sldId="329"/>
-            <ac:spMk id="2" creationId="{66890E70-EDB5-4D8C-2B4F-029FA9E51D4E}"/>
-          </ac:spMkLst>
-        </pc:spChg>
-        <pc:spChg chg="mod ord">
-          <ac:chgData name="Hsia, Cheehong" userId="6bc27941-0d5a-4c11-8dfb-8bbe9da0911b" providerId="ADAL" clId="{5BE5096F-7F8C-496A-A13C-FF7D0CA7A6B4}" dt="2024-02-14T15:22:48.747" v="1106" actId="700"/>
-          <ac:spMkLst>
-            <pc:docMk/>
-            <pc:sldMk cId="192906094" sldId="329"/>
-            <ac:spMk id="3" creationId="{0E733FD9-82CF-FCB7-F012-0EAA939C393E}"/>
-          </ac:spMkLst>
-        </pc:spChg>
-        <pc:spChg chg="mod ord">
-          <ac:chgData name="Hsia, Cheehong" userId="6bc27941-0d5a-4c11-8dfb-8bbe9da0911b" providerId="ADAL" clId="{5BE5096F-7F8C-496A-A13C-FF7D0CA7A6B4}" dt="2024-02-14T15:22:48.747" v="1106" actId="700"/>
-          <ac:spMkLst>
-            <pc:docMk/>
-            <pc:sldMk cId="192906094" sldId="329"/>
-            <ac:spMk id="4" creationId="{F978620C-B722-98CC-0FA2-E22F5047512F}"/>
-          </ac:spMkLst>
-        </pc:spChg>
-        <pc:spChg chg="mod ord">
-          <ac:chgData name="Hsia, Cheehong" userId="6bc27941-0d5a-4c11-8dfb-8bbe9da0911b" providerId="ADAL" clId="{5BE5096F-7F8C-496A-A13C-FF7D0CA7A6B4}" dt="2024-02-14T15:22:48.747" v="1106" actId="700"/>
-          <ac:spMkLst>
-            <pc:docMk/>
-            <pc:sldMk cId="192906094" sldId="329"/>
-            <ac:spMk id="5" creationId="{CC5FDBA6-3880-4279-5835-037270B656BC}"/>
-          </ac:spMkLst>
-        </pc:spChg>
-      </pc:sldChg>
-      <pc:sldChg chg="modSp add mod modClrScheme chgLayout">
-        <pc:chgData name="Hsia, Cheehong" userId="6bc27941-0d5a-4c11-8dfb-8bbe9da0911b" providerId="ADAL" clId="{5BE5096F-7F8C-496A-A13C-FF7D0CA7A6B4}" dt="2024-02-14T15:23:11.155" v="1113" actId="700"/>
-        <pc:sldMkLst>
-          <pc:docMk/>
-          <pc:sldMk cId="727514259" sldId="330"/>
-        </pc:sldMkLst>
-        <pc:spChg chg="mod ord">
-          <ac:chgData name="Hsia, Cheehong" userId="6bc27941-0d5a-4c11-8dfb-8bbe9da0911b" providerId="ADAL" clId="{5BE5096F-7F8C-496A-A13C-FF7D0CA7A6B4}" dt="2024-02-14T15:23:11.155" v="1113" actId="700"/>
-          <ac:spMkLst>
-            <pc:docMk/>
-            <pc:sldMk cId="727514259" sldId="330"/>
-            <ac:spMk id="2" creationId="{66890E70-EDB5-4D8C-2B4F-029FA9E51D4E}"/>
-          </ac:spMkLst>
-        </pc:spChg>
-        <pc:spChg chg="mod ord">
-          <ac:chgData name="Hsia, Cheehong" userId="6bc27941-0d5a-4c11-8dfb-8bbe9da0911b" providerId="ADAL" clId="{5BE5096F-7F8C-496A-A13C-FF7D0CA7A6B4}" dt="2024-02-14T15:23:11.155" v="1113" actId="700"/>
-          <ac:spMkLst>
-            <pc:docMk/>
-            <pc:sldMk cId="727514259" sldId="330"/>
-            <ac:spMk id="3" creationId="{0E733FD9-82CF-FCB7-F012-0EAA939C393E}"/>
-          </ac:spMkLst>
-        </pc:spChg>
-        <pc:spChg chg="mod ord">
-          <ac:chgData name="Hsia, Cheehong" userId="6bc27941-0d5a-4c11-8dfb-8bbe9da0911b" providerId="ADAL" clId="{5BE5096F-7F8C-496A-A13C-FF7D0CA7A6B4}" dt="2024-02-14T15:23:11.155" v="1113" actId="700"/>
-          <ac:spMkLst>
-            <pc:docMk/>
-            <pc:sldMk cId="727514259" sldId="330"/>
-            <ac:spMk id="4" creationId="{F978620C-B722-98CC-0FA2-E22F5047512F}"/>
-          </ac:spMkLst>
-        </pc:spChg>
-        <pc:spChg chg="mod ord">
-          <ac:chgData name="Hsia, Cheehong" userId="6bc27941-0d5a-4c11-8dfb-8bbe9da0911b" providerId="ADAL" clId="{5BE5096F-7F8C-496A-A13C-FF7D0CA7A6B4}" dt="2024-02-14T15:23:11.155" v="1113" actId="700"/>
-          <ac:spMkLst>
-            <pc:docMk/>
-            <pc:sldMk cId="727514259" sldId="330"/>
-            <ac:spMk id="5" creationId="{CC5FDBA6-3880-4279-5835-037270B656BC}"/>
-          </ac:spMkLst>
-        </pc:spChg>
-      </pc:sldChg>
-      <pc:sldChg chg="modSp add mod modClrScheme chgLayout">
-        <pc:chgData name="Hsia, Cheehong" userId="6bc27941-0d5a-4c11-8dfb-8bbe9da0911b" providerId="ADAL" clId="{5BE5096F-7F8C-496A-A13C-FF7D0CA7A6B4}" dt="2024-02-14T15:24:02.325" v="1124" actId="700"/>
-        <pc:sldMkLst>
-          <pc:docMk/>
-          <pc:sldMk cId="3785406611" sldId="331"/>
-        </pc:sldMkLst>
-        <pc:spChg chg="mod ord">
-          <ac:chgData name="Hsia, Cheehong" userId="6bc27941-0d5a-4c11-8dfb-8bbe9da0911b" providerId="ADAL" clId="{5BE5096F-7F8C-496A-A13C-FF7D0CA7A6B4}" dt="2024-02-14T15:24:02.325" v="1124" actId="700"/>
-          <ac:spMkLst>
-            <pc:docMk/>
-            <pc:sldMk cId="3785406611" sldId="331"/>
-            <ac:spMk id="2" creationId="{AD90CEB0-783B-5FA4-1028-D4B692C5B2CE}"/>
-          </ac:spMkLst>
-        </pc:spChg>
-        <pc:spChg chg="mod ord">
-          <ac:chgData name="Hsia, Cheehong" userId="6bc27941-0d5a-4c11-8dfb-8bbe9da0911b" providerId="ADAL" clId="{5BE5096F-7F8C-496A-A13C-FF7D0CA7A6B4}" dt="2024-02-14T15:24:02.325" v="1124" actId="700"/>
-          <ac:spMkLst>
-            <pc:docMk/>
-            <pc:sldMk cId="3785406611" sldId="331"/>
-            <ac:spMk id="3" creationId="{11925C94-7DB2-3EEF-C390-EA8A563BE132}"/>
-          </ac:spMkLst>
-        </pc:spChg>
-        <pc:spChg chg="mod ord">
-          <ac:chgData name="Hsia, Cheehong" userId="6bc27941-0d5a-4c11-8dfb-8bbe9da0911b" providerId="ADAL" clId="{5BE5096F-7F8C-496A-A13C-FF7D0CA7A6B4}" dt="2024-02-14T15:24:02.325" v="1124" actId="700"/>
-          <ac:spMkLst>
-            <pc:docMk/>
-            <pc:sldMk cId="3785406611" sldId="331"/>
-            <ac:spMk id="4" creationId="{3859056E-FEDA-2D8C-90B8-7DB995ECB8A4}"/>
-          </ac:spMkLst>
-        </pc:spChg>
-        <pc:spChg chg="mod ord">
-          <ac:chgData name="Hsia, Cheehong" userId="6bc27941-0d5a-4c11-8dfb-8bbe9da0911b" providerId="ADAL" clId="{5BE5096F-7F8C-496A-A13C-FF7D0CA7A6B4}" dt="2024-02-14T15:24:02.325" v="1124" actId="700"/>
-          <ac:spMkLst>
-            <pc:docMk/>
-            <pc:sldMk cId="3785406611" sldId="331"/>
-            <ac:spMk id="5" creationId="{1D8E0DE9-59C5-51BC-C26E-CD16F2ECED89}"/>
-          </ac:spMkLst>
-        </pc:spChg>
-      </pc:sldChg>
-      <pc:sldChg chg="modSp add mod modClrScheme chgLayout">
-        <pc:chgData name="Hsia, Cheehong" userId="6bc27941-0d5a-4c11-8dfb-8bbe9da0911b" providerId="ADAL" clId="{5BE5096F-7F8C-496A-A13C-FF7D0CA7A6B4}" dt="2024-02-14T15:24:31.123" v="1134" actId="700"/>
-        <pc:sldMkLst>
-          <pc:docMk/>
-          <pc:sldMk cId="3728195757" sldId="332"/>
-        </pc:sldMkLst>
-        <pc:spChg chg="mod ord">
-          <ac:chgData name="Hsia, Cheehong" userId="6bc27941-0d5a-4c11-8dfb-8bbe9da0911b" providerId="ADAL" clId="{5BE5096F-7F8C-496A-A13C-FF7D0CA7A6B4}" dt="2024-02-14T15:24:31.123" v="1134" actId="700"/>
-          <ac:spMkLst>
-            <pc:docMk/>
-            <pc:sldMk cId="3728195757" sldId="332"/>
-            <ac:spMk id="2" creationId="{AD90CEB0-783B-5FA4-1028-D4B692C5B2CE}"/>
-          </ac:spMkLst>
-        </pc:spChg>
-        <pc:spChg chg="mod ord">
-          <ac:chgData name="Hsia, Cheehong" userId="6bc27941-0d5a-4c11-8dfb-8bbe9da0911b" providerId="ADAL" clId="{5BE5096F-7F8C-496A-A13C-FF7D0CA7A6B4}" dt="2024-02-14T15:24:31.123" v="1134" actId="700"/>
-          <ac:spMkLst>
-            <pc:docMk/>
-            <pc:sldMk cId="3728195757" sldId="332"/>
-            <ac:spMk id="3" creationId="{11925C94-7DB2-3EEF-C390-EA8A563BE132}"/>
-          </ac:spMkLst>
-        </pc:spChg>
-        <pc:spChg chg="mod ord">
-          <ac:chgData name="Hsia, Cheehong" userId="6bc27941-0d5a-4c11-8dfb-8bbe9da0911b" providerId="ADAL" clId="{5BE5096F-7F8C-496A-A13C-FF7D0CA7A6B4}" dt="2024-02-14T15:24:31.123" v="1134" actId="700"/>
-          <ac:spMkLst>
-            <pc:docMk/>
-            <pc:sldMk cId="3728195757" sldId="332"/>
-            <ac:spMk id="4" creationId="{3859056E-FEDA-2D8C-90B8-7DB995ECB8A4}"/>
-          </ac:spMkLst>
-        </pc:spChg>
-        <pc:spChg chg="mod ord">
-          <ac:chgData name="Hsia, Cheehong" userId="6bc27941-0d5a-4c11-8dfb-8bbe9da0911b" providerId="ADAL" clId="{5BE5096F-7F8C-496A-A13C-FF7D0CA7A6B4}" dt="2024-02-14T15:24:31.123" v="1134" actId="700"/>
-          <ac:spMkLst>
-            <pc:docMk/>
-            <pc:sldMk cId="3728195757" sldId="332"/>
-            <ac:spMk id="5" creationId="{1D8E0DE9-59C5-51BC-C26E-CD16F2ECED89}"/>
-          </ac:spMkLst>
-        </pc:spChg>
-      </pc:sldChg>
-      <pc:sldChg chg="modSp add mod modClrScheme chgLayout">
-        <pc:chgData name="Hsia, Cheehong" userId="6bc27941-0d5a-4c11-8dfb-8bbe9da0911b" providerId="ADAL" clId="{5BE5096F-7F8C-496A-A13C-FF7D0CA7A6B4}" dt="2024-02-14T15:25:03.031" v="1144" actId="700"/>
-        <pc:sldMkLst>
-          <pc:docMk/>
-          <pc:sldMk cId="1070377419" sldId="333"/>
-        </pc:sldMkLst>
-        <pc:spChg chg="mod ord">
-          <ac:chgData name="Hsia, Cheehong" userId="6bc27941-0d5a-4c11-8dfb-8bbe9da0911b" providerId="ADAL" clId="{5BE5096F-7F8C-496A-A13C-FF7D0CA7A6B4}" dt="2024-02-14T15:25:03.031" v="1144" actId="700"/>
-          <ac:spMkLst>
-            <pc:docMk/>
-            <pc:sldMk cId="1070377419" sldId="333"/>
-            <ac:spMk id="2" creationId="{AD90CEB0-783B-5FA4-1028-D4B692C5B2CE}"/>
-          </ac:spMkLst>
-        </pc:spChg>
-        <pc:spChg chg="mod ord">
-          <ac:chgData name="Hsia, Cheehong" userId="6bc27941-0d5a-4c11-8dfb-8bbe9da0911b" providerId="ADAL" clId="{5BE5096F-7F8C-496A-A13C-FF7D0CA7A6B4}" dt="2024-02-14T15:25:03.031" v="1144" actId="700"/>
-          <ac:spMkLst>
-            <pc:docMk/>
-            <pc:sldMk cId="1070377419" sldId="333"/>
-            <ac:spMk id="3" creationId="{11925C94-7DB2-3EEF-C390-EA8A563BE132}"/>
-          </ac:spMkLst>
-        </pc:spChg>
-        <pc:spChg chg="mod ord">
-          <ac:chgData name="Hsia, Cheehong" userId="6bc27941-0d5a-4c11-8dfb-8bbe9da0911b" providerId="ADAL" clId="{5BE5096F-7F8C-496A-A13C-FF7D0CA7A6B4}" dt="2024-02-14T15:25:03.031" v="1144" actId="700"/>
-          <ac:spMkLst>
-            <pc:docMk/>
-            <pc:sldMk cId="1070377419" sldId="333"/>
-            <ac:spMk id="4" creationId="{3859056E-FEDA-2D8C-90B8-7DB995ECB8A4}"/>
-          </ac:spMkLst>
-        </pc:spChg>
-        <pc:spChg chg="mod ord">
-          <ac:chgData name="Hsia, Cheehong" userId="6bc27941-0d5a-4c11-8dfb-8bbe9da0911b" providerId="ADAL" clId="{5BE5096F-7F8C-496A-A13C-FF7D0CA7A6B4}" dt="2024-02-14T15:25:03.031" v="1144" actId="700"/>
-          <ac:spMkLst>
-            <pc:docMk/>
-            <pc:sldMk cId="1070377419" sldId="333"/>
-            <ac:spMk id="5" creationId="{1D8E0DE9-59C5-51BC-C26E-CD16F2ECED89}"/>
-          </ac:spMkLst>
-        </pc:spChg>
-      </pc:sldChg>
-      <pc:sldChg chg="modSp add mod modClrScheme chgLayout">
-        <pc:chgData name="Hsia, Cheehong" userId="6bc27941-0d5a-4c11-8dfb-8bbe9da0911b" providerId="ADAL" clId="{5BE5096F-7F8C-496A-A13C-FF7D0CA7A6B4}" dt="2024-02-14T15:25:22.883" v="1151" actId="700"/>
-        <pc:sldMkLst>
-          <pc:docMk/>
-          <pc:sldMk cId="3134009850" sldId="334"/>
-        </pc:sldMkLst>
-        <pc:spChg chg="mod ord">
-          <ac:chgData name="Hsia, Cheehong" userId="6bc27941-0d5a-4c11-8dfb-8bbe9da0911b" providerId="ADAL" clId="{5BE5096F-7F8C-496A-A13C-FF7D0CA7A6B4}" dt="2024-02-14T15:25:22.883" v="1151" actId="700"/>
-          <ac:spMkLst>
-            <pc:docMk/>
-            <pc:sldMk cId="3134009850" sldId="334"/>
-            <ac:spMk id="2" creationId="{AD90CEB0-783B-5FA4-1028-D4B692C5B2CE}"/>
-          </ac:spMkLst>
-        </pc:spChg>
-        <pc:spChg chg="mod ord">
-          <ac:chgData name="Hsia, Cheehong" userId="6bc27941-0d5a-4c11-8dfb-8bbe9da0911b" providerId="ADAL" clId="{5BE5096F-7F8C-496A-A13C-FF7D0CA7A6B4}" dt="2024-02-14T15:25:22.883" v="1151" actId="700"/>
-          <ac:spMkLst>
-            <pc:docMk/>
-            <pc:sldMk cId="3134009850" sldId="334"/>
-            <ac:spMk id="3" creationId="{11925C94-7DB2-3EEF-C390-EA8A563BE132}"/>
-          </ac:spMkLst>
-        </pc:spChg>
-        <pc:spChg chg="mod ord">
-          <ac:chgData name="Hsia, Cheehong" userId="6bc27941-0d5a-4c11-8dfb-8bbe9da0911b" providerId="ADAL" clId="{5BE5096F-7F8C-496A-A13C-FF7D0CA7A6B4}" dt="2024-02-14T15:25:22.883" v="1151" actId="700"/>
-          <ac:spMkLst>
-            <pc:docMk/>
-            <pc:sldMk cId="3134009850" sldId="334"/>
-            <ac:spMk id="4" creationId="{3859056E-FEDA-2D8C-90B8-7DB995ECB8A4}"/>
-          </ac:spMkLst>
-        </pc:spChg>
-        <pc:spChg chg="mod ord">
-          <ac:chgData name="Hsia, Cheehong" userId="6bc27941-0d5a-4c11-8dfb-8bbe9da0911b" providerId="ADAL" clId="{5BE5096F-7F8C-496A-A13C-FF7D0CA7A6B4}" dt="2024-02-14T15:25:22.883" v="1151" actId="700"/>
-          <ac:spMkLst>
-            <pc:docMk/>
-            <pc:sldMk cId="3134009850" sldId="334"/>
-            <ac:spMk id="5" creationId="{1D8E0DE9-59C5-51BC-C26E-CD16F2ECED89}"/>
-          </ac:spMkLst>
-        </pc:spChg>
-      </pc:sldChg>
-      <pc:sldChg chg="modSp add mod modClrScheme chgLayout">
-        <pc:chgData name="Hsia, Cheehong" userId="6bc27941-0d5a-4c11-8dfb-8bbe9da0911b" providerId="ADAL" clId="{5BE5096F-7F8C-496A-A13C-FF7D0CA7A6B4}" dt="2024-02-14T15:25:46.858" v="1159" actId="700"/>
-        <pc:sldMkLst>
-          <pc:docMk/>
-          <pc:sldMk cId="2446414719" sldId="335"/>
-        </pc:sldMkLst>
-        <pc:spChg chg="mod ord">
-          <ac:chgData name="Hsia, Cheehong" userId="6bc27941-0d5a-4c11-8dfb-8bbe9da0911b" providerId="ADAL" clId="{5BE5096F-7F8C-496A-A13C-FF7D0CA7A6B4}" dt="2024-02-14T15:25:46.858" v="1159" actId="700"/>
-          <ac:spMkLst>
-            <pc:docMk/>
-            <pc:sldMk cId="2446414719" sldId="335"/>
-            <ac:spMk id="2" creationId="{AD90CEB0-783B-5FA4-1028-D4B692C5B2CE}"/>
-          </ac:spMkLst>
-        </pc:spChg>
-        <pc:spChg chg="mod ord">
-          <ac:chgData name="Hsia, Cheehong" userId="6bc27941-0d5a-4c11-8dfb-8bbe9da0911b" providerId="ADAL" clId="{5BE5096F-7F8C-496A-A13C-FF7D0CA7A6B4}" dt="2024-02-14T15:25:46.858" v="1159" actId="700"/>
-          <ac:spMkLst>
-            <pc:docMk/>
-            <pc:sldMk cId="2446414719" sldId="335"/>
-            <ac:spMk id="3" creationId="{11925C94-7DB2-3EEF-C390-EA8A563BE132}"/>
-          </ac:spMkLst>
-        </pc:spChg>
-        <pc:spChg chg="mod ord">
-          <ac:chgData name="Hsia, Cheehong" userId="6bc27941-0d5a-4c11-8dfb-8bbe9da0911b" providerId="ADAL" clId="{5BE5096F-7F8C-496A-A13C-FF7D0CA7A6B4}" dt="2024-02-14T15:25:46.858" v="1159" actId="700"/>
-          <ac:spMkLst>
-            <pc:docMk/>
-            <pc:sldMk cId="2446414719" sldId="335"/>
-            <ac:spMk id="4" creationId="{3859056E-FEDA-2D8C-90B8-7DB995ECB8A4}"/>
-          </ac:spMkLst>
-        </pc:spChg>
-        <pc:spChg chg="mod ord">
-          <ac:chgData name="Hsia, Cheehong" userId="6bc27941-0d5a-4c11-8dfb-8bbe9da0911b" providerId="ADAL" clId="{5BE5096F-7F8C-496A-A13C-FF7D0CA7A6B4}" dt="2024-02-14T15:25:46.858" v="1159" actId="700"/>
-          <ac:spMkLst>
-            <pc:docMk/>
-            <pc:sldMk cId="2446414719" sldId="335"/>
-            <ac:spMk id="5" creationId="{1D8E0DE9-59C5-51BC-C26E-CD16F2ECED89}"/>
-          </ac:spMkLst>
-        </pc:spChg>
-      </pc:sldChg>
-      <pc:sldChg chg="modSp add mod modClrScheme chgLayout">
-        <pc:chgData name="Hsia, Cheehong" userId="6bc27941-0d5a-4c11-8dfb-8bbe9da0911b" providerId="ADAL" clId="{5BE5096F-7F8C-496A-A13C-FF7D0CA7A6B4}" dt="2024-02-14T15:26:21.452" v="1169" actId="700"/>
-        <pc:sldMkLst>
-          <pc:docMk/>
-          <pc:sldMk cId="2718256781" sldId="336"/>
-        </pc:sldMkLst>
-        <pc:spChg chg="mod ord">
-          <ac:chgData name="Hsia, Cheehong" userId="6bc27941-0d5a-4c11-8dfb-8bbe9da0911b" providerId="ADAL" clId="{5BE5096F-7F8C-496A-A13C-FF7D0CA7A6B4}" dt="2024-02-14T15:26:21.452" v="1169" actId="700"/>
-          <ac:spMkLst>
-            <pc:docMk/>
-            <pc:sldMk cId="2718256781" sldId="336"/>
-            <ac:spMk id="2" creationId="{9024BA51-C630-BA2A-58B6-69F9BB6816A0}"/>
-          </ac:spMkLst>
-        </pc:spChg>
-        <pc:spChg chg="mod ord">
-          <ac:chgData name="Hsia, Cheehong" userId="6bc27941-0d5a-4c11-8dfb-8bbe9da0911b" providerId="ADAL" clId="{5BE5096F-7F8C-496A-A13C-FF7D0CA7A6B4}" dt="2024-02-14T15:26:21.452" v="1169" actId="700"/>
-          <ac:spMkLst>
-            <pc:docMk/>
-            <pc:sldMk cId="2718256781" sldId="336"/>
-            <ac:spMk id="3" creationId="{2077BF95-1F9E-AA05-3D0B-83E184AA9C48}"/>
-          </ac:spMkLst>
-        </pc:spChg>
-        <pc:spChg chg="mod ord">
-          <ac:chgData name="Hsia, Cheehong" userId="6bc27941-0d5a-4c11-8dfb-8bbe9da0911b" providerId="ADAL" clId="{5BE5096F-7F8C-496A-A13C-FF7D0CA7A6B4}" dt="2024-02-14T15:26:21.452" v="1169" actId="700"/>
-          <ac:spMkLst>
-            <pc:docMk/>
-            <pc:sldMk cId="2718256781" sldId="336"/>
-            <ac:spMk id="4" creationId="{8946D5DF-DDC9-DF42-4883-DA9549CF8DE5}"/>
-          </ac:spMkLst>
-        </pc:spChg>
-        <pc:spChg chg="mod ord">
-          <ac:chgData name="Hsia, Cheehong" userId="6bc27941-0d5a-4c11-8dfb-8bbe9da0911b" providerId="ADAL" clId="{5BE5096F-7F8C-496A-A13C-FF7D0CA7A6B4}" dt="2024-02-14T15:26:21.452" v="1169" actId="700"/>
-          <ac:spMkLst>
-            <pc:docMk/>
-            <pc:sldMk cId="2718256781" sldId="336"/>
-            <ac:spMk id="5" creationId="{860EF69F-79FC-8315-A261-A0DDABAAA234}"/>
-          </ac:spMkLst>
-        </pc:spChg>
-      </pc:sldChg>
-      <pc:sldChg chg="modSp add mod modClrScheme chgLayout">
-        <pc:chgData name="Hsia, Cheehong" userId="6bc27941-0d5a-4c11-8dfb-8bbe9da0911b" providerId="ADAL" clId="{5BE5096F-7F8C-496A-A13C-FF7D0CA7A6B4}" dt="2024-02-14T15:26:43.457" v="1178" actId="700"/>
-        <pc:sldMkLst>
-          <pc:docMk/>
-          <pc:sldMk cId="116660721" sldId="337"/>
-        </pc:sldMkLst>
-        <pc:spChg chg="mod ord">
-          <ac:chgData name="Hsia, Cheehong" userId="6bc27941-0d5a-4c11-8dfb-8bbe9da0911b" providerId="ADAL" clId="{5BE5096F-7F8C-496A-A13C-FF7D0CA7A6B4}" dt="2024-02-14T15:26:43.457" v="1178" actId="700"/>
-          <ac:spMkLst>
-            <pc:docMk/>
-            <pc:sldMk cId="116660721" sldId="337"/>
-            <ac:spMk id="2" creationId="{9024BA51-C630-BA2A-58B6-69F9BB6816A0}"/>
-          </ac:spMkLst>
-        </pc:spChg>
-        <pc:spChg chg="mod ord">
-          <ac:chgData name="Hsia, Cheehong" userId="6bc27941-0d5a-4c11-8dfb-8bbe9da0911b" providerId="ADAL" clId="{5BE5096F-7F8C-496A-A13C-FF7D0CA7A6B4}" dt="2024-02-14T15:26:43.457" v="1178" actId="700"/>
-          <ac:spMkLst>
-            <pc:docMk/>
-            <pc:sldMk cId="116660721" sldId="337"/>
-            <ac:spMk id="3" creationId="{2077BF95-1F9E-AA05-3D0B-83E184AA9C48}"/>
-          </ac:spMkLst>
-        </pc:spChg>
-        <pc:spChg chg="mod ord">
-          <ac:chgData name="Hsia, Cheehong" userId="6bc27941-0d5a-4c11-8dfb-8bbe9da0911b" providerId="ADAL" clId="{5BE5096F-7F8C-496A-A13C-FF7D0CA7A6B4}" dt="2024-02-14T15:26:43.457" v="1178" actId="700"/>
-          <ac:spMkLst>
-            <pc:docMk/>
-            <pc:sldMk cId="116660721" sldId="337"/>
-            <ac:spMk id="4" creationId="{8946D5DF-DDC9-DF42-4883-DA9549CF8DE5}"/>
-          </ac:spMkLst>
-        </pc:spChg>
-        <pc:spChg chg="mod ord">
-          <ac:chgData name="Hsia, Cheehong" userId="6bc27941-0d5a-4c11-8dfb-8bbe9da0911b" providerId="ADAL" clId="{5BE5096F-7F8C-496A-A13C-FF7D0CA7A6B4}" dt="2024-02-14T15:26:43.457" v="1178" actId="700"/>
-          <ac:spMkLst>
-            <pc:docMk/>
-            <pc:sldMk cId="116660721" sldId="337"/>
-            <ac:spMk id="5" creationId="{860EF69F-79FC-8315-A261-A0DDABAAA234}"/>
-          </ac:spMkLst>
-        </pc:spChg>
-      </pc:sldChg>
-      <pc:sldChg chg="modSp add mod modClrScheme chgLayout">
-        <pc:chgData name="Hsia, Cheehong" userId="6bc27941-0d5a-4c11-8dfb-8bbe9da0911b" providerId="ADAL" clId="{5BE5096F-7F8C-496A-A13C-FF7D0CA7A6B4}" dt="2024-02-14T15:28:03.924" v="1329" actId="700"/>
-        <pc:sldMkLst>
-          <pc:docMk/>
-          <pc:sldMk cId="781062866" sldId="338"/>
-        </pc:sldMkLst>
-        <pc:spChg chg="mod ord">
-          <ac:chgData name="Hsia, Cheehong" userId="6bc27941-0d5a-4c11-8dfb-8bbe9da0911b" providerId="ADAL" clId="{5BE5096F-7F8C-496A-A13C-FF7D0CA7A6B4}" dt="2024-02-14T15:28:03.924" v="1329" actId="700"/>
-          <ac:spMkLst>
-            <pc:docMk/>
-            <pc:sldMk cId="781062866" sldId="338"/>
-            <ac:spMk id="2" creationId="{9024BA51-C630-BA2A-58B6-69F9BB6816A0}"/>
-          </ac:spMkLst>
-        </pc:spChg>
-        <pc:spChg chg="mod ord">
-          <ac:chgData name="Hsia, Cheehong" userId="6bc27941-0d5a-4c11-8dfb-8bbe9da0911b" providerId="ADAL" clId="{5BE5096F-7F8C-496A-A13C-FF7D0CA7A6B4}" dt="2024-02-14T15:28:03.924" v="1329" actId="700"/>
-          <ac:spMkLst>
-            <pc:docMk/>
-            <pc:sldMk cId="781062866" sldId="338"/>
-            <ac:spMk id="3" creationId="{2077BF95-1F9E-AA05-3D0B-83E184AA9C48}"/>
-          </ac:spMkLst>
-        </pc:spChg>
-        <pc:spChg chg="mod ord">
-          <ac:chgData name="Hsia, Cheehong" userId="6bc27941-0d5a-4c11-8dfb-8bbe9da0911b" providerId="ADAL" clId="{5BE5096F-7F8C-496A-A13C-FF7D0CA7A6B4}" dt="2024-02-14T15:28:03.924" v="1329" actId="700"/>
-          <ac:spMkLst>
-            <pc:docMk/>
-            <pc:sldMk cId="781062866" sldId="338"/>
-            <ac:spMk id="4" creationId="{8946D5DF-DDC9-DF42-4883-DA9549CF8DE5}"/>
-          </ac:spMkLst>
-        </pc:spChg>
-        <pc:spChg chg="mod ord">
-          <ac:chgData name="Hsia, Cheehong" userId="6bc27941-0d5a-4c11-8dfb-8bbe9da0911b" providerId="ADAL" clId="{5BE5096F-7F8C-496A-A13C-FF7D0CA7A6B4}" dt="2024-02-14T15:28:03.924" v="1329" actId="700"/>
-          <ac:spMkLst>
-            <pc:docMk/>
-            <pc:sldMk cId="781062866" sldId="338"/>
-            <ac:spMk id="5" creationId="{860EF69F-79FC-8315-A261-A0DDABAAA234}"/>
-          </ac:spMkLst>
-        </pc:spChg>
-      </pc:sldChg>
-      <pc:sldChg chg="modSp add mod modClrScheme chgLayout">
-        <pc:chgData name="Hsia, Cheehong" userId="6bc27941-0d5a-4c11-8dfb-8bbe9da0911b" providerId="ADAL" clId="{5BE5096F-7F8C-496A-A13C-FF7D0CA7A6B4}" dt="2024-02-14T15:29:17.156" v="1486" actId="700"/>
-        <pc:sldMkLst>
-          <pc:docMk/>
-          <pc:sldMk cId="3259217527" sldId="339"/>
-        </pc:sldMkLst>
-        <pc:spChg chg="mod ord">
-          <ac:chgData name="Hsia, Cheehong" userId="6bc27941-0d5a-4c11-8dfb-8bbe9da0911b" providerId="ADAL" clId="{5BE5096F-7F8C-496A-A13C-FF7D0CA7A6B4}" dt="2024-02-14T15:29:17.156" v="1486" actId="700"/>
-          <ac:spMkLst>
-            <pc:docMk/>
-            <pc:sldMk cId="3259217527" sldId="339"/>
-            <ac:spMk id="2" creationId="{9024BA51-C630-BA2A-58B6-69F9BB6816A0}"/>
-          </ac:spMkLst>
-        </pc:spChg>
-        <pc:spChg chg="mod ord">
-          <ac:chgData name="Hsia, Cheehong" userId="6bc27941-0d5a-4c11-8dfb-8bbe9da0911b" providerId="ADAL" clId="{5BE5096F-7F8C-496A-A13C-FF7D0CA7A6B4}" dt="2024-02-14T15:29:17.156" v="1486" actId="700"/>
-          <ac:spMkLst>
-            <pc:docMk/>
-            <pc:sldMk cId="3259217527" sldId="339"/>
-            <ac:spMk id="3" creationId="{2077BF95-1F9E-AA05-3D0B-83E184AA9C48}"/>
-          </ac:spMkLst>
-        </pc:spChg>
-        <pc:spChg chg="mod ord">
-          <ac:chgData name="Hsia, Cheehong" userId="6bc27941-0d5a-4c11-8dfb-8bbe9da0911b" providerId="ADAL" clId="{5BE5096F-7F8C-496A-A13C-FF7D0CA7A6B4}" dt="2024-02-14T15:29:17.156" v="1486" actId="700"/>
-          <ac:spMkLst>
-            <pc:docMk/>
-            <pc:sldMk cId="3259217527" sldId="339"/>
-            <ac:spMk id="4" creationId="{8946D5DF-DDC9-DF42-4883-DA9549CF8DE5}"/>
-          </ac:spMkLst>
-        </pc:spChg>
-        <pc:spChg chg="mod ord">
-          <ac:chgData name="Hsia, Cheehong" userId="6bc27941-0d5a-4c11-8dfb-8bbe9da0911b" providerId="ADAL" clId="{5BE5096F-7F8C-496A-A13C-FF7D0CA7A6B4}" dt="2024-02-14T15:29:17.156" v="1486" actId="700"/>
-          <ac:spMkLst>
-            <pc:docMk/>
-            <pc:sldMk cId="3259217527" sldId="339"/>
-            <ac:spMk id="5" creationId="{860EF69F-79FC-8315-A261-A0DDABAAA234}"/>
-          </ac:spMkLst>
-        </pc:spChg>
-      </pc:sldChg>
-      <pc:sldChg chg="modSp add mod modClrScheme chgLayout">
-        <pc:chgData name="Hsia, Cheehong" userId="6bc27941-0d5a-4c11-8dfb-8bbe9da0911b" providerId="ADAL" clId="{5BE5096F-7F8C-496A-A13C-FF7D0CA7A6B4}" dt="2024-02-14T15:30:29.053" v="1624" actId="700"/>
-        <pc:sldMkLst>
-          <pc:docMk/>
-          <pc:sldMk cId="2466321810" sldId="340"/>
-        </pc:sldMkLst>
-        <pc:spChg chg="mod ord">
-          <ac:chgData name="Hsia, Cheehong" userId="6bc27941-0d5a-4c11-8dfb-8bbe9da0911b" providerId="ADAL" clId="{5BE5096F-7F8C-496A-A13C-FF7D0CA7A6B4}" dt="2024-02-14T15:30:29.053" v="1624" actId="700"/>
-          <ac:spMkLst>
-            <pc:docMk/>
-            <pc:sldMk cId="2466321810" sldId="340"/>
-            <ac:spMk id="2" creationId="{9024BA51-C630-BA2A-58B6-69F9BB6816A0}"/>
-          </ac:spMkLst>
-        </pc:spChg>
-        <pc:spChg chg="mod ord">
-          <ac:chgData name="Hsia, Cheehong" userId="6bc27941-0d5a-4c11-8dfb-8bbe9da0911b" providerId="ADAL" clId="{5BE5096F-7F8C-496A-A13C-FF7D0CA7A6B4}" dt="2024-02-14T15:30:29.053" v="1624" actId="700"/>
-          <ac:spMkLst>
-            <pc:docMk/>
-            <pc:sldMk cId="2466321810" sldId="340"/>
-            <ac:spMk id="3" creationId="{2077BF95-1F9E-AA05-3D0B-83E184AA9C48}"/>
-          </ac:spMkLst>
-        </pc:spChg>
-        <pc:spChg chg="mod ord">
-          <ac:chgData name="Hsia, Cheehong" userId="6bc27941-0d5a-4c11-8dfb-8bbe9da0911b" providerId="ADAL" clId="{5BE5096F-7F8C-496A-A13C-FF7D0CA7A6B4}" dt="2024-02-14T15:30:29.053" v="1624" actId="700"/>
-          <ac:spMkLst>
-            <pc:docMk/>
-            <pc:sldMk cId="2466321810" sldId="340"/>
-            <ac:spMk id="4" creationId="{8946D5DF-DDC9-DF42-4883-DA9549CF8DE5}"/>
-          </ac:spMkLst>
-        </pc:spChg>
-        <pc:spChg chg="mod ord">
-          <ac:chgData name="Hsia, Cheehong" userId="6bc27941-0d5a-4c11-8dfb-8bbe9da0911b" providerId="ADAL" clId="{5BE5096F-7F8C-496A-A13C-FF7D0CA7A6B4}" dt="2024-02-14T15:30:29.053" v="1624" actId="700"/>
-          <ac:spMkLst>
-            <pc:docMk/>
-            <pc:sldMk cId="2466321810" sldId="340"/>
-            <ac:spMk id="5" creationId="{860EF69F-79FC-8315-A261-A0DDABAAA234}"/>
-          </ac:spMkLst>
-        </pc:spChg>
       </pc:sldChg>
       <pc:sldMasterChg chg="modSldLayout">
         <pc:chgData name="Hsia, Cheehong" userId="6bc27941-0d5a-4c11-8dfb-8bbe9da0911b" providerId="ADAL" clId="{5BE5096F-7F8C-496A-A13C-FF7D0CA7A6B4}" dt="2024-01-31T20:12:39.319" v="46" actId="11529"/>
@@ -4355,7 +3247,7 @@
           <a:p>
             <a:fld id="{0739BF60-9B09-42B3-AD3C-449FED2CBA10}" type="datetimeFigureOut">
               <a:rPr lang="en-NL" smtClean="0"/>
-              <a:t>14/02/2024</a:t>
+              <a:t>03/02/2024</a:t>
             </a:fld>
             <a:endParaRPr lang="en-NL"/>
           </a:p>
@@ -22623,10 +21515,8 @@
           <a:lstStyle/>
           <a:p>
             <a:r>
-              <a:rPr lang="en-US" sz="3000" dirty="0">
-                <a:latin typeface="Ubuntu" panose="020B0504030602030204" pitchFamily="34" charset="0"/>
-              </a:rPr>
-              <a:t>Plan &amp; facilitates all Scrum events</a:t>
+              <a:rPr lang="en-US" sz="4000" dirty="0"/>
+              <a:t>Plan &amp; facilitates all scrum events</a:t>
             </a:r>
           </a:p>
         </p:txBody>
@@ -22682,16 +21572,12 @@
           <a:lstStyle/>
           <a:p>
             <a:r>
-              <a:rPr lang="en-US" sz="3000" dirty="0">
-                <a:latin typeface="Ubuntu" panose="020B0504030602030204" pitchFamily="34" charset="0"/>
-              </a:rPr>
+              <a:rPr lang="en-US" sz="4000" dirty="0"/>
               <a:t>Track progress &amp; visualizes work</a:t>
             </a:r>
           </a:p>
           <a:p>
-            <a:endParaRPr lang="en-NL" sz="3000" dirty="0">
-              <a:latin typeface="Ubuntu" panose="020B0504030602030204" pitchFamily="34" charset="0"/>
-            </a:endParaRPr>
+            <a:endParaRPr lang="en-NL" dirty="0"/>
           </a:p>
         </p:txBody>
       </p:sp>
@@ -22956,7 +21842,7 @@
           <p:cNvPr id="2" name="Text Placeholder 1">
             <a:extLst>
               <a:ext uri="{FF2B5EF4-FFF2-40B4-BE49-F238E27FC236}">
-                <a16:creationId xmlns:a16="http://schemas.microsoft.com/office/drawing/2014/main" id="{700D1D6A-607B-8919-A042-BCCDC9CF0CF0}"/>
+                <a16:creationId xmlns:a16="http://schemas.microsoft.com/office/drawing/2014/main" id="{94189FDF-7B80-50D5-3AD1-CB96FAC44E6D}"/>
               </a:ext>
             </a:extLst>
           </p:cNvPr>
@@ -22973,10 +21859,8 @@
           <a:lstStyle/>
           <a:p>
             <a:r>
-              <a:rPr lang="en-US" sz="3000" dirty="0">
-                <a:latin typeface="Ubuntu" panose="020B0504030602030204" pitchFamily="34" charset="0"/>
-              </a:rPr>
-              <a:t>Plan &amp; facilitates all Scrum events</a:t>
+              <a:rPr lang="en-US" sz="4000" dirty="0"/>
+              <a:t>Plan &amp; facilitates all scrum events</a:t>
             </a:r>
           </a:p>
         </p:txBody>
@@ -22986,7 +21870,7 @@
           <p:cNvPr id="3" name="Content Placeholder 2">
             <a:extLst>
               <a:ext uri="{FF2B5EF4-FFF2-40B4-BE49-F238E27FC236}">
-                <a16:creationId xmlns:a16="http://schemas.microsoft.com/office/drawing/2014/main" id="{DB4E66FB-476A-BB21-1B46-4C8125462E5C}"/>
+                <a16:creationId xmlns:a16="http://schemas.microsoft.com/office/drawing/2014/main" id="{6D5D3A66-6B08-9C79-C4F4-E89BA6813204}"/>
               </a:ext>
             </a:extLst>
           </p:cNvPr>
@@ -23015,7 +21899,7 @@
           <p:cNvPr id="4" name="Text Placeholder 3">
             <a:extLst>
               <a:ext uri="{FF2B5EF4-FFF2-40B4-BE49-F238E27FC236}">
-                <a16:creationId xmlns:a16="http://schemas.microsoft.com/office/drawing/2014/main" id="{101FB840-DD80-334A-87FD-81DC71AD8A57}"/>
+                <a16:creationId xmlns:a16="http://schemas.microsoft.com/office/drawing/2014/main" id="{BAAAF6E7-F37F-1543-6120-55C0EE119F6E}"/>
               </a:ext>
             </a:extLst>
           </p:cNvPr>
@@ -23032,16 +21916,9 @@
           <a:lstStyle/>
           <a:p>
             <a:r>
-              <a:rPr lang="en-US" sz="3000" dirty="0">
-                <a:latin typeface="Ubuntu" panose="020B0504030602030204" pitchFamily="34" charset="0"/>
-              </a:rPr>
+              <a:rPr lang="en-US" sz="4000" dirty="0"/>
               <a:t>Track progress &amp; visualizes work</a:t>
             </a:r>
-          </a:p>
-          <a:p>
-            <a:endParaRPr lang="en-NL" sz="3000" dirty="0">
-              <a:latin typeface="Ubuntu" panose="020B0504030602030204" pitchFamily="34" charset="0"/>
-            </a:endParaRPr>
           </a:p>
         </p:txBody>
       </p:sp>
@@ -23050,7 +21927,7 @@
           <p:cNvPr id="5" name="Content Placeholder 4">
             <a:extLst>
               <a:ext uri="{FF2B5EF4-FFF2-40B4-BE49-F238E27FC236}">
-                <a16:creationId xmlns:a16="http://schemas.microsoft.com/office/drawing/2014/main" id="{3994DC0B-F72F-6BFF-C694-00CBF68920C1}"/>
+                <a16:creationId xmlns:a16="http://schemas.microsoft.com/office/drawing/2014/main" id="{BF99AF0D-A600-46B8-4778-8413DABABEFB}"/>
               </a:ext>
             </a:extLst>
           </p:cNvPr>
@@ -23079,7 +21956,7 @@
           <p:cNvPr id="6" name="Text Placeholder 1">
             <a:extLst>
               <a:ext uri="{FF2B5EF4-FFF2-40B4-BE49-F238E27FC236}">
-                <a16:creationId xmlns:a16="http://schemas.microsoft.com/office/drawing/2014/main" id="{973DC34E-6561-45C7-EF65-6ED303617764}"/>
+                <a16:creationId xmlns:a16="http://schemas.microsoft.com/office/drawing/2014/main" id="{46EB0A5B-8321-F4D4-A1D8-FF92E744308A}"/>
               </a:ext>
             </a:extLst>
           </p:cNvPr>
@@ -23274,7 +22151,7 @@
     </p:spTree>
     <p:extLst>
       <p:ext uri="{BB962C8B-B14F-4D97-AF65-F5344CB8AC3E}">
-        <p14:creationId xmlns:p14="http://schemas.microsoft.com/office/powerpoint/2010/main" val="2830884995"/>
+        <p14:creationId xmlns:p14="http://schemas.microsoft.com/office/powerpoint/2010/main" val="106282829"/>
       </p:ext>
     </p:extLst>
   </p:cSld>
@@ -23323,10 +22200,8 @@
           <a:lstStyle/>
           <a:p>
             <a:r>
-              <a:rPr lang="en-US" sz="3000" dirty="0">
-                <a:latin typeface="Ubuntu" panose="020B0504030602030204" pitchFamily="34" charset="0"/>
-              </a:rPr>
-              <a:t>Facilitates the scrum events</a:t>
+              <a:rPr lang="en-US" sz="4000" dirty="0"/>
+              <a:t>facilitates the scrum events</a:t>
             </a:r>
           </a:p>
         </p:txBody>
@@ -23382,9 +22257,7 @@
           <a:lstStyle/>
           <a:p>
             <a:r>
-              <a:rPr lang="en-US" sz="3000" dirty="0">
-                <a:latin typeface="Ubuntu" panose="020B0504030602030204" pitchFamily="34" charset="0"/>
-              </a:rPr>
+              <a:rPr lang="en-US" sz="4000" dirty="0"/>
               <a:t>Enables the Developers to track &amp; visualizes work</a:t>
             </a:r>
           </a:p>
@@ -23668,10 +22541,8 @@
           <a:lstStyle/>
           <a:p>
             <a:r>
-              <a:rPr lang="en-US" sz="3000" dirty="0">
-                <a:latin typeface="Ubuntu" panose="020B0504030602030204" pitchFamily="34" charset="0"/>
-              </a:rPr>
-              <a:t>Facilitates the scrum events</a:t>
+              <a:rPr lang="en-US" sz="4000" dirty="0"/>
+              <a:t>facilitates the scrum events</a:t>
             </a:r>
           </a:p>
         </p:txBody>
@@ -23727,9 +22598,7 @@
           <a:lstStyle/>
           <a:p>
             <a:r>
-              <a:rPr lang="en-US" sz="3000" dirty="0">
-                <a:latin typeface="Ubuntu" panose="020B0504030602030204" pitchFamily="34" charset="0"/>
-              </a:rPr>
+              <a:rPr lang="en-US" sz="4000" dirty="0"/>
               <a:t>Enables the Developers to track &amp; visualizes work</a:t>
             </a:r>
           </a:p>
@@ -23769,7 +22638,7 @@
           <p:cNvPr id="6" name="Text Placeholder 1">
             <a:extLst>
               <a:ext uri="{FF2B5EF4-FFF2-40B4-BE49-F238E27FC236}">
-                <a16:creationId xmlns:a16="http://schemas.microsoft.com/office/drawing/2014/main" id="{D1E185FA-1FC9-E9CF-807A-D1563F37C59A}"/>
+                <a16:creationId xmlns:a16="http://schemas.microsoft.com/office/drawing/2014/main" id="{CCA63276-EDC3-D604-4F00-B405F28D19A4}"/>
               </a:ext>
             </a:extLst>
           </p:cNvPr>
@@ -23964,7 +22833,7 @@
     </p:spTree>
     <p:extLst>
       <p:ext uri="{BB962C8B-B14F-4D97-AF65-F5344CB8AC3E}">
-        <p14:creationId xmlns:p14="http://schemas.microsoft.com/office/powerpoint/2010/main" val="393363697"/>
+        <p14:creationId xmlns:p14="http://schemas.microsoft.com/office/powerpoint/2010/main" val="433227676"/>
       </p:ext>
     </p:extLst>
   </p:cSld>
@@ -24013,10 +22882,8 @@
           <a:lstStyle/>
           <a:p>
             <a:r>
-              <a:rPr lang="en-US" sz="3000" dirty="0">
-                <a:latin typeface="Ubuntu" panose="020B0504030602030204" pitchFamily="34" charset="0"/>
-              </a:rPr>
-              <a:t>Help Scrum team by facilitating transparency, inspection &amp; adaptation</a:t>
+              <a:rPr lang="en-US" sz="4000" dirty="0"/>
+              <a:t>Help scrum team by facilitating transparency, inspection &amp; adaptation</a:t>
             </a:r>
           </a:p>
         </p:txBody>
@@ -24072,9 +22939,7 @@
           <a:lstStyle/>
           <a:p>
             <a:r>
-              <a:rPr lang="en-US" sz="3000" dirty="0">
-                <a:latin typeface="Ubuntu" panose="020B0504030602030204" pitchFamily="34" charset="0"/>
-              </a:rPr>
+              <a:rPr lang="en-US" sz="4000" dirty="0"/>
               <a:t>Enables Product Owner to focus on value delivery</a:t>
             </a:r>
           </a:p>
@@ -24557,10 +23422,8 @@
           <a:lstStyle/>
           <a:p>
             <a:r>
-              <a:rPr lang="en-US" sz="3000" dirty="0">
-                <a:latin typeface="Ubuntu" panose="020B0504030602030204" pitchFamily="34" charset="0"/>
-              </a:rPr>
-              <a:t>Help Scrum team by facilitating transparency, inspection &amp; adaptation</a:t>
+              <a:rPr lang="en-US" sz="4000" dirty="0"/>
+              <a:t>Help scrum team by facilitating transparency, inspection &amp; adaptation</a:t>
             </a:r>
           </a:p>
         </p:txBody>
@@ -24616,9 +23479,7 @@
           <a:lstStyle/>
           <a:p>
             <a:r>
-              <a:rPr lang="en-US" sz="3000" dirty="0">
-                <a:latin typeface="Ubuntu" panose="020B0504030602030204" pitchFamily="34" charset="0"/>
-              </a:rPr>
+              <a:rPr lang="en-US" sz="4000" dirty="0"/>
               <a:t>Enables Product Owner to focus on value delivery</a:t>
             </a:r>
           </a:p>
@@ -24658,7 +23519,7 @@
           <p:cNvPr id="6" name="Text Placeholder 1">
             <a:extLst>
               <a:ext uri="{FF2B5EF4-FFF2-40B4-BE49-F238E27FC236}">
-                <a16:creationId xmlns:a16="http://schemas.microsoft.com/office/drawing/2014/main" id="{E465B4E2-6EB9-48B1-02D0-538A233218DB}"/>
+                <a16:creationId xmlns:a16="http://schemas.microsoft.com/office/drawing/2014/main" id="{BDFF8CC1-719D-8EFA-797B-7194698D8FA9}"/>
               </a:ext>
             </a:extLst>
           </p:cNvPr>
@@ -24853,7 +23714,7 @@
     </p:spTree>
     <p:extLst>
       <p:ext uri="{BB962C8B-B14F-4D97-AF65-F5344CB8AC3E}">
-        <p14:creationId xmlns:p14="http://schemas.microsoft.com/office/powerpoint/2010/main" val="3631058862"/>
+        <p14:creationId xmlns:p14="http://schemas.microsoft.com/office/powerpoint/2010/main" val="1970583200"/>
       </p:ext>
     </p:extLst>
   </p:cSld>
@@ -24902,9 +23763,7 @@
           <a:lstStyle/>
           <a:p>
             <a:r>
-              <a:rPr lang="en-US" sz="3000" dirty="0">
-                <a:latin typeface="Ubuntu" panose="020B0504030602030204" pitchFamily="34" charset="0"/>
-              </a:rPr>
+              <a:rPr lang="en-US" sz="4000" dirty="0"/>
               <a:t>Help stakeholders understand &amp; apply Agile principles</a:t>
             </a:r>
           </a:p>
@@ -24961,10 +23820,8 @@
           <a:lstStyle/>
           <a:p>
             <a:r>
-              <a:rPr lang="en-US" sz="3000" dirty="0">
-                <a:latin typeface="Ubuntu" panose="020B0504030602030204" pitchFamily="34" charset="0"/>
-              </a:rPr>
-              <a:t>Focus on continuous improvements in the value chain</a:t>
+              <a:rPr lang="en-US" sz="4000" dirty="0"/>
+              <a:t>Focus on continuous Improvements in the value chain</a:t>
             </a:r>
           </a:p>
         </p:txBody>
@@ -25247,9 +24104,7 @@
           <a:lstStyle/>
           <a:p>
             <a:r>
-              <a:rPr lang="en-US" sz="3000" dirty="0">
-                <a:latin typeface="Ubuntu" panose="020B0504030602030204" pitchFamily="34" charset="0"/>
-              </a:rPr>
+              <a:rPr lang="en-US" sz="4000" dirty="0"/>
               <a:t>Help stakeholders understand &amp; apply Agile principles</a:t>
             </a:r>
           </a:p>
@@ -25306,10 +24161,8 @@
           <a:lstStyle/>
           <a:p>
             <a:r>
-              <a:rPr lang="en-US" sz="3000" dirty="0">
-                <a:latin typeface="Ubuntu" panose="020B0504030602030204" pitchFamily="34" charset="0"/>
-              </a:rPr>
-              <a:t>Focus on continuous improvements in the value chain</a:t>
+              <a:rPr lang="en-US" sz="4000" dirty="0"/>
+              <a:t>Focus on continuous Improvements in the value chain</a:t>
             </a:r>
           </a:p>
         </p:txBody>
@@ -25348,7 +24201,7 @@
           <p:cNvPr id="6" name="Text Placeholder 1">
             <a:extLst>
               <a:ext uri="{FF2B5EF4-FFF2-40B4-BE49-F238E27FC236}">
-                <a16:creationId xmlns:a16="http://schemas.microsoft.com/office/drawing/2014/main" id="{D10F6304-FA83-2181-CF93-41489AC119C9}"/>
+                <a16:creationId xmlns:a16="http://schemas.microsoft.com/office/drawing/2014/main" id="{0AC00613-D4A6-7303-7DBE-D611CDB22F95}"/>
               </a:ext>
             </a:extLst>
           </p:cNvPr>
@@ -25543,7 +24396,7 @@
     </p:spTree>
     <p:extLst>
       <p:ext uri="{BB962C8B-B14F-4D97-AF65-F5344CB8AC3E}">
-        <p14:creationId xmlns:p14="http://schemas.microsoft.com/office/powerpoint/2010/main" val="1252257208"/>
+        <p14:creationId xmlns:p14="http://schemas.microsoft.com/office/powerpoint/2010/main" val="596055484"/>
       </p:ext>
     </p:extLst>
   </p:cSld>
@@ -25592,11 +24445,12 @@
           <a:lstStyle/>
           <a:p>
             <a:r>
-              <a:rPr lang="en-US" sz="3000" dirty="0">
-                <a:latin typeface="Ubuntu" panose="020B0504030602030204" pitchFamily="34" charset="0"/>
-              </a:rPr>
-              <a:t>Help the organization to understand &amp; apply Agile principles</a:t>
+              <a:rPr lang="en-US" sz="4000" dirty="0"/>
+              <a:t>Help the organization to understand &amp; apply agile principles</a:t>
             </a:r>
+            <a:endParaRPr lang="en-US" sz="1050" dirty="0">
+              <a:latin typeface="Manrope" pitchFamily="2" charset="0"/>
+            </a:endParaRPr>
           </a:p>
         </p:txBody>
       </p:sp>
@@ -25651,9 +24505,7 @@
           <a:lstStyle/>
           <a:p>
             <a:r>
-              <a:rPr lang="en-US" sz="3000" dirty="0">
-                <a:latin typeface="Ubuntu" panose="020B0504030602030204" pitchFamily="34" charset="0"/>
-              </a:rPr>
+              <a:rPr lang="en-US" sz="4000" dirty="0"/>
               <a:t>Enables the organization to continuously have impact on customers</a:t>
             </a:r>
           </a:p>
@@ -25937,11 +24789,12 @@
           <a:lstStyle/>
           <a:p>
             <a:r>
-              <a:rPr lang="en-US" sz="3000" dirty="0">
-                <a:latin typeface="Ubuntu" panose="020B0504030602030204" pitchFamily="34" charset="0"/>
-              </a:rPr>
-              <a:t>Help the organization to understand &amp; apply Agile principles</a:t>
+              <a:rPr lang="en-US" sz="4000" dirty="0"/>
+              <a:t>Help the organization to understand &amp; apply agile principles</a:t>
             </a:r>
+            <a:endParaRPr lang="en-US" sz="1050" dirty="0">
+              <a:latin typeface="Manrope" pitchFamily="2" charset="0"/>
+            </a:endParaRPr>
           </a:p>
         </p:txBody>
       </p:sp>
@@ -25996,9 +24849,7 @@
           <a:lstStyle/>
           <a:p>
             <a:r>
-              <a:rPr lang="en-US" sz="3000" dirty="0">
-                <a:latin typeface="Ubuntu" panose="020B0504030602030204" pitchFamily="34" charset="0"/>
-              </a:rPr>
+              <a:rPr lang="en-US" sz="4000" dirty="0"/>
               <a:t>Enables the organization to continuously have impact on customers</a:t>
             </a:r>
           </a:p>
@@ -26038,7 +24889,7 @@
           <p:cNvPr id="6" name="Text Placeholder 1">
             <a:extLst>
               <a:ext uri="{FF2B5EF4-FFF2-40B4-BE49-F238E27FC236}">
-                <a16:creationId xmlns:a16="http://schemas.microsoft.com/office/drawing/2014/main" id="{ED5B7504-6185-5EDE-5BF5-A64E95E63231}"/>
+                <a16:creationId xmlns:a16="http://schemas.microsoft.com/office/drawing/2014/main" id="{E0EF5841-980D-CFB1-9AE2-83ECCF432CE6}"/>
               </a:ext>
             </a:extLst>
           </p:cNvPr>
@@ -26233,7 +25084,7 @@
     </p:spTree>
     <p:extLst>
       <p:ext uri="{BB962C8B-B14F-4D97-AF65-F5344CB8AC3E}">
-        <p14:creationId xmlns:p14="http://schemas.microsoft.com/office/powerpoint/2010/main" val="1151322812"/>
+        <p14:creationId xmlns:p14="http://schemas.microsoft.com/office/powerpoint/2010/main" val="3282675112"/>
       </p:ext>
     </p:extLst>
   </p:cSld>
@@ -26406,11 +25257,12 @@
           <a:lstStyle/>
           <a:p>
             <a:r>
-              <a:rPr lang="en-US" sz="3000" dirty="0">
-                <a:latin typeface="Ubuntu" panose="020B0504030602030204" pitchFamily="34" charset="0"/>
-              </a:rPr>
-              <a:t>Focus on creating requirements &amp; Product Backlog Items</a:t>
+              <a:rPr lang="en-US" sz="4000" dirty="0"/>
+              <a:t>Focus on creating requirements &amp; product backlog items</a:t>
             </a:r>
+            <a:endParaRPr lang="en-US" sz="1050" dirty="0">
+              <a:latin typeface="Manrope" pitchFamily="2" charset="0"/>
+            </a:endParaRPr>
           </a:p>
         </p:txBody>
       </p:sp>
@@ -26465,9 +25317,7 @@
           <a:lstStyle/>
           <a:p>
             <a:r>
-              <a:rPr lang="en-US" sz="3000" dirty="0">
-                <a:latin typeface="Ubuntu" panose="020B0504030602030204" pitchFamily="34" charset="0"/>
-              </a:rPr>
+              <a:rPr lang="en-US" sz="4000" dirty="0"/>
               <a:t>Executes plans &amp; decisions made by stakeholders</a:t>
             </a:r>
           </a:p>
@@ -26751,11 +25601,12 @@
           <a:lstStyle/>
           <a:p>
             <a:r>
-              <a:rPr lang="en-US" sz="3000" dirty="0">
-                <a:latin typeface="Ubuntu" panose="020B0504030602030204" pitchFamily="34" charset="0"/>
-              </a:rPr>
-              <a:t>Focus on creating requirements &amp; Product Backlog Items</a:t>
+              <a:rPr lang="en-US" sz="4000" dirty="0"/>
+              <a:t>Focus on creating requirements &amp; product backlog items</a:t>
             </a:r>
+            <a:endParaRPr lang="en-US" sz="1050" dirty="0">
+              <a:latin typeface="Manrope" pitchFamily="2" charset="0"/>
+            </a:endParaRPr>
           </a:p>
         </p:txBody>
       </p:sp>
@@ -26810,9 +25661,7 @@
           <a:lstStyle/>
           <a:p>
             <a:r>
-              <a:rPr lang="en-US" sz="3000" dirty="0">
-                <a:latin typeface="Ubuntu" panose="020B0504030602030204" pitchFamily="34" charset="0"/>
-              </a:rPr>
+              <a:rPr lang="en-US" sz="4000" dirty="0"/>
               <a:t>Executes plans &amp; decisions made by stakeholders</a:t>
             </a:r>
           </a:p>
@@ -26852,7 +25701,7 @@
           <p:cNvPr id="6" name="Text Placeholder 1">
             <a:extLst>
               <a:ext uri="{FF2B5EF4-FFF2-40B4-BE49-F238E27FC236}">
-                <a16:creationId xmlns:a16="http://schemas.microsoft.com/office/drawing/2014/main" id="{0053F6A2-9CE5-1161-4CE8-79A7313E43CB}"/>
+                <a16:creationId xmlns:a16="http://schemas.microsoft.com/office/drawing/2014/main" id="{1B178722-AB77-ADD4-F984-1FEF568FB3FF}"/>
               </a:ext>
             </a:extLst>
           </p:cNvPr>
@@ -27047,7 +25896,7 @@
     </p:spTree>
     <p:extLst>
       <p:ext uri="{BB962C8B-B14F-4D97-AF65-F5344CB8AC3E}">
-        <p14:creationId xmlns:p14="http://schemas.microsoft.com/office/powerpoint/2010/main" val="2954588375"/>
+        <p14:creationId xmlns:p14="http://schemas.microsoft.com/office/powerpoint/2010/main" val="1386201035"/>
       </p:ext>
     </p:extLst>
   </p:cSld>
@@ -27096,11 +25945,12 @@
           <a:lstStyle/>
           <a:p>
             <a:r>
-              <a:rPr lang="en-US" sz="3000" dirty="0">
-                <a:latin typeface="Ubuntu" panose="020B0504030602030204" pitchFamily="34" charset="0"/>
-              </a:rPr>
-              <a:t>Focus on creating Sprint Goals &amp; Product Increments</a:t>
+              <a:rPr lang="en-US" sz="4000" dirty="0"/>
+              <a:t>Focus on creating Sprint goals &amp; product increments</a:t>
             </a:r>
+            <a:endParaRPr lang="en-US" sz="1050" dirty="0">
+              <a:latin typeface="Manrope" pitchFamily="2" charset="0"/>
+            </a:endParaRPr>
           </a:p>
         </p:txBody>
       </p:sp>
@@ -27155,10 +26005,8 @@
           <a:lstStyle/>
           <a:p>
             <a:r>
-              <a:rPr lang="en-US" sz="3000" dirty="0">
-                <a:latin typeface="Ubuntu" panose="020B0504030602030204" pitchFamily="34" charset="0"/>
-              </a:rPr>
-              <a:t>Has influence on stakeholders in making plans &amp; Product related decisions</a:t>
+              <a:rPr lang="en-US" sz="4000" dirty="0"/>
+              <a:t>Has influence on stakeholders in making plans &amp; product related decisions</a:t>
             </a:r>
           </a:p>
         </p:txBody>
@@ -27500,11 +26348,12 @@
           <a:lstStyle/>
           <a:p>
             <a:r>
-              <a:rPr lang="en-US" sz="3000" dirty="0">
-                <a:latin typeface="Ubuntu" panose="020B0504030602030204" pitchFamily="34" charset="0"/>
-              </a:rPr>
-              <a:t>Focus on creating Sprint Goals &amp; Product Increments</a:t>
+              <a:rPr lang="en-US" sz="4000" dirty="0"/>
+              <a:t>Focus on creating Sprint goals &amp; product increments</a:t>
             </a:r>
+            <a:endParaRPr lang="en-US" sz="1050" dirty="0">
+              <a:latin typeface="Manrope" pitchFamily="2" charset="0"/>
+            </a:endParaRPr>
           </a:p>
         </p:txBody>
       </p:sp>
@@ -27559,10 +26408,8 @@
           <a:lstStyle/>
           <a:p>
             <a:r>
-              <a:rPr lang="en-US" sz="3000" dirty="0">
-                <a:latin typeface="Ubuntu" panose="020B0504030602030204" pitchFamily="34" charset="0"/>
-              </a:rPr>
-              <a:t>Has influence on stakeholders in making plans &amp; Product related decisions</a:t>
+              <a:rPr lang="en-US" sz="4000" dirty="0"/>
+              <a:t>Has influence on stakeholders in making plans &amp; product related decisions</a:t>
             </a:r>
           </a:p>
         </p:txBody>
@@ -27601,7 +26448,7 @@
           <p:cNvPr id="6" name="Text Placeholder 1">
             <a:extLst>
               <a:ext uri="{FF2B5EF4-FFF2-40B4-BE49-F238E27FC236}">
-                <a16:creationId xmlns:a16="http://schemas.microsoft.com/office/drawing/2014/main" id="{785CE489-A858-784D-5923-57B8923E5C1C}"/>
+                <a16:creationId xmlns:a16="http://schemas.microsoft.com/office/drawing/2014/main" id="{C86B6B4E-62E9-7F97-892C-CC962139E3F7}"/>
               </a:ext>
             </a:extLst>
           </p:cNvPr>
@@ -27796,7 +26643,7 @@
     </p:spTree>
     <p:extLst>
       <p:ext uri="{BB962C8B-B14F-4D97-AF65-F5344CB8AC3E}">
-        <p14:creationId xmlns:p14="http://schemas.microsoft.com/office/powerpoint/2010/main" val="397487342"/>
+        <p14:creationId xmlns:p14="http://schemas.microsoft.com/office/powerpoint/2010/main" val="3471392720"/>
       </p:ext>
     </p:extLst>
   </p:cSld>
@@ -27845,11 +26692,12 @@
           <a:lstStyle/>
           <a:p>
             <a:r>
-              <a:rPr lang="en-US" sz="3000" dirty="0">
-                <a:latin typeface="Ubuntu" panose="020B0504030602030204" pitchFamily="34" charset="0"/>
-              </a:rPr>
+              <a:rPr lang="en-US" sz="4000" dirty="0"/>
               <a:t>Focus on creating value &amp; continuously validate assumptions</a:t>
             </a:r>
+            <a:endParaRPr lang="en-US" sz="1050" dirty="0">
+              <a:latin typeface="Manrope" pitchFamily="2" charset="0"/>
+            </a:endParaRPr>
           </a:p>
         </p:txBody>
       </p:sp>
@@ -27904,10 +26752,8 @@
           <a:lstStyle/>
           <a:p>
             <a:r>
-              <a:rPr lang="en-US" sz="3000" dirty="0">
-                <a:latin typeface="Ubuntu" panose="020B0504030602030204" pitchFamily="34" charset="0"/>
-              </a:rPr>
-              <a:t>Collaborate with stakeholders to make plans &amp; Product related decisions</a:t>
+              <a:rPr lang="en-US" sz="4000" dirty="0"/>
+              <a:t>Collaborate with stakeholders to make plans &amp; product related decisions</a:t>
             </a:r>
           </a:p>
         </p:txBody>
@@ -28190,11 +27036,12 @@
           <a:lstStyle/>
           <a:p>
             <a:r>
-              <a:rPr lang="en-US" sz="3000" dirty="0">
-                <a:latin typeface="Ubuntu" panose="020B0504030602030204" pitchFamily="34" charset="0"/>
-              </a:rPr>
+              <a:rPr lang="en-US" sz="4000" dirty="0"/>
               <a:t>Focus on creating value &amp; continuously validate assumptions</a:t>
             </a:r>
+            <a:endParaRPr lang="en-US" sz="1050" dirty="0">
+              <a:latin typeface="Manrope" pitchFamily="2" charset="0"/>
+            </a:endParaRPr>
           </a:p>
         </p:txBody>
       </p:sp>
@@ -28249,10 +27096,8 @@
           <a:lstStyle/>
           <a:p>
             <a:r>
-              <a:rPr lang="en-US" sz="3000" dirty="0">
-                <a:latin typeface="Ubuntu" panose="020B0504030602030204" pitchFamily="34" charset="0"/>
-              </a:rPr>
-              <a:t>Collaborate with stakeholders to make plans &amp; Product related decisions</a:t>
+              <a:rPr lang="en-US" sz="4000" dirty="0"/>
+              <a:t>Collaborate with stakeholders to make plans &amp; product related decisions</a:t>
             </a:r>
           </a:p>
         </p:txBody>
@@ -28291,7 +27136,7 @@
           <p:cNvPr id="6" name="Text Placeholder 1">
             <a:extLst>
               <a:ext uri="{FF2B5EF4-FFF2-40B4-BE49-F238E27FC236}">
-                <a16:creationId xmlns:a16="http://schemas.microsoft.com/office/drawing/2014/main" id="{BA244130-E98C-1723-C038-309240C3E6ED}"/>
+                <a16:creationId xmlns:a16="http://schemas.microsoft.com/office/drawing/2014/main" id="{D04BA9A7-079E-1C5C-4768-57AF3A15C8BD}"/>
               </a:ext>
             </a:extLst>
           </p:cNvPr>
@@ -28486,7 +27331,7 @@
     </p:spTree>
     <p:extLst>
       <p:ext uri="{BB962C8B-B14F-4D97-AF65-F5344CB8AC3E}">
-        <p14:creationId xmlns:p14="http://schemas.microsoft.com/office/powerpoint/2010/main" val="3775546726"/>
+        <p14:creationId xmlns:p14="http://schemas.microsoft.com/office/powerpoint/2010/main" val="1734131973"/>
       </p:ext>
     </p:extLst>
   </p:cSld>
@@ -28535,11 +27380,12 @@
           <a:lstStyle/>
           <a:p>
             <a:r>
-              <a:rPr lang="en-US" sz="3000" dirty="0">
-                <a:latin typeface="Ubuntu" panose="020B0504030602030204" pitchFamily="34" charset="0"/>
-              </a:rPr>
+              <a:rPr lang="en-US" sz="4000" dirty="0"/>
               <a:t>Focus on continuous value creation &amp; stakeholder collaboration</a:t>
             </a:r>
+            <a:endParaRPr lang="en-US" sz="1050" dirty="0">
+              <a:latin typeface="Manrope" pitchFamily="2" charset="0"/>
+            </a:endParaRPr>
           </a:p>
         </p:txBody>
       </p:sp>
@@ -28594,10 +27440,8 @@
           <a:lstStyle/>
           <a:p>
             <a:r>
-              <a:rPr lang="en-US" sz="3000" dirty="0">
-                <a:latin typeface="Ubuntu" panose="020B0504030602030204" pitchFamily="34" charset="0"/>
-              </a:rPr>
-              <a:t>Has mandate to make Product related decisions &amp; release plans</a:t>
+              <a:rPr lang="en-US" sz="4000" dirty="0"/>
+              <a:t>Has mandate to make product related decisions &amp; release plans</a:t>
             </a:r>
           </a:p>
         </p:txBody>
@@ -28880,11 +27724,12 @@
           <a:lstStyle/>
           <a:p>
             <a:r>
-              <a:rPr lang="en-US" sz="3000" dirty="0">
-                <a:latin typeface="Ubuntu" panose="020B0504030602030204" pitchFamily="34" charset="0"/>
-              </a:rPr>
+              <a:rPr lang="en-US" sz="4000" dirty="0"/>
               <a:t>Focus on continuous value creation &amp; stakeholder collaboration</a:t>
             </a:r>
+            <a:endParaRPr lang="en-US" sz="1050" dirty="0">
+              <a:latin typeface="Manrope" pitchFamily="2" charset="0"/>
+            </a:endParaRPr>
           </a:p>
         </p:txBody>
       </p:sp>
@@ -28939,10 +27784,8 @@
           <a:lstStyle/>
           <a:p>
             <a:r>
-              <a:rPr lang="en-US" sz="3000" dirty="0">
-                <a:latin typeface="Ubuntu" panose="020B0504030602030204" pitchFamily="34" charset="0"/>
-              </a:rPr>
-              <a:t>Has mandate to make Product related decisions &amp; release plans</a:t>
+              <a:rPr lang="en-US" sz="4000" dirty="0"/>
+              <a:t>Has mandate to make product related decisions &amp; release plans</a:t>
             </a:r>
           </a:p>
         </p:txBody>
@@ -28981,7 +27824,7 @@
           <p:cNvPr id="6" name="Text Placeholder 1">
             <a:extLst>
               <a:ext uri="{FF2B5EF4-FFF2-40B4-BE49-F238E27FC236}">
-                <a16:creationId xmlns:a16="http://schemas.microsoft.com/office/drawing/2014/main" id="{14273908-59D9-940C-9E72-950C9177D7BD}"/>
+                <a16:creationId xmlns:a16="http://schemas.microsoft.com/office/drawing/2014/main" id="{82E8965E-D376-8AAF-2C21-7244AA581A2A}"/>
               </a:ext>
             </a:extLst>
           </p:cNvPr>
@@ -29176,7 +28019,7 @@
     </p:spTree>
     <p:extLst>
       <p:ext uri="{BB962C8B-B14F-4D97-AF65-F5344CB8AC3E}">
-        <p14:creationId xmlns:p14="http://schemas.microsoft.com/office/powerpoint/2010/main" val="192906094"/>
+        <p14:creationId xmlns:p14="http://schemas.microsoft.com/office/powerpoint/2010/main" val="1292218336"/>
       </p:ext>
     </p:extLst>
   </p:cSld>
@@ -29225,11 +28068,12 @@
           <a:lstStyle/>
           <a:p>
             <a:r>
-              <a:rPr lang="en-US" sz="3000" dirty="0">
-                <a:latin typeface="Ubuntu" panose="020B0504030602030204" pitchFamily="34" charset="0"/>
-              </a:rPr>
+              <a:rPr lang="en-US" sz="4000" dirty="0"/>
               <a:t>Focus on continuous value optimizing &amp; customer collaboration</a:t>
             </a:r>
+            <a:endParaRPr lang="en-US" sz="1050" dirty="0">
+              <a:latin typeface="Manrope" pitchFamily="2" charset="0"/>
+            </a:endParaRPr>
           </a:p>
         </p:txBody>
       </p:sp>
@@ -29284,9 +28128,7 @@
           <a:lstStyle/>
           <a:p>
             <a:r>
-              <a:rPr lang="en-US" sz="3000" dirty="0">
-                <a:latin typeface="Ubuntu" panose="020B0504030602030204" pitchFamily="34" charset="0"/>
-              </a:rPr>
+              <a:rPr lang="en-US" sz="3500" dirty="0"/>
               <a:t>Is responsible for planning, budget, profits &amp; loss of the products’ value chain</a:t>
             </a:r>
           </a:p>
@@ -29570,11 +28412,12 @@
           <a:lstStyle/>
           <a:p>
             <a:r>
-              <a:rPr lang="en-US" sz="3000" dirty="0">
-                <a:latin typeface="Ubuntu" panose="020B0504030602030204" pitchFamily="34" charset="0"/>
-              </a:rPr>
+              <a:rPr lang="en-US" sz="4000" dirty="0"/>
               <a:t>Focus on continuous value optimizing &amp; customer collaboration</a:t>
             </a:r>
+            <a:endParaRPr lang="en-US" sz="1050" dirty="0">
+              <a:latin typeface="Manrope" pitchFamily="2" charset="0"/>
+            </a:endParaRPr>
           </a:p>
         </p:txBody>
       </p:sp>
@@ -29629,9 +28472,7 @@
           <a:lstStyle/>
           <a:p>
             <a:r>
-              <a:rPr lang="en-US" sz="3000" dirty="0">
-                <a:latin typeface="Ubuntu" panose="020B0504030602030204" pitchFamily="34" charset="0"/>
-              </a:rPr>
+              <a:rPr lang="en-US" sz="3500" dirty="0"/>
               <a:t>Is responsible for planning, budget, profits &amp; loss of the products’ value chain</a:t>
             </a:r>
           </a:p>
@@ -29671,7 +28512,7 @@
           <p:cNvPr id="6" name="Text Placeholder 1">
             <a:extLst>
               <a:ext uri="{FF2B5EF4-FFF2-40B4-BE49-F238E27FC236}">
-                <a16:creationId xmlns:a16="http://schemas.microsoft.com/office/drawing/2014/main" id="{1206E5F5-5C4F-4016-C424-D33847996D39}"/>
+                <a16:creationId xmlns:a16="http://schemas.microsoft.com/office/drawing/2014/main" id="{F9BCBE14-7BE1-AE3D-BCD7-F6EF173F845C}"/>
               </a:ext>
             </a:extLst>
           </p:cNvPr>
@@ -29866,7 +28707,7 @@
     </p:spTree>
     <p:extLst>
       <p:ext uri="{BB962C8B-B14F-4D97-AF65-F5344CB8AC3E}">
-        <p14:creationId xmlns:p14="http://schemas.microsoft.com/office/powerpoint/2010/main" val="727514259"/>
+        <p14:creationId xmlns:p14="http://schemas.microsoft.com/office/powerpoint/2010/main" val="2951154706"/>
       </p:ext>
     </p:extLst>
   </p:cSld>
@@ -30033,11 +28874,12 @@
           <a:lstStyle/>
           <a:p>
             <a:r>
-              <a:rPr lang="en-US" sz="3000" dirty="0">
-                <a:latin typeface="Ubuntu" panose="020B0504030602030204" pitchFamily="34" charset="0"/>
-              </a:rPr>
-              <a:t>Relying on the Scrum Master to facilitate them</a:t>
+              <a:rPr lang="en-US" sz="4000" dirty="0"/>
+              <a:t>Relying on the Scrum master to facilitate them</a:t>
             </a:r>
+            <a:endParaRPr lang="en-US" sz="1050" dirty="0">
+              <a:latin typeface="Manrope" pitchFamily="2" charset="0"/>
+            </a:endParaRPr>
           </a:p>
         </p:txBody>
       </p:sp>
@@ -30092,16 +28934,12 @@
           <a:lstStyle/>
           <a:p>
             <a:r>
-              <a:rPr lang="en-US" sz="3000" dirty="0">
-                <a:latin typeface="Ubuntu" panose="020B0504030602030204" pitchFamily="34" charset="0"/>
-              </a:rPr>
-              <a:t>Avoiding conflict /  Pursuing individual targets / generating outputs</a:t>
+              <a:rPr lang="en-US" sz="3500" dirty="0"/>
+              <a:t>Avoiding conflict/  Pursuing individual targets/ generating outputs</a:t>
             </a:r>
           </a:p>
           <a:p>
-            <a:endParaRPr lang="en-NL" sz="3000" dirty="0">
-              <a:latin typeface="Ubuntu" panose="020B0504030602030204" pitchFamily="34" charset="0"/>
-            </a:endParaRPr>
+            <a:endParaRPr lang="en-NL" sz="3500" dirty="0"/>
           </a:p>
         </p:txBody>
       </p:sp>
@@ -30442,11 +29280,12 @@
           <a:lstStyle/>
           <a:p>
             <a:r>
-              <a:rPr lang="en-US" sz="3000" dirty="0">
-                <a:latin typeface="Ubuntu" panose="020B0504030602030204" pitchFamily="34" charset="0"/>
-              </a:rPr>
-              <a:t>Relying on the Scrum Master to facilitate them</a:t>
+              <a:rPr lang="en-US" sz="4000" dirty="0"/>
+              <a:t>Relying on the Scrum master to facilitate them</a:t>
             </a:r>
+            <a:endParaRPr lang="en-US" sz="1050" dirty="0">
+              <a:latin typeface="Manrope" pitchFamily="2" charset="0"/>
+            </a:endParaRPr>
           </a:p>
         </p:txBody>
       </p:sp>
@@ -30501,16 +29340,12 @@
           <a:lstStyle/>
           <a:p>
             <a:r>
-              <a:rPr lang="en-US" sz="3000" dirty="0">
-                <a:latin typeface="Ubuntu" panose="020B0504030602030204" pitchFamily="34" charset="0"/>
-              </a:rPr>
-              <a:t>Avoiding conflict /  Pursuing individual targets / generating outputs</a:t>
+              <a:rPr lang="en-US" sz="3500" dirty="0"/>
+              <a:t>Avoiding conflict/  Pursuing individual targets/ generating outputs</a:t>
             </a:r>
           </a:p>
           <a:p>
-            <a:endParaRPr lang="en-NL" sz="3000" dirty="0">
-              <a:latin typeface="Ubuntu" panose="020B0504030602030204" pitchFamily="34" charset="0"/>
-            </a:endParaRPr>
+            <a:endParaRPr lang="en-NL" sz="3500" dirty="0"/>
           </a:p>
         </p:txBody>
       </p:sp>
@@ -30548,7 +29383,7 @@
           <p:cNvPr id="6" name="Text Placeholder 1">
             <a:extLst>
               <a:ext uri="{FF2B5EF4-FFF2-40B4-BE49-F238E27FC236}">
-                <a16:creationId xmlns:a16="http://schemas.microsoft.com/office/drawing/2014/main" id="{10226E01-C3C9-A7B1-D098-706D305EB80E}"/>
+                <a16:creationId xmlns:a16="http://schemas.microsoft.com/office/drawing/2014/main" id="{E1192895-10ED-219A-5A7D-A9EC7BF9AB95}"/>
               </a:ext>
             </a:extLst>
           </p:cNvPr>
@@ -30743,7 +29578,7 @@
     </p:spTree>
     <p:extLst>
       <p:ext uri="{BB962C8B-B14F-4D97-AF65-F5344CB8AC3E}">
-        <p14:creationId xmlns:p14="http://schemas.microsoft.com/office/powerpoint/2010/main" val="3785406611"/>
+        <p14:creationId xmlns:p14="http://schemas.microsoft.com/office/powerpoint/2010/main" val="826171372"/>
       </p:ext>
     </p:extLst>
   </p:cSld>
@@ -30792,11 +29627,12 @@
           <a:lstStyle/>
           <a:p>
             <a:r>
-              <a:rPr lang="en-US" sz="3000" dirty="0">
-                <a:latin typeface="Ubuntu" panose="020B0504030602030204" pitchFamily="34" charset="0"/>
-              </a:rPr>
-              <a:t>Ensuring the outcome of all events &amp; learning the Scrum Values</a:t>
+              <a:rPr lang="en-US" sz="4000" dirty="0"/>
+              <a:t>Ensuring the outcome of all events &amp; learning the scrum values</a:t>
             </a:r>
+            <a:endParaRPr lang="en-US" sz="1050" dirty="0">
+              <a:latin typeface="Manrope" pitchFamily="2" charset="0"/>
+            </a:endParaRPr>
           </a:p>
         </p:txBody>
       </p:sp>
@@ -30851,10 +29687,8 @@
           <a:lstStyle/>
           <a:p>
             <a:r>
-              <a:rPr lang="en-US" sz="3000" dirty="0">
-                <a:latin typeface="Ubuntu" panose="020B0504030602030204" pitchFamily="34" charset="0"/>
-              </a:rPr>
-              <a:t>Discovering differences/ conflicts / shared values</a:t>
+              <a:rPr lang="en-US" dirty="0"/>
+              <a:t>Discovering differences/ conflicts/ shared values</a:t>
             </a:r>
           </a:p>
         </p:txBody>
@@ -31137,11 +29971,12 @@
           <a:lstStyle/>
           <a:p>
             <a:r>
-              <a:rPr lang="en-US" sz="3000" dirty="0">
-                <a:latin typeface="Ubuntu" panose="020B0504030602030204" pitchFamily="34" charset="0"/>
-              </a:rPr>
-              <a:t>Ensuring the outcome of all events &amp; learning the Scrum Values</a:t>
+              <a:rPr lang="en-US" sz="4000" dirty="0"/>
+              <a:t>Ensuring the outcome of all events &amp; learning the scrum values</a:t>
             </a:r>
+            <a:endParaRPr lang="en-US" sz="1050" dirty="0">
+              <a:latin typeface="Manrope" pitchFamily="2" charset="0"/>
+            </a:endParaRPr>
           </a:p>
         </p:txBody>
       </p:sp>
@@ -31196,10 +30031,8 @@
           <a:lstStyle/>
           <a:p>
             <a:r>
-              <a:rPr lang="en-US" sz="3000" dirty="0">
-                <a:latin typeface="Ubuntu" panose="020B0504030602030204" pitchFamily="34" charset="0"/>
-              </a:rPr>
-              <a:t>Discovering differences/ conflicts / shared values</a:t>
+              <a:rPr lang="en-US" dirty="0"/>
+              <a:t>Discovering differences/ conflicts/ shared values</a:t>
             </a:r>
           </a:p>
         </p:txBody>
@@ -31238,7 +30071,7 @@
           <p:cNvPr id="6" name="Text Placeholder 1">
             <a:extLst>
               <a:ext uri="{FF2B5EF4-FFF2-40B4-BE49-F238E27FC236}">
-                <a16:creationId xmlns:a16="http://schemas.microsoft.com/office/drawing/2014/main" id="{F004852F-27A1-2D1A-7A2B-526B8399434B}"/>
+                <a16:creationId xmlns:a16="http://schemas.microsoft.com/office/drawing/2014/main" id="{4AD64D31-6963-B999-2E9B-EEC0241A77B3}"/>
               </a:ext>
             </a:extLst>
           </p:cNvPr>
@@ -31433,7 +30266,7 @@
     </p:spTree>
     <p:extLst>
       <p:ext uri="{BB962C8B-B14F-4D97-AF65-F5344CB8AC3E}">
-        <p14:creationId xmlns:p14="http://schemas.microsoft.com/office/powerpoint/2010/main" val="3728195757"/>
+        <p14:creationId xmlns:p14="http://schemas.microsoft.com/office/powerpoint/2010/main" val="217489594"/>
       </p:ext>
     </p:extLst>
   </p:cSld>
@@ -31482,11 +30315,12 @@
           <a:lstStyle/>
           <a:p>
             <a:r>
-              <a:rPr lang="en-US" sz="3000" dirty="0">
-                <a:latin typeface="Ubuntu" panose="020B0504030602030204" pitchFamily="34" charset="0"/>
-              </a:rPr>
-              <a:t>Focused on reaching Sprint Goals &amp; improving quality </a:t>
+              <a:rPr lang="en-US" sz="4000" dirty="0"/>
+              <a:t>Focused on reaching sprint goals &amp; improving quality </a:t>
             </a:r>
+            <a:endParaRPr lang="en-US" sz="1050" dirty="0">
+              <a:latin typeface="Manrope" pitchFamily="2" charset="0"/>
+            </a:endParaRPr>
           </a:p>
         </p:txBody>
       </p:sp>
@@ -31541,10 +30375,8 @@
           <a:lstStyle/>
           <a:p>
             <a:r>
-              <a:rPr lang="en-US" sz="3000" dirty="0">
-                <a:latin typeface="Ubuntu" panose="020B0504030602030204" pitchFamily="34" charset="0"/>
-              </a:rPr>
-              <a:t>Using Scrum &amp; Agile principles as a guideline for all interactions</a:t>
+              <a:rPr lang="en-US" sz="4000" dirty="0"/>
+              <a:t>Using Scrum &amp; agile principles as a guideline for all interactions</a:t>
             </a:r>
           </a:p>
         </p:txBody>
@@ -31827,11 +30659,12 @@
           <a:lstStyle/>
           <a:p>
             <a:r>
-              <a:rPr lang="en-US" sz="3000" dirty="0">
-                <a:latin typeface="Ubuntu" panose="020B0504030602030204" pitchFamily="34" charset="0"/>
-              </a:rPr>
-              <a:t>Focused on reaching Sprint Goals &amp; improving quality </a:t>
+              <a:rPr lang="en-US" sz="4000" dirty="0"/>
+              <a:t>Focused on reaching sprint goals &amp; improving quality </a:t>
             </a:r>
+            <a:endParaRPr lang="en-US" sz="1050" dirty="0">
+              <a:latin typeface="Manrope" pitchFamily="2" charset="0"/>
+            </a:endParaRPr>
           </a:p>
         </p:txBody>
       </p:sp>
@@ -31886,10 +30719,8 @@
           <a:lstStyle/>
           <a:p>
             <a:r>
-              <a:rPr lang="en-US" sz="3000" dirty="0">
-                <a:latin typeface="Ubuntu" panose="020B0504030602030204" pitchFamily="34" charset="0"/>
-              </a:rPr>
-              <a:t>Using Scrum &amp; Agile principles as a guideline for all interactions</a:t>
+              <a:rPr lang="en-US" sz="4000" dirty="0"/>
+              <a:t>Using Scrum &amp; agile principles as a guideline for all interactions</a:t>
             </a:r>
           </a:p>
         </p:txBody>
@@ -31928,7 +30759,7 @@
           <p:cNvPr id="6" name="Text Placeholder 1">
             <a:extLst>
               <a:ext uri="{FF2B5EF4-FFF2-40B4-BE49-F238E27FC236}">
-                <a16:creationId xmlns:a16="http://schemas.microsoft.com/office/drawing/2014/main" id="{BCB5172D-C8FC-D98E-87DD-C0822EAE47F0}"/>
+                <a16:creationId xmlns:a16="http://schemas.microsoft.com/office/drawing/2014/main" id="{6B6D2E77-90B1-EB40-8A23-ABBC4704C6AC}"/>
               </a:ext>
             </a:extLst>
           </p:cNvPr>
@@ -32123,7 +30954,7 @@
     </p:spTree>
     <p:extLst>
       <p:ext uri="{BB962C8B-B14F-4D97-AF65-F5344CB8AC3E}">
-        <p14:creationId xmlns:p14="http://schemas.microsoft.com/office/powerpoint/2010/main" val="1070377419"/>
+        <p14:creationId xmlns:p14="http://schemas.microsoft.com/office/powerpoint/2010/main" val="2693914518"/>
       </p:ext>
     </p:extLst>
   </p:cSld>
@@ -32172,11 +31003,12 @@
           <a:lstStyle/>
           <a:p>
             <a:r>
-              <a:rPr lang="en-US" sz="3000" dirty="0">
-                <a:latin typeface="Ubuntu" panose="020B0504030602030204" pitchFamily="34" charset="0"/>
-              </a:rPr>
+              <a:rPr lang="en-US" sz="4000" dirty="0"/>
               <a:t>Responsible &amp; committed to continuously deliver valuable outcome</a:t>
             </a:r>
+            <a:endParaRPr lang="en-US" sz="1050" dirty="0">
+              <a:latin typeface="Manrope" pitchFamily="2" charset="0"/>
+            </a:endParaRPr>
           </a:p>
         </p:txBody>
       </p:sp>
@@ -32231,9 +31063,7 @@
           <a:lstStyle/>
           <a:p>
             <a:r>
-              <a:rPr lang="en-US" sz="3000" dirty="0">
-                <a:latin typeface="Ubuntu" panose="020B0504030602030204" pitchFamily="34" charset="0"/>
-              </a:rPr>
+              <a:rPr lang="en-US" sz="4000" dirty="0"/>
               <a:t>Collaborating with stakeholders to continuously adapt</a:t>
             </a:r>
           </a:p>
@@ -32517,11 +31347,12 @@
           <a:lstStyle/>
           <a:p>
             <a:r>
-              <a:rPr lang="en-US" sz="3000" dirty="0">
-                <a:latin typeface="Ubuntu" panose="020B0504030602030204" pitchFamily="34" charset="0"/>
-              </a:rPr>
+              <a:rPr lang="en-US" sz="4000" dirty="0"/>
               <a:t>Responsible &amp; committed to continuously deliver valuable outcome</a:t>
             </a:r>
+            <a:endParaRPr lang="en-US" sz="1050" dirty="0">
+              <a:latin typeface="Manrope" pitchFamily="2" charset="0"/>
+            </a:endParaRPr>
           </a:p>
         </p:txBody>
       </p:sp>
@@ -32576,9 +31407,7 @@
           <a:lstStyle/>
           <a:p>
             <a:r>
-              <a:rPr lang="en-US" sz="3000" dirty="0">
-                <a:latin typeface="Ubuntu" panose="020B0504030602030204" pitchFamily="34" charset="0"/>
-              </a:rPr>
+              <a:rPr lang="en-US" sz="4000" dirty="0"/>
               <a:t>Collaborating with stakeholders to continuously adapt</a:t>
             </a:r>
           </a:p>
@@ -32618,7 +31447,7 @@
           <p:cNvPr id="6" name="Text Placeholder 1">
             <a:extLst>
               <a:ext uri="{FF2B5EF4-FFF2-40B4-BE49-F238E27FC236}">
-                <a16:creationId xmlns:a16="http://schemas.microsoft.com/office/drawing/2014/main" id="{D8E98A5A-46BD-B309-379D-9FA98DEF33FC}"/>
+                <a16:creationId xmlns:a16="http://schemas.microsoft.com/office/drawing/2014/main" id="{B6E8D1CB-527B-6AED-F2BA-071B9C9B78E9}"/>
               </a:ext>
             </a:extLst>
           </p:cNvPr>
@@ -32813,7 +31642,7 @@
     </p:spTree>
     <p:extLst>
       <p:ext uri="{BB962C8B-B14F-4D97-AF65-F5344CB8AC3E}">
-        <p14:creationId xmlns:p14="http://schemas.microsoft.com/office/powerpoint/2010/main" val="3134009850"/>
+        <p14:creationId xmlns:p14="http://schemas.microsoft.com/office/powerpoint/2010/main" val="4239895058"/>
       </p:ext>
     </p:extLst>
   </p:cSld>
@@ -32862,11 +31691,12 @@
           <a:lstStyle/>
           <a:p>
             <a:r>
-              <a:rPr lang="en-US" sz="3000" dirty="0">
-                <a:latin typeface="Ubuntu" panose="020B0504030602030204" pitchFamily="34" charset="0"/>
-              </a:rPr>
-              <a:t>Accountable or creating high quality Products</a:t>
+              <a:rPr lang="en-US" sz="4000" dirty="0"/>
+              <a:t>Accountable or creating high quality products</a:t>
             </a:r>
+            <a:endParaRPr lang="en-US" sz="1050" dirty="0">
+              <a:latin typeface="Manrope" pitchFamily="2" charset="0"/>
+            </a:endParaRPr>
           </a:p>
         </p:txBody>
       </p:sp>
@@ -32921,9 +31751,7 @@
           <a:lstStyle/>
           <a:p>
             <a:r>
-              <a:rPr lang="en-US" sz="3000" dirty="0">
-                <a:latin typeface="Ubuntu" panose="020B0504030602030204" pitchFamily="34" charset="0"/>
-              </a:rPr>
+              <a:rPr lang="en-US" sz="4000" dirty="0"/>
               <a:t>Collaborating with everyone to participate in sharing feedback &amp; learning</a:t>
             </a:r>
           </a:p>
@@ -33207,11 +32035,12 @@
           <a:lstStyle/>
           <a:p>
             <a:r>
-              <a:rPr lang="en-US" sz="3000" dirty="0">
-                <a:latin typeface="Ubuntu" panose="020B0504030602030204" pitchFamily="34" charset="0"/>
-              </a:rPr>
-              <a:t>Accountable or creating high quality Products</a:t>
+              <a:rPr lang="en-US" sz="4000" dirty="0"/>
+              <a:t>Accountable or creating high quality products</a:t>
             </a:r>
+            <a:endParaRPr lang="en-US" sz="1050" dirty="0">
+              <a:latin typeface="Manrope" pitchFamily="2" charset="0"/>
+            </a:endParaRPr>
           </a:p>
         </p:txBody>
       </p:sp>
@@ -33266,9 +32095,7 @@
           <a:lstStyle/>
           <a:p>
             <a:r>
-              <a:rPr lang="en-US" sz="3000" dirty="0">
-                <a:latin typeface="Ubuntu" panose="020B0504030602030204" pitchFamily="34" charset="0"/>
-              </a:rPr>
+              <a:rPr lang="en-US" sz="4000" dirty="0"/>
               <a:t>Collaborating with everyone to participate in sharing feedback &amp; learning</a:t>
             </a:r>
           </a:p>
@@ -33308,7 +32135,7 @@
           <p:cNvPr id="6" name="Text Placeholder 1">
             <a:extLst>
               <a:ext uri="{FF2B5EF4-FFF2-40B4-BE49-F238E27FC236}">
-                <a16:creationId xmlns:a16="http://schemas.microsoft.com/office/drawing/2014/main" id="{D93CADC4-D2B9-3874-59F9-1690AA15F907}"/>
+                <a16:creationId xmlns:a16="http://schemas.microsoft.com/office/drawing/2014/main" id="{A6CFE622-B8F9-400E-7940-DC1B1916F743}"/>
               </a:ext>
             </a:extLst>
           </p:cNvPr>
@@ -33503,7 +32330,7 @@
     </p:spTree>
     <p:extLst>
       <p:ext uri="{BB962C8B-B14F-4D97-AF65-F5344CB8AC3E}">
-        <p14:creationId xmlns:p14="http://schemas.microsoft.com/office/powerpoint/2010/main" val="2446414719"/>
+        <p14:creationId xmlns:p14="http://schemas.microsoft.com/office/powerpoint/2010/main" val="178219345"/>
       </p:ext>
     </p:extLst>
   </p:cSld>
@@ -33729,11 +32556,12 @@
           <a:lstStyle/>
           <a:p>
             <a:r>
-              <a:rPr lang="en-US" sz="3000" dirty="0">
-                <a:latin typeface="Ubuntu" panose="020B0504030602030204" pitchFamily="34" charset="0"/>
-              </a:rPr>
+              <a:rPr lang="en-US" sz="4000" dirty="0"/>
               <a:t>Wants full control &amp; has a directive communication style</a:t>
             </a:r>
+            <a:endParaRPr lang="en-US" sz="1050" dirty="0">
+              <a:latin typeface="Manrope" pitchFamily="2" charset="0"/>
+            </a:endParaRPr>
           </a:p>
         </p:txBody>
       </p:sp>
@@ -33788,10 +32616,8 @@
           <a:lstStyle/>
           <a:p>
             <a:r>
-              <a:rPr lang="en-US" sz="3000" dirty="0">
-                <a:latin typeface="Ubuntu" panose="020B0504030602030204" pitchFamily="34" charset="0"/>
-              </a:rPr>
-              <a:t>Gives individual targets and on progress / efficiency/ quality &amp; outcomes</a:t>
+              <a:rPr lang="en-US" sz="3500" dirty="0"/>
+              <a:t>Gives individual targets and on progress/ efficiency/ quality &amp; outcomes</a:t>
             </a:r>
           </a:p>
         </p:txBody>
@@ -34074,11 +32900,12 @@
           <a:lstStyle/>
           <a:p>
             <a:r>
-              <a:rPr lang="en-US" sz="3000" dirty="0">
-                <a:latin typeface="Ubuntu" panose="020B0504030602030204" pitchFamily="34" charset="0"/>
-              </a:rPr>
+              <a:rPr lang="en-US" sz="4000" dirty="0"/>
               <a:t>Wants full control &amp; has a directive communication style</a:t>
             </a:r>
+            <a:endParaRPr lang="en-US" sz="1050" dirty="0">
+              <a:latin typeface="Manrope" pitchFamily="2" charset="0"/>
+            </a:endParaRPr>
           </a:p>
         </p:txBody>
       </p:sp>
@@ -34133,10 +32960,8 @@
           <a:lstStyle/>
           <a:p>
             <a:r>
-              <a:rPr lang="en-US" sz="3000" dirty="0">
-                <a:latin typeface="Ubuntu" panose="020B0504030602030204" pitchFamily="34" charset="0"/>
-              </a:rPr>
-              <a:t>Gives individual targets and on progress / efficiency/ quality &amp; outcomes</a:t>
+              <a:rPr lang="en-US" sz="3500" dirty="0"/>
+              <a:t>Gives individual targets and on progress/ efficiency/ quality &amp; outcomes</a:t>
             </a:r>
           </a:p>
         </p:txBody>
@@ -34175,7 +33000,7 @@
           <p:cNvPr id="6" name="Text Placeholder 1">
             <a:extLst>
               <a:ext uri="{FF2B5EF4-FFF2-40B4-BE49-F238E27FC236}">
-                <a16:creationId xmlns:a16="http://schemas.microsoft.com/office/drawing/2014/main" id="{30EB7D6E-0473-1CF2-0312-219FF0DBC038}"/>
+                <a16:creationId xmlns:a16="http://schemas.microsoft.com/office/drawing/2014/main" id="{EE640219-8CF2-52AD-77AE-27EBB52B6CAD}"/>
               </a:ext>
             </a:extLst>
           </p:cNvPr>
@@ -34370,7 +33195,7 @@
     </p:spTree>
     <p:extLst>
       <p:ext uri="{BB962C8B-B14F-4D97-AF65-F5344CB8AC3E}">
-        <p14:creationId xmlns:p14="http://schemas.microsoft.com/office/powerpoint/2010/main" val="2718256781"/>
+        <p14:creationId xmlns:p14="http://schemas.microsoft.com/office/powerpoint/2010/main" val="415980821"/>
       </p:ext>
     </p:extLst>
   </p:cSld>
@@ -34419,11 +33244,12 @@
           <a:lstStyle/>
           <a:p>
             <a:r>
-              <a:rPr lang="en-US" sz="3000" dirty="0">
-                <a:latin typeface="Ubuntu" panose="020B0504030602030204" pitchFamily="34" charset="0"/>
-              </a:rPr>
+              <a:rPr lang="en-US" sz="4000" dirty="0"/>
               <a:t>Wants to be in control &amp; delegates less critical responsibilities</a:t>
             </a:r>
+            <a:endParaRPr lang="en-US" sz="1050" dirty="0">
+              <a:latin typeface="Manrope" pitchFamily="2" charset="0"/>
+            </a:endParaRPr>
           </a:p>
         </p:txBody>
       </p:sp>
@@ -34478,10 +33304,8 @@
           <a:lstStyle/>
           <a:p>
             <a:r>
-              <a:rPr lang="en-US" sz="3000" dirty="0">
-                <a:latin typeface="Ubuntu" panose="020B0504030602030204" pitchFamily="34" charset="0"/>
-              </a:rPr>
-              <a:t>Gives team(s) targets and on progress / efficiency / quality &amp; outcomes</a:t>
+              <a:rPr lang="en-US" sz="3500" dirty="0"/>
+              <a:t>Gives team(s) targets and on progress/ efficiency/ quality &amp; outcomes</a:t>
             </a:r>
           </a:p>
         </p:txBody>
@@ -34764,11 +33588,12 @@
           <a:lstStyle/>
           <a:p>
             <a:r>
-              <a:rPr lang="en-US" sz="3000" dirty="0">
-                <a:latin typeface="Ubuntu" panose="020B0504030602030204" pitchFamily="34" charset="0"/>
-              </a:rPr>
+              <a:rPr lang="en-US" sz="4000" dirty="0"/>
               <a:t>Wants to be in control &amp; delegates less critical responsibilities</a:t>
             </a:r>
+            <a:endParaRPr lang="en-US" sz="1050" dirty="0">
+              <a:latin typeface="Manrope" pitchFamily="2" charset="0"/>
+            </a:endParaRPr>
           </a:p>
         </p:txBody>
       </p:sp>
@@ -34823,10 +33648,8 @@
           <a:lstStyle/>
           <a:p>
             <a:r>
-              <a:rPr lang="en-US" sz="3000" dirty="0">
-                <a:latin typeface="Ubuntu" panose="020B0504030602030204" pitchFamily="34" charset="0"/>
-              </a:rPr>
-              <a:t>Gives team(s) targets and on progress / efficiency / quality &amp; outcomes</a:t>
+              <a:rPr lang="en-US" sz="3500" dirty="0"/>
+              <a:t>Gives team(s) targets and on progress/ efficiency/ quality &amp; outcomes</a:t>
             </a:r>
           </a:p>
         </p:txBody>
@@ -34865,7 +33688,7 @@
           <p:cNvPr id="6" name="Text Placeholder 1">
             <a:extLst>
               <a:ext uri="{FF2B5EF4-FFF2-40B4-BE49-F238E27FC236}">
-                <a16:creationId xmlns:a16="http://schemas.microsoft.com/office/drawing/2014/main" id="{4468637D-9389-3D43-7766-53E64610CED3}"/>
+                <a16:creationId xmlns:a16="http://schemas.microsoft.com/office/drawing/2014/main" id="{C829B1EB-3C9B-D14D-49B7-C01C1DD40CE3}"/>
               </a:ext>
             </a:extLst>
           </p:cNvPr>
@@ -35060,7 +33883,7 @@
     </p:spTree>
     <p:extLst>
       <p:ext uri="{BB962C8B-B14F-4D97-AF65-F5344CB8AC3E}">
-        <p14:creationId xmlns:p14="http://schemas.microsoft.com/office/powerpoint/2010/main" val="116660721"/>
+        <p14:creationId xmlns:p14="http://schemas.microsoft.com/office/powerpoint/2010/main" val="1467359079"/>
       </p:ext>
     </p:extLst>
   </p:cSld>
@@ -35109,11 +33932,12 @@
           <a:lstStyle/>
           <a:p>
             <a:r>
-              <a:rPr lang="en-US" sz="3000" dirty="0">
-                <a:latin typeface="Ubuntu" panose="020B0504030602030204" pitchFamily="34" charset="0"/>
-              </a:rPr>
-              <a:t>Delegates more important responsibilities</a:t>
+              <a:rPr lang="en-US" sz="4000" dirty="0"/>
+              <a:t>DELEGATES MORE IMPORTANT RESPONSIBILITIES</a:t>
             </a:r>
+            <a:endParaRPr lang="en-US" sz="1050" dirty="0">
+              <a:latin typeface="Manrope" pitchFamily="2" charset="0"/>
+            </a:endParaRPr>
           </a:p>
         </p:txBody>
       </p:sp>
@@ -35168,10 +33992,8 @@
           <a:lstStyle/>
           <a:p>
             <a:r>
-              <a:rPr lang="en-US" sz="3000" dirty="0">
-                <a:latin typeface="Ubuntu" panose="020B0504030602030204" pitchFamily="34" charset="0"/>
-              </a:rPr>
-              <a:t>Provides boundary conditions for teams to set  their own targets</a:t>
+              <a:rPr lang="en-US" sz="3500" dirty="0"/>
+              <a:t>PROVIDES BOUNDARY CONDITIONS FOR TEAMS TO SET THEIR OWN TARGETS</a:t>
             </a:r>
           </a:p>
         </p:txBody>
@@ -35454,11 +34276,12 @@
           <a:lstStyle/>
           <a:p>
             <a:r>
-              <a:rPr lang="en-US" sz="3000" dirty="0">
-                <a:latin typeface="Ubuntu" panose="020B0504030602030204" pitchFamily="34" charset="0"/>
-              </a:rPr>
-              <a:t>Delegates more important responsibilities</a:t>
+              <a:rPr lang="en-US" sz="4000" dirty="0"/>
+              <a:t>DELEGATES MORE IMPORTANT RESPONSIBILITIES</a:t>
             </a:r>
+            <a:endParaRPr lang="en-US" sz="1050" dirty="0">
+              <a:latin typeface="Manrope" pitchFamily="2" charset="0"/>
+            </a:endParaRPr>
           </a:p>
         </p:txBody>
       </p:sp>
@@ -35513,10 +34336,8 @@
           <a:lstStyle/>
           <a:p>
             <a:r>
-              <a:rPr lang="en-US" sz="3000" dirty="0">
-                <a:latin typeface="Ubuntu" panose="020B0504030602030204" pitchFamily="34" charset="0"/>
-              </a:rPr>
-              <a:t>Provides boundary conditions for teams to set  their own targets</a:t>
+              <a:rPr lang="en-US" sz="3500" dirty="0"/>
+              <a:t>PROVIDES BOUNDARY CONDITIONS FOR TEAMS TO SET THEIR OWN TARGETS</a:t>
             </a:r>
           </a:p>
         </p:txBody>
@@ -35555,7 +34376,7 @@
           <p:cNvPr id="6" name="Text Placeholder 1">
             <a:extLst>
               <a:ext uri="{FF2B5EF4-FFF2-40B4-BE49-F238E27FC236}">
-                <a16:creationId xmlns:a16="http://schemas.microsoft.com/office/drawing/2014/main" id="{BA430EAE-37CA-BDC6-7261-6924ACB82ECC}"/>
+                <a16:creationId xmlns:a16="http://schemas.microsoft.com/office/drawing/2014/main" id="{6F8856BA-9EA8-97AD-E583-646C0191130C}"/>
               </a:ext>
             </a:extLst>
           </p:cNvPr>
@@ -35750,7 +34571,7 @@
     </p:spTree>
     <p:extLst>
       <p:ext uri="{BB962C8B-B14F-4D97-AF65-F5344CB8AC3E}">
-        <p14:creationId xmlns:p14="http://schemas.microsoft.com/office/powerpoint/2010/main" val="781062866"/>
+        <p14:creationId xmlns:p14="http://schemas.microsoft.com/office/powerpoint/2010/main" val="2313812796"/>
       </p:ext>
     </p:extLst>
   </p:cSld>
@@ -35799,11 +34620,12 @@
           <a:lstStyle/>
           <a:p>
             <a:r>
-              <a:rPr lang="en-US" sz="3000" dirty="0">
-                <a:latin typeface="Ubuntu" panose="020B0504030602030204" pitchFamily="34" charset="0"/>
-              </a:rPr>
-              <a:t>Delegates all but critical decisions &amp; responsibilities</a:t>
+              <a:rPr lang="en-US" sz="4000" dirty="0"/>
+              <a:t>DELEGATES ALL BUT CRITICAL DECISIONS &amp; RESPONSIBILITIES</a:t>
             </a:r>
+            <a:endParaRPr lang="en-US" sz="1050" dirty="0">
+              <a:latin typeface="Manrope" pitchFamily="2" charset="0"/>
+            </a:endParaRPr>
           </a:p>
         </p:txBody>
       </p:sp>
@@ -35858,10 +34680,8 @@
           <a:lstStyle/>
           <a:p>
             <a:r>
-              <a:rPr lang="en-US" sz="3000" dirty="0">
-                <a:latin typeface="Ubuntu" panose="020B0504030602030204" pitchFamily="34" charset="0"/>
-              </a:rPr>
-              <a:t>Creates an environment where teams can self-manage &amp; create value</a:t>
+              <a:rPr lang="en-US" dirty="0"/>
+              <a:t>CREATES AN ENVIRONMENT WHERE TEAMS CAN SELF-MANAGE &amp; CREATE VALUE</a:t>
             </a:r>
           </a:p>
         </p:txBody>
@@ -36144,11 +34964,12 @@
           <a:lstStyle/>
           <a:p>
             <a:r>
-              <a:rPr lang="en-US" sz="3000" dirty="0">
-                <a:latin typeface="Ubuntu" panose="020B0504030602030204" pitchFamily="34" charset="0"/>
-              </a:rPr>
-              <a:t>Delegates all but critical decisions &amp; responsibilities</a:t>
+              <a:rPr lang="en-US" sz="4000" dirty="0"/>
+              <a:t>DELEGATES ALL BUT CRITICAL DECISIONS &amp; RESPONSIBILITIES</a:t>
             </a:r>
+            <a:endParaRPr lang="en-US" sz="1050" dirty="0">
+              <a:latin typeface="Manrope" pitchFamily="2" charset="0"/>
+            </a:endParaRPr>
           </a:p>
         </p:txBody>
       </p:sp>
@@ -36203,10 +35024,8 @@
           <a:lstStyle/>
           <a:p>
             <a:r>
-              <a:rPr lang="en-US" sz="3000" dirty="0">
-                <a:latin typeface="Ubuntu" panose="020B0504030602030204" pitchFamily="34" charset="0"/>
-              </a:rPr>
-              <a:t>Creates an environment where teams can self-manage &amp; create value</a:t>
+              <a:rPr lang="en-US" dirty="0"/>
+              <a:t>CREATES AN ENVIRONMENT WHERE TEAMS CAN SELF-MANAGE &amp; CREATE VALUE</a:t>
             </a:r>
           </a:p>
         </p:txBody>
@@ -36245,7 +35064,7 @@
           <p:cNvPr id="6" name="Text Placeholder 1">
             <a:extLst>
               <a:ext uri="{FF2B5EF4-FFF2-40B4-BE49-F238E27FC236}">
-                <a16:creationId xmlns:a16="http://schemas.microsoft.com/office/drawing/2014/main" id="{D869DEFD-FAD9-D801-FF67-E2AA59254600}"/>
+                <a16:creationId xmlns:a16="http://schemas.microsoft.com/office/drawing/2014/main" id="{C6EF0E42-794A-4C32-B57E-C28AD4330158}"/>
               </a:ext>
             </a:extLst>
           </p:cNvPr>
@@ -36440,7 +35259,7 @@
     </p:spTree>
     <p:extLst>
       <p:ext uri="{BB962C8B-B14F-4D97-AF65-F5344CB8AC3E}">
-        <p14:creationId xmlns:p14="http://schemas.microsoft.com/office/powerpoint/2010/main" val="3259217527"/>
+        <p14:creationId xmlns:p14="http://schemas.microsoft.com/office/powerpoint/2010/main" val="2393475525"/>
       </p:ext>
     </p:extLst>
   </p:cSld>
@@ -36489,11 +35308,12 @@
           <a:lstStyle/>
           <a:p>
             <a:r>
-              <a:rPr lang="en-US" sz="3000" dirty="0">
-                <a:latin typeface="Ubuntu" panose="020B0504030602030204" pitchFamily="34" charset="0"/>
-              </a:rPr>
-              <a:t>Delegate all decisions &amp; responsibilities</a:t>
+              <a:rPr lang="en-US" sz="4000" dirty="0"/>
+              <a:t>DELEGATE ALL DECISIONS &amp; RESPONSIBILITIES</a:t>
             </a:r>
+            <a:endParaRPr lang="en-US" sz="1050" dirty="0">
+              <a:latin typeface="Manrope" pitchFamily="2" charset="0"/>
+            </a:endParaRPr>
           </a:p>
         </p:txBody>
       </p:sp>
@@ -36548,10 +35368,8 @@
           <a:lstStyle/>
           <a:p>
             <a:r>
-              <a:rPr lang="en-US" sz="3000" dirty="0">
-                <a:latin typeface="Ubuntu" panose="020B0504030602030204" pitchFamily="34" charset="0"/>
-              </a:rPr>
-              <a:t>Facilitates entrepreneurship &amp; growth for every employee</a:t>
+              <a:rPr lang="en-US" sz="3500" dirty="0"/>
+              <a:t>FACILITATES ENTREPRENEURSHIP &amp; GROWTH FOR EVERY EMPLOYEE</a:t>
             </a:r>
           </a:p>
         </p:txBody>
@@ -36893,11 +35711,12 @@
           <a:lstStyle/>
           <a:p>
             <a:r>
-              <a:rPr lang="en-US" sz="3000" dirty="0">
-                <a:latin typeface="Ubuntu" panose="020B0504030602030204" pitchFamily="34" charset="0"/>
-              </a:rPr>
-              <a:t>Delegate all decisions &amp; responsibilities</a:t>
+              <a:rPr lang="en-US" sz="4000" dirty="0"/>
+              <a:t>DELEGATE ALL DECISIONS &amp; RESPONSIBILITIES</a:t>
             </a:r>
+            <a:endParaRPr lang="en-US" sz="1050" dirty="0">
+              <a:latin typeface="Manrope" pitchFamily="2" charset="0"/>
+            </a:endParaRPr>
           </a:p>
         </p:txBody>
       </p:sp>
@@ -36952,10 +35771,8 @@
           <a:lstStyle/>
           <a:p>
             <a:r>
-              <a:rPr lang="en-US" sz="3000" dirty="0">
-                <a:latin typeface="Ubuntu" panose="020B0504030602030204" pitchFamily="34" charset="0"/>
-              </a:rPr>
-              <a:t>Facilitates entrepreneurship &amp; growth for every employee</a:t>
+              <a:rPr lang="en-US" sz="3500" dirty="0"/>
+              <a:t>FACILITATES ENTREPRENEURSHIP &amp; GROWTH FOR EVERY EMPLOYEE</a:t>
             </a:r>
           </a:p>
         </p:txBody>
@@ -36994,7 +35811,7 @@
           <p:cNvPr id="6" name="Text Placeholder 1">
             <a:extLst>
               <a:ext uri="{FF2B5EF4-FFF2-40B4-BE49-F238E27FC236}">
-                <a16:creationId xmlns:a16="http://schemas.microsoft.com/office/drawing/2014/main" id="{0A756B05-B252-E3EA-B220-4ABEC0201AE9}"/>
+                <a16:creationId xmlns:a16="http://schemas.microsoft.com/office/drawing/2014/main" id="{22EAF0F9-9274-6C7B-3037-6FBA51710A18}"/>
               </a:ext>
             </a:extLst>
           </p:cNvPr>
@@ -37189,7 +36006,7 @@
     </p:spTree>
     <p:extLst>
       <p:ext uri="{BB962C8B-B14F-4D97-AF65-F5344CB8AC3E}">
-        <p14:creationId xmlns:p14="http://schemas.microsoft.com/office/powerpoint/2010/main" val="2466321810"/>
+        <p14:creationId xmlns:p14="http://schemas.microsoft.com/office/powerpoint/2010/main" val="1520640515"/>
       </p:ext>
     </p:extLst>
   </p:cSld>

</xml_diff>

<commit_message>
Change text to Ubuntu font to improve readability and fixes #2
</commit_message>
<xml_diff>
--- a/Exploring Self-Management.pptx
+++ b/Exploring Self-Management.pptx
@@ -26,51 +26,51 @@
     <p:sldId id="318" r:id="rId17"/>
     <p:sldId id="269" r:id="rId18"/>
     <p:sldId id="270" r:id="rId19"/>
-    <p:sldId id="273" r:id="rId20"/>
+    <p:sldId id="321" r:id="rId20"/>
     <p:sldId id="271" r:id="rId21"/>
-    <p:sldId id="274" r:id="rId22"/>
+    <p:sldId id="322" r:id="rId22"/>
     <p:sldId id="275" r:id="rId23"/>
-    <p:sldId id="276" r:id="rId24"/>
+    <p:sldId id="323" r:id="rId24"/>
     <p:sldId id="278" r:id="rId25"/>
-    <p:sldId id="279" r:id="rId26"/>
+    <p:sldId id="324" r:id="rId26"/>
     <p:sldId id="280" r:id="rId27"/>
-    <p:sldId id="281" r:id="rId28"/>
+    <p:sldId id="325" r:id="rId28"/>
     <p:sldId id="282" r:id="rId29"/>
     <p:sldId id="284" r:id="rId30"/>
     <p:sldId id="283" r:id="rId31"/>
-    <p:sldId id="285" r:id="rId32"/>
+    <p:sldId id="326" r:id="rId32"/>
     <p:sldId id="286" r:id="rId33"/>
-    <p:sldId id="287" r:id="rId34"/>
+    <p:sldId id="327" r:id="rId34"/>
     <p:sldId id="288" r:id="rId35"/>
-    <p:sldId id="289" r:id="rId36"/>
+    <p:sldId id="328" r:id="rId36"/>
     <p:sldId id="290" r:id="rId37"/>
-    <p:sldId id="291" r:id="rId38"/>
+    <p:sldId id="329" r:id="rId38"/>
     <p:sldId id="292" r:id="rId39"/>
-    <p:sldId id="293" r:id="rId40"/>
+    <p:sldId id="330" r:id="rId40"/>
     <p:sldId id="294" r:id="rId41"/>
     <p:sldId id="295" r:id="rId42"/>
     <p:sldId id="296" r:id="rId43"/>
-    <p:sldId id="297" r:id="rId44"/>
+    <p:sldId id="331" r:id="rId44"/>
     <p:sldId id="298" r:id="rId45"/>
-    <p:sldId id="299" r:id="rId46"/>
+    <p:sldId id="332" r:id="rId46"/>
     <p:sldId id="300" r:id="rId47"/>
-    <p:sldId id="301" r:id="rId48"/>
+    <p:sldId id="333" r:id="rId48"/>
     <p:sldId id="302" r:id="rId49"/>
-    <p:sldId id="303" r:id="rId50"/>
+    <p:sldId id="334" r:id="rId50"/>
     <p:sldId id="304" r:id="rId51"/>
-    <p:sldId id="305" r:id="rId52"/>
+    <p:sldId id="335" r:id="rId52"/>
     <p:sldId id="306" r:id="rId53"/>
     <p:sldId id="307" r:id="rId54"/>
     <p:sldId id="308" r:id="rId55"/>
-    <p:sldId id="309" r:id="rId56"/>
+    <p:sldId id="336" r:id="rId56"/>
     <p:sldId id="310" r:id="rId57"/>
-    <p:sldId id="311" r:id="rId58"/>
+    <p:sldId id="337" r:id="rId58"/>
     <p:sldId id="312" r:id="rId59"/>
-    <p:sldId id="313" r:id="rId60"/>
+    <p:sldId id="338" r:id="rId60"/>
     <p:sldId id="314" r:id="rId61"/>
-    <p:sldId id="315" r:id="rId62"/>
+    <p:sldId id="339" r:id="rId62"/>
     <p:sldId id="316" r:id="rId63"/>
-    <p:sldId id="317" r:id="rId64"/>
+    <p:sldId id="340" r:id="rId64"/>
     <p:sldId id="319" r:id="rId65"/>
     <p:sldId id="320" r:id="rId66"/>
   </p:sldIdLst>
@@ -192,7 +192,7 @@
   <pc:docChgLst>
     <pc:chgData name="Hsia, Cheehong" userId="6bc27941-0d5a-4c11-8dfb-8bbe9da0911b" providerId="ADAL" clId="{5BE5096F-7F8C-496A-A13C-FF7D0CA7A6B4}"/>
     <pc:docChg chg="undo custSel addSld delSld modSld modMainMaster">
-      <pc:chgData name="Hsia, Cheehong" userId="6bc27941-0d5a-4c11-8dfb-8bbe9da0911b" providerId="ADAL" clId="{5BE5096F-7F8C-496A-A13C-FF7D0CA7A6B4}" dt="2024-02-03T16:00:29.879" v="1021" actId="680"/>
+      <pc:chgData name="Hsia, Cheehong" userId="6bc27941-0d5a-4c11-8dfb-8bbe9da0911b" providerId="ADAL" clId="{5BE5096F-7F8C-496A-A13C-FF7D0CA7A6B4}" dt="2024-02-14T15:30:29.053" v="1624" actId="700"/>
       <pc:docMkLst>
         <pc:docMk/>
       </pc:docMkLst>
@@ -308,11 +308,27 @@
         </pc:picChg>
       </pc:sldChg>
       <pc:sldChg chg="addSp modSp mod">
-        <pc:chgData name="Hsia, Cheehong" userId="6bc27941-0d5a-4c11-8dfb-8bbe9da0911b" providerId="ADAL" clId="{5BE5096F-7F8C-496A-A13C-FF7D0CA7A6B4}" dt="2024-02-03T15:43:14.771" v="812" actId="255"/>
+        <pc:chgData name="Hsia, Cheehong" userId="6bc27941-0d5a-4c11-8dfb-8bbe9da0911b" providerId="ADAL" clId="{5BE5096F-7F8C-496A-A13C-FF7D0CA7A6B4}" dt="2024-02-14T15:18:37.824" v="1036" actId="20577"/>
         <pc:sldMkLst>
           <pc:docMk/>
           <pc:sldMk cId="1496529656" sldId="270"/>
         </pc:sldMkLst>
+        <pc:spChg chg="mod">
+          <ac:chgData name="Hsia, Cheehong" userId="6bc27941-0d5a-4c11-8dfb-8bbe9da0911b" providerId="ADAL" clId="{5BE5096F-7F8C-496A-A13C-FF7D0CA7A6B4}" dt="2024-02-14T15:18:37.824" v="1036" actId="20577"/>
+          <ac:spMkLst>
+            <pc:docMk/>
+            <pc:sldMk cId="1496529656" sldId="270"/>
+            <ac:spMk id="2" creationId="{700D1D6A-607B-8919-A042-BCCDC9CF0CF0}"/>
+          </ac:spMkLst>
+        </pc:spChg>
+        <pc:spChg chg="mod">
+          <ac:chgData name="Hsia, Cheehong" userId="6bc27941-0d5a-4c11-8dfb-8bbe9da0911b" providerId="ADAL" clId="{5BE5096F-7F8C-496A-A13C-FF7D0CA7A6B4}" dt="2024-02-14T15:17:03.412" v="1025" actId="255"/>
+          <ac:spMkLst>
+            <pc:docMk/>
+            <pc:sldMk cId="1496529656" sldId="270"/>
+            <ac:spMk id="4" creationId="{101FB840-DD80-334A-87FD-81DC71AD8A57}"/>
+          </ac:spMkLst>
+        </pc:spChg>
         <pc:spChg chg="add mod">
           <ac:chgData name="Hsia, Cheehong" userId="6bc27941-0d5a-4c11-8dfb-8bbe9da0911b" providerId="ADAL" clId="{5BE5096F-7F8C-496A-A13C-FF7D0CA7A6B4}" dt="2024-02-03T15:43:14.771" v="812" actId="255"/>
           <ac:spMkLst>
@@ -323,11 +339,27 @@
         </pc:spChg>
       </pc:sldChg>
       <pc:sldChg chg="addSp modSp mod">
-        <pc:chgData name="Hsia, Cheehong" userId="6bc27941-0d5a-4c11-8dfb-8bbe9da0911b" providerId="ADAL" clId="{5BE5096F-7F8C-496A-A13C-FF7D0CA7A6B4}" dt="2024-02-03T15:43:33.700" v="816" actId="20577"/>
+        <pc:chgData name="Hsia, Cheehong" userId="6bc27941-0d5a-4c11-8dfb-8bbe9da0911b" providerId="ADAL" clId="{5BE5096F-7F8C-496A-A13C-FF7D0CA7A6B4}" dt="2024-02-14T15:18:31.948" v="1035" actId="20577"/>
         <pc:sldMkLst>
           <pc:docMk/>
           <pc:sldMk cId="2685147449" sldId="271"/>
         </pc:sldMkLst>
+        <pc:spChg chg="mod">
+          <ac:chgData name="Hsia, Cheehong" userId="6bc27941-0d5a-4c11-8dfb-8bbe9da0911b" providerId="ADAL" clId="{5BE5096F-7F8C-496A-A13C-FF7D0CA7A6B4}" dt="2024-02-14T15:18:31.948" v="1035" actId="20577"/>
+          <ac:spMkLst>
+            <pc:docMk/>
+            <pc:sldMk cId="2685147449" sldId="271"/>
+            <ac:spMk id="2" creationId="{509F87C3-07A1-0EDC-D899-CD15F645C37F}"/>
+          </ac:spMkLst>
+        </pc:spChg>
+        <pc:spChg chg="mod">
+          <ac:chgData name="Hsia, Cheehong" userId="6bc27941-0d5a-4c11-8dfb-8bbe9da0911b" providerId="ADAL" clId="{5BE5096F-7F8C-496A-A13C-FF7D0CA7A6B4}" dt="2024-02-14T15:18:28.898" v="1034" actId="2711"/>
+          <ac:spMkLst>
+            <pc:docMk/>
+            <pc:sldMk cId="2685147449" sldId="271"/>
+            <ac:spMk id="4" creationId="{AA1D8D56-7997-9149-E3C2-4243BC163909}"/>
+          </ac:spMkLst>
+        </pc:spChg>
         <pc:spChg chg="add mod">
           <ac:chgData name="Hsia, Cheehong" userId="6bc27941-0d5a-4c11-8dfb-8bbe9da0911b" providerId="ADAL" clId="{5BE5096F-7F8C-496A-A13C-FF7D0CA7A6B4}" dt="2024-02-03T15:43:33.700" v="816" actId="20577"/>
           <ac:spMkLst>
@@ -337,12 +369,20 @@
           </ac:spMkLst>
         </pc:spChg>
       </pc:sldChg>
-      <pc:sldChg chg="addSp modSp">
-        <pc:chgData name="Hsia, Cheehong" userId="6bc27941-0d5a-4c11-8dfb-8bbe9da0911b" providerId="ADAL" clId="{5BE5096F-7F8C-496A-A13C-FF7D0CA7A6B4}" dt="2024-02-03T15:43:19.831" v="813"/>
+      <pc:sldChg chg="addSp modSp del mod">
+        <pc:chgData name="Hsia, Cheehong" userId="6bc27941-0d5a-4c11-8dfb-8bbe9da0911b" providerId="ADAL" clId="{5BE5096F-7F8C-496A-A13C-FF7D0CA7A6B4}" dt="2024-02-14T15:17:28.919" v="1028" actId="47"/>
         <pc:sldMkLst>
           <pc:docMk/>
           <pc:sldMk cId="106282829" sldId="273"/>
         </pc:sldMkLst>
+        <pc:spChg chg="mod">
+          <ac:chgData name="Hsia, Cheehong" userId="6bc27941-0d5a-4c11-8dfb-8bbe9da0911b" providerId="ADAL" clId="{5BE5096F-7F8C-496A-A13C-FF7D0CA7A6B4}" dt="2024-02-14T15:17:22.994" v="1027" actId="255"/>
+          <ac:spMkLst>
+            <pc:docMk/>
+            <pc:sldMk cId="106282829" sldId="273"/>
+            <ac:spMk id="2" creationId="{94189FDF-7B80-50D5-3AD1-CB96FAC44E6D}"/>
+          </ac:spMkLst>
+        </pc:spChg>
         <pc:spChg chg="add mod">
           <ac:chgData name="Hsia, Cheehong" userId="6bc27941-0d5a-4c11-8dfb-8bbe9da0911b" providerId="ADAL" clId="{5BE5096F-7F8C-496A-A13C-FF7D0CA7A6B4}" dt="2024-02-03T15:43:19.831" v="813"/>
           <ac:spMkLst>
@@ -352,8 +392,8 @@
           </ac:spMkLst>
         </pc:spChg>
       </pc:sldChg>
-      <pc:sldChg chg="addSp modSp">
-        <pc:chgData name="Hsia, Cheehong" userId="6bc27941-0d5a-4c11-8dfb-8bbe9da0911b" providerId="ADAL" clId="{5BE5096F-7F8C-496A-A13C-FF7D0CA7A6B4}" dt="2024-02-03T15:43:37.989" v="817"/>
+      <pc:sldChg chg="addSp modSp del">
+        <pc:chgData name="Hsia, Cheehong" userId="6bc27941-0d5a-4c11-8dfb-8bbe9da0911b" providerId="ADAL" clId="{5BE5096F-7F8C-496A-A13C-FF7D0CA7A6B4}" dt="2024-02-14T15:18:52.358" v="1038" actId="47"/>
         <pc:sldMkLst>
           <pc:docMk/>
           <pc:sldMk cId="433227676" sldId="274"/>
@@ -368,11 +408,27 @@
         </pc:spChg>
       </pc:sldChg>
       <pc:sldChg chg="addSp modSp mod">
-        <pc:chgData name="Hsia, Cheehong" userId="6bc27941-0d5a-4c11-8dfb-8bbe9da0911b" providerId="ADAL" clId="{5BE5096F-7F8C-496A-A13C-FF7D0CA7A6B4}" dt="2024-02-03T15:43:49.397" v="820" actId="20577"/>
+        <pc:chgData name="Hsia, Cheehong" userId="6bc27941-0d5a-4c11-8dfb-8bbe9da0911b" providerId="ADAL" clId="{5BE5096F-7F8C-496A-A13C-FF7D0CA7A6B4}" dt="2024-02-14T15:19:18.918" v="1046" actId="20577"/>
         <pc:sldMkLst>
           <pc:docMk/>
           <pc:sldMk cId="1492287320" sldId="275"/>
         </pc:sldMkLst>
+        <pc:spChg chg="mod">
+          <ac:chgData name="Hsia, Cheehong" userId="6bc27941-0d5a-4c11-8dfb-8bbe9da0911b" providerId="ADAL" clId="{5BE5096F-7F8C-496A-A13C-FF7D0CA7A6B4}" dt="2024-02-14T15:19:18.918" v="1046" actId="20577"/>
+          <ac:spMkLst>
+            <pc:docMk/>
+            <pc:sldMk cId="1492287320" sldId="275"/>
+            <ac:spMk id="2" creationId="{509F87C3-07A1-0EDC-D899-CD15F645C37F}"/>
+          </ac:spMkLst>
+        </pc:spChg>
+        <pc:spChg chg="mod">
+          <ac:chgData name="Hsia, Cheehong" userId="6bc27941-0d5a-4c11-8dfb-8bbe9da0911b" providerId="ADAL" clId="{5BE5096F-7F8C-496A-A13C-FF7D0CA7A6B4}" dt="2024-02-14T15:19:14.972" v="1045" actId="2711"/>
+          <ac:spMkLst>
+            <pc:docMk/>
+            <pc:sldMk cId="1492287320" sldId="275"/>
+            <ac:spMk id="4" creationId="{AA1D8D56-7997-9149-E3C2-4243BC163909}"/>
+          </ac:spMkLst>
+        </pc:spChg>
         <pc:spChg chg="add mod">
           <ac:chgData name="Hsia, Cheehong" userId="6bc27941-0d5a-4c11-8dfb-8bbe9da0911b" providerId="ADAL" clId="{5BE5096F-7F8C-496A-A13C-FF7D0CA7A6B4}" dt="2024-02-03T15:43:49.397" v="820" actId="20577"/>
           <ac:spMkLst>
@@ -382,8 +438,8 @@
           </ac:spMkLst>
         </pc:spChg>
       </pc:sldChg>
-      <pc:sldChg chg="addSp modSp">
-        <pc:chgData name="Hsia, Cheehong" userId="6bc27941-0d5a-4c11-8dfb-8bbe9da0911b" providerId="ADAL" clId="{5BE5096F-7F8C-496A-A13C-FF7D0CA7A6B4}" dt="2024-02-03T15:43:55.173" v="821"/>
+      <pc:sldChg chg="addSp modSp del">
+        <pc:chgData name="Hsia, Cheehong" userId="6bc27941-0d5a-4c11-8dfb-8bbe9da0911b" providerId="ADAL" clId="{5BE5096F-7F8C-496A-A13C-FF7D0CA7A6B4}" dt="2024-02-14T15:19:24.465" v="1047" actId="47"/>
         <pc:sldMkLst>
           <pc:docMk/>
           <pc:sldMk cId="1970583200" sldId="276"/>
@@ -398,11 +454,27 @@
         </pc:spChg>
       </pc:sldChg>
       <pc:sldChg chg="addSp modSp mod">
-        <pc:chgData name="Hsia, Cheehong" userId="6bc27941-0d5a-4c11-8dfb-8bbe9da0911b" providerId="ADAL" clId="{5BE5096F-7F8C-496A-A13C-FF7D0CA7A6B4}" dt="2024-02-03T15:44:05.210" v="823" actId="20577"/>
+        <pc:chgData name="Hsia, Cheehong" userId="6bc27941-0d5a-4c11-8dfb-8bbe9da0911b" providerId="ADAL" clId="{5BE5096F-7F8C-496A-A13C-FF7D0CA7A6B4}" dt="2024-02-14T15:19:55.972" v="1056" actId="20577"/>
         <pc:sldMkLst>
           <pc:docMk/>
           <pc:sldMk cId="161617201" sldId="278"/>
         </pc:sldMkLst>
+        <pc:spChg chg="mod">
+          <ac:chgData name="Hsia, Cheehong" userId="6bc27941-0d5a-4c11-8dfb-8bbe9da0911b" providerId="ADAL" clId="{5BE5096F-7F8C-496A-A13C-FF7D0CA7A6B4}" dt="2024-02-14T15:19:36.821" v="1051" actId="255"/>
+          <ac:spMkLst>
+            <pc:docMk/>
+            <pc:sldMk cId="161617201" sldId="278"/>
+            <ac:spMk id="2" creationId="{509F87C3-07A1-0EDC-D899-CD15F645C37F}"/>
+          </ac:spMkLst>
+        </pc:spChg>
+        <pc:spChg chg="mod">
+          <ac:chgData name="Hsia, Cheehong" userId="6bc27941-0d5a-4c11-8dfb-8bbe9da0911b" providerId="ADAL" clId="{5BE5096F-7F8C-496A-A13C-FF7D0CA7A6B4}" dt="2024-02-14T15:19:55.972" v="1056" actId="20577"/>
+          <ac:spMkLst>
+            <pc:docMk/>
+            <pc:sldMk cId="161617201" sldId="278"/>
+            <ac:spMk id="4" creationId="{AA1D8D56-7997-9149-E3C2-4243BC163909}"/>
+          </ac:spMkLst>
+        </pc:spChg>
         <pc:spChg chg="add mod">
           <ac:chgData name="Hsia, Cheehong" userId="6bc27941-0d5a-4c11-8dfb-8bbe9da0911b" providerId="ADAL" clId="{5BE5096F-7F8C-496A-A13C-FF7D0CA7A6B4}" dt="2024-02-03T15:44:05.210" v="823" actId="20577"/>
           <ac:spMkLst>
@@ -412,8 +484,8 @@
           </ac:spMkLst>
         </pc:spChg>
       </pc:sldChg>
-      <pc:sldChg chg="addSp modSp">
-        <pc:chgData name="Hsia, Cheehong" userId="6bc27941-0d5a-4c11-8dfb-8bbe9da0911b" providerId="ADAL" clId="{5BE5096F-7F8C-496A-A13C-FF7D0CA7A6B4}" dt="2024-02-03T15:44:10.377" v="824"/>
+      <pc:sldChg chg="addSp modSp del">
+        <pc:chgData name="Hsia, Cheehong" userId="6bc27941-0d5a-4c11-8dfb-8bbe9da0911b" providerId="ADAL" clId="{5BE5096F-7F8C-496A-A13C-FF7D0CA7A6B4}" dt="2024-02-14T15:20:01.083" v="1057" actId="47"/>
         <pc:sldMkLst>
           <pc:docMk/>
           <pc:sldMk cId="596055484" sldId="279"/>
@@ -428,11 +500,27 @@
         </pc:spChg>
       </pc:sldChg>
       <pc:sldChg chg="addSp modSp mod">
-        <pc:chgData name="Hsia, Cheehong" userId="6bc27941-0d5a-4c11-8dfb-8bbe9da0911b" providerId="ADAL" clId="{5BE5096F-7F8C-496A-A13C-FF7D0CA7A6B4}" dt="2024-02-03T15:44:25.731" v="826" actId="20577"/>
+        <pc:chgData name="Hsia, Cheehong" userId="6bc27941-0d5a-4c11-8dfb-8bbe9da0911b" providerId="ADAL" clId="{5BE5096F-7F8C-496A-A13C-FF7D0CA7A6B4}" dt="2024-02-14T15:20:23.544" v="1064" actId="255"/>
         <pc:sldMkLst>
           <pc:docMk/>
           <pc:sldMk cId="2564199674" sldId="280"/>
         </pc:sldMkLst>
+        <pc:spChg chg="mod">
+          <ac:chgData name="Hsia, Cheehong" userId="6bc27941-0d5a-4c11-8dfb-8bbe9da0911b" providerId="ADAL" clId="{5BE5096F-7F8C-496A-A13C-FF7D0CA7A6B4}" dt="2024-02-14T15:20:18.129" v="1062" actId="20577"/>
+          <ac:spMkLst>
+            <pc:docMk/>
+            <pc:sldMk cId="2564199674" sldId="280"/>
+            <ac:spMk id="2" creationId="{509F87C3-07A1-0EDC-D899-CD15F645C37F}"/>
+          </ac:spMkLst>
+        </pc:spChg>
+        <pc:spChg chg="mod">
+          <ac:chgData name="Hsia, Cheehong" userId="6bc27941-0d5a-4c11-8dfb-8bbe9da0911b" providerId="ADAL" clId="{5BE5096F-7F8C-496A-A13C-FF7D0CA7A6B4}" dt="2024-02-14T15:20:23.544" v="1064" actId="255"/>
+          <ac:spMkLst>
+            <pc:docMk/>
+            <pc:sldMk cId="2564199674" sldId="280"/>
+            <ac:spMk id="4" creationId="{AA1D8D56-7997-9149-E3C2-4243BC163909}"/>
+          </ac:spMkLst>
+        </pc:spChg>
         <pc:spChg chg="add mod">
           <ac:chgData name="Hsia, Cheehong" userId="6bc27941-0d5a-4c11-8dfb-8bbe9da0911b" providerId="ADAL" clId="{5BE5096F-7F8C-496A-A13C-FF7D0CA7A6B4}" dt="2024-02-03T15:44:25.731" v="826" actId="20577"/>
           <ac:spMkLst>
@@ -442,8 +530,8 @@
           </ac:spMkLst>
         </pc:spChg>
       </pc:sldChg>
-      <pc:sldChg chg="addSp modSp">
-        <pc:chgData name="Hsia, Cheehong" userId="6bc27941-0d5a-4c11-8dfb-8bbe9da0911b" providerId="ADAL" clId="{5BE5096F-7F8C-496A-A13C-FF7D0CA7A6B4}" dt="2024-02-03T15:44:29.892" v="827"/>
+      <pc:sldChg chg="addSp modSp del">
+        <pc:chgData name="Hsia, Cheehong" userId="6bc27941-0d5a-4c11-8dfb-8bbe9da0911b" providerId="ADAL" clId="{5BE5096F-7F8C-496A-A13C-FF7D0CA7A6B4}" dt="2024-02-14T15:20:28.551" v="1065" actId="47"/>
         <pc:sldMkLst>
           <pc:docMk/>
           <pc:sldMk cId="3282675112" sldId="281"/>
@@ -585,11 +673,27 @@
         </pc:picChg>
       </pc:sldChg>
       <pc:sldChg chg="addSp modSp mod">
-        <pc:chgData name="Hsia, Cheehong" userId="6bc27941-0d5a-4c11-8dfb-8bbe9da0911b" providerId="ADAL" clId="{5BE5096F-7F8C-496A-A13C-FF7D0CA7A6B4}" dt="2024-02-03T15:46:47.779" v="829" actId="20577"/>
+        <pc:chgData name="Hsia, Cheehong" userId="6bc27941-0d5a-4c11-8dfb-8bbe9da0911b" providerId="ADAL" clId="{5BE5096F-7F8C-496A-A13C-FF7D0CA7A6B4}" dt="2024-02-14T15:21:01.204" v="1076" actId="255"/>
         <pc:sldMkLst>
           <pc:docMk/>
           <pc:sldMk cId="1962898729" sldId="283"/>
         </pc:sldMkLst>
+        <pc:spChg chg="mod">
+          <ac:chgData name="Hsia, Cheehong" userId="6bc27941-0d5a-4c11-8dfb-8bbe9da0911b" providerId="ADAL" clId="{5BE5096F-7F8C-496A-A13C-FF7D0CA7A6B4}" dt="2024-02-14T15:20:54.979" v="1074" actId="20577"/>
+          <ac:spMkLst>
+            <pc:docMk/>
+            <pc:sldMk cId="1962898729" sldId="283"/>
+            <ac:spMk id="2" creationId="{66890E70-EDB5-4D8C-2B4F-029FA9E51D4E}"/>
+          </ac:spMkLst>
+        </pc:spChg>
+        <pc:spChg chg="mod">
+          <ac:chgData name="Hsia, Cheehong" userId="6bc27941-0d5a-4c11-8dfb-8bbe9da0911b" providerId="ADAL" clId="{5BE5096F-7F8C-496A-A13C-FF7D0CA7A6B4}" dt="2024-02-14T15:21:01.204" v="1076" actId="255"/>
+          <ac:spMkLst>
+            <pc:docMk/>
+            <pc:sldMk cId="1962898729" sldId="283"/>
+            <ac:spMk id="4" creationId="{F978620C-B722-98CC-0FA2-E22F5047512F}"/>
+          </ac:spMkLst>
+        </pc:spChg>
         <pc:spChg chg="add mod">
           <ac:chgData name="Hsia, Cheehong" userId="6bc27941-0d5a-4c11-8dfb-8bbe9da0911b" providerId="ADAL" clId="{5BE5096F-7F8C-496A-A13C-FF7D0CA7A6B4}" dt="2024-02-03T15:46:47.779" v="829" actId="20577"/>
           <ac:spMkLst>
@@ -599,8 +703,8 @@
           </ac:spMkLst>
         </pc:spChg>
       </pc:sldChg>
-      <pc:sldChg chg="addSp modSp">
-        <pc:chgData name="Hsia, Cheehong" userId="6bc27941-0d5a-4c11-8dfb-8bbe9da0911b" providerId="ADAL" clId="{5BE5096F-7F8C-496A-A13C-FF7D0CA7A6B4}" dt="2024-02-03T15:46:52.802" v="830"/>
+      <pc:sldChg chg="addSp modSp del">
+        <pc:chgData name="Hsia, Cheehong" userId="6bc27941-0d5a-4c11-8dfb-8bbe9da0911b" providerId="ADAL" clId="{5BE5096F-7F8C-496A-A13C-FF7D0CA7A6B4}" dt="2024-02-14T15:21:05.503" v="1077" actId="47"/>
         <pc:sldMkLst>
           <pc:docMk/>
           <pc:sldMk cId="1386201035" sldId="285"/>
@@ -615,11 +719,27 @@
         </pc:spChg>
       </pc:sldChg>
       <pc:sldChg chg="addSp modSp mod">
-        <pc:chgData name="Hsia, Cheehong" userId="6bc27941-0d5a-4c11-8dfb-8bbe9da0911b" providerId="ADAL" clId="{5BE5096F-7F8C-496A-A13C-FF7D0CA7A6B4}" dt="2024-02-03T15:47:01.223" v="832" actId="20577"/>
+        <pc:chgData name="Hsia, Cheehong" userId="6bc27941-0d5a-4c11-8dfb-8bbe9da0911b" providerId="ADAL" clId="{5BE5096F-7F8C-496A-A13C-FF7D0CA7A6B4}" dt="2024-02-14T15:21:33.516" v="1087" actId="20577"/>
         <pc:sldMkLst>
           <pc:docMk/>
           <pc:sldMk cId="3741328940" sldId="286"/>
         </pc:sldMkLst>
+        <pc:spChg chg="mod">
+          <ac:chgData name="Hsia, Cheehong" userId="6bc27941-0d5a-4c11-8dfb-8bbe9da0911b" providerId="ADAL" clId="{5BE5096F-7F8C-496A-A13C-FF7D0CA7A6B4}" dt="2024-02-14T15:21:23.173" v="1084" actId="20577"/>
+          <ac:spMkLst>
+            <pc:docMk/>
+            <pc:sldMk cId="3741328940" sldId="286"/>
+            <ac:spMk id="2" creationId="{66890E70-EDB5-4D8C-2B4F-029FA9E51D4E}"/>
+          </ac:spMkLst>
+        </pc:spChg>
+        <pc:spChg chg="mod">
+          <ac:chgData name="Hsia, Cheehong" userId="6bc27941-0d5a-4c11-8dfb-8bbe9da0911b" providerId="ADAL" clId="{5BE5096F-7F8C-496A-A13C-FF7D0CA7A6B4}" dt="2024-02-14T15:21:33.516" v="1087" actId="20577"/>
+          <ac:spMkLst>
+            <pc:docMk/>
+            <pc:sldMk cId="3741328940" sldId="286"/>
+            <ac:spMk id="4" creationId="{F978620C-B722-98CC-0FA2-E22F5047512F}"/>
+          </ac:spMkLst>
+        </pc:spChg>
         <pc:spChg chg="add mod">
           <ac:chgData name="Hsia, Cheehong" userId="6bc27941-0d5a-4c11-8dfb-8bbe9da0911b" providerId="ADAL" clId="{5BE5096F-7F8C-496A-A13C-FF7D0CA7A6B4}" dt="2024-02-03T15:47:01.223" v="832" actId="20577"/>
           <ac:spMkLst>
@@ -629,8 +749,8 @@
           </ac:spMkLst>
         </pc:spChg>
       </pc:sldChg>
-      <pc:sldChg chg="addSp modSp">
-        <pc:chgData name="Hsia, Cheehong" userId="6bc27941-0d5a-4c11-8dfb-8bbe9da0911b" providerId="ADAL" clId="{5BE5096F-7F8C-496A-A13C-FF7D0CA7A6B4}" dt="2024-02-03T15:47:04.644" v="833"/>
+      <pc:sldChg chg="addSp modSp del">
+        <pc:chgData name="Hsia, Cheehong" userId="6bc27941-0d5a-4c11-8dfb-8bbe9da0911b" providerId="ADAL" clId="{5BE5096F-7F8C-496A-A13C-FF7D0CA7A6B4}" dt="2024-02-14T15:21:38.274" v="1088" actId="47"/>
         <pc:sldMkLst>
           <pc:docMk/>
           <pc:sldMk cId="3471392720" sldId="287"/>
@@ -645,11 +765,27 @@
         </pc:spChg>
       </pc:sldChg>
       <pc:sldChg chg="addSp modSp mod">
-        <pc:chgData name="Hsia, Cheehong" userId="6bc27941-0d5a-4c11-8dfb-8bbe9da0911b" providerId="ADAL" clId="{5BE5096F-7F8C-496A-A13C-FF7D0CA7A6B4}" dt="2024-02-03T15:47:10.059" v="835" actId="20577"/>
+        <pc:chgData name="Hsia, Cheehong" userId="6bc27941-0d5a-4c11-8dfb-8bbe9da0911b" providerId="ADAL" clId="{5BE5096F-7F8C-496A-A13C-FF7D0CA7A6B4}" dt="2024-02-14T15:22:03.481" v="1095" actId="20577"/>
         <pc:sldMkLst>
           <pc:docMk/>
           <pc:sldMk cId="3337217698" sldId="288"/>
         </pc:sldMkLst>
+        <pc:spChg chg="mod">
+          <ac:chgData name="Hsia, Cheehong" userId="6bc27941-0d5a-4c11-8dfb-8bbe9da0911b" providerId="ADAL" clId="{5BE5096F-7F8C-496A-A13C-FF7D0CA7A6B4}" dt="2024-02-14T15:21:51.734" v="1092" actId="255"/>
+          <ac:spMkLst>
+            <pc:docMk/>
+            <pc:sldMk cId="3337217698" sldId="288"/>
+            <ac:spMk id="2" creationId="{66890E70-EDB5-4D8C-2B4F-029FA9E51D4E}"/>
+          </ac:spMkLst>
+        </pc:spChg>
+        <pc:spChg chg="mod">
+          <ac:chgData name="Hsia, Cheehong" userId="6bc27941-0d5a-4c11-8dfb-8bbe9da0911b" providerId="ADAL" clId="{5BE5096F-7F8C-496A-A13C-FF7D0CA7A6B4}" dt="2024-02-14T15:22:03.481" v="1095" actId="20577"/>
+          <ac:spMkLst>
+            <pc:docMk/>
+            <pc:sldMk cId="3337217698" sldId="288"/>
+            <ac:spMk id="4" creationId="{F978620C-B722-98CC-0FA2-E22F5047512F}"/>
+          </ac:spMkLst>
+        </pc:spChg>
         <pc:spChg chg="add mod">
           <ac:chgData name="Hsia, Cheehong" userId="6bc27941-0d5a-4c11-8dfb-8bbe9da0911b" providerId="ADAL" clId="{5BE5096F-7F8C-496A-A13C-FF7D0CA7A6B4}" dt="2024-02-03T15:47:10.059" v="835" actId="20577"/>
           <ac:spMkLst>
@@ -659,8 +795,8 @@
           </ac:spMkLst>
         </pc:spChg>
       </pc:sldChg>
-      <pc:sldChg chg="addSp modSp">
-        <pc:chgData name="Hsia, Cheehong" userId="6bc27941-0d5a-4c11-8dfb-8bbe9da0911b" providerId="ADAL" clId="{5BE5096F-7F8C-496A-A13C-FF7D0CA7A6B4}" dt="2024-02-03T15:47:12.570" v="836"/>
+      <pc:sldChg chg="addSp modSp del">
+        <pc:chgData name="Hsia, Cheehong" userId="6bc27941-0d5a-4c11-8dfb-8bbe9da0911b" providerId="ADAL" clId="{5BE5096F-7F8C-496A-A13C-FF7D0CA7A6B4}" dt="2024-02-14T15:22:08.970" v="1096" actId="47"/>
         <pc:sldMkLst>
           <pc:docMk/>
           <pc:sldMk cId="1734131973" sldId="289"/>
@@ -675,11 +811,27 @@
         </pc:spChg>
       </pc:sldChg>
       <pc:sldChg chg="addSp modSp mod">
-        <pc:chgData name="Hsia, Cheehong" userId="6bc27941-0d5a-4c11-8dfb-8bbe9da0911b" providerId="ADAL" clId="{5BE5096F-7F8C-496A-A13C-FF7D0CA7A6B4}" dt="2024-02-03T15:47:20.656" v="839" actId="20577"/>
+        <pc:chgData name="Hsia, Cheehong" userId="6bc27941-0d5a-4c11-8dfb-8bbe9da0911b" providerId="ADAL" clId="{5BE5096F-7F8C-496A-A13C-FF7D0CA7A6B4}" dt="2024-02-14T15:22:38.841" v="1103" actId="20577"/>
         <pc:sldMkLst>
           <pc:docMk/>
           <pc:sldMk cId="539056256" sldId="290"/>
         </pc:sldMkLst>
+        <pc:spChg chg="mod">
+          <ac:chgData name="Hsia, Cheehong" userId="6bc27941-0d5a-4c11-8dfb-8bbe9da0911b" providerId="ADAL" clId="{5BE5096F-7F8C-496A-A13C-FF7D0CA7A6B4}" dt="2024-02-14T15:22:25.294" v="1100" actId="255"/>
+          <ac:spMkLst>
+            <pc:docMk/>
+            <pc:sldMk cId="539056256" sldId="290"/>
+            <ac:spMk id="2" creationId="{66890E70-EDB5-4D8C-2B4F-029FA9E51D4E}"/>
+          </ac:spMkLst>
+        </pc:spChg>
+        <pc:spChg chg="mod">
+          <ac:chgData name="Hsia, Cheehong" userId="6bc27941-0d5a-4c11-8dfb-8bbe9da0911b" providerId="ADAL" clId="{5BE5096F-7F8C-496A-A13C-FF7D0CA7A6B4}" dt="2024-02-14T15:22:38.841" v="1103" actId="20577"/>
+          <ac:spMkLst>
+            <pc:docMk/>
+            <pc:sldMk cId="539056256" sldId="290"/>
+            <ac:spMk id="4" creationId="{F978620C-B722-98CC-0FA2-E22F5047512F}"/>
+          </ac:spMkLst>
+        </pc:spChg>
         <pc:spChg chg="add mod">
           <ac:chgData name="Hsia, Cheehong" userId="6bc27941-0d5a-4c11-8dfb-8bbe9da0911b" providerId="ADAL" clId="{5BE5096F-7F8C-496A-A13C-FF7D0CA7A6B4}" dt="2024-02-03T15:47:20.656" v="839" actId="20577"/>
           <ac:spMkLst>
@@ -689,8 +841,8 @@
           </ac:spMkLst>
         </pc:spChg>
       </pc:sldChg>
-      <pc:sldChg chg="addSp modSp">
-        <pc:chgData name="Hsia, Cheehong" userId="6bc27941-0d5a-4c11-8dfb-8bbe9da0911b" providerId="ADAL" clId="{5BE5096F-7F8C-496A-A13C-FF7D0CA7A6B4}" dt="2024-02-03T15:47:23.609" v="840"/>
+      <pc:sldChg chg="addSp modSp del">
+        <pc:chgData name="Hsia, Cheehong" userId="6bc27941-0d5a-4c11-8dfb-8bbe9da0911b" providerId="ADAL" clId="{5BE5096F-7F8C-496A-A13C-FF7D0CA7A6B4}" dt="2024-02-14T15:22:44.977" v="1105" actId="47"/>
         <pc:sldMkLst>
           <pc:docMk/>
           <pc:sldMk cId="1292218336" sldId="291"/>
@@ -705,11 +857,27 @@
         </pc:spChg>
       </pc:sldChg>
       <pc:sldChg chg="addSp modSp mod">
-        <pc:chgData name="Hsia, Cheehong" userId="6bc27941-0d5a-4c11-8dfb-8bbe9da0911b" providerId="ADAL" clId="{5BE5096F-7F8C-496A-A13C-FF7D0CA7A6B4}" dt="2024-02-03T15:47:34.543" v="842" actId="20577"/>
+        <pc:chgData name="Hsia, Cheehong" userId="6bc27941-0d5a-4c11-8dfb-8bbe9da0911b" providerId="ADAL" clId="{5BE5096F-7F8C-496A-A13C-FF7D0CA7A6B4}" dt="2024-02-14T15:23:01.262" v="1110" actId="255"/>
         <pc:sldMkLst>
           <pc:docMk/>
           <pc:sldMk cId="2261043360" sldId="292"/>
         </pc:sldMkLst>
+        <pc:spChg chg="mod">
+          <ac:chgData name="Hsia, Cheehong" userId="6bc27941-0d5a-4c11-8dfb-8bbe9da0911b" providerId="ADAL" clId="{5BE5096F-7F8C-496A-A13C-FF7D0CA7A6B4}" dt="2024-02-14T15:22:55.702" v="1108" actId="255"/>
+          <ac:spMkLst>
+            <pc:docMk/>
+            <pc:sldMk cId="2261043360" sldId="292"/>
+            <ac:spMk id="2" creationId="{66890E70-EDB5-4D8C-2B4F-029FA9E51D4E}"/>
+          </ac:spMkLst>
+        </pc:spChg>
+        <pc:spChg chg="mod">
+          <ac:chgData name="Hsia, Cheehong" userId="6bc27941-0d5a-4c11-8dfb-8bbe9da0911b" providerId="ADAL" clId="{5BE5096F-7F8C-496A-A13C-FF7D0CA7A6B4}" dt="2024-02-14T15:23:01.262" v="1110" actId="255"/>
+          <ac:spMkLst>
+            <pc:docMk/>
+            <pc:sldMk cId="2261043360" sldId="292"/>
+            <ac:spMk id="4" creationId="{F978620C-B722-98CC-0FA2-E22F5047512F}"/>
+          </ac:spMkLst>
+        </pc:spChg>
         <pc:spChg chg="add mod">
           <ac:chgData name="Hsia, Cheehong" userId="6bc27941-0d5a-4c11-8dfb-8bbe9da0911b" providerId="ADAL" clId="{5BE5096F-7F8C-496A-A13C-FF7D0CA7A6B4}" dt="2024-02-03T15:47:34.543" v="842" actId="20577"/>
           <ac:spMkLst>
@@ -719,8 +887,8 @@
           </ac:spMkLst>
         </pc:spChg>
       </pc:sldChg>
-      <pc:sldChg chg="addSp modSp">
-        <pc:chgData name="Hsia, Cheehong" userId="6bc27941-0d5a-4c11-8dfb-8bbe9da0911b" providerId="ADAL" clId="{5BE5096F-7F8C-496A-A13C-FF7D0CA7A6B4}" dt="2024-02-03T15:47:40.382" v="843"/>
+      <pc:sldChg chg="addSp modSp del">
+        <pc:chgData name="Hsia, Cheehong" userId="6bc27941-0d5a-4c11-8dfb-8bbe9da0911b" providerId="ADAL" clId="{5BE5096F-7F8C-496A-A13C-FF7D0CA7A6B4}" dt="2024-02-14T15:23:07.102" v="1111" actId="47"/>
         <pc:sldMkLst>
           <pc:docMk/>
           <pc:sldMk cId="2951154706" sldId="293"/>
@@ -798,11 +966,27 @@
         </pc:picChg>
       </pc:sldChg>
       <pc:sldChg chg="addSp modSp mod">
-        <pc:chgData name="Hsia, Cheehong" userId="6bc27941-0d5a-4c11-8dfb-8bbe9da0911b" providerId="ADAL" clId="{5BE5096F-7F8C-496A-A13C-FF7D0CA7A6B4}" dt="2024-02-03T15:48:33.891" v="845" actId="20577"/>
+        <pc:chgData name="Hsia, Cheehong" userId="6bc27941-0d5a-4c11-8dfb-8bbe9da0911b" providerId="ADAL" clId="{5BE5096F-7F8C-496A-A13C-FF7D0CA7A6B4}" dt="2024-02-14T15:23:49.503" v="1121" actId="20577"/>
         <pc:sldMkLst>
           <pc:docMk/>
           <pc:sldMk cId="3190214858" sldId="296"/>
         </pc:sldMkLst>
+        <pc:spChg chg="mod">
+          <ac:chgData name="Hsia, Cheehong" userId="6bc27941-0d5a-4c11-8dfb-8bbe9da0911b" providerId="ADAL" clId="{5BE5096F-7F8C-496A-A13C-FF7D0CA7A6B4}" dt="2024-02-14T15:23:25.803" v="1117" actId="20577"/>
+          <ac:spMkLst>
+            <pc:docMk/>
+            <pc:sldMk cId="3190214858" sldId="296"/>
+            <ac:spMk id="2" creationId="{AD90CEB0-783B-5FA4-1028-D4B692C5B2CE}"/>
+          </ac:spMkLst>
+        </pc:spChg>
+        <pc:spChg chg="mod">
+          <ac:chgData name="Hsia, Cheehong" userId="6bc27941-0d5a-4c11-8dfb-8bbe9da0911b" providerId="ADAL" clId="{5BE5096F-7F8C-496A-A13C-FF7D0CA7A6B4}" dt="2024-02-14T15:23:49.503" v="1121" actId="20577"/>
+          <ac:spMkLst>
+            <pc:docMk/>
+            <pc:sldMk cId="3190214858" sldId="296"/>
+            <ac:spMk id="4" creationId="{3859056E-FEDA-2D8C-90B8-7DB995ECB8A4}"/>
+          </ac:spMkLst>
+        </pc:spChg>
         <pc:spChg chg="add mod">
           <ac:chgData name="Hsia, Cheehong" userId="6bc27941-0d5a-4c11-8dfb-8bbe9da0911b" providerId="ADAL" clId="{5BE5096F-7F8C-496A-A13C-FF7D0CA7A6B4}" dt="2024-02-03T15:48:33.891" v="845" actId="20577"/>
           <ac:spMkLst>
@@ -812,8 +996,8 @@
           </ac:spMkLst>
         </pc:spChg>
       </pc:sldChg>
-      <pc:sldChg chg="addSp modSp">
-        <pc:chgData name="Hsia, Cheehong" userId="6bc27941-0d5a-4c11-8dfb-8bbe9da0911b" providerId="ADAL" clId="{5BE5096F-7F8C-496A-A13C-FF7D0CA7A6B4}" dt="2024-02-03T15:48:35.964" v="846"/>
+      <pc:sldChg chg="addSp modSp del">
+        <pc:chgData name="Hsia, Cheehong" userId="6bc27941-0d5a-4c11-8dfb-8bbe9da0911b" providerId="ADAL" clId="{5BE5096F-7F8C-496A-A13C-FF7D0CA7A6B4}" dt="2024-02-14T15:23:58.099" v="1122" actId="47"/>
         <pc:sldMkLst>
           <pc:docMk/>
           <pc:sldMk cId="826171372" sldId="297"/>
@@ -828,11 +1012,27 @@
         </pc:spChg>
       </pc:sldChg>
       <pc:sldChg chg="addSp modSp mod">
-        <pc:chgData name="Hsia, Cheehong" userId="6bc27941-0d5a-4c11-8dfb-8bbe9da0911b" providerId="ADAL" clId="{5BE5096F-7F8C-496A-A13C-FF7D0CA7A6B4}" dt="2024-02-03T15:48:40.876" v="849" actId="20577"/>
+        <pc:chgData name="Hsia, Cheehong" userId="6bc27941-0d5a-4c11-8dfb-8bbe9da0911b" providerId="ADAL" clId="{5BE5096F-7F8C-496A-A13C-FF7D0CA7A6B4}" dt="2024-02-14T15:24:23.724" v="1131" actId="20577"/>
         <pc:sldMkLst>
           <pc:docMk/>
           <pc:sldMk cId="2752436879" sldId="298"/>
         </pc:sldMkLst>
+        <pc:spChg chg="mod">
+          <ac:chgData name="Hsia, Cheehong" userId="6bc27941-0d5a-4c11-8dfb-8bbe9da0911b" providerId="ADAL" clId="{5BE5096F-7F8C-496A-A13C-FF7D0CA7A6B4}" dt="2024-02-14T15:24:16.544" v="1128" actId="20577"/>
+          <ac:spMkLst>
+            <pc:docMk/>
+            <pc:sldMk cId="2752436879" sldId="298"/>
+            <ac:spMk id="2" creationId="{AD90CEB0-783B-5FA4-1028-D4B692C5B2CE}"/>
+          </ac:spMkLst>
+        </pc:spChg>
+        <pc:spChg chg="mod">
+          <ac:chgData name="Hsia, Cheehong" userId="6bc27941-0d5a-4c11-8dfb-8bbe9da0911b" providerId="ADAL" clId="{5BE5096F-7F8C-496A-A13C-FF7D0CA7A6B4}" dt="2024-02-14T15:24:23.724" v="1131" actId="20577"/>
+          <ac:spMkLst>
+            <pc:docMk/>
+            <pc:sldMk cId="2752436879" sldId="298"/>
+            <ac:spMk id="4" creationId="{3859056E-FEDA-2D8C-90B8-7DB995ECB8A4}"/>
+          </ac:spMkLst>
+        </pc:spChg>
         <pc:spChg chg="add mod">
           <ac:chgData name="Hsia, Cheehong" userId="6bc27941-0d5a-4c11-8dfb-8bbe9da0911b" providerId="ADAL" clId="{5BE5096F-7F8C-496A-A13C-FF7D0CA7A6B4}" dt="2024-02-03T15:48:40.876" v="849" actId="20577"/>
           <ac:spMkLst>
@@ -842,8 +1042,8 @@
           </ac:spMkLst>
         </pc:spChg>
       </pc:sldChg>
-      <pc:sldChg chg="addSp modSp">
-        <pc:chgData name="Hsia, Cheehong" userId="6bc27941-0d5a-4c11-8dfb-8bbe9da0911b" providerId="ADAL" clId="{5BE5096F-7F8C-496A-A13C-FF7D0CA7A6B4}" dt="2024-02-03T15:48:46.723" v="850"/>
+      <pc:sldChg chg="addSp modSp del">
+        <pc:chgData name="Hsia, Cheehong" userId="6bc27941-0d5a-4c11-8dfb-8bbe9da0911b" providerId="ADAL" clId="{5BE5096F-7F8C-496A-A13C-FF7D0CA7A6B4}" dt="2024-02-14T15:24:27.336" v="1132" actId="47"/>
         <pc:sldMkLst>
           <pc:docMk/>
           <pc:sldMk cId="217489594" sldId="299"/>
@@ -858,11 +1058,27 @@
         </pc:spChg>
       </pc:sldChg>
       <pc:sldChg chg="addSp modSp mod">
-        <pc:chgData name="Hsia, Cheehong" userId="6bc27941-0d5a-4c11-8dfb-8bbe9da0911b" providerId="ADAL" clId="{5BE5096F-7F8C-496A-A13C-FF7D0CA7A6B4}" dt="2024-02-03T15:48:56.170" v="853" actId="20577"/>
+        <pc:chgData name="Hsia, Cheehong" userId="6bc27941-0d5a-4c11-8dfb-8bbe9da0911b" providerId="ADAL" clId="{5BE5096F-7F8C-496A-A13C-FF7D0CA7A6B4}" dt="2024-02-14T15:24:52.407" v="1141" actId="20577"/>
         <pc:sldMkLst>
           <pc:docMk/>
           <pc:sldMk cId="2193924565" sldId="300"/>
         </pc:sldMkLst>
+        <pc:spChg chg="mod">
+          <ac:chgData name="Hsia, Cheehong" userId="6bc27941-0d5a-4c11-8dfb-8bbe9da0911b" providerId="ADAL" clId="{5BE5096F-7F8C-496A-A13C-FF7D0CA7A6B4}" dt="2024-02-14T15:24:42.813" v="1138" actId="20577"/>
+          <ac:spMkLst>
+            <pc:docMk/>
+            <pc:sldMk cId="2193924565" sldId="300"/>
+            <ac:spMk id="2" creationId="{AD90CEB0-783B-5FA4-1028-D4B692C5B2CE}"/>
+          </ac:spMkLst>
+        </pc:spChg>
+        <pc:spChg chg="mod">
+          <ac:chgData name="Hsia, Cheehong" userId="6bc27941-0d5a-4c11-8dfb-8bbe9da0911b" providerId="ADAL" clId="{5BE5096F-7F8C-496A-A13C-FF7D0CA7A6B4}" dt="2024-02-14T15:24:52.407" v="1141" actId="20577"/>
+          <ac:spMkLst>
+            <pc:docMk/>
+            <pc:sldMk cId="2193924565" sldId="300"/>
+            <ac:spMk id="4" creationId="{3859056E-FEDA-2D8C-90B8-7DB995ECB8A4}"/>
+          </ac:spMkLst>
+        </pc:spChg>
         <pc:spChg chg="add mod">
           <ac:chgData name="Hsia, Cheehong" userId="6bc27941-0d5a-4c11-8dfb-8bbe9da0911b" providerId="ADAL" clId="{5BE5096F-7F8C-496A-A13C-FF7D0CA7A6B4}" dt="2024-02-03T15:48:56.170" v="853" actId="20577"/>
           <ac:spMkLst>
@@ -872,8 +1088,8 @@
           </ac:spMkLst>
         </pc:spChg>
       </pc:sldChg>
-      <pc:sldChg chg="addSp modSp">
-        <pc:chgData name="Hsia, Cheehong" userId="6bc27941-0d5a-4c11-8dfb-8bbe9da0911b" providerId="ADAL" clId="{5BE5096F-7F8C-496A-A13C-FF7D0CA7A6B4}" dt="2024-02-03T15:48:58.780" v="854"/>
+      <pc:sldChg chg="addSp modSp del">
+        <pc:chgData name="Hsia, Cheehong" userId="6bc27941-0d5a-4c11-8dfb-8bbe9da0911b" providerId="ADAL" clId="{5BE5096F-7F8C-496A-A13C-FF7D0CA7A6B4}" dt="2024-02-14T15:24:57.186" v="1142" actId="47"/>
         <pc:sldMkLst>
           <pc:docMk/>
           <pc:sldMk cId="2693914518" sldId="301"/>
@@ -888,11 +1104,27 @@
         </pc:spChg>
       </pc:sldChg>
       <pc:sldChg chg="addSp modSp mod">
-        <pc:chgData name="Hsia, Cheehong" userId="6bc27941-0d5a-4c11-8dfb-8bbe9da0911b" providerId="ADAL" clId="{5BE5096F-7F8C-496A-A13C-FF7D0CA7A6B4}" dt="2024-02-03T15:49:05.730" v="857" actId="20577"/>
+        <pc:chgData name="Hsia, Cheehong" userId="6bc27941-0d5a-4c11-8dfb-8bbe9da0911b" providerId="ADAL" clId="{5BE5096F-7F8C-496A-A13C-FF7D0CA7A6B4}" dt="2024-02-14T15:25:14.635" v="1148" actId="255"/>
         <pc:sldMkLst>
           <pc:docMk/>
           <pc:sldMk cId="155960899" sldId="302"/>
         </pc:sldMkLst>
+        <pc:spChg chg="mod">
+          <ac:chgData name="Hsia, Cheehong" userId="6bc27941-0d5a-4c11-8dfb-8bbe9da0911b" providerId="ADAL" clId="{5BE5096F-7F8C-496A-A13C-FF7D0CA7A6B4}" dt="2024-02-14T15:25:09.006" v="1146" actId="255"/>
+          <ac:spMkLst>
+            <pc:docMk/>
+            <pc:sldMk cId="155960899" sldId="302"/>
+            <ac:spMk id="2" creationId="{AD90CEB0-783B-5FA4-1028-D4B692C5B2CE}"/>
+          </ac:spMkLst>
+        </pc:spChg>
+        <pc:spChg chg="mod">
+          <ac:chgData name="Hsia, Cheehong" userId="6bc27941-0d5a-4c11-8dfb-8bbe9da0911b" providerId="ADAL" clId="{5BE5096F-7F8C-496A-A13C-FF7D0CA7A6B4}" dt="2024-02-14T15:25:14.635" v="1148" actId="255"/>
+          <ac:spMkLst>
+            <pc:docMk/>
+            <pc:sldMk cId="155960899" sldId="302"/>
+            <ac:spMk id="4" creationId="{3859056E-FEDA-2D8C-90B8-7DB995ECB8A4}"/>
+          </ac:spMkLst>
+        </pc:spChg>
         <pc:spChg chg="add mod">
           <ac:chgData name="Hsia, Cheehong" userId="6bc27941-0d5a-4c11-8dfb-8bbe9da0911b" providerId="ADAL" clId="{5BE5096F-7F8C-496A-A13C-FF7D0CA7A6B4}" dt="2024-02-03T15:49:05.730" v="857" actId="20577"/>
           <ac:spMkLst>
@@ -902,8 +1134,8 @@
           </ac:spMkLst>
         </pc:spChg>
       </pc:sldChg>
-      <pc:sldChg chg="addSp modSp">
-        <pc:chgData name="Hsia, Cheehong" userId="6bc27941-0d5a-4c11-8dfb-8bbe9da0911b" providerId="ADAL" clId="{5BE5096F-7F8C-496A-A13C-FF7D0CA7A6B4}" dt="2024-02-03T15:49:08.951" v="858"/>
+      <pc:sldChg chg="addSp modSp del">
+        <pc:chgData name="Hsia, Cheehong" userId="6bc27941-0d5a-4c11-8dfb-8bbe9da0911b" providerId="ADAL" clId="{5BE5096F-7F8C-496A-A13C-FF7D0CA7A6B4}" dt="2024-02-14T15:25:18.004" v="1149" actId="47"/>
         <pc:sldMkLst>
           <pc:docMk/>
           <pc:sldMk cId="4239895058" sldId="303"/>
@@ -918,11 +1150,27 @@
         </pc:spChg>
       </pc:sldChg>
       <pc:sldChg chg="addSp modSp mod">
-        <pc:chgData name="Hsia, Cheehong" userId="6bc27941-0d5a-4c11-8dfb-8bbe9da0911b" providerId="ADAL" clId="{5BE5096F-7F8C-496A-A13C-FF7D0CA7A6B4}" dt="2024-02-03T15:49:13.900" v="861" actId="20577"/>
+        <pc:chgData name="Hsia, Cheehong" userId="6bc27941-0d5a-4c11-8dfb-8bbe9da0911b" providerId="ADAL" clId="{5BE5096F-7F8C-496A-A13C-FF7D0CA7A6B4}" dt="2024-02-14T15:25:39.039" v="1156" actId="255"/>
         <pc:sldMkLst>
           <pc:docMk/>
           <pc:sldMk cId="1487932769" sldId="304"/>
         </pc:sldMkLst>
+        <pc:spChg chg="mod">
+          <ac:chgData name="Hsia, Cheehong" userId="6bc27941-0d5a-4c11-8dfb-8bbe9da0911b" providerId="ADAL" clId="{5BE5096F-7F8C-496A-A13C-FF7D0CA7A6B4}" dt="2024-02-14T15:25:33.114" v="1154" actId="20577"/>
+          <ac:spMkLst>
+            <pc:docMk/>
+            <pc:sldMk cId="1487932769" sldId="304"/>
+            <ac:spMk id="2" creationId="{AD90CEB0-783B-5FA4-1028-D4B692C5B2CE}"/>
+          </ac:spMkLst>
+        </pc:spChg>
+        <pc:spChg chg="mod">
+          <ac:chgData name="Hsia, Cheehong" userId="6bc27941-0d5a-4c11-8dfb-8bbe9da0911b" providerId="ADAL" clId="{5BE5096F-7F8C-496A-A13C-FF7D0CA7A6B4}" dt="2024-02-14T15:25:39.039" v="1156" actId="255"/>
+          <ac:spMkLst>
+            <pc:docMk/>
+            <pc:sldMk cId="1487932769" sldId="304"/>
+            <ac:spMk id="4" creationId="{3859056E-FEDA-2D8C-90B8-7DB995ECB8A4}"/>
+          </ac:spMkLst>
+        </pc:spChg>
         <pc:spChg chg="add mod">
           <ac:chgData name="Hsia, Cheehong" userId="6bc27941-0d5a-4c11-8dfb-8bbe9da0911b" providerId="ADAL" clId="{5BE5096F-7F8C-496A-A13C-FF7D0CA7A6B4}" dt="2024-02-03T15:49:13.900" v="861" actId="20577"/>
           <ac:spMkLst>
@@ -932,8 +1180,8 @@
           </ac:spMkLst>
         </pc:spChg>
       </pc:sldChg>
-      <pc:sldChg chg="addSp modSp">
-        <pc:chgData name="Hsia, Cheehong" userId="6bc27941-0d5a-4c11-8dfb-8bbe9da0911b" providerId="ADAL" clId="{5BE5096F-7F8C-496A-A13C-FF7D0CA7A6B4}" dt="2024-02-03T15:49:18.534" v="862"/>
+      <pc:sldChg chg="addSp modSp del">
+        <pc:chgData name="Hsia, Cheehong" userId="6bc27941-0d5a-4c11-8dfb-8bbe9da0911b" providerId="ADAL" clId="{5BE5096F-7F8C-496A-A13C-FF7D0CA7A6B4}" dt="2024-02-14T15:25:43.086" v="1157" actId="47"/>
         <pc:sldMkLst>
           <pc:docMk/>
           <pc:sldMk cId="178219345" sldId="305"/>
@@ -948,11 +1196,27 @@
         </pc:spChg>
       </pc:sldChg>
       <pc:sldChg chg="addSp modSp mod">
-        <pc:chgData name="Hsia, Cheehong" userId="6bc27941-0d5a-4c11-8dfb-8bbe9da0911b" providerId="ADAL" clId="{5BE5096F-7F8C-496A-A13C-FF7D0CA7A6B4}" dt="2024-02-03T15:49:31.273" v="865" actId="20577"/>
+        <pc:chgData name="Hsia, Cheehong" userId="6bc27941-0d5a-4c11-8dfb-8bbe9da0911b" providerId="ADAL" clId="{5BE5096F-7F8C-496A-A13C-FF7D0CA7A6B4}" dt="2024-02-14T15:26:14.343" v="1166" actId="20577"/>
         <pc:sldMkLst>
           <pc:docMk/>
           <pc:sldMk cId="961020213" sldId="308"/>
         </pc:sldMkLst>
+        <pc:spChg chg="mod">
+          <ac:chgData name="Hsia, Cheehong" userId="6bc27941-0d5a-4c11-8dfb-8bbe9da0911b" providerId="ADAL" clId="{5BE5096F-7F8C-496A-A13C-FF7D0CA7A6B4}" dt="2024-02-14T15:26:03.778" v="1161" actId="255"/>
+          <ac:spMkLst>
+            <pc:docMk/>
+            <pc:sldMk cId="961020213" sldId="308"/>
+            <ac:spMk id="2" creationId="{9024BA51-C630-BA2A-58B6-69F9BB6816A0}"/>
+          </ac:spMkLst>
+        </pc:spChg>
+        <pc:spChg chg="mod">
+          <ac:chgData name="Hsia, Cheehong" userId="6bc27941-0d5a-4c11-8dfb-8bbe9da0911b" providerId="ADAL" clId="{5BE5096F-7F8C-496A-A13C-FF7D0CA7A6B4}" dt="2024-02-14T15:26:14.343" v="1166" actId="20577"/>
+          <ac:spMkLst>
+            <pc:docMk/>
+            <pc:sldMk cId="961020213" sldId="308"/>
+            <ac:spMk id="4" creationId="{8946D5DF-DDC9-DF42-4883-DA9549CF8DE5}"/>
+          </ac:spMkLst>
+        </pc:spChg>
         <pc:spChg chg="add mod">
           <ac:chgData name="Hsia, Cheehong" userId="6bc27941-0d5a-4c11-8dfb-8bbe9da0911b" providerId="ADAL" clId="{5BE5096F-7F8C-496A-A13C-FF7D0CA7A6B4}" dt="2024-02-03T15:49:31.273" v="865" actId="20577"/>
           <ac:spMkLst>
@@ -962,8 +1226,8 @@
           </ac:spMkLst>
         </pc:spChg>
       </pc:sldChg>
-      <pc:sldChg chg="addSp modSp">
-        <pc:chgData name="Hsia, Cheehong" userId="6bc27941-0d5a-4c11-8dfb-8bbe9da0911b" providerId="ADAL" clId="{5BE5096F-7F8C-496A-A13C-FF7D0CA7A6B4}" dt="2024-02-03T15:49:33.609" v="866"/>
+      <pc:sldChg chg="addSp modSp del">
+        <pc:chgData name="Hsia, Cheehong" userId="6bc27941-0d5a-4c11-8dfb-8bbe9da0911b" providerId="ADAL" clId="{5BE5096F-7F8C-496A-A13C-FF7D0CA7A6B4}" dt="2024-02-14T15:26:17.372" v="1167" actId="47"/>
         <pc:sldMkLst>
           <pc:docMk/>
           <pc:sldMk cId="415980821" sldId="309"/>
@@ -978,11 +1242,27 @@
         </pc:spChg>
       </pc:sldChg>
       <pc:sldChg chg="addSp modSp mod">
-        <pc:chgData name="Hsia, Cheehong" userId="6bc27941-0d5a-4c11-8dfb-8bbe9da0911b" providerId="ADAL" clId="{5BE5096F-7F8C-496A-A13C-FF7D0CA7A6B4}" dt="2024-02-03T15:49:39.036" v="868" actId="20577"/>
+        <pc:chgData name="Hsia, Cheehong" userId="6bc27941-0d5a-4c11-8dfb-8bbe9da0911b" providerId="ADAL" clId="{5BE5096F-7F8C-496A-A13C-FF7D0CA7A6B4}" dt="2024-02-14T15:26:34.448" v="1175" actId="20577"/>
         <pc:sldMkLst>
           <pc:docMk/>
           <pc:sldMk cId="1482915617" sldId="310"/>
         </pc:sldMkLst>
+        <pc:spChg chg="mod">
+          <ac:chgData name="Hsia, Cheehong" userId="6bc27941-0d5a-4c11-8dfb-8bbe9da0911b" providerId="ADAL" clId="{5BE5096F-7F8C-496A-A13C-FF7D0CA7A6B4}" dt="2024-02-14T15:26:26.946" v="1171" actId="255"/>
+          <ac:spMkLst>
+            <pc:docMk/>
+            <pc:sldMk cId="1482915617" sldId="310"/>
+            <ac:spMk id="2" creationId="{9024BA51-C630-BA2A-58B6-69F9BB6816A0}"/>
+          </ac:spMkLst>
+        </pc:spChg>
+        <pc:spChg chg="mod">
+          <ac:chgData name="Hsia, Cheehong" userId="6bc27941-0d5a-4c11-8dfb-8bbe9da0911b" providerId="ADAL" clId="{5BE5096F-7F8C-496A-A13C-FF7D0CA7A6B4}" dt="2024-02-14T15:26:34.448" v="1175" actId="20577"/>
+          <ac:spMkLst>
+            <pc:docMk/>
+            <pc:sldMk cId="1482915617" sldId="310"/>
+            <ac:spMk id="4" creationId="{8946D5DF-DDC9-DF42-4883-DA9549CF8DE5}"/>
+          </ac:spMkLst>
+        </pc:spChg>
         <pc:spChg chg="add mod">
           <ac:chgData name="Hsia, Cheehong" userId="6bc27941-0d5a-4c11-8dfb-8bbe9da0911b" providerId="ADAL" clId="{5BE5096F-7F8C-496A-A13C-FF7D0CA7A6B4}" dt="2024-02-03T15:49:39.036" v="868" actId="20577"/>
           <ac:spMkLst>
@@ -992,8 +1272,8 @@
           </ac:spMkLst>
         </pc:spChg>
       </pc:sldChg>
-      <pc:sldChg chg="addSp modSp">
-        <pc:chgData name="Hsia, Cheehong" userId="6bc27941-0d5a-4c11-8dfb-8bbe9da0911b" providerId="ADAL" clId="{5BE5096F-7F8C-496A-A13C-FF7D0CA7A6B4}" dt="2024-02-03T15:49:41.631" v="869"/>
+      <pc:sldChg chg="addSp modSp del">
+        <pc:chgData name="Hsia, Cheehong" userId="6bc27941-0d5a-4c11-8dfb-8bbe9da0911b" providerId="ADAL" clId="{5BE5096F-7F8C-496A-A13C-FF7D0CA7A6B4}" dt="2024-02-14T15:26:38.983" v="1176" actId="47"/>
         <pc:sldMkLst>
           <pc:docMk/>
           <pc:sldMk cId="1467359079" sldId="311"/>
@@ -1008,11 +1288,27 @@
         </pc:spChg>
       </pc:sldChg>
       <pc:sldChg chg="addSp modSp mod">
-        <pc:chgData name="Hsia, Cheehong" userId="6bc27941-0d5a-4c11-8dfb-8bbe9da0911b" providerId="ADAL" clId="{5BE5096F-7F8C-496A-A13C-FF7D0CA7A6B4}" dt="2024-02-03T15:49:48.203" v="872" actId="20577"/>
+        <pc:chgData name="Hsia, Cheehong" userId="6bc27941-0d5a-4c11-8dfb-8bbe9da0911b" providerId="ADAL" clId="{5BE5096F-7F8C-496A-A13C-FF7D0CA7A6B4}" dt="2024-02-14T15:27:53.942" v="1326" actId="20577"/>
         <pc:sldMkLst>
           <pc:docMk/>
           <pc:sldMk cId="3790017242" sldId="312"/>
         </pc:sldMkLst>
+        <pc:spChg chg="mod">
+          <ac:chgData name="Hsia, Cheehong" userId="6bc27941-0d5a-4c11-8dfb-8bbe9da0911b" providerId="ADAL" clId="{5BE5096F-7F8C-496A-A13C-FF7D0CA7A6B4}" dt="2024-02-14T15:27:12.206" v="1227" actId="20577"/>
+          <ac:spMkLst>
+            <pc:docMk/>
+            <pc:sldMk cId="3790017242" sldId="312"/>
+            <ac:spMk id="2" creationId="{9024BA51-C630-BA2A-58B6-69F9BB6816A0}"/>
+          </ac:spMkLst>
+        </pc:spChg>
+        <pc:spChg chg="mod">
+          <ac:chgData name="Hsia, Cheehong" userId="6bc27941-0d5a-4c11-8dfb-8bbe9da0911b" providerId="ADAL" clId="{5BE5096F-7F8C-496A-A13C-FF7D0CA7A6B4}" dt="2024-02-14T15:27:53.942" v="1326" actId="20577"/>
+          <ac:spMkLst>
+            <pc:docMk/>
+            <pc:sldMk cId="3790017242" sldId="312"/>
+            <ac:spMk id="4" creationId="{8946D5DF-DDC9-DF42-4883-DA9549CF8DE5}"/>
+          </ac:spMkLst>
+        </pc:spChg>
         <pc:spChg chg="add mod">
           <ac:chgData name="Hsia, Cheehong" userId="6bc27941-0d5a-4c11-8dfb-8bbe9da0911b" providerId="ADAL" clId="{5BE5096F-7F8C-496A-A13C-FF7D0CA7A6B4}" dt="2024-02-03T15:49:48.203" v="872" actId="20577"/>
           <ac:spMkLst>
@@ -1022,8 +1318,8 @@
           </ac:spMkLst>
         </pc:spChg>
       </pc:sldChg>
-      <pc:sldChg chg="addSp modSp">
-        <pc:chgData name="Hsia, Cheehong" userId="6bc27941-0d5a-4c11-8dfb-8bbe9da0911b" providerId="ADAL" clId="{5BE5096F-7F8C-496A-A13C-FF7D0CA7A6B4}" dt="2024-02-03T15:49:51.097" v="873"/>
+      <pc:sldChg chg="addSp modSp del">
+        <pc:chgData name="Hsia, Cheehong" userId="6bc27941-0d5a-4c11-8dfb-8bbe9da0911b" providerId="ADAL" clId="{5BE5096F-7F8C-496A-A13C-FF7D0CA7A6B4}" dt="2024-02-14T15:28:00.058" v="1327" actId="47"/>
         <pc:sldMkLst>
           <pc:docMk/>
           <pc:sldMk cId="2313812796" sldId="313"/>
@@ -1038,11 +1334,27 @@
         </pc:spChg>
       </pc:sldChg>
       <pc:sldChg chg="addSp modSp mod">
-        <pc:chgData name="Hsia, Cheehong" userId="6bc27941-0d5a-4c11-8dfb-8bbe9da0911b" providerId="ADAL" clId="{5BE5096F-7F8C-496A-A13C-FF7D0CA7A6B4}" dt="2024-02-03T15:50:01.487" v="875" actId="20577"/>
+        <pc:chgData name="Hsia, Cheehong" userId="6bc27941-0d5a-4c11-8dfb-8bbe9da0911b" providerId="ADAL" clId="{5BE5096F-7F8C-496A-A13C-FF7D0CA7A6B4}" dt="2024-02-14T15:29:07.335" v="1483" actId="20577"/>
         <pc:sldMkLst>
           <pc:docMk/>
           <pc:sldMk cId="2198057494" sldId="314"/>
         </pc:sldMkLst>
+        <pc:spChg chg="mod">
+          <ac:chgData name="Hsia, Cheehong" userId="6bc27941-0d5a-4c11-8dfb-8bbe9da0911b" providerId="ADAL" clId="{5BE5096F-7F8C-496A-A13C-FF7D0CA7A6B4}" dt="2024-02-14T15:28:35.051" v="1395" actId="20577"/>
+          <ac:spMkLst>
+            <pc:docMk/>
+            <pc:sldMk cId="2198057494" sldId="314"/>
+            <ac:spMk id="2" creationId="{9024BA51-C630-BA2A-58B6-69F9BB6816A0}"/>
+          </ac:spMkLst>
+        </pc:spChg>
+        <pc:spChg chg="mod">
+          <ac:chgData name="Hsia, Cheehong" userId="6bc27941-0d5a-4c11-8dfb-8bbe9da0911b" providerId="ADAL" clId="{5BE5096F-7F8C-496A-A13C-FF7D0CA7A6B4}" dt="2024-02-14T15:29:07.335" v="1483" actId="20577"/>
+          <ac:spMkLst>
+            <pc:docMk/>
+            <pc:sldMk cId="2198057494" sldId="314"/>
+            <ac:spMk id="4" creationId="{8946D5DF-DDC9-DF42-4883-DA9549CF8DE5}"/>
+          </ac:spMkLst>
+        </pc:spChg>
         <pc:spChg chg="add mod">
           <ac:chgData name="Hsia, Cheehong" userId="6bc27941-0d5a-4c11-8dfb-8bbe9da0911b" providerId="ADAL" clId="{5BE5096F-7F8C-496A-A13C-FF7D0CA7A6B4}" dt="2024-02-03T15:50:01.487" v="875" actId="20577"/>
           <ac:spMkLst>
@@ -1052,8 +1364,8 @@
           </ac:spMkLst>
         </pc:spChg>
       </pc:sldChg>
-      <pc:sldChg chg="addSp modSp">
-        <pc:chgData name="Hsia, Cheehong" userId="6bc27941-0d5a-4c11-8dfb-8bbe9da0911b" providerId="ADAL" clId="{5BE5096F-7F8C-496A-A13C-FF7D0CA7A6B4}" dt="2024-02-03T15:50:04.971" v="876"/>
+      <pc:sldChg chg="addSp modSp del">
+        <pc:chgData name="Hsia, Cheehong" userId="6bc27941-0d5a-4c11-8dfb-8bbe9da0911b" providerId="ADAL" clId="{5BE5096F-7F8C-496A-A13C-FF7D0CA7A6B4}" dt="2024-02-14T15:29:13.288" v="1484" actId="47"/>
         <pc:sldMkLst>
           <pc:docMk/>
           <pc:sldMk cId="2393475525" sldId="315"/>
@@ -1068,11 +1380,27 @@
         </pc:spChg>
       </pc:sldChg>
       <pc:sldChg chg="addSp modSp mod">
-        <pc:chgData name="Hsia, Cheehong" userId="6bc27941-0d5a-4c11-8dfb-8bbe9da0911b" providerId="ADAL" clId="{5BE5096F-7F8C-496A-A13C-FF7D0CA7A6B4}" dt="2024-02-03T15:50:15.430" v="879" actId="20577"/>
+        <pc:chgData name="Hsia, Cheehong" userId="6bc27941-0d5a-4c11-8dfb-8bbe9da0911b" providerId="ADAL" clId="{5BE5096F-7F8C-496A-A13C-FF7D0CA7A6B4}" dt="2024-02-14T15:30:20.423" v="1621" actId="20577"/>
         <pc:sldMkLst>
           <pc:docMk/>
           <pc:sldMk cId="1870647430" sldId="316"/>
         </pc:sldMkLst>
+        <pc:spChg chg="mod">
+          <ac:chgData name="Hsia, Cheehong" userId="6bc27941-0d5a-4c11-8dfb-8bbe9da0911b" providerId="ADAL" clId="{5BE5096F-7F8C-496A-A13C-FF7D0CA7A6B4}" dt="2024-02-14T15:29:45.483" v="1536" actId="20577"/>
+          <ac:spMkLst>
+            <pc:docMk/>
+            <pc:sldMk cId="1870647430" sldId="316"/>
+            <ac:spMk id="2" creationId="{9024BA51-C630-BA2A-58B6-69F9BB6816A0}"/>
+          </ac:spMkLst>
+        </pc:spChg>
+        <pc:spChg chg="mod">
+          <ac:chgData name="Hsia, Cheehong" userId="6bc27941-0d5a-4c11-8dfb-8bbe9da0911b" providerId="ADAL" clId="{5BE5096F-7F8C-496A-A13C-FF7D0CA7A6B4}" dt="2024-02-14T15:30:20.423" v="1621" actId="20577"/>
+          <ac:spMkLst>
+            <pc:docMk/>
+            <pc:sldMk cId="1870647430" sldId="316"/>
+            <ac:spMk id="4" creationId="{8946D5DF-DDC9-DF42-4883-DA9549CF8DE5}"/>
+          </ac:spMkLst>
+        </pc:spChg>
         <pc:spChg chg="add mod">
           <ac:chgData name="Hsia, Cheehong" userId="6bc27941-0d5a-4c11-8dfb-8bbe9da0911b" providerId="ADAL" clId="{5BE5096F-7F8C-496A-A13C-FF7D0CA7A6B4}" dt="2024-02-03T15:50:15.430" v="879" actId="20577"/>
           <ac:spMkLst>
@@ -1082,8 +1410,8 @@
           </ac:spMkLst>
         </pc:spChg>
       </pc:sldChg>
-      <pc:sldChg chg="addSp modSp">
-        <pc:chgData name="Hsia, Cheehong" userId="6bc27941-0d5a-4c11-8dfb-8bbe9da0911b" providerId="ADAL" clId="{5BE5096F-7F8C-496A-A13C-FF7D0CA7A6B4}" dt="2024-02-03T15:50:17.421" v="880"/>
+      <pc:sldChg chg="addSp modSp del">
+        <pc:chgData name="Hsia, Cheehong" userId="6bc27941-0d5a-4c11-8dfb-8bbe9da0911b" providerId="ADAL" clId="{5BE5096F-7F8C-496A-A13C-FF7D0CA7A6B4}" dt="2024-02-14T15:30:25.141" v="1622" actId="47"/>
         <pc:sldMkLst>
           <pc:docMk/>
           <pc:sldMk cId="1520640515" sldId="317"/>
@@ -1371,6 +1699,786 @@
           <pc:docMk/>
           <pc:sldMk cId="2178182827" sldId="320"/>
         </pc:sldMkLst>
+      </pc:sldChg>
+      <pc:sldChg chg="modSp add mod modClrScheme chgLayout">
+        <pc:chgData name="Hsia, Cheehong" userId="6bc27941-0d5a-4c11-8dfb-8bbe9da0911b" providerId="ADAL" clId="{5BE5096F-7F8C-496A-A13C-FF7D0CA7A6B4}" dt="2024-02-14T15:18:42.673" v="1037" actId="20577"/>
+        <pc:sldMkLst>
+          <pc:docMk/>
+          <pc:sldMk cId="2830884995" sldId="321"/>
+        </pc:sldMkLst>
+        <pc:spChg chg="mod ord">
+          <ac:chgData name="Hsia, Cheehong" userId="6bc27941-0d5a-4c11-8dfb-8bbe9da0911b" providerId="ADAL" clId="{5BE5096F-7F8C-496A-A13C-FF7D0CA7A6B4}" dt="2024-02-14T15:18:42.673" v="1037" actId="20577"/>
+          <ac:spMkLst>
+            <pc:docMk/>
+            <pc:sldMk cId="2830884995" sldId="321"/>
+            <ac:spMk id="2" creationId="{700D1D6A-607B-8919-A042-BCCDC9CF0CF0}"/>
+          </ac:spMkLst>
+        </pc:spChg>
+        <pc:spChg chg="mod ord">
+          <ac:chgData name="Hsia, Cheehong" userId="6bc27941-0d5a-4c11-8dfb-8bbe9da0911b" providerId="ADAL" clId="{5BE5096F-7F8C-496A-A13C-FF7D0CA7A6B4}" dt="2024-02-14T15:17:41.464" v="1030" actId="700"/>
+          <ac:spMkLst>
+            <pc:docMk/>
+            <pc:sldMk cId="2830884995" sldId="321"/>
+            <ac:spMk id="3" creationId="{DB4E66FB-476A-BB21-1B46-4C8125462E5C}"/>
+          </ac:spMkLst>
+        </pc:spChg>
+        <pc:spChg chg="mod ord">
+          <ac:chgData name="Hsia, Cheehong" userId="6bc27941-0d5a-4c11-8dfb-8bbe9da0911b" providerId="ADAL" clId="{5BE5096F-7F8C-496A-A13C-FF7D0CA7A6B4}" dt="2024-02-14T15:17:41.464" v="1030" actId="700"/>
+          <ac:spMkLst>
+            <pc:docMk/>
+            <pc:sldMk cId="2830884995" sldId="321"/>
+            <ac:spMk id="4" creationId="{101FB840-DD80-334A-87FD-81DC71AD8A57}"/>
+          </ac:spMkLst>
+        </pc:spChg>
+        <pc:spChg chg="mod ord">
+          <ac:chgData name="Hsia, Cheehong" userId="6bc27941-0d5a-4c11-8dfb-8bbe9da0911b" providerId="ADAL" clId="{5BE5096F-7F8C-496A-A13C-FF7D0CA7A6B4}" dt="2024-02-14T15:17:41.464" v="1030" actId="700"/>
+          <ac:spMkLst>
+            <pc:docMk/>
+            <pc:sldMk cId="2830884995" sldId="321"/>
+            <ac:spMk id="5" creationId="{3994DC0B-F72F-6BFF-C694-00CBF68920C1}"/>
+          </ac:spMkLst>
+        </pc:spChg>
+      </pc:sldChg>
+      <pc:sldChg chg="modSp add mod modClrScheme chgLayout">
+        <pc:chgData name="Hsia, Cheehong" userId="6bc27941-0d5a-4c11-8dfb-8bbe9da0911b" providerId="ADAL" clId="{5BE5096F-7F8C-496A-A13C-FF7D0CA7A6B4}" dt="2024-02-14T15:18:58.663" v="1040" actId="700"/>
+        <pc:sldMkLst>
+          <pc:docMk/>
+          <pc:sldMk cId="393363697" sldId="322"/>
+        </pc:sldMkLst>
+        <pc:spChg chg="mod ord">
+          <ac:chgData name="Hsia, Cheehong" userId="6bc27941-0d5a-4c11-8dfb-8bbe9da0911b" providerId="ADAL" clId="{5BE5096F-7F8C-496A-A13C-FF7D0CA7A6B4}" dt="2024-02-14T15:18:58.663" v="1040" actId="700"/>
+          <ac:spMkLst>
+            <pc:docMk/>
+            <pc:sldMk cId="393363697" sldId="322"/>
+            <ac:spMk id="2" creationId="{509F87C3-07A1-0EDC-D899-CD15F645C37F}"/>
+          </ac:spMkLst>
+        </pc:spChg>
+        <pc:spChg chg="mod ord">
+          <ac:chgData name="Hsia, Cheehong" userId="6bc27941-0d5a-4c11-8dfb-8bbe9da0911b" providerId="ADAL" clId="{5BE5096F-7F8C-496A-A13C-FF7D0CA7A6B4}" dt="2024-02-14T15:18:58.663" v="1040" actId="700"/>
+          <ac:spMkLst>
+            <pc:docMk/>
+            <pc:sldMk cId="393363697" sldId="322"/>
+            <ac:spMk id="3" creationId="{9B42B0F5-1A67-8C70-FDCF-4C93DB02E94F}"/>
+          </ac:spMkLst>
+        </pc:spChg>
+        <pc:spChg chg="mod ord">
+          <ac:chgData name="Hsia, Cheehong" userId="6bc27941-0d5a-4c11-8dfb-8bbe9da0911b" providerId="ADAL" clId="{5BE5096F-7F8C-496A-A13C-FF7D0CA7A6B4}" dt="2024-02-14T15:18:58.663" v="1040" actId="700"/>
+          <ac:spMkLst>
+            <pc:docMk/>
+            <pc:sldMk cId="393363697" sldId="322"/>
+            <ac:spMk id="4" creationId="{AA1D8D56-7997-9149-E3C2-4243BC163909}"/>
+          </ac:spMkLst>
+        </pc:spChg>
+        <pc:spChg chg="mod ord">
+          <ac:chgData name="Hsia, Cheehong" userId="6bc27941-0d5a-4c11-8dfb-8bbe9da0911b" providerId="ADAL" clId="{5BE5096F-7F8C-496A-A13C-FF7D0CA7A6B4}" dt="2024-02-14T15:18:58.663" v="1040" actId="700"/>
+          <ac:spMkLst>
+            <pc:docMk/>
+            <pc:sldMk cId="393363697" sldId="322"/>
+            <ac:spMk id="5" creationId="{B975B983-7343-8A2D-4201-2198F0BCF4D0}"/>
+          </ac:spMkLst>
+        </pc:spChg>
+      </pc:sldChg>
+      <pc:sldChg chg="modSp add mod modClrScheme chgLayout">
+        <pc:chgData name="Hsia, Cheehong" userId="6bc27941-0d5a-4c11-8dfb-8bbe9da0911b" providerId="ADAL" clId="{5BE5096F-7F8C-496A-A13C-FF7D0CA7A6B4}" dt="2024-02-14T15:19:29.177" v="1049" actId="700"/>
+        <pc:sldMkLst>
+          <pc:docMk/>
+          <pc:sldMk cId="3631058862" sldId="323"/>
+        </pc:sldMkLst>
+        <pc:spChg chg="mod ord">
+          <ac:chgData name="Hsia, Cheehong" userId="6bc27941-0d5a-4c11-8dfb-8bbe9da0911b" providerId="ADAL" clId="{5BE5096F-7F8C-496A-A13C-FF7D0CA7A6B4}" dt="2024-02-14T15:19:29.177" v="1049" actId="700"/>
+          <ac:spMkLst>
+            <pc:docMk/>
+            <pc:sldMk cId="3631058862" sldId="323"/>
+            <ac:spMk id="2" creationId="{509F87C3-07A1-0EDC-D899-CD15F645C37F}"/>
+          </ac:spMkLst>
+        </pc:spChg>
+        <pc:spChg chg="mod ord">
+          <ac:chgData name="Hsia, Cheehong" userId="6bc27941-0d5a-4c11-8dfb-8bbe9da0911b" providerId="ADAL" clId="{5BE5096F-7F8C-496A-A13C-FF7D0CA7A6B4}" dt="2024-02-14T15:19:29.177" v="1049" actId="700"/>
+          <ac:spMkLst>
+            <pc:docMk/>
+            <pc:sldMk cId="3631058862" sldId="323"/>
+            <ac:spMk id="3" creationId="{9B42B0F5-1A67-8C70-FDCF-4C93DB02E94F}"/>
+          </ac:spMkLst>
+        </pc:spChg>
+        <pc:spChg chg="mod ord">
+          <ac:chgData name="Hsia, Cheehong" userId="6bc27941-0d5a-4c11-8dfb-8bbe9da0911b" providerId="ADAL" clId="{5BE5096F-7F8C-496A-A13C-FF7D0CA7A6B4}" dt="2024-02-14T15:19:29.177" v="1049" actId="700"/>
+          <ac:spMkLst>
+            <pc:docMk/>
+            <pc:sldMk cId="3631058862" sldId="323"/>
+            <ac:spMk id="4" creationId="{AA1D8D56-7997-9149-E3C2-4243BC163909}"/>
+          </ac:spMkLst>
+        </pc:spChg>
+        <pc:spChg chg="mod ord">
+          <ac:chgData name="Hsia, Cheehong" userId="6bc27941-0d5a-4c11-8dfb-8bbe9da0911b" providerId="ADAL" clId="{5BE5096F-7F8C-496A-A13C-FF7D0CA7A6B4}" dt="2024-02-14T15:19:29.177" v="1049" actId="700"/>
+          <ac:spMkLst>
+            <pc:docMk/>
+            <pc:sldMk cId="3631058862" sldId="323"/>
+            <ac:spMk id="5" creationId="{B975B983-7343-8A2D-4201-2198F0BCF4D0}"/>
+          </ac:spMkLst>
+        </pc:spChg>
+      </pc:sldChg>
+      <pc:sldChg chg="modSp add mod modClrScheme chgLayout">
+        <pc:chgData name="Hsia, Cheehong" userId="6bc27941-0d5a-4c11-8dfb-8bbe9da0911b" providerId="ADAL" clId="{5BE5096F-7F8C-496A-A13C-FF7D0CA7A6B4}" dt="2024-02-14T15:20:05.467" v="1059" actId="700"/>
+        <pc:sldMkLst>
+          <pc:docMk/>
+          <pc:sldMk cId="1252257208" sldId="324"/>
+        </pc:sldMkLst>
+        <pc:spChg chg="mod ord">
+          <ac:chgData name="Hsia, Cheehong" userId="6bc27941-0d5a-4c11-8dfb-8bbe9da0911b" providerId="ADAL" clId="{5BE5096F-7F8C-496A-A13C-FF7D0CA7A6B4}" dt="2024-02-14T15:20:05.467" v="1059" actId="700"/>
+          <ac:spMkLst>
+            <pc:docMk/>
+            <pc:sldMk cId="1252257208" sldId="324"/>
+            <ac:spMk id="2" creationId="{509F87C3-07A1-0EDC-D899-CD15F645C37F}"/>
+          </ac:spMkLst>
+        </pc:spChg>
+        <pc:spChg chg="mod ord">
+          <ac:chgData name="Hsia, Cheehong" userId="6bc27941-0d5a-4c11-8dfb-8bbe9da0911b" providerId="ADAL" clId="{5BE5096F-7F8C-496A-A13C-FF7D0CA7A6B4}" dt="2024-02-14T15:20:05.467" v="1059" actId="700"/>
+          <ac:spMkLst>
+            <pc:docMk/>
+            <pc:sldMk cId="1252257208" sldId="324"/>
+            <ac:spMk id="3" creationId="{9B42B0F5-1A67-8C70-FDCF-4C93DB02E94F}"/>
+          </ac:spMkLst>
+        </pc:spChg>
+        <pc:spChg chg="mod ord">
+          <ac:chgData name="Hsia, Cheehong" userId="6bc27941-0d5a-4c11-8dfb-8bbe9da0911b" providerId="ADAL" clId="{5BE5096F-7F8C-496A-A13C-FF7D0CA7A6B4}" dt="2024-02-14T15:20:05.467" v="1059" actId="700"/>
+          <ac:spMkLst>
+            <pc:docMk/>
+            <pc:sldMk cId="1252257208" sldId="324"/>
+            <ac:spMk id="4" creationId="{AA1D8D56-7997-9149-E3C2-4243BC163909}"/>
+          </ac:spMkLst>
+        </pc:spChg>
+        <pc:spChg chg="mod ord">
+          <ac:chgData name="Hsia, Cheehong" userId="6bc27941-0d5a-4c11-8dfb-8bbe9da0911b" providerId="ADAL" clId="{5BE5096F-7F8C-496A-A13C-FF7D0CA7A6B4}" dt="2024-02-14T15:20:05.467" v="1059" actId="700"/>
+          <ac:spMkLst>
+            <pc:docMk/>
+            <pc:sldMk cId="1252257208" sldId="324"/>
+            <ac:spMk id="5" creationId="{B975B983-7343-8A2D-4201-2198F0BCF4D0}"/>
+          </ac:spMkLst>
+        </pc:spChg>
+      </pc:sldChg>
+      <pc:sldChg chg="modSp add mod modClrScheme chgLayout">
+        <pc:chgData name="Hsia, Cheehong" userId="6bc27941-0d5a-4c11-8dfb-8bbe9da0911b" providerId="ADAL" clId="{5BE5096F-7F8C-496A-A13C-FF7D0CA7A6B4}" dt="2024-02-14T15:20:33.361" v="1067" actId="700"/>
+        <pc:sldMkLst>
+          <pc:docMk/>
+          <pc:sldMk cId="1151322812" sldId="325"/>
+        </pc:sldMkLst>
+        <pc:spChg chg="mod ord">
+          <ac:chgData name="Hsia, Cheehong" userId="6bc27941-0d5a-4c11-8dfb-8bbe9da0911b" providerId="ADAL" clId="{5BE5096F-7F8C-496A-A13C-FF7D0CA7A6B4}" dt="2024-02-14T15:20:33.361" v="1067" actId="700"/>
+          <ac:spMkLst>
+            <pc:docMk/>
+            <pc:sldMk cId="1151322812" sldId="325"/>
+            <ac:spMk id="2" creationId="{509F87C3-07A1-0EDC-D899-CD15F645C37F}"/>
+          </ac:spMkLst>
+        </pc:spChg>
+        <pc:spChg chg="mod ord">
+          <ac:chgData name="Hsia, Cheehong" userId="6bc27941-0d5a-4c11-8dfb-8bbe9da0911b" providerId="ADAL" clId="{5BE5096F-7F8C-496A-A13C-FF7D0CA7A6B4}" dt="2024-02-14T15:20:33.361" v="1067" actId="700"/>
+          <ac:spMkLst>
+            <pc:docMk/>
+            <pc:sldMk cId="1151322812" sldId="325"/>
+            <ac:spMk id="3" creationId="{9B42B0F5-1A67-8C70-FDCF-4C93DB02E94F}"/>
+          </ac:spMkLst>
+        </pc:spChg>
+        <pc:spChg chg="mod ord">
+          <ac:chgData name="Hsia, Cheehong" userId="6bc27941-0d5a-4c11-8dfb-8bbe9da0911b" providerId="ADAL" clId="{5BE5096F-7F8C-496A-A13C-FF7D0CA7A6B4}" dt="2024-02-14T15:20:33.361" v="1067" actId="700"/>
+          <ac:spMkLst>
+            <pc:docMk/>
+            <pc:sldMk cId="1151322812" sldId="325"/>
+            <ac:spMk id="4" creationId="{AA1D8D56-7997-9149-E3C2-4243BC163909}"/>
+          </ac:spMkLst>
+        </pc:spChg>
+        <pc:spChg chg="mod ord">
+          <ac:chgData name="Hsia, Cheehong" userId="6bc27941-0d5a-4c11-8dfb-8bbe9da0911b" providerId="ADAL" clId="{5BE5096F-7F8C-496A-A13C-FF7D0CA7A6B4}" dt="2024-02-14T15:20:33.361" v="1067" actId="700"/>
+          <ac:spMkLst>
+            <pc:docMk/>
+            <pc:sldMk cId="1151322812" sldId="325"/>
+            <ac:spMk id="5" creationId="{B975B983-7343-8A2D-4201-2198F0BCF4D0}"/>
+          </ac:spMkLst>
+        </pc:spChg>
+      </pc:sldChg>
+      <pc:sldChg chg="modSp add mod modClrScheme chgLayout">
+        <pc:chgData name="Hsia, Cheehong" userId="6bc27941-0d5a-4c11-8dfb-8bbe9da0911b" providerId="ADAL" clId="{5BE5096F-7F8C-496A-A13C-FF7D0CA7A6B4}" dt="2024-02-14T15:21:09.600" v="1079" actId="700"/>
+        <pc:sldMkLst>
+          <pc:docMk/>
+          <pc:sldMk cId="2954588375" sldId="326"/>
+        </pc:sldMkLst>
+        <pc:spChg chg="mod ord">
+          <ac:chgData name="Hsia, Cheehong" userId="6bc27941-0d5a-4c11-8dfb-8bbe9da0911b" providerId="ADAL" clId="{5BE5096F-7F8C-496A-A13C-FF7D0CA7A6B4}" dt="2024-02-14T15:21:09.600" v="1079" actId="700"/>
+          <ac:spMkLst>
+            <pc:docMk/>
+            <pc:sldMk cId="2954588375" sldId="326"/>
+            <ac:spMk id="2" creationId="{66890E70-EDB5-4D8C-2B4F-029FA9E51D4E}"/>
+          </ac:spMkLst>
+        </pc:spChg>
+        <pc:spChg chg="mod ord">
+          <ac:chgData name="Hsia, Cheehong" userId="6bc27941-0d5a-4c11-8dfb-8bbe9da0911b" providerId="ADAL" clId="{5BE5096F-7F8C-496A-A13C-FF7D0CA7A6B4}" dt="2024-02-14T15:21:09.600" v="1079" actId="700"/>
+          <ac:spMkLst>
+            <pc:docMk/>
+            <pc:sldMk cId="2954588375" sldId="326"/>
+            <ac:spMk id="3" creationId="{0E733FD9-82CF-FCB7-F012-0EAA939C393E}"/>
+          </ac:spMkLst>
+        </pc:spChg>
+        <pc:spChg chg="mod ord">
+          <ac:chgData name="Hsia, Cheehong" userId="6bc27941-0d5a-4c11-8dfb-8bbe9da0911b" providerId="ADAL" clId="{5BE5096F-7F8C-496A-A13C-FF7D0CA7A6B4}" dt="2024-02-14T15:21:09.600" v="1079" actId="700"/>
+          <ac:spMkLst>
+            <pc:docMk/>
+            <pc:sldMk cId="2954588375" sldId="326"/>
+            <ac:spMk id="4" creationId="{F978620C-B722-98CC-0FA2-E22F5047512F}"/>
+          </ac:spMkLst>
+        </pc:spChg>
+        <pc:spChg chg="mod ord">
+          <ac:chgData name="Hsia, Cheehong" userId="6bc27941-0d5a-4c11-8dfb-8bbe9da0911b" providerId="ADAL" clId="{5BE5096F-7F8C-496A-A13C-FF7D0CA7A6B4}" dt="2024-02-14T15:21:09.600" v="1079" actId="700"/>
+          <ac:spMkLst>
+            <pc:docMk/>
+            <pc:sldMk cId="2954588375" sldId="326"/>
+            <ac:spMk id="5" creationId="{CC5FDBA6-3880-4279-5835-037270B656BC}"/>
+          </ac:spMkLst>
+        </pc:spChg>
+      </pc:sldChg>
+      <pc:sldChg chg="modSp add mod modClrScheme chgLayout">
+        <pc:chgData name="Hsia, Cheehong" userId="6bc27941-0d5a-4c11-8dfb-8bbe9da0911b" providerId="ADAL" clId="{5BE5096F-7F8C-496A-A13C-FF7D0CA7A6B4}" dt="2024-02-14T15:21:44.233" v="1090" actId="700"/>
+        <pc:sldMkLst>
+          <pc:docMk/>
+          <pc:sldMk cId="397487342" sldId="327"/>
+        </pc:sldMkLst>
+        <pc:spChg chg="mod ord">
+          <ac:chgData name="Hsia, Cheehong" userId="6bc27941-0d5a-4c11-8dfb-8bbe9da0911b" providerId="ADAL" clId="{5BE5096F-7F8C-496A-A13C-FF7D0CA7A6B4}" dt="2024-02-14T15:21:44.233" v="1090" actId="700"/>
+          <ac:spMkLst>
+            <pc:docMk/>
+            <pc:sldMk cId="397487342" sldId="327"/>
+            <ac:spMk id="2" creationId="{66890E70-EDB5-4D8C-2B4F-029FA9E51D4E}"/>
+          </ac:spMkLst>
+        </pc:spChg>
+        <pc:spChg chg="mod ord">
+          <ac:chgData name="Hsia, Cheehong" userId="6bc27941-0d5a-4c11-8dfb-8bbe9da0911b" providerId="ADAL" clId="{5BE5096F-7F8C-496A-A13C-FF7D0CA7A6B4}" dt="2024-02-14T15:21:44.233" v="1090" actId="700"/>
+          <ac:spMkLst>
+            <pc:docMk/>
+            <pc:sldMk cId="397487342" sldId="327"/>
+            <ac:spMk id="3" creationId="{0E733FD9-82CF-FCB7-F012-0EAA939C393E}"/>
+          </ac:spMkLst>
+        </pc:spChg>
+        <pc:spChg chg="mod ord">
+          <ac:chgData name="Hsia, Cheehong" userId="6bc27941-0d5a-4c11-8dfb-8bbe9da0911b" providerId="ADAL" clId="{5BE5096F-7F8C-496A-A13C-FF7D0CA7A6B4}" dt="2024-02-14T15:21:44.233" v="1090" actId="700"/>
+          <ac:spMkLst>
+            <pc:docMk/>
+            <pc:sldMk cId="397487342" sldId="327"/>
+            <ac:spMk id="4" creationId="{F978620C-B722-98CC-0FA2-E22F5047512F}"/>
+          </ac:spMkLst>
+        </pc:spChg>
+        <pc:spChg chg="mod ord">
+          <ac:chgData name="Hsia, Cheehong" userId="6bc27941-0d5a-4c11-8dfb-8bbe9da0911b" providerId="ADAL" clId="{5BE5096F-7F8C-496A-A13C-FF7D0CA7A6B4}" dt="2024-02-14T15:21:44.233" v="1090" actId="700"/>
+          <ac:spMkLst>
+            <pc:docMk/>
+            <pc:sldMk cId="397487342" sldId="327"/>
+            <ac:spMk id="5" creationId="{CC5FDBA6-3880-4279-5835-037270B656BC}"/>
+          </ac:spMkLst>
+        </pc:spChg>
+      </pc:sldChg>
+      <pc:sldChg chg="modSp add mod modClrScheme chgLayout">
+        <pc:chgData name="Hsia, Cheehong" userId="6bc27941-0d5a-4c11-8dfb-8bbe9da0911b" providerId="ADAL" clId="{5BE5096F-7F8C-496A-A13C-FF7D0CA7A6B4}" dt="2024-02-14T15:22:13.964" v="1098" actId="700"/>
+        <pc:sldMkLst>
+          <pc:docMk/>
+          <pc:sldMk cId="3775546726" sldId="328"/>
+        </pc:sldMkLst>
+        <pc:spChg chg="mod ord">
+          <ac:chgData name="Hsia, Cheehong" userId="6bc27941-0d5a-4c11-8dfb-8bbe9da0911b" providerId="ADAL" clId="{5BE5096F-7F8C-496A-A13C-FF7D0CA7A6B4}" dt="2024-02-14T15:22:13.964" v="1098" actId="700"/>
+          <ac:spMkLst>
+            <pc:docMk/>
+            <pc:sldMk cId="3775546726" sldId="328"/>
+            <ac:spMk id="2" creationId="{66890E70-EDB5-4D8C-2B4F-029FA9E51D4E}"/>
+          </ac:spMkLst>
+        </pc:spChg>
+        <pc:spChg chg="mod ord">
+          <ac:chgData name="Hsia, Cheehong" userId="6bc27941-0d5a-4c11-8dfb-8bbe9da0911b" providerId="ADAL" clId="{5BE5096F-7F8C-496A-A13C-FF7D0CA7A6B4}" dt="2024-02-14T15:22:13.964" v="1098" actId="700"/>
+          <ac:spMkLst>
+            <pc:docMk/>
+            <pc:sldMk cId="3775546726" sldId="328"/>
+            <ac:spMk id="3" creationId="{0E733FD9-82CF-FCB7-F012-0EAA939C393E}"/>
+          </ac:spMkLst>
+        </pc:spChg>
+        <pc:spChg chg="mod ord">
+          <ac:chgData name="Hsia, Cheehong" userId="6bc27941-0d5a-4c11-8dfb-8bbe9da0911b" providerId="ADAL" clId="{5BE5096F-7F8C-496A-A13C-FF7D0CA7A6B4}" dt="2024-02-14T15:22:13.964" v="1098" actId="700"/>
+          <ac:spMkLst>
+            <pc:docMk/>
+            <pc:sldMk cId="3775546726" sldId="328"/>
+            <ac:spMk id="4" creationId="{F978620C-B722-98CC-0FA2-E22F5047512F}"/>
+          </ac:spMkLst>
+        </pc:spChg>
+        <pc:spChg chg="mod ord">
+          <ac:chgData name="Hsia, Cheehong" userId="6bc27941-0d5a-4c11-8dfb-8bbe9da0911b" providerId="ADAL" clId="{5BE5096F-7F8C-496A-A13C-FF7D0CA7A6B4}" dt="2024-02-14T15:22:13.964" v="1098" actId="700"/>
+          <ac:spMkLst>
+            <pc:docMk/>
+            <pc:sldMk cId="3775546726" sldId="328"/>
+            <ac:spMk id="5" creationId="{CC5FDBA6-3880-4279-5835-037270B656BC}"/>
+          </ac:spMkLst>
+        </pc:spChg>
+      </pc:sldChg>
+      <pc:sldChg chg="modSp add mod modClrScheme chgLayout">
+        <pc:chgData name="Hsia, Cheehong" userId="6bc27941-0d5a-4c11-8dfb-8bbe9da0911b" providerId="ADAL" clId="{5BE5096F-7F8C-496A-A13C-FF7D0CA7A6B4}" dt="2024-02-14T15:22:48.747" v="1106" actId="700"/>
+        <pc:sldMkLst>
+          <pc:docMk/>
+          <pc:sldMk cId="192906094" sldId="329"/>
+        </pc:sldMkLst>
+        <pc:spChg chg="mod ord">
+          <ac:chgData name="Hsia, Cheehong" userId="6bc27941-0d5a-4c11-8dfb-8bbe9da0911b" providerId="ADAL" clId="{5BE5096F-7F8C-496A-A13C-FF7D0CA7A6B4}" dt="2024-02-14T15:22:48.747" v="1106" actId="700"/>
+          <ac:spMkLst>
+            <pc:docMk/>
+            <pc:sldMk cId="192906094" sldId="329"/>
+            <ac:spMk id="2" creationId="{66890E70-EDB5-4D8C-2B4F-029FA9E51D4E}"/>
+          </ac:spMkLst>
+        </pc:spChg>
+        <pc:spChg chg="mod ord">
+          <ac:chgData name="Hsia, Cheehong" userId="6bc27941-0d5a-4c11-8dfb-8bbe9da0911b" providerId="ADAL" clId="{5BE5096F-7F8C-496A-A13C-FF7D0CA7A6B4}" dt="2024-02-14T15:22:48.747" v="1106" actId="700"/>
+          <ac:spMkLst>
+            <pc:docMk/>
+            <pc:sldMk cId="192906094" sldId="329"/>
+            <ac:spMk id="3" creationId="{0E733FD9-82CF-FCB7-F012-0EAA939C393E}"/>
+          </ac:spMkLst>
+        </pc:spChg>
+        <pc:spChg chg="mod ord">
+          <ac:chgData name="Hsia, Cheehong" userId="6bc27941-0d5a-4c11-8dfb-8bbe9da0911b" providerId="ADAL" clId="{5BE5096F-7F8C-496A-A13C-FF7D0CA7A6B4}" dt="2024-02-14T15:22:48.747" v="1106" actId="700"/>
+          <ac:spMkLst>
+            <pc:docMk/>
+            <pc:sldMk cId="192906094" sldId="329"/>
+            <ac:spMk id="4" creationId="{F978620C-B722-98CC-0FA2-E22F5047512F}"/>
+          </ac:spMkLst>
+        </pc:spChg>
+        <pc:spChg chg="mod ord">
+          <ac:chgData name="Hsia, Cheehong" userId="6bc27941-0d5a-4c11-8dfb-8bbe9da0911b" providerId="ADAL" clId="{5BE5096F-7F8C-496A-A13C-FF7D0CA7A6B4}" dt="2024-02-14T15:22:48.747" v="1106" actId="700"/>
+          <ac:spMkLst>
+            <pc:docMk/>
+            <pc:sldMk cId="192906094" sldId="329"/>
+            <ac:spMk id="5" creationId="{CC5FDBA6-3880-4279-5835-037270B656BC}"/>
+          </ac:spMkLst>
+        </pc:spChg>
+      </pc:sldChg>
+      <pc:sldChg chg="modSp add mod modClrScheme chgLayout">
+        <pc:chgData name="Hsia, Cheehong" userId="6bc27941-0d5a-4c11-8dfb-8bbe9da0911b" providerId="ADAL" clId="{5BE5096F-7F8C-496A-A13C-FF7D0CA7A6B4}" dt="2024-02-14T15:23:11.155" v="1113" actId="700"/>
+        <pc:sldMkLst>
+          <pc:docMk/>
+          <pc:sldMk cId="727514259" sldId="330"/>
+        </pc:sldMkLst>
+        <pc:spChg chg="mod ord">
+          <ac:chgData name="Hsia, Cheehong" userId="6bc27941-0d5a-4c11-8dfb-8bbe9da0911b" providerId="ADAL" clId="{5BE5096F-7F8C-496A-A13C-FF7D0CA7A6B4}" dt="2024-02-14T15:23:11.155" v="1113" actId="700"/>
+          <ac:spMkLst>
+            <pc:docMk/>
+            <pc:sldMk cId="727514259" sldId="330"/>
+            <ac:spMk id="2" creationId="{66890E70-EDB5-4D8C-2B4F-029FA9E51D4E}"/>
+          </ac:spMkLst>
+        </pc:spChg>
+        <pc:spChg chg="mod ord">
+          <ac:chgData name="Hsia, Cheehong" userId="6bc27941-0d5a-4c11-8dfb-8bbe9da0911b" providerId="ADAL" clId="{5BE5096F-7F8C-496A-A13C-FF7D0CA7A6B4}" dt="2024-02-14T15:23:11.155" v="1113" actId="700"/>
+          <ac:spMkLst>
+            <pc:docMk/>
+            <pc:sldMk cId="727514259" sldId="330"/>
+            <ac:spMk id="3" creationId="{0E733FD9-82CF-FCB7-F012-0EAA939C393E}"/>
+          </ac:spMkLst>
+        </pc:spChg>
+        <pc:spChg chg="mod ord">
+          <ac:chgData name="Hsia, Cheehong" userId="6bc27941-0d5a-4c11-8dfb-8bbe9da0911b" providerId="ADAL" clId="{5BE5096F-7F8C-496A-A13C-FF7D0CA7A6B4}" dt="2024-02-14T15:23:11.155" v="1113" actId="700"/>
+          <ac:spMkLst>
+            <pc:docMk/>
+            <pc:sldMk cId="727514259" sldId="330"/>
+            <ac:spMk id="4" creationId="{F978620C-B722-98CC-0FA2-E22F5047512F}"/>
+          </ac:spMkLst>
+        </pc:spChg>
+        <pc:spChg chg="mod ord">
+          <ac:chgData name="Hsia, Cheehong" userId="6bc27941-0d5a-4c11-8dfb-8bbe9da0911b" providerId="ADAL" clId="{5BE5096F-7F8C-496A-A13C-FF7D0CA7A6B4}" dt="2024-02-14T15:23:11.155" v="1113" actId="700"/>
+          <ac:spMkLst>
+            <pc:docMk/>
+            <pc:sldMk cId="727514259" sldId="330"/>
+            <ac:spMk id="5" creationId="{CC5FDBA6-3880-4279-5835-037270B656BC}"/>
+          </ac:spMkLst>
+        </pc:spChg>
+      </pc:sldChg>
+      <pc:sldChg chg="modSp add mod modClrScheme chgLayout">
+        <pc:chgData name="Hsia, Cheehong" userId="6bc27941-0d5a-4c11-8dfb-8bbe9da0911b" providerId="ADAL" clId="{5BE5096F-7F8C-496A-A13C-FF7D0CA7A6B4}" dt="2024-02-14T15:24:02.325" v="1124" actId="700"/>
+        <pc:sldMkLst>
+          <pc:docMk/>
+          <pc:sldMk cId="3785406611" sldId="331"/>
+        </pc:sldMkLst>
+        <pc:spChg chg="mod ord">
+          <ac:chgData name="Hsia, Cheehong" userId="6bc27941-0d5a-4c11-8dfb-8bbe9da0911b" providerId="ADAL" clId="{5BE5096F-7F8C-496A-A13C-FF7D0CA7A6B4}" dt="2024-02-14T15:24:02.325" v="1124" actId="700"/>
+          <ac:spMkLst>
+            <pc:docMk/>
+            <pc:sldMk cId="3785406611" sldId="331"/>
+            <ac:spMk id="2" creationId="{AD90CEB0-783B-5FA4-1028-D4B692C5B2CE}"/>
+          </ac:spMkLst>
+        </pc:spChg>
+        <pc:spChg chg="mod ord">
+          <ac:chgData name="Hsia, Cheehong" userId="6bc27941-0d5a-4c11-8dfb-8bbe9da0911b" providerId="ADAL" clId="{5BE5096F-7F8C-496A-A13C-FF7D0CA7A6B4}" dt="2024-02-14T15:24:02.325" v="1124" actId="700"/>
+          <ac:spMkLst>
+            <pc:docMk/>
+            <pc:sldMk cId="3785406611" sldId="331"/>
+            <ac:spMk id="3" creationId="{11925C94-7DB2-3EEF-C390-EA8A563BE132}"/>
+          </ac:spMkLst>
+        </pc:spChg>
+        <pc:spChg chg="mod ord">
+          <ac:chgData name="Hsia, Cheehong" userId="6bc27941-0d5a-4c11-8dfb-8bbe9da0911b" providerId="ADAL" clId="{5BE5096F-7F8C-496A-A13C-FF7D0CA7A6B4}" dt="2024-02-14T15:24:02.325" v="1124" actId="700"/>
+          <ac:spMkLst>
+            <pc:docMk/>
+            <pc:sldMk cId="3785406611" sldId="331"/>
+            <ac:spMk id="4" creationId="{3859056E-FEDA-2D8C-90B8-7DB995ECB8A4}"/>
+          </ac:spMkLst>
+        </pc:spChg>
+        <pc:spChg chg="mod ord">
+          <ac:chgData name="Hsia, Cheehong" userId="6bc27941-0d5a-4c11-8dfb-8bbe9da0911b" providerId="ADAL" clId="{5BE5096F-7F8C-496A-A13C-FF7D0CA7A6B4}" dt="2024-02-14T15:24:02.325" v="1124" actId="700"/>
+          <ac:spMkLst>
+            <pc:docMk/>
+            <pc:sldMk cId="3785406611" sldId="331"/>
+            <ac:spMk id="5" creationId="{1D8E0DE9-59C5-51BC-C26E-CD16F2ECED89}"/>
+          </ac:spMkLst>
+        </pc:spChg>
+      </pc:sldChg>
+      <pc:sldChg chg="modSp add mod modClrScheme chgLayout">
+        <pc:chgData name="Hsia, Cheehong" userId="6bc27941-0d5a-4c11-8dfb-8bbe9da0911b" providerId="ADAL" clId="{5BE5096F-7F8C-496A-A13C-FF7D0CA7A6B4}" dt="2024-02-14T15:24:31.123" v="1134" actId="700"/>
+        <pc:sldMkLst>
+          <pc:docMk/>
+          <pc:sldMk cId="3728195757" sldId="332"/>
+        </pc:sldMkLst>
+        <pc:spChg chg="mod ord">
+          <ac:chgData name="Hsia, Cheehong" userId="6bc27941-0d5a-4c11-8dfb-8bbe9da0911b" providerId="ADAL" clId="{5BE5096F-7F8C-496A-A13C-FF7D0CA7A6B4}" dt="2024-02-14T15:24:31.123" v="1134" actId="700"/>
+          <ac:spMkLst>
+            <pc:docMk/>
+            <pc:sldMk cId="3728195757" sldId="332"/>
+            <ac:spMk id="2" creationId="{AD90CEB0-783B-5FA4-1028-D4B692C5B2CE}"/>
+          </ac:spMkLst>
+        </pc:spChg>
+        <pc:spChg chg="mod ord">
+          <ac:chgData name="Hsia, Cheehong" userId="6bc27941-0d5a-4c11-8dfb-8bbe9da0911b" providerId="ADAL" clId="{5BE5096F-7F8C-496A-A13C-FF7D0CA7A6B4}" dt="2024-02-14T15:24:31.123" v="1134" actId="700"/>
+          <ac:spMkLst>
+            <pc:docMk/>
+            <pc:sldMk cId="3728195757" sldId="332"/>
+            <ac:spMk id="3" creationId="{11925C94-7DB2-3EEF-C390-EA8A563BE132}"/>
+          </ac:spMkLst>
+        </pc:spChg>
+        <pc:spChg chg="mod ord">
+          <ac:chgData name="Hsia, Cheehong" userId="6bc27941-0d5a-4c11-8dfb-8bbe9da0911b" providerId="ADAL" clId="{5BE5096F-7F8C-496A-A13C-FF7D0CA7A6B4}" dt="2024-02-14T15:24:31.123" v="1134" actId="700"/>
+          <ac:spMkLst>
+            <pc:docMk/>
+            <pc:sldMk cId="3728195757" sldId="332"/>
+            <ac:spMk id="4" creationId="{3859056E-FEDA-2D8C-90B8-7DB995ECB8A4}"/>
+          </ac:spMkLst>
+        </pc:spChg>
+        <pc:spChg chg="mod ord">
+          <ac:chgData name="Hsia, Cheehong" userId="6bc27941-0d5a-4c11-8dfb-8bbe9da0911b" providerId="ADAL" clId="{5BE5096F-7F8C-496A-A13C-FF7D0CA7A6B4}" dt="2024-02-14T15:24:31.123" v="1134" actId="700"/>
+          <ac:spMkLst>
+            <pc:docMk/>
+            <pc:sldMk cId="3728195757" sldId="332"/>
+            <ac:spMk id="5" creationId="{1D8E0DE9-59C5-51BC-C26E-CD16F2ECED89}"/>
+          </ac:spMkLst>
+        </pc:spChg>
+      </pc:sldChg>
+      <pc:sldChg chg="modSp add mod modClrScheme chgLayout">
+        <pc:chgData name="Hsia, Cheehong" userId="6bc27941-0d5a-4c11-8dfb-8bbe9da0911b" providerId="ADAL" clId="{5BE5096F-7F8C-496A-A13C-FF7D0CA7A6B4}" dt="2024-02-14T15:25:03.031" v="1144" actId="700"/>
+        <pc:sldMkLst>
+          <pc:docMk/>
+          <pc:sldMk cId="1070377419" sldId="333"/>
+        </pc:sldMkLst>
+        <pc:spChg chg="mod ord">
+          <ac:chgData name="Hsia, Cheehong" userId="6bc27941-0d5a-4c11-8dfb-8bbe9da0911b" providerId="ADAL" clId="{5BE5096F-7F8C-496A-A13C-FF7D0CA7A6B4}" dt="2024-02-14T15:25:03.031" v="1144" actId="700"/>
+          <ac:spMkLst>
+            <pc:docMk/>
+            <pc:sldMk cId="1070377419" sldId="333"/>
+            <ac:spMk id="2" creationId="{AD90CEB0-783B-5FA4-1028-D4B692C5B2CE}"/>
+          </ac:spMkLst>
+        </pc:spChg>
+        <pc:spChg chg="mod ord">
+          <ac:chgData name="Hsia, Cheehong" userId="6bc27941-0d5a-4c11-8dfb-8bbe9da0911b" providerId="ADAL" clId="{5BE5096F-7F8C-496A-A13C-FF7D0CA7A6B4}" dt="2024-02-14T15:25:03.031" v="1144" actId="700"/>
+          <ac:spMkLst>
+            <pc:docMk/>
+            <pc:sldMk cId="1070377419" sldId="333"/>
+            <ac:spMk id="3" creationId="{11925C94-7DB2-3EEF-C390-EA8A563BE132}"/>
+          </ac:spMkLst>
+        </pc:spChg>
+        <pc:spChg chg="mod ord">
+          <ac:chgData name="Hsia, Cheehong" userId="6bc27941-0d5a-4c11-8dfb-8bbe9da0911b" providerId="ADAL" clId="{5BE5096F-7F8C-496A-A13C-FF7D0CA7A6B4}" dt="2024-02-14T15:25:03.031" v="1144" actId="700"/>
+          <ac:spMkLst>
+            <pc:docMk/>
+            <pc:sldMk cId="1070377419" sldId="333"/>
+            <ac:spMk id="4" creationId="{3859056E-FEDA-2D8C-90B8-7DB995ECB8A4}"/>
+          </ac:spMkLst>
+        </pc:spChg>
+        <pc:spChg chg="mod ord">
+          <ac:chgData name="Hsia, Cheehong" userId="6bc27941-0d5a-4c11-8dfb-8bbe9da0911b" providerId="ADAL" clId="{5BE5096F-7F8C-496A-A13C-FF7D0CA7A6B4}" dt="2024-02-14T15:25:03.031" v="1144" actId="700"/>
+          <ac:spMkLst>
+            <pc:docMk/>
+            <pc:sldMk cId="1070377419" sldId="333"/>
+            <ac:spMk id="5" creationId="{1D8E0DE9-59C5-51BC-C26E-CD16F2ECED89}"/>
+          </ac:spMkLst>
+        </pc:spChg>
+      </pc:sldChg>
+      <pc:sldChg chg="modSp add mod modClrScheme chgLayout">
+        <pc:chgData name="Hsia, Cheehong" userId="6bc27941-0d5a-4c11-8dfb-8bbe9da0911b" providerId="ADAL" clId="{5BE5096F-7F8C-496A-A13C-FF7D0CA7A6B4}" dt="2024-02-14T15:25:22.883" v="1151" actId="700"/>
+        <pc:sldMkLst>
+          <pc:docMk/>
+          <pc:sldMk cId="3134009850" sldId="334"/>
+        </pc:sldMkLst>
+        <pc:spChg chg="mod ord">
+          <ac:chgData name="Hsia, Cheehong" userId="6bc27941-0d5a-4c11-8dfb-8bbe9da0911b" providerId="ADAL" clId="{5BE5096F-7F8C-496A-A13C-FF7D0CA7A6B4}" dt="2024-02-14T15:25:22.883" v="1151" actId="700"/>
+          <ac:spMkLst>
+            <pc:docMk/>
+            <pc:sldMk cId="3134009850" sldId="334"/>
+            <ac:spMk id="2" creationId="{AD90CEB0-783B-5FA4-1028-D4B692C5B2CE}"/>
+          </ac:spMkLst>
+        </pc:spChg>
+        <pc:spChg chg="mod ord">
+          <ac:chgData name="Hsia, Cheehong" userId="6bc27941-0d5a-4c11-8dfb-8bbe9da0911b" providerId="ADAL" clId="{5BE5096F-7F8C-496A-A13C-FF7D0CA7A6B4}" dt="2024-02-14T15:25:22.883" v="1151" actId="700"/>
+          <ac:spMkLst>
+            <pc:docMk/>
+            <pc:sldMk cId="3134009850" sldId="334"/>
+            <ac:spMk id="3" creationId="{11925C94-7DB2-3EEF-C390-EA8A563BE132}"/>
+          </ac:spMkLst>
+        </pc:spChg>
+        <pc:spChg chg="mod ord">
+          <ac:chgData name="Hsia, Cheehong" userId="6bc27941-0d5a-4c11-8dfb-8bbe9da0911b" providerId="ADAL" clId="{5BE5096F-7F8C-496A-A13C-FF7D0CA7A6B4}" dt="2024-02-14T15:25:22.883" v="1151" actId="700"/>
+          <ac:spMkLst>
+            <pc:docMk/>
+            <pc:sldMk cId="3134009850" sldId="334"/>
+            <ac:spMk id="4" creationId="{3859056E-FEDA-2D8C-90B8-7DB995ECB8A4}"/>
+          </ac:spMkLst>
+        </pc:spChg>
+        <pc:spChg chg="mod ord">
+          <ac:chgData name="Hsia, Cheehong" userId="6bc27941-0d5a-4c11-8dfb-8bbe9da0911b" providerId="ADAL" clId="{5BE5096F-7F8C-496A-A13C-FF7D0CA7A6B4}" dt="2024-02-14T15:25:22.883" v="1151" actId="700"/>
+          <ac:spMkLst>
+            <pc:docMk/>
+            <pc:sldMk cId="3134009850" sldId="334"/>
+            <ac:spMk id="5" creationId="{1D8E0DE9-59C5-51BC-C26E-CD16F2ECED89}"/>
+          </ac:spMkLst>
+        </pc:spChg>
+      </pc:sldChg>
+      <pc:sldChg chg="modSp add mod modClrScheme chgLayout">
+        <pc:chgData name="Hsia, Cheehong" userId="6bc27941-0d5a-4c11-8dfb-8bbe9da0911b" providerId="ADAL" clId="{5BE5096F-7F8C-496A-A13C-FF7D0CA7A6B4}" dt="2024-02-14T15:25:46.858" v="1159" actId="700"/>
+        <pc:sldMkLst>
+          <pc:docMk/>
+          <pc:sldMk cId="2446414719" sldId="335"/>
+        </pc:sldMkLst>
+        <pc:spChg chg="mod ord">
+          <ac:chgData name="Hsia, Cheehong" userId="6bc27941-0d5a-4c11-8dfb-8bbe9da0911b" providerId="ADAL" clId="{5BE5096F-7F8C-496A-A13C-FF7D0CA7A6B4}" dt="2024-02-14T15:25:46.858" v="1159" actId="700"/>
+          <ac:spMkLst>
+            <pc:docMk/>
+            <pc:sldMk cId="2446414719" sldId="335"/>
+            <ac:spMk id="2" creationId="{AD90CEB0-783B-5FA4-1028-D4B692C5B2CE}"/>
+          </ac:spMkLst>
+        </pc:spChg>
+        <pc:spChg chg="mod ord">
+          <ac:chgData name="Hsia, Cheehong" userId="6bc27941-0d5a-4c11-8dfb-8bbe9da0911b" providerId="ADAL" clId="{5BE5096F-7F8C-496A-A13C-FF7D0CA7A6B4}" dt="2024-02-14T15:25:46.858" v="1159" actId="700"/>
+          <ac:spMkLst>
+            <pc:docMk/>
+            <pc:sldMk cId="2446414719" sldId="335"/>
+            <ac:spMk id="3" creationId="{11925C94-7DB2-3EEF-C390-EA8A563BE132}"/>
+          </ac:spMkLst>
+        </pc:spChg>
+        <pc:spChg chg="mod ord">
+          <ac:chgData name="Hsia, Cheehong" userId="6bc27941-0d5a-4c11-8dfb-8bbe9da0911b" providerId="ADAL" clId="{5BE5096F-7F8C-496A-A13C-FF7D0CA7A6B4}" dt="2024-02-14T15:25:46.858" v="1159" actId="700"/>
+          <ac:spMkLst>
+            <pc:docMk/>
+            <pc:sldMk cId="2446414719" sldId="335"/>
+            <ac:spMk id="4" creationId="{3859056E-FEDA-2D8C-90B8-7DB995ECB8A4}"/>
+          </ac:spMkLst>
+        </pc:spChg>
+        <pc:spChg chg="mod ord">
+          <ac:chgData name="Hsia, Cheehong" userId="6bc27941-0d5a-4c11-8dfb-8bbe9da0911b" providerId="ADAL" clId="{5BE5096F-7F8C-496A-A13C-FF7D0CA7A6B4}" dt="2024-02-14T15:25:46.858" v="1159" actId="700"/>
+          <ac:spMkLst>
+            <pc:docMk/>
+            <pc:sldMk cId="2446414719" sldId="335"/>
+            <ac:spMk id="5" creationId="{1D8E0DE9-59C5-51BC-C26E-CD16F2ECED89}"/>
+          </ac:spMkLst>
+        </pc:spChg>
+      </pc:sldChg>
+      <pc:sldChg chg="modSp add mod modClrScheme chgLayout">
+        <pc:chgData name="Hsia, Cheehong" userId="6bc27941-0d5a-4c11-8dfb-8bbe9da0911b" providerId="ADAL" clId="{5BE5096F-7F8C-496A-A13C-FF7D0CA7A6B4}" dt="2024-02-14T15:26:21.452" v="1169" actId="700"/>
+        <pc:sldMkLst>
+          <pc:docMk/>
+          <pc:sldMk cId="2718256781" sldId="336"/>
+        </pc:sldMkLst>
+        <pc:spChg chg="mod ord">
+          <ac:chgData name="Hsia, Cheehong" userId="6bc27941-0d5a-4c11-8dfb-8bbe9da0911b" providerId="ADAL" clId="{5BE5096F-7F8C-496A-A13C-FF7D0CA7A6B4}" dt="2024-02-14T15:26:21.452" v="1169" actId="700"/>
+          <ac:spMkLst>
+            <pc:docMk/>
+            <pc:sldMk cId="2718256781" sldId="336"/>
+            <ac:spMk id="2" creationId="{9024BA51-C630-BA2A-58B6-69F9BB6816A0}"/>
+          </ac:spMkLst>
+        </pc:spChg>
+        <pc:spChg chg="mod ord">
+          <ac:chgData name="Hsia, Cheehong" userId="6bc27941-0d5a-4c11-8dfb-8bbe9da0911b" providerId="ADAL" clId="{5BE5096F-7F8C-496A-A13C-FF7D0CA7A6B4}" dt="2024-02-14T15:26:21.452" v="1169" actId="700"/>
+          <ac:spMkLst>
+            <pc:docMk/>
+            <pc:sldMk cId="2718256781" sldId="336"/>
+            <ac:spMk id="3" creationId="{2077BF95-1F9E-AA05-3D0B-83E184AA9C48}"/>
+          </ac:spMkLst>
+        </pc:spChg>
+        <pc:spChg chg="mod ord">
+          <ac:chgData name="Hsia, Cheehong" userId="6bc27941-0d5a-4c11-8dfb-8bbe9da0911b" providerId="ADAL" clId="{5BE5096F-7F8C-496A-A13C-FF7D0CA7A6B4}" dt="2024-02-14T15:26:21.452" v="1169" actId="700"/>
+          <ac:spMkLst>
+            <pc:docMk/>
+            <pc:sldMk cId="2718256781" sldId="336"/>
+            <ac:spMk id="4" creationId="{8946D5DF-DDC9-DF42-4883-DA9549CF8DE5}"/>
+          </ac:spMkLst>
+        </pc:spChg>
+        <pc:spChg chg="mod ord">
+          <ac:chgData name="Hsia, Cheehong" userId="6bc27941-0d5a-4c11-8dfb-8bbe9da0911b" providerId="ADAL" clId="{5BE5096F-7F8C-496A-A13C-FF7D0CA7A6B4}" dt="2024-02-14T15:26:21.452" v="1169" actId="700"/>
+          <ac:spMkLst>
+            <pc:docMk/>
+            <pc:sldMk cId="2718256781" sldId="336"/>
+            <ac:spMk id="5" creationId="{860EF69F-79FC-8315-A261-A0DDABAAA234}"/>
+          </ac:spMkLst>
+        </pc:spChg>
+      </pc:sldChg>
+      <pc:sldChg chg="modSp add mod modClrScheme chgLayout">
+        <pc:chgData name="Hsia, Cheehong" userId="6bc27941-0d5a-4c11-8dfb-8bbe9da0911b" providerId="ADAL" clId="{5BE5096F-7F8C-496A-A13C-FF7D0CA7A6B4}" dt="2024-02-14T15:26:43.457" v="1178" actId="700"/>
+        <pc:sldMkLst>
+          <pc:docMk/>
+          <pc:sldMk cId="116660721" sldId="337"/>
+        </pc:sldMkLst>
+        <pc:spChg chg="mod ord">
+          <ac:chgData name="Hsia, Cheehong" userId="6bc27941-0d5a-4c11-8dfb-8bbe9da0911b" providerId="ADAL" clId="{5BE5096F-7F8C-496A-A13C-FF7D0CA7A6B4}" dt="2024-02-14T15:26:43.457" v="1178" actId="700"/>
+          <ac:spMkLst>
+            <pc:docMk/>
+            <pc:sldMk cId="116660721" sldId="337"/>
+            <ac:spMk id="2" creationId="{9024BA51-C630-BA2A-58B6-69F9BB6816A0}"/>
+          </ac:spMkLst>
+        </pc:spChg>
+        <pc:spChg chg="mod ord">
+          <ac:chgData name="Hsia, Cheehong" userId="6bc27941-0d5a-4c11-8dfb-8bbe9da0911b" providerId="ADAL" clId="{5BE5096F-7F8C-496A-A13C-FF7D0CA7A6B4}" dt="2024-02-14T15:26:43.457" v="1178" actId="700"/>
+          <ac:spMkLst>
+            <pc:docMk/>
+            <pc:sldMk cId="116660721" sldId="337"/>
+            <ac:spMk id="3" creationId="{2077BF95-1F9E-AA05-3D0B-83E184AA9C48}"/>
+          </ac:spMkLst>
+        </pc:spChg>
+        <pc:spChg chg="mod ord">
+          <ac:chgData name="Hsia, Cheehong" userId="6bc27941-0d5a-4c11-8dfb-8bbe9da0911b" providerId="ADAL" clId="{5BE5096F-7F8C-496A-A13C-FF7D0CA7A6B4}" dt="2024-02-14T15:26:43.457" v="1178" actId="700"/>
+          <ac:spMkLst>
+            <pc:docMk/>
+            <pc:sldMk cId="116660721" sldId="337"/>
+            <ac:spMk id="4" creationId="{8946D5DF-DDC9-DF42-4883-DA9549CF8DE5}"/>
+          </ac:spMkLst>
+        </pc:spChg>
+        <pc:spChg chg="mod ord">
+          <ac:chgData name="Hsia, Cheehong" userId="6bc27941-0d5a-4c11-8dfb-8bbe9da0911b" providerId="ADAL" clId="{5BE5096F-7F8C-496A-A13C-FF7D0CA7A6B4}" dt="2024-02-14T15:26:43.457" v="1178" actId="700"/>
+          <ac:spMkLst>
+            <pc:docMk/>
+            <pc:sldMk cId="116660721" sldId="337"/>
+            <ac:spMk id="5" creationId="{860EF69F-79FC-8315-A261-A0DDABAAA234}"/>
+          </ac:spMkLst>
+        </pc:spChg>
+      </pc:sldChg>
+      <pc:sldChg chg="modSp add mod modClrScheme chgLayout">
+        <pc:chgData name="Hsia, Cheehong" userId="6bc27941-0d5a-4c11-8dfb-8bbe9da0911b" providerId="ADAL" clId="{5BE5096F-7F8C-496A-A13C-FF7D0CA7A6B4}" dt="2024-02-14T15:28:03.924" v="1329" actId="700"/>
+        <pc:sldMkLst>
+          <pc:docMk/>
+          <pc:sldMk cId="781062866" sldId="338"/>
+        </pc:sldMkLst>
+        <pc:spChg chg="mod ord">
+          <ac:chgData name="Hsia, Cheehong" userId="6bc27941-0d5a-4c11-8dfb-8bbe9da0911b" providerId="ADAL" clId="{5BE5096F-7F8C-496A-A13C-FF7D0CA7A6B4}" dt="2024-02-14T15:28:03.924" v="1329" actId="700"/>
+          <ac:spMkLst>
+            <pc:docMk/>
+            <pc:sldMk cId="781062866" sldId="338"/>
+            <ac:spMk id="2" creationId="{9024BA51-C630-BA2A-58B6-69F9BB6816A0}"/>
+          </ac:spMkLst>
+        </pc:spChg>
+        <pc:spChg chg="mod ord">
+          <ac:chgData name="Hsia, Cheehong" userId="6bc27941-0d5a-4c11-8dfb-8bbe9da0911b" providerId="ADAL" clId="{5BE5096F-7F8C-496A-A13C-FF7D0CA7A6B4}" dt="2024-02-14T15:28:03.924" v="1329" actId="700"/>
+          <ac:spMkLst>
+            <pc:docMk/>
+            <pc:sldMk cId="781062866" sldId="338"/>
+            <ac:spMk id="3" creationId="{2077BF95-1F9E-AA05-3D0B-83E184AA9C48}"/>
+          </ac:spMkLst>
+        </pc:spChg>
+        <pc:spChg chg="mod ord">
+          <ac:chgData name="Hsia, Cheehong" userId="6bc27941-0d5a-4c11-8dfb-8bbe9da0911b" providerId="ADAL" clId="{5BE5096F-7F8C-496A-A13C-FF7D0CA7A6B4}" dt="2024-02-14T15:28:03.924" v="1329" actId="700"/>
+          <ac:spMkLst>
+            <pc:docMk/>
+            <pc:sldMk cId="781062866" sldId="338"/>
+            <ac:spMk id="4" creationId="{8946D5DF-DDC9-DF42-4883-DA9549CF8DE5}"/>
+          </ac:spMkLst>
+        </pc:spChg>
+        <pc:spChg chg="mod ord">
+          <ac:chgData name="Hsia, Cheehong" userId="6bc27941-0d5a-4c11-8dfb-8bbe9da0911b" providerId="ADAL" clId="{5BE5096F-7F8C-496A-A13C-FF7D0CA7A6B4}" dt="2024-02-14T15:28:03.924" v="1329" actId="700"/>
+          <ac:spMkLst>
+            <pc:docMk/>
+            <pc:sldMk cId="781062866" sldId="338"/>
+            <ac:spMk id="5" creationId="{860EF69F-79FC-8315-A261-A0DDABAAA234}"/>
+          </ac:spMkLst>
+        </pc:spChg>
+      </pc:sldChg>
+      <pc:sldChg chg="modSp add mod modClrScheme chgLayout">
+        <pc:chgData name="Hsia, Cheehong" userId="6bc27941-0d5a-4c11-8dfb-8bbe9da0911b" providerId="ADAL" clId="{5BE5096F-7F8C-496A-A13C-FF7D0CA7A6B4}" dt="2024-02-14T15:29:17.156" v="1486" actId="700"/>
+        <pc:sldMkLst>
+          <pc:docMk/>
+          <pc:sldMk cId="3259217527" sldId="339"/>
+        </pc:sldMkLst>
+        <pc:spChg chg="mod ord">
+          <ac:chgData name="Hsia, Cheehong" userId="6bc27941-0d5a-4c11-8dfb-8bbe9da0911b" providerId="ADAL" clId="{5BE5096F-7F8C-496A-A13C-FF7D0CA7A6B4}" dt="2024-02-14T15:29:17.156" v="1486" actId="700"/>
+          <ac:spMkLst>
+            <pc:docMk/>
+            <pc:sldMk cId="3259217527" sldId="339"/>
+            <ac:spMk id="2" creationId="{9024BA51-C630-BA2A-58B6-69F9BB6816A0}"/>
+          </ac:spMkLst>
+        </pc:spChg>
+        <pc:spChg chg="mod ord">
+          <ac:chgData name="Hsia, Cheehong" userId="6bc27941-0d5a-4c11-8dfb-8bbe9da0911b" providerId="ADAL" clId="{5BE5096F-7F8C-496A-A13C-FF7D0CA7A6B4}" dt="2024-02-14T15:29:17.156" v="1486" actId="700"/>
+          <ac:spMkLst>
+            <pc:docMk/>
+            <pc:sldMk cId="3259217527" sldId="339"/>
+            <ac:spMk id="3" creationId="{2077BF95-1F9E-AA05-3D0B-83E184AA9C48}"/>
+          </ac:spMkLst>
+        </pc:spChg>
+        <pc:spChg chg="mod ord">
+          <ac:chgData name="Hsia, Cheehong" userId="6bc27941-0d5a-4c11-8dfb-8bbe9da0911b" providerId="ADAL" clId="{5BE5096F-7F8C-496A-A13C-FF7D0CA7A6B4}" dt="2024-02-14T15:29:17.156" v="1486" actId="700"/>
+          <ac:spMkLst>
+            <pc:docMk/>
+            <pc:sldMk cId="3259217527" sldId="339"/>
+            <ac:spMk id="4" creationId="{8946D5DF-DDC9-DF42-4883-DA9549CF8DE5}"/>
+          </ac:spMkLst>
+        </pc:spChg>
+        <pc:spChg chg="mod ord">
+          <ac:chgData name="Hsia, Cheehong" userId="6bc27941-0d5a-4c11-8dfb-8bbe9da0911b" providerId="ADAL" clId="{5BE5096F-7F8C-496A-A13C-FF7D0CA7A6B4}" dt="2024-02-14T15:29:17.156" v="1486" actId="700"/>
+          <ac:spMkLst>
+            <pc:docMk/>
+            <pc:sldMk cId="3259217527" sldId="339"/>
+            <ac:spMk id="5" creationId="{860EF69F-79FC-8315-A261-A0DDABAAA234}"/>
+          </ac:spMkLst>
+        </pc:spChg>
+      </pc:sldChg>
+      <pc:sldChg chg="modSp add mod modClrScheme chgLayout">
+        <pc:chgData name="Hsia, Cheehong" userId="6bc27941-0d5a-4c11-8dfb-8bbe9da0911b" providerId="ADAL" clId="{5BE5096F-7F8C-496A-A13C-FF7D0CA7A6B4}" dt="2024-02-14T15:30:29.053" v="1624" actId="700"/>
+        <pc:sldMkLst>
+          <pc:docMk/>
+          <pc:sldMk cId="2466321810" sldId="340"/>
+        </pc:sldMkLst>
+        <pc:spChg chg="mod ord">
+          <ac:chgData name="Hsia, Cheehong" userId="6bc27941-0d5a-4c11-8dfb-8bbe9da0911b" providerId="ADAL" clId="{5BE5096F-7F8C-496A-A13C-FF7D0CA7A6B4}" dt="2024-02-14T15:30:29.053" v="1624" actId="700"/>
+          <ac:spMkLst>
+            <pc:docMk/>
+            <pc:sldMk cId="2466321810" sldId="340"/>
+            <ac:spMk id="2" creationId="{9024BA51-C630-BA2A-58B6-69F9BB6816A0}"/>
+          </ac:spMkLst>
+        </pc:spChg>
+        <pc:spChg chg="mod ord">
+          <ac:chgData name="Hsia, Cheehong" userId="6bc27941-0d5a-4c11-8dfb-8bbe9da0911b" providerId="ADAL" clId="{5BE5096F-7F8C-496A-A13C-FF7D0CA7A6B4}" dt="2024-02-14T15:30:29.053" v="1624" actId="700"/>
+          <ac:spMkLst>
+            <pc:docMk/>
+            <pc:sldMk cId="2466321810" sldId="340"/>
+            <ac:spMk id="3" creationId="{2077BF95-1F9E-AA05-3D0B-83E184AA9C48}"/>
+          </ac:spMkLst>
+        </pc:spChg>
+        <pc:spChg chg="mod ord">
+          <ac:chgData name="Hsia, Cheehong" userId="6bc27941-0d5a-4c11-8dfb-8bbe9da0911b" providerId="ADAL" clId="{5BE5096F-7F8C-496A-A13C-FF7D0CA7A6B4}" dt="2024-02-14T15:30:29.053" v="1624" actId="700"/>
+          <ac:spMkLst>
+            <pc:docMk/>
+            <pc:sldMk cId="2466321810" sldId="340"/>
+            <ac:spMk id="4" creationId="{8946D5DF-DDC9-DF42-4883-DA9549CF8DE5}"/>
+          </ac:spMkLst>
+        </pc:spChg>
+        <pc:spChg chg="mod ord">
+          <ac:chgData name="Hsia, Cheehong" userId="6bc27941-0d5a-4c11-8dfb-8bbe9da0911b" providerId="ADAL" clId="{5BE5096F-7F8C-496A-A13C-FF7D0CA7A6B4}" dt="2024-02-14T15:30:29.053" v="1624" actId="700"/>
+          <ac:spMkLst>
+            <pc:docMk/>
+            <pc:sldMk cId="2466321810" sldId="340"/>
+            <ac:spMk id="5" creationId="{860EF69F-79FC-8315-A261-A0DDABAAA234}"/>
+          </ac:spMkLst>
+        </pc:spChg>
       </pc:sldChg>
       <pc:sldMasterChg chg="modSldLayout">
         <pc:chgData name="Hsia, Cheehong" userId="6bc27941-0d5a-4c11-8dfb-8bbe9da0911b" providerId="ADAL" clId="{5BE5096F-7F8C-496A-A13C-FF7D0CA7A6B4}" dt="2024-01-31T20:12:39.319" v="46" actId="11529"/>
@@ -3247,7 +4355,7 @@
           <a:p>
             <a:fld id="{0739BF60-9B09-42B3-AD3C-449FED2CBA10}" type="datetimeFigureOut">
               <a:rPr lang="en-NL" smtClean="0"/>
-              <a:t>03/02/2024</a:t>
+              <a:t>14/02/2024</a:t>
             </a:fld>
             <a:endParaRPr lang="en-NL"/>
           </a:p>
@@ -21515,8 +22623,10 @@
           <a:lstStyle/>
           <a:p>
             <a:r>
-              <a:rPr lang="en-US" sz="4000" dirty="0"/>
-              <a:t>Plan &amp; facilitates all scrum events</a:t>
+              <a:rPr lang="en-US" sz="3000" dirty="0">
+                <a:latin typeface="Ubuntu" panose="020B0504030602030204" pitchFamily="34" charset="0"/>
+              </a:rPr>
+              <a:t>Plan &amp; facilitates all Scrum events</a:t>
             </a:r>
           </a:p>
         </p:txBody>
@@ -21572,12 +22682,16 @@
           <a:lstStyle/>
           <a:p>
             <a:r>
-              <a:rPr lang="en-US" sz="4000" dirty="0"/>
+              <a:rPr lang="en-US" sz="3000" dirty="0">
+                <a:latin typeface="Ubuntu" panose="020B0504030602030204" pitchFamily="34" charset="0"/>
+              </a:rPr>
               <a:t>Track progress &amp; visualizes work</a:t>
             </a:r>
           </a:p>
           <a:p>
-            <a:endParaRPr lang="en-NL" dirty="0"/>
+            <a:endParaRPr lang="en-NL" sz="3000" dirty="0">
+              <a:latin typeface="Ubuntu" panose="020B0504030602030204" pitchFamily="34" charset="0"/>
+            </a:endParaRPr>
           </a:p>
         </p:txBody>
       </p:sp>
@@ -21842,7 +22956,7 @@
           <p:cNvPr id="2" name="Text Placeholder 1">
             <a:extLst>
               <a:ext uri="{FF2B5EF4-FFF2-40B4-BE49-F238E27FC236}">
-                <a16:creationId xmlns:a16="http://schemas.microsoft.com/office/drawing/2014/main" id="{94189FDF-7B80-50D5-3AD1-CB96FAC44E6D}"/>
+                <a16:creationId xmlns:a16="http://schemas.microsoft.com/office/drawing/2014/main" id="{700D1D6A-607B-8919-A042-BCCDC9CF0CF0}"/>
               </a:ext>
             </a:extLst>
           </p:cNvPr>
@@ -21859,8 +22973,10 @@
           <a:lstStyle/>
           <a:p>
             <a:r>
-              <a:rPr lang="en-US" sz="4000" dirty="0"/>
-              <a:t>Plan &amp; facilitates all scrum events</a:t>
+              <a:rPr lang="en-US" sz="3000" dirty="0">
+                <a:latin typeface="Ubuntu" panose="020B0504030602030204" pitchFamily="34" charset="0"/>
+              </a:rPr>
+              <a:t>Plan &amp; facilitates all Scrum events</a:t>
             </a:r>
           </a:p>
         </p:txBody>
@@ -21870,7 +22986,7 @@
           <p:cNvPr id="3" name="Content Placeholder 2">
             <a:extLst>
               <a:ext uri="{FF2B5EF4-FFF2-40B4-BE49-F238E27FC236}">
-                <a16:creationId xmlns:a16="http://schemas.microsoft.com/office/drawing/2014/main" id="{6D5D3A66-6B08-9C79-C4F4-E89BA6813204}"/>
+                <a16:creationId xmlns:a16="http://schemas.microsoft.com/office/drawing/2014/main" id="{DB4E66FB-476A-BB21-1B46-4C8125462E5C}"/>
               </a:ext>
             </a:extLst>
           </p:cNvPr>
@@ -21899,7 +23015,7 @@
           <p:cNvPr id="4" name="Text Placeholder 3">
             <a:extLst>
               <a:ext uri="{FF2B5EF4-FFF2-40B4-BE49-F238E27FC236}">
-                <a16:creationId xmlns:a16="http://schemas.microsoft.com/office/drawing/2014/main" id="{BAAAF6E7-F37F-1543-6120-55C0EE119F6E}"/>
+                <a16:creationId xmlns:a16="http://schemas.microsoft.com/office/drawing/2014/main" id="{101FB840-DD80-334A-87FD-81DC71AD8A57}"/>
               </a:ext>
             </a:extLst>
           </p:cNvPr>
@@ -21916,9 +23032,16 @@
           <a:lstStyle/>
           <a:p>
             <a:r>
-              <a:rPr lang="en-US" sz="4000" dirty="0"/>
+              <a:rPr lang="en-US" sz="3000" dirty="0">
+                <a:latin typeface="Ubuntu" panose="020B0504030602030204" pitchFamily="34" charset="0"/>
+              </a:rPr>
               <a:t>Track progress &amp; visualizes work</a:t>
             </a:r>
+          </a:p>
+          <a:p>
+            <a:endParaRPr lang="en-NL" sz="3000" dirty="0">
+              <a:latin typeface="Ubuntu" panose="020B0504030602030204" pitchFamily="34" charset="0"/>
+            </a:endParaRPr>
           </a:p>
         </p:txBody>
       </p:sp>
@@ -21927,7 +23050,7 @@
           <p:cNvPr id="5" name="Content Placeholder 4">
             <a:extLst>
               <a:ext uri="{FF2B5EF4-FFF2-40B4-BE49-F238E27FC236}">
-                <a16:creationId xmlns:a16="http://schemas.microsoft.com/office/drawing/2014/main" id="{BF99AF0D-A600-46B8-4778-8413DABABEFB}"/>
+                <a16:creationId xmlns:a16="http://schemas.microsoft.com/office/drawing/2014/main" id="{3994DC0B-F72F-6BFF-C694-00CBF68920C1}"/>
               </a:ext>
             </a:extLst>
           </p:cNvPr>
@@ -21956,7 +23079,7 @@
           <p:cNvPr id="6" name="Text Placeholder 1">
             <a:extLst>
               <a:ext uri="{FF2B5EF4-FFF2-40B4-BE49-F238E27FC236}">
-                <a16:creationId xmlns:a16="http://schemas.microsoft.com/office/drawing/2014/main" id="{46EB0A5B-8321-F4D4-A1D8-FF92E744308A}"/>
+                <a16:creationId xmlns:a16="http://schemas.microsoft.com/office/drawing/2014/main" id="{973DC34E-6561-45C7-EF65-6ED303617764}"/>
               </a:ext>
             </a:extLst>
           </p:cNvPr>
@@ -22151,7 +23274,7 @@
     </p:spTree>
     <p:extLst>
       <p:ext uri="{BB962C8B-B14F-4D97-AF65-F5344CB8AC3E}">
-        <p14:creationId xmlns:p14="http://schemas.microsoft.com/office/powerpoint/2010/main" val="106282829"/>
+        <p14:creationId xmlns:p14="http://schemas.microsoft.com/office/powerpoint/2010/main" val="2830884995"/>
       </p:ext>
     </p:extLst>
   </p:cSld>
@@ -22200,8 +23323,10 @@
           <a:lstStyle/>
           <a:p>
             <a:r>
-              <a:rPr lang="en-US" sz="4000" dirty="0"/>
-              <a:t>facilitates the scrum events</a:t>
+              <a:rPr lang="en-US" sz="3000" dirty="0">
+                <a:latin typeface="Ubuntu" panose="020B0504030602030204" pitchFamily="34" charset="0"/>
+              </a:rPr>
+              <a:t>Facilitates the scrum events</a:t>
             </a:r>
           </a:p>
         </p:txBody>
@@ -22257,7 +23382,9 @@
           <a:lstStyle/>
           <a:p>
             <a:r>
-              <a:rPr lang="en-US" sz="4000" dirty="0"/>
+              <a:rPr lang="en-US" sz="3000" dirty="0">
+                <a:latin typeface="Ubuntu" panose="020B0504030602030204" pitchFamily="34" charset="0"/>
+              </a:rPr>
               <a:t>Enables the Developers to track &amp; visualizes work</a:t>
             </a:r>
           </a:p>
@@ -22541,8 +23668,10 @@
           <a:lstStyle/>
           <a:p>
             <a:r>
-              <a:rPr lang="en-US" sz="4000" dirty="0"/>
-              <a:t>facilitates the scrum events</a:t>
+              <a:rPr lang="en-US" sz="3000" dirty="0">
+                <a:latin typeface="Ubuntu" panose="020B0504030602030204" pitchFamily="34" charset="0"/>
+              </a:rPr>
+              <a:t>Facilitates the scrum events</a:t>
             </a:r>
           </a:p>
         </p:txBody>
@@ -22598,7 +23727,9 @@
           <a:lstStyle/>
           <a:p>
             <a:r>
-              <a:rPr lang="en-US" sz="4000" dirty="0"/>
+              <a:rPr lang="en-US" sz="3000" dirty="0">
+                <a:latin typeface="Ubuntu" panose="020B0504030602030204" pitchFamily="34" charset="0"/>
+              </a:rPr>
               <a:t>Enables the Developers to track &amp; visualizes work</a:t>
             </a:r>
           </a:p>
@@ -22638,7 +23769,7 @@
           <p:cNvPr id="6" name="Text Placeholder 1">
             <a:extLst>
               <a:ext uri="{FF2B5EF4-FFF2-40B4-BE49-F238E27FC236}">
-                <a16:creationId xmlns:a16="http://schemas.microsoft.com/office/drawing/2014/main" id="{CCA63276-EDC3-D604-4F00-B405F28D19A4}"/>
+                <a16:creationId xmlns:a16="http://schemas.microsoft.com/office/drawing/2014/main" id="{D1E185FA-1FC9-E9CF-807A-D1563F37C59A}"/>
               </a:ext>
             </a:extLst>
           </p:cNvPr>
@@ -22833,7 +23964,7 @@
     </p:spTree>
     <p:extLst>
       <p:ext uri="{BB962C8B-B14F-4D97-AF65-F5344CB8AC3E}">
-        <p14:creationId xmlns:p14="http://schemas.microsoft.com/office/powerpoint/2010/main" val="433227676"/>
+        <p14:creationId xmlns:p14="http://schemas.microsoft.com/office/powerpoint/2010/main" val="393363697"/>
       </p:ext>
     </p:extLst>
   </p:cSld>
@@ -22882,8 +24013,10 @@
           <a:lstStyle/>
           <a:p>
             <a:r>
-              <a:rPr lang="en-US" sz="4000" dirty="0"/>
-              <a:t>Help scrum team by facilitating transparency, inspection &amp; adaptation</a:t>
+              <a:rPr lang="en-US" sz="3000" dirty="0">
+                <a:latin typeface="Ubuntu" panose="020B0504030602030204" pitchFamily="34" charset="0"/>
+              </a:rPr>
+              <a:t>Help Scrum team by facilitating transparency, inspection &amp; adaptation</a:t>
             </a:r>
           </a:p>
         </p:txBody>
@@ -22939,7 +24072,9 @@
           <a:lstStyle/>
           <a:p>
             <a:r>
-              <a:rPr lang="en-US" sz="4000" dirty="0"/>
+              <a:rPr lang="en-US" sz="3000" dirty="0">
+                <a:latin typeface="Ubuntu" panose="020B0504030602030204" pitchFamily="34" charset="0"/>
+              </a:rPr>
               <a:t>Enables Product Owner to focus on value delivery</a:t>
             </a:r>
           </a:p>
@@ -23422,8 +24557,10 @@
           <a:lstStyle/>
           <a:p>
             <a:r>
-              <a:rPr lang="en-US" sz="4000" dirty="0"/>
-              <a:t>Help scrum team by facilitating transparency, inspection &amp; adaptation</a:t>
+              <a:rPr lang="en-US" sz="3000" dirty="0">
+                <a:latin typeface="Ubuntu" panose="020B0504030602030204" pitchFamily="34" charset="0"/>
+              </a:rPr>
+              <a:t>Help Scrum team by facilitating transparency, inspection &amp; adaptation</a:t>
             </a:r>
           </a:p>
         </p:txBody>
@@ -23479,7 +24616,9 @@
           <a:lstStyle/>
           <a:p>
             <a:r>
-              <a:rPr lang="en-US" sz="4000" dirty="0"/>
+              <a:rPr lang="en-US" sz="3000" dirty="0">
+                <a:latin typeface="Ubuntu" panose="020B0504030602030204" pitchFamily="34" charset="0"/>
+              </a:rPr>
               <a:t>Enables Product Owner to focus on value delivery</a:t>
             </a:r>
           </a:p>
@@ -23519,7 +24658,7 @@
           <p:cNvPr id="6" name="Text Placeholder 1">
             <a:extLst>
               <a:ext uri="{FF2B5EF4-FFF2-40B4-BE49-F238E27FC236}">
-                <a16:creationId xmlns:a16="http://schemas.microsoft.com/office/drawing/2014/main" id="{BDFF8CC1-719D-8EFA-797B-7194698D8FA9}"/>
+                <a16:creationId xmlns:a16="http://schemas.microsoft.com/office/drawing/2014/main" id="{E465B4E2-6EB9-48B1-02D0-538A233218DB}"/>
               </a:ext>
             </a:extLst>
           </p:cNvPr>
@@ -23714,7 +24853,7 @@
     </p:spTree>
     <p:extLst>
       <p:ext uri="{BB962C8B-B14F-4D97-AF65-F5344CB8AC3E}">
-        <p14:creationId xmlns:p14="http://schemas.microsoft.com/office/powerpoint/2010/main" val="1970583200"/>
+        <p14:creationId xmlns:p14="http://schemas.microsoft.com/office/powerpoint/2010/main" val="3631058862"/>
       </p:ext>
     </p:extLst>
   </p:cSld>
@@ -23763,7 +24902,9 @@
           <a:lstStyle/>
           <a:p>
             <a:r>
-              <a:rPr lang="en-US" sz="4000" dirty="0"/>
+              <a:rPr lang="en-US" sz="3000" dirty="0">
+                <a:latin typeface="Ubuntu" panose="020B0504030602030204" pitchFamily="34" charset="0"/>
+              </a:rPr>
               <a:t>Help stakeholders understand &amp; apply Agile principles</a:t>
             </a:r>
           </a:p>
@@ -23820,8 +24961,10 @@
           <a:lstStyle/>
           <a:p>
             <a:r>
-              <a:rPr lang="en-US" sz="4000" dirty="0"/>
-              <a:t>Focus on continuous Improvements in the value chain</a:t>
+              <a:rPr lang="en-US" sz="3000" dirty="0">
+                <a:latin typeface="Ubuntu" panose="020B0504030602030204" pitchFamily="34" charset="0"/>
+              </a:rPr>
+              <a:t>Focus on continuous improvements in the value chain</a:t>
             </a:r>
           </a:p>
         </p:txBody>
@@ -24104,7 +25247,9 @@
           <a:lstStyle/>
           <a:p>
             <a:r>
-              <a:rPr lang="en-US" sz="4000" dirty="0"/>
+              <a:rPr lang="en-US" sz="3000" dirty="0">
+                <a:latin typeface="Ubuntu" panose="020B0504030602030204" pitchFamily="34" charset="0"/>
+              </a:rPr>
               <a:t>Help stakeholders understand &amp; apply Agile principles</a:t>
             </a:r>
           </a:p>
@@ -24161,8 +25306,10 @@
           <a:lstStyle/>
           <a:p>
             <a:r>
-              <a:rPr lang="en-US" sz="4000" dirty="0"/>
-              <a:t>Focus on continuous Improvements in the value chain</a:t>
+              <a:rPr lang="en-US" sz="3000" dirty="0">
+                <a:latin typeface="Ubuntu" panose="020B0504030602030204" pitchFamily="34" charset="0"/>
+              </a:rPr>
+              <a:t>Focus on continuous improvements in the value chain</a:t>
             </a:r>
           </a:p>
         </p:txBody>
@@ -24201,7 +25348,7 @@
           <p:cNvPr id="6" name="Text Placeholder 1">
             <a:extLst>
               <a:ext uri="{FF2B5EF4-FFF2-40B4-BE49-F238E27FC236}">
-                <a16:creationId xmlns:a16="http://schemas.microsoft.com/office/drawing/2014/main" id="{0AC00613-D4A6-7303-7DBE-D611CDB22F95}"/>
+                <a16:creationId xmlns:a16="http://schemas.microsoft.com/office/drawing/2014/main" id="{D10F6304-FA83-2181-CF93-41489AC119C9}"/>
               </a:ext>
             </a:extLst>
           </p:cNvPr>
@@ -24396,7 +25543,7 @@
     </p:spTree>
     <p:extLst>
       <p:ext uri="{BB962C8B-B14F-4D97-AF65-F5344CB8AC3E}">
-        <p14:creationId xmlns:p14="http://schemas.microsoft.com/office/powerpoint/2010/main" val="596055484"/>
+        <p14:creationId xmlns:p14="http://schemas.microsoft.com/office/powerpoint/2010/main" val="1252257208"/>
       </p:ext>
     </p:extLst>
   </p:cSld>
@@ -24445,12 +25592,11 @@
           <a:lstStyle/>
           <a:p>
             <a:r>
-              <a:rPr lang="en-US" sz="4000" dirty="0"/>
-              <a:t>Help the organization to understand &amp; apply agile principles</a:t>
+              <a:rPr lang="en-US" sz="3000" dirty="0">
+                <a:latin typeface="Ubuntu" panose="020B0504030602030204" pitchFamily="34" charset="0"/>
+              </a:rPr>
+              <a:t>Help the organization to understand &amp; apply Agile principles</a:t>
             </a:r>
-            <a:endParaRPr lang="en-US" sz="1050" dirty="0">
-              <a:latin typeface="Manrope" pitchFamily="2" charset="0"/>
-            </a:endParaRPr>
           </a:p>
         </p:txBody>
       </p:sp>
@@ -24505,7 +25651,9 @@
           <a:lstStyle/>
           <a:p>
             <a:r>
-              <a:rPr lang="en-US" sz="4000" dirty="0"/>
+              <a:rPr lang="en-US" sz="3000" dirty="0">
+                <a:latin typeface="Ubuntu" panose="020B0504030602030204" pitchFamily="34" charset="0"/>
+              </a:rPr>
               <a:t>Enables the organization to continuously have impact on customers</a:t>
             </a:r>
           </a:p>
@@ -24789,12 +25937,11 @@
           <a:lstStyle/>
           <a:p>
             <a:r>
-              <a:rPr lang="en-US" sz="4000" dirty="0"/>
-              <a:t>Help the organization to understand &amp; apply agile principles</a:t>
+              <a:rPr lang="en-US" sz="3000" dirty="0">
+                <a:latin typeface="Ubuntu" panose="020B0504030602030204" pitchFamily="34" charset="0"/>
+              </a:rPr>
+              <a:t>Help the organization to understand &amp; apply Agile principles</a:t>
             </a:r>
-            <a:endParaRPr lang="en-US" sz="1050" dirty="0">
-              <a:latin typeface="Manrope" pitchFamily="2" charset="0"/>
-            </a:endParaRPr>
           </a:p>
         </p:txBody>
       </p:sp>
@@ -24849,7 +25996,9 @@
           <a:lstStyle/>
           <a:p>
             <a:r>
-              <a:rPr lang="en-US" sz="4000" dirty="0"/>
+              <a:rPr lang="en-US" sz="3000" dirty="0">
+                <a:latin typeface="Ubuntu" panose="020B0504030602030204" pitchFamily="34" charset="0"/>
+              </a:rPr>
               <a:t>Enables the organization to continuously have impact on customers</a:t>
             </a:r>
           </a:p>
@@ -24889,7 +26038,7 @@
           <p:cNvPr id="6" name="Text Placeholder 1">
             <a:extLst>
               <a:ext uri="{FF2B5EF4-FFF2-40B4-BE49-F238E27FC236}">
-                <a16:creationId xmlns:a16="http://schemas.microsoft.com/office/drawing/2014/main" id="{E0EF5841-980D-CFB1-9AE2-83ECCF432CE6}"/>
+                <a16:creationId xmlns:a16="http://schemas.microsoft.com/office/drawing/2014/main" id="{ED5B7504-6185-5EDE-5BF5-A64E95E63231}"/>
               </a:ext>
             </a:extLst>
           </p:cNvPr>
@@ -25084,7 +26233,7 @@
     </p:spTree>
     <p:extLst>
       <p:ext uri="{BB962C8B-B14F-4D97-AF65-F5344CB8AC3E}">
-        <p14:creationId xmlns:p14="http://schemas.microsoft.com/office/powerpoint/2010/main" val="3282675112"/>
+        <p14:creationId xmlns:p14="http://schemas.microsoft.com/office/powerpoint/2010/main" val="1151322812"/>
       </p:ext>
     </p:extLst>
   </p:cSld>
@@ -25257,12 +26406,11 @@
           <a:lstStyle/>
           <a:p>
             <a:r>
-              <a:rPr lang="en-US" sz="4000" dirty="0"/>
-              <a:t>Focus on creating requirements &amp; product backlog items</a:t>
+              <a:rPr lang="en-US" sz="3000" dirty="0">
+                <a:latin typeface="Ubuntu" panose="020B0504030602030204" pitchFamily="34" charset="0"/>
+              </a:rPr>
+              <a:t>Focus on creating requirements &amp; Product Backlog Items</a:t>
             </a:r>
-            <a:endParaRPr lang="en-US" sz="1050" dirty="0">
-              <a:latin typeface="Manrope" pitchFamily="2" charset="0"/>
-            </a:endParaRPr>
           </a:p>
         </p:txBody>
       </p:sp>
@@ -25317,7 +26465,9 @@
           <a:lstStyle/>
           <a:p>
             <a:r>
-              <a:rPr lang="en-US" sz="4000" dirty="0"/>
+              <a:rPr lang="en-US" sz="3000" dirty="0">
+                <a:latin typeface="Ubuntu" panose="020B0504030602030204" pitchFamily="34" charset="0"/>
+              </a:rPr>
               <a:t>Executes plans &amp; decisions made by stakeholders</a:t>
             </a:r>
           </a:p>
@@ -25601,12 +26751,11 @@
           <a:lstStyle/>
           <a:p>
             <a:r>
-              <a:rPr lang="en-US" sz="4000" dirty="0"/>
-              <a:t>Focus on creating requirements &amp; product backlog items</a:t>
+              <a:rPr lang="en-US" sz="3000" dirty="0">
+                <a:latin typeface="Ubuntu" panose="020B0504030602030204" pitchFamily="34" charset="0"/>
+              </a:rPr>
+              <a:t>Focus on creating requirements &amp; Product Backlog Items</a:t>
             </a:r>
-            <a:endParaRPr lang="en-US" sz="1050" dirty="0">
-              <a:latin typeface="Manrope" pitchFamily="2" charset="0"/>
-            </a:endParaRPr>
           </a:p>
         </p:txBody>
       </p:sp>
@@ -25661,7 +26810,9 @@
           <a:lstStyle/>
           <a:p>
             <a:r>
-              <a:rPr lang="en-US" sz="4000" dirty="0"/>
+              <a:rPr lang="en-US" sz="3000" dirty="0">
+                <a:latin typeface="Ubuntu" panose="020B0504030602030204" pitchFamily="34" charset="0"/>
+              </a:rPr>
               <a:t>Executes plans &amp; decisions made by stakeholders</a:t>
             </a:r>
           </a:p>
@@ -25701,7 +26852,7 @@
           <p:cNvPr id="6" name="Text Placeholder 1">
             <a:extLst>
               <a:ext uri="{FF2B5EF4-FFF2-40B4-BE49-F238E27FC236}">
-                <a16:creationId xmlns:a16="http://schemas.microsoft.com/office/drawing/2014/main" id="{1B178722-AB77-ADD4-F984-1FEF568FB3FF}"/>
+                <a16:creationId xmlns:a16="http://schemas.microsoft.com/office/drawing/2014/main" id="{0053F6A2-9CE5-1161-4CE8-79A7313E43CB}"/>
               </a:ext>
             </a:extLst>
           </p:cNvPr>
@@ -25896,7 +27047,7 @@
     </p:spTree>
     <p:extLst>
       <p:ext uri="{BB962C8B-B14F-4D97-AF65-F5344CB8AC3E}">
-        <p14:creationId xmlns:p14="http://schemas.microsoft.com/office/powerpoint/2010/main" val="1386201035"/>
+        <p14:creationId xmlns:p14="http://schemas.microsoft.com/office/powerpoint/2010/main" val="2954588375"/>
       </p:ext>
     </p:extLst>
   </p:cSld>
@@ -25945,12 +27096,11 @@
           <a:lstStyle/>
           <a:p>
             <a:r>
-              <a:rPr lang="en-US" sz="4000" dirty="0"/>
-              <a:t>Focus on creating Sprint goals &amp; product increments</a:t>
+              <a:rPr lang="en-US" sz="3000" dirty="0">
+                <a:latin typeface="Ubuntu" panose="020B0504030602030204" pitchFamily="34" charset="0"/>
+              </a:rPr>
+              <a:t>Focus on creating Sprint Goals &amp; Product Increments</a:t>
             </a:r>
-            <a:endParaRPr lang="en-US" sz="1050" dirty="0">
-              <a:latin typeface="Manrope" pitchFamily="2" charset="0"/>
-            </a:endParaRPr>
           </a:p>
         </p:txBody>
       </p:sp>
@@ -26005,8 +27155,10 @@
           <a:lstStyle/>
           <a:p>
             <a:r>
-              <a:rPr lang="en-US" sz="4000" dirty="0"/>
-              <a:t>Has influence on stakeholders in making plans &amp; product related decisions</a:t>
+              <a:rPr lang="en-US" sz="3000" dirty="0">
+                <a:latin typeface="Ubuntu" panose="020B0504030602030204" pitchFamily="34" charset="0"/>
+              </a:rPr>
+              <a:t>Has influence on stakeholders in making plans &amp; Product related decisions</a:t>
             </a:r>
           </a:p>
         </p:txBody>
@@ -26348,12 +27500,11 @@
           <a:lstStyle/>
           <a:p>
             <a:r>
-              <a:rPr lang="en-US" sz="4000" dirty="0"/>
-              <a:t>Focus on creating Sprint goals &amp; product increments</a:t>
+              <a:rPr lang="en-US" sz="3000" dirty="0">
+                <a:latin typeface="Ubuntu" panose="020B0504030602030204" pitchFamily="34" charset="0"/>
+              </a:rPr>
+              <a:t>Focus on creating Sprint Goals &amp; Product Increments</a:t>
             </a:r>
-            <a:endParaRPr lang="en-US" sz="1050" dirty="0">
-              <a:latin typeface="Manrope" pitchFamily="2" charset="0"/>
-            </a:endParaRPr>
           </a:p>
         </p:txBody>
       </p:sp>
@@ -26408,8 +27559,10 @@
           <a:lstStyle/>
           <a:p>
             <a:r>
-              <a:rPr lang="en-US" sz="4000" dirty="0"/>
-              <a:t>Has influence on stakeholders in making plans &amp; product related decisions</a:t>
+              <a:rPr lang="en-US" sz="3000" dirty="0">
+                <a:latin typeface="Ubuntu" panose="020B0504030602030204" pitchFamily="34" charset="0"/>
+              </a:rPr>
+              <a:t>Has influence on stakeholders in making plans &amp; Product related decisions</a:t>
             </a:r>
           </a:p>
         </p:txBody>
@@ -26448,7 +27601,7 @@
           <p:cNvPr id="6" name="Text Placeholder 1">
             <a:extLst>
               <a:ext uri="{FF2B5EF4-FFF2-40B4-BE49-F238E27FC236}">
-                <a16:creationId xmlns:a16="http://schemas.microsoft.com/office/drawing/2014/main" id="{C86B6B4E-62E9-7F97-892C-CC962139E3F7}"/>
+                <a16:creationId xmlns:a16="http://schemas.microsoft.com/office/drawing/2014/main" id="{785CE489-A858-784D-5923-57B8923E5C1C}"/>
               </a:ext>
             </a:extLst>
           </p:cNvPr>
@@ -26643,7 +27796,7 @@
     </p:spTree>
     <p:extLst>
       <p:ext uri="{BB962C8B-B14F-4D97-AF65-F5344CB8AC3E}">
-        <p14:creationId xmlns:p14="http://schemas.microsoft.com/office/powerpoint/2010/main" val="3471392720"/>
+        <p14:creationId xmlns:p14="http://schemas.microsoft.com/office/powerpoint/2010/main" val="397487342"/>
       </p:ext>
     </p:extLst>
   </p:cSld>
@@ -26692,12 +27845,11 @@
           <a:lstStyle/>
           <a:p>
             <a:r>
-              <a:rPr lang="en-US" sz="4000" dirty="0"/>
+              <a:rPr lang="en-US" sz="3000" dirty="0">
+                <a:latin typeface="Ubuntu" panose="020B0504030602030204" pitchFamily="34" charset="0"/>
+              </a:rPr>
               <a:t>Focus on creating value &amp; continuously validate assumptions</a:t>
             </a:r>
-            <a:endParaRPr lang="en-US" sz="1050" dirty="0">
-              <a:latin typeface="Manrope" pitchFamily="2" charset="0"/>
-            </a:endParaRPr>
           </a:p>
         </p:txBody>
       </p:sp>
@@ -26752,8 +27904,10 @@
           <a:lstStyle/>
           <a:p>
             <a:r>
-              <a:rPr lang="en-US" sz="4000" dirty="0"/>
-              <a:t>Collaborate with stakeholders to make plans &amp; product related decisions</a:t>
+              <a:rPr lang="en-US" sz="3000" dirty="0">
+                <a:latin typeface="Ubuntu" panose="020B0504030602030204" pitchFamily="34" charset="0"/>
+              </a:rPr>
+              <a:t>Collaborate with stakeholders to make plans &amp; Product related decisions</a:t>
             </a:r>
           </a:p>
         </p:txBody>
@@ -27036,12 +28190,11 @@
           <a:lstStyle/>
           <a:p>
             <a:r>
-              <a:rPr lang="en-US" sz="4000" dirty="0"/>
+              <a:rPr lang="en-US" sz="3000" dirty="0">
+                <a:latin typeface="Ubuntu" panose="020B0504030602030204" pitchFamily="34" charset="0"/>
+              </a:rPr>
               <a:t>Focus on creating value &amp; continuously validate assumptions</a:t>
             </a:r>
-            <a:endParaRPr lang="en-US" sz="1050" dirty="0">
-              <a:latin typeface="Manrope" pitchFamily="2" charset="0"/>
-            </a:endParaRPr>
           </a:p>
         </p:txBody>
       </p:sp>
@@ -27096,8 +28249,10 @@
           <a:lstStyle/>
           <a:p>
             <a:r>
-              <a:rPr lang="en-US" sz="4000" dirty="0"/>
-              <a:t>Collaborate with stakeholders to make plans &amp; product related decisions</a:t>
+              <a:rPr lang="en-US" sz="3000" dirty="0">
+                <a:latin typeface="Ubuntu" panose="020B0504030602030204" pitchFamily="34" charset="0"/>
+              </a:rPr>
+              <a:t>Collaborate with stakeholders to make plans &amp; Product related decisions</a:t>
             </a:r>
           </a:p>
         </p:txBody>
@@ -27136,7 +28291,7 @@
           <p:cNvPr id="6" name="Text Placeholder 1">
             <a:extLst>
               <a:ext uri="{FF2B5EF4-FFF2-40B4-BE49-F238E27FC236}">
-                <a16:creationId xmlns:a16="http://schemas.microsoft.com/office/drawing/2014/main" id="{D04BA9A7-079E-1C5C-4768-57AF3A15C8BD}"/>
+                <a16:creationId xmlns:a16="http://schemas.microsoft.com/office/drawing/2014/main" id="{BA244130-E98C-1723-C038-309240C3E6ED}"/>
               </a:ext>
             </a:extLst>
           </p:cNvPr>
@@ -27331,7 +28486,7 @@
     </p:spTree>
     <p:extLst>
       <p:ext uri="{BB962C8B-B14F-4D97-AF65-F5344CB8AC3E}">
-        <p14:creationId xmlns:p14="http://schemas.microsoft.com/office/powerpoint/2010/main" val="1734131973"/>
+        <p14:creationId xmlns:p14="http://schemas.microsoft.com/office/powerpoint/2010/main" val="3775546726"/>
       </p:ext>
     </p:extLst>
   </p:cSld>
@@ -27380,12 +28535,11 @@
           <a:lstStyle/>
           <a:p>
             <a:r>
-              <a:rPr lang="en-US" sz="4000" dirty="0"/>
+              <a:rPr lang="en-US" sz="3000" dirty="0">
+                <a:latin typeface="Ubuntu" panose="020B0504030602030204" pitchFamily="34" charset="0"/>
+              </a:rPr>
               <a:t>Focus on continuous value creation &amp; stakeholder collaboration</a:t>
             </a:r>
-            <a:endParaRPr lang="en-US" sz="1050" dirty="0">
-              <a:latin typeface="Manrope" pitchFamily="2" charset="0"/>
-            </a:endParaRPr>
           </a:p>
         </p:txBody>
       </p:sp>
@@ -27440,8 +28594,10 @@
           <a:lstStyle/>
           <a:p>
             <a:r>
-              <a:rPr lang="en-US" sz="4000" dirty="0"/>
-              <a:t>Has mandate to make product related decisions &amp; release plans</a:t>
+              <a:rPr lang="en-US" sz="3000" dirty="0">
+                <a:latin typeface="Ubuntu" panose="020B0504030602030204" pitchFamily="34" charset="0"/>
+              </a:rPr>
+              <a:t>Has mandate to make Product related decisions &amp; release plans</a:t>
             </a:r>
           </a:p>
         </p:txBody>
@@ -27724,12 +28880,11 @@
           <a:lstStyle/>
           <a:p>
             <a:r>
-              <a:rPr lang="en-US" sz="4000" dirty="0"/>
+              <a:rPr lang="en-US" sz="3000" dirty="0">
+                <a:latin typeface="Ubuntu" panose="020B0504030602030204" pitchFamily="34" charset="0"/>
+              </a:rPr>
               <a:t>Focus on continuous value creation &amp; stakeholder collaboration</a:t>
             </a:r>
-            <a:endParaRPr lang="en-US" sz="1050" dirty="0">
-              <a:latin typeface="Manrope" pitchFamily="2" charset="0"/>
-            </a:endParaRPr>
           </a:p>
         </p:txBody>
       </p:sp>
@@ -27784,8 +28939,10 @@
           <a:lstStyle/>
           <a:p>
             <a:r>
-              <a:rPr lang="en-US" sz="4000" dirty="0"/>
-              <a:t>Has mandate to make product related decisions &amp; release plans</a:t>
+              <a:rPr lang="en-US" sz="3000" dirty="0">
+                <a:latin typeface="Ubuntu" panose="020B0504030602030204" pitchFamily="34" charset="0"/>
+              </a:rPr>
+              <a:t>Has mandate to make Product related decisions &amp; release plans</a:t>
             </a:r>
           </a:p>
         </p:txBody>
@@ -27824,7 +28981,7 @@
           <p:cNvPr id="6" name="Text Placeholder 1">
             <a:extLst>
               <a:ext uri="{FF2B5EF4-FFF2-40B4-BE49-F238E27FC236}">
-                <a16:creationId xmlns:a16="http://schemas.microsoft.com/office/drawing/2014/main" id="{82E8965E-D376-8AAF-2C21-7244AA581A2A}"/>
+                <a16:creationId xmlns:a16="http://schemas.microsoft.com/office/drawing/2014/main" id="{14273908-59D9-940C-9E72-950C9177D7BD}"/>
               </a:ext>
             </a:extLst>
           </p:cNvPr>
@@ -28019,7 +29176,7 @@
     </p:spTree>
     <p:extLst>
       <p:ext uri="{BB962C8B-B14F-4D97-AF65-F5344CB8AC3E}">
-        <p14:creationId xmlns:p14="http://schemas.microsoft.com/office/powerpoint/2010/main" val="1292218336"/>
+        <p14:creationId xmlns:p14="http://schemas.microsoft.com/office/powerpoint/2010/main" val="192906094"/>
       </p:ext>
     </p:extLst>
   </p:cSld>
@@ -28068,12 +29225,11 @@
           <a:lstStyle/>
           <a:p>
             <a:r>
-              <a:rPr lang="en-US" sz="4000" dirty="0"/>
+              <a:rPr lang="en-US" sz="3000" dirty="0">
+                <a:latin typeface="Ubuntu" panose="020B0504030602030204" pitchFamily="34" charset="0"/>
+              </a:rPr>
               <a:t>Focus on continuous value optimizing &amp; customer collaboration</a:t>
             </a:r>
-            <a:endParaRPr lang="en-US" sz="1050" dirty="0">
-              <a:latin typeface="Manrope" pitchFamily="2" charset="0"/>
-            </a:endParaRPr>
           </a:p>
         </p:txBody>
       </p:sp>
@@ -28128,7 +29284,9 @@
           <a:lstStyle/>
           <a:p>
             <a:r>
-              <a:rPr lang="en-US" sz="3500" dirty="0"/>
+              <a:rPr lang="en-US" sz="3000" dirty="0">
+                <a:latin typeface="Ubuntu" panose="020B0504030602030204" pitchFamily="34" charset="0"/>
+              </a:rPr>
               <a:t>Is responsible for planning, budget, profits &amp; loss of the products’ value chain</a:t>
             </a:r>
           </a:p>
@@ -28412,12 +29570,11 @@
           <a:lstStyle/>
           <a:p>
             <a:r>
-              <a:rPr lang="en-US" sz="4000" dirty="0"/>
+              <a:rPr lang="en-US" sz="3000" dirty="0">
+                <a:latin typeface="Ubuntu" panose="020B0504030602030204" pitchFamily="34" charset="0"/>
+              </a:rPr>
               <a:t>Focus on continuous value optimizing &amp; customer collaboration</a:t>
             </a:r>
-            <a:endParaRPr lang="en-US" sz="1050" dirty="0">
-              <a:latin typeface="Manrope" pitchFamily="2" charset="0"/>
-            </a:endParaRPr>
           </a:p>
         </p:txBody>
       </p:sp>
@@ -28472,7 +29629,9 @@
           <a:lstStyle/>
           <a:p>
             <a:r>
-              <a:rPr lang="en-US" sz="3500" dirty="0"/>
+              <a:rPr lang="en-US" sz="3000" dirty="0">
+                <a:latin typeface="Ubuntu" panose="020B0504030602030204" pitchFamily="34" charset="0"/>
+              </a:rPr>
               <a:t>Is responsible for planning, budget, profits &amp; loss of the products’ value chain</a:t>
             </a:r>
           </a:p>
@@ -28512,7 +29671,7 @@
           <p:cNvPr id="6" name="Text Placeholder 1">
             <a:extLst>
               <a:ext uri="{FF2B5EF4-FFF2-40B4-BE49-F238E27FC236}">
-                <a16:creationId xmlns:a16="http://schemas.microsoft.com/office/drawing/2014/main" id="{F9BCBE14-7BE1-AE3D-BCD7-F6EF173F845C}"/>
+                <a16:creationId xmlns:a16="http://schemas.microsoft.com/office/drawing/2014/main" id="{1206E5F5-5C4F-4016-C424-D33847996D39}"/>
               </a:ext>
             </a:extLst>
           </p:cNvPr>
@@ -28707,7 +29866,7 @@
     </p:spTree>
     <p:extLst>
       <p:ext uri="{BB962C8B-B14F-4D97-AF65-F5344CB8AC3E}">
-        <p14:creationId xmlns:p14="http://schemas.microsoft.com/office/powerpoint/2010/main" val="2951154706"/>
+        <p14:creationId xmlns:p14="http://schemas.microsoft.com/office/powerpoint/2010/main" val="727514259"/>
       </p:ext>
     </p:extLst>
   </p:cSld>
@@ -28874,12 +30033,11 @@
           <a:lstStyle/>
           <a:p>
             <a:r>
-              <a:rPr lang="en-US" sz="4000" dirty="0"/>
-              <a:t>Relying on the Scrum master to facilitate them</a:t>
+              <a:rPr lang="en-US" sz="3000" dirty="0">
+                <a:latin typeface="Ubuntu" panose="020B0504030602030204" pitchFamily="34" charset="0"/>
+              </a:rPr>
+              <a:t>Relying on the Scrum Master to facilitate them</a:t>
             </a:r>
-            <a:endParaRPr lang="en-US" sz="1050" dirty="0">
-              <a:latin typeface="Manrope" pitchFamily="2" charset="0"/>
-            </a:endParaRPr>
           </a:p>
         </p:txBody>
       </p:sp>
@@ -28934,12 +30092,16 @@
           <a:lstStyle/>
           <a:p>
             <a:r>
-              <a:rPr lang="en-US" sz="3500" dirty="0"/>
-              <a:t>Avoiding conflict/  Pursuing individual targets/ generating outputs</a:t>
+              <a:rPr lang="en-US" sz="3000" dirty="0">
+                <a:latin typeface="Ubuntu" panose="020B0504030602030204" pitchFamily="34" charset="0"/>
+              </a:rPr>
+              <a:t>Avoiding conflict /  Pursuing individual targets / generating outputs</a:t>
             </a:r>
           </a:p>
           <a:p>
-            <a:endParaRPr lang="en-NL" sz="3500" dirty="0"/>
+            <a:endParaRPr lang="en-NL" sz="3000" dirty="0">
+              <a:latin typeface="Ubuntu" panose="020B0504030602030204" pitchFamily="34" charset="0"/>
+            </a:endParaRPr>
           </a:p>
         </p:txBody>
       </p:sp>
@@ -29280,12 +30442,11 @@
           <a:lstStyle/>
           <a:p>
             <a:r>
-              <a:rPr lang="en-US" sz="4000" dirty="0"/>
-              <a:t>Relying on the Scrum master to facilitate them</a:t>
+              <a:rPr lang="en-US" sz="3000" dirty="0">
+                <a:latin typeface="Ubuntu" panose="020B0504030602030204" pitchFamily="34" charset="0"/>
+              </a:rPr>
+              <a:t>Relying on the Scrum Master to facilitate them</a:t>
             </a:r>
-            <a:endParaRPr lang="en-US" sz="1050" dirty="0">
-              <a:latin typeface="Manrope" pitchFamily="2" charset="0"/>
-            </a:endParaRPr>
           </a:p>
         </p:txBody>
       </p:sp>
@@ -29340,12 +30501,16 @@
           <a:lstStyle/>
           <a:p>
             <a:r>
-              <a:rPr lang="en-US" sz="3500" dirty="0"/>
-              <a:t>Avoiding conflict/  Pursuing individual targets/ generating outputs</a:t>
+              <a:rPr lang="en-US" sz="3000" dirty="0">
+                <a:latin typeface="Ubuntu" panose="020B0504030602030204" pitchFamily="34" charset="0"/>
+              </a:rPr>
+              <a:t>Avoiding conflict /  Pursuing individual targets / generating outputs</a:t>
             </a:r>
           </a:p>
           <a:p>
-            <a:endParaRPr lang="en-NL" sz="3500" dirty="0"/>
+            <a:endParaRPr lang="en-NL" sz="3000" dirty="0">
+              <a:latin typeface="Ubuntu" panose="020B0504030602030204" pitchFamily="34" charset="0"/>
+            </a:endParaRPr>
           </a:p>
         </p:txBody>
       </p:sp>
@@ -29383,7 +30548,7 @@
           <p:cNvPr id="6" name="Text Placeholder 1">
             <a:extLst>
               <a:ext uri="{FF2B5EF4-FFF2-40B4-BE49-F238E27FC236}">
-                <a16:creationId xmlns:a16="http://schemas.microsoft.com/office/drawing/2014/main" id="{E1192895-10ED-219A-5A7D-A9EC7BF9AB95}"/>
+                <a16:creationId xmlns:a16="http://schemas.microsoft.com/office/drawing/2014/main" id="{10226E01-C3C9-A7B1-D098-706D305EB80E}"/>
               </a:ext>
             </a:extLst>
           </p:cNvPr>
@@ -29578,7 +30743,7 @@
     </p:spTree>
     <p:extLst>
       <p:ext uri="{BB962C8B-B14F-4D97-AF65-F5344CB8AC3E}">
-        <p14:creationId xmlns:p14="http://schemas.microsoft.com/office/powerpoint/2010/main" val="826171372"/>
+        <p14:creationId xmlns:p14="http://schemas.microsoft.com/office/powerpoint/2010/main" val="3785406611"/>
       </p:ext>
     </p:extLst>
   </p:cSld>
@@ -29627,12 +30792,11 @@
           <a:lstStyle/>
           <a:p>
             <a:r>
-              <a:rPr lang="en-US" sz="4000" dirty="0"/>
-              <a:t>Ensuring the outcome of all events &amp; learning the scrum values</a:t>
+              <a:rPr lang="en-US" sz="3000" dirty="0">
+                <a:latin typeface="Ubuntu" panose="020B0504030602030204" pitchFamily="34" charset="0"/>
+              </a:rPr>
+              <a:t>Ensuring the outcome of all events &amp; learning the Scrum Values</a:t>
             </a:r>
-            <a:endParaRPr lang="en-US" sz="1050" dirty="0">
-              <a:latin typeface="Manrope" pitchFamily="2" charset="0"/>
-            </a:endParaRPr>
           </a:p>
         </p:txBody>
       </p:sp>
@@ -29687,8 +30851,10 @@
           <a:lstStyle/>
           <a:p>
             <a:r>
-              <a:rPr lang="en-US" dirty="0"/>
-              <a:t>Discovering differences/ conflicts/ shared values</a:t>
+              <a:rPr lang="en-US" sz="3000" dirty="0">
+                <a:latin typeface="Ubuntu" panose="020B0504030602030204" pitchFamily="34" charset="0"/>
+              </a:rPr>
+              <a:t>Discovering differences/ conflicts / shared values</a:t>
             </a:r>
           </a:p>
         </p:txBody>
@@ -29971,12 +31137,11 @@
           <a:lstStyle/>
           <a:p>
             <a:r>
-              <a:rPr lang="en-US" sz="4000" dirty="0"/>
-              <a:t>Ensuring the outcome of all events &amp; learning the scrum values</a:t>
+              <a:rPr lang="en-US" sz="3000" dirty="0">
+                <a:latin typeface="Ubuntu" panose="020B0504030602030204" pitchFamily="34" charset="0"/>
+              </a:rPr>
+              <a:t>Ensuring the outcome of all events &amp; learning the Scrum Values</a:t>
             </a:r>
-            <a:endParaRPr lang="en-US" sz="1050" dirty="0">
-              <a:latin typeface="Manrope" pitchFamily="2" charset="0"/>
-            </a:endParaRPr>
           </a:p>
         </p:txBody>
       </p:sp>
@@ -30031,8 +31196,10 @@
           <a:lstStyle/>
           <a:p>
             <a:r>
-              <a:rPr lang="en-US" dirty="0"/>
-              <a:t>Discovering differences/ conflicts/ shared values</a:t>
+              <a:rPr lang="en-US" sz="3000" dirty="0">
+                <a:latin typeface="Ubuntu" panose="020B0504030602030204" pitchFamily="34" charset="0"/>
+              </a:rPr>
+              <a:t>Discovering differences/ conflicts / shared values</a:t>
             </a:r>
           </a:p>
         </p:txBody>
@@ -30071,7 +31238,7 @@
           <p:cNvPr id="6" name="Text Placeholder 1">
             <a:extLst>
               <a:ext uri="{FF2B5EF4-FFF2-40B4-BE49-F238E27FC236}">
-                <a16:creationId xmlns:a16="http://schemas.microsoft.com/office/drawing/2014/main" id="{4AD64D31-6963-B999-2E9B-EEC0241A77B3}"/>
+                <a16:creationId xmlns:a16="http://schemas.microsoft.com/office/drawing/2014/main" id="{F004852F-27A1-2D1A-7A2B-526B8399434B}"/>
               </a:ext>
             </a:extLst>
           </p:cNvPr>
@@ -30266,7 +31433,7 @@
     </p:spTree>
     <p:extLst>
       <p:ext uri="{BB962C8B-B14F-4D97-AF65-F5344CB8AC3E}">
-        <p14:creationId xmlns:p14="http://schemas.microsoft.com/office/powerpoint/2010/main" val="217489594"/>
+        <p14:creationId xmlns:p14="http://schemas.microsoft.com/office/powerpoint/2010/main" val="3728195757"/>
       </p:ext>
     </p:extLst>
   </p:cSld>
@@ -30315,12 +31482,11 @@
           <a:lstStyle/>
           <a:p>
             <a:r>
-              <a:rPr lang="en-US" sz="4000" dirty="0"/>
-              <a:t>Focused on reaching sprint goals &amp; improving quality </a:t>
+              <a:rPr lang="en-US" sz="3000" dirty="0">
+                <a:latin typeface="Ubuntu" panose="020B0504030602030204" pitchFamily="34" charset="0"/>
+              </a:rPr>
+              <a:t>Focused on reaching Sprint Goals &amp; improving quality </a:t>
             </a:r>
-            <a:endParaRPr lang="en-US" sz="1050" dirty="0">
-              <a:latin typeface="Manrope" pitchFamily="2" charset="0"/>
-            </a:endParaRPr>
           </a:p>
         </p:txBody>
       </p:sp>
@@ -30375,8 +31541,10 @@
           <a:lstStyle/>
           <a:p>
             <a:r>
-              <a:rPr lang="en-US" sz="4000" dirty="0"/>
-              <a:t>Using Scrum &amp; agile principles as a guideline for all interactions</a:t>
+              <a:rPr lang="en-US" sz="3000" dirty="0">
+                <a:latin typeface="Ubuntu" panose="020B0504030602030204" pitchFamily="34" charset="0"/>
+              </a:rPr>
+              <a:t>Using Scrum &amp; Agile principles as a guideline for all interactions</a:t>
             </a:r>
           </a:p>
         </p:txBody>
@@ -30659,12 +31827,11 @@
           <a:lstStyle/>
           <a:p>
             <a:r>
-              <a:rPr lang="en-US" sz="4000" dirty="0"/>
-              <a:t>Focused on reaching sprint goals &amp; improving quality </a:t>
+              <a:rPr lang="en-US" sz="3000" dirty="0">
+                <a:latin typeface="Ubuntu" panose="020B0504030602030204" pitchFamily="34" charset="0"/>
+              </a:rPr>
+              <a:t>Focused on reaching Sprint Goals &amp; improving quality </a:t>
             </a:r>
-            <a:endParaRPr lang="en-US" sz="1050" dirty="0">
-              <a:latin typeface="Manrope" pitchFamily="2" charset="0"/>
-            </a:endParaRPr>
           </a:p>
         </p:txBody>
       </p:sp>
@@ -30719,8 +31886,10 @@
           <a:lstStyle/>
           <a:p>
             <a:r>
-              <a:rPr lang="en-US" sz="4000" dirty="0"/>
-              <a:t>Using Scrum &amp; agile principles as a guideline for all interactions</a:t>
+              <a:rPr lang="en-US" sz="3000" dirty="0">
+                <a:latin typeface="Ubuntu" panose="020B0504030602030204" pitchFamily="34" charset="0"/>
+              </a:rPr>
+              <a:t>Using Scrum &amp; Agile principles as a guideline for all interactions</a:t>
             </a:r>
           </a:p>
         </p:txBody>
@@ -30759,7 +31928,7 @@
           <p:cNvPr id="6" name="Text Placeholder 1">
             <a:extLst>
               <a:ext uri="{FF2B5EF4-FFF2-40B4-BE49-F238E27FC236}">
-                <a16:creationId xmlns:a16="http://schemas.microsoft.com/office/drawing/2014/main" id="{6B6D2E77-90B1-EB40-8A23-ABBC4704C6AC}"/>
+                <a16:creationId xmlns:a16="http://schemas.microsoft.com/office/drawing/2014/main" id="{BCB5172D-C8FC-D98E-87DD-C0822EAE47F0}"/>
               </a:ext>
             </a:extLst>
           </p:cNvPr>
@@ -30954,7 +32123,7 @@
     </p:spTree>
     <p:extLst>
       <p:ext uri="{BB962C8B-B14F-4D97-AF65-F5344CB8AC3E}">
-        <p14:creationId xmlns:p14="http://schemas.microsoft.com/office/powerpoint/2010/main" val="2693914518"/>
+        <p14:creationId xmlns:p14="http://schemas.microsoft.com/office/powerpoint/2010/main" val="1070377419"/>
       </p:ext>
     </p:extLst>
   </p:cSld>
@@ -31003,12 +32172,11 @@
           <a:lstStyle/>
           <a:p>
             <a:r>
-              <a:rPr lang="en-US" sz="4000" dirty="0"/>
+              <a:rPr lang="en-US" sz="3000" dirty="0">
+                <a:latin typeface="Ubuntu" panose="020B0504030602030204" pitchFamily="34" charset="0"/>
+              </a:rPr>
               <a:t>Responsible &amp; committed to continuously deliver valuable outcome</a:t>
             </a:r>
-            <a:endParaRPr lang="en-US" sz="1050" dirty="0">
-              <a:latin typeface="Manrope" pitchFamily="2" charset="0"/>
-            </a:endParaRPr>
           </a:p>
         </p:txBody>
       </p:sp>
@@ -31063,7 +32231,9 @@
           <a:lstStyle/>
           <a:p>
             <a:r>
-              <a:rPr lang="en-US" sz="4000" dirty="0"/>
+              <a:rPr lang="en-US" sz="3000" dirty="0">
+                <a:latin typeface="Ubuntu" panose="020B0504030602030204" pitchFamily="34" charset="0"/>
+              </a:rPr>
               <a:t>Collaborating with stakeholders to continuously adapt</a:t>
             </a:r>
           </a:p>
@@ -31347,12 +32517,11 @@
           <a:lstStyle/>
           <a:p>
             <a:r>
-              <a:rPr lang="en-US" sz="4000" dirty="0"/>
+              <a:rPr lang="en-US" sz="3000" dirty="0">
+                <a:latin typeface="Ubuntu" panose="020B0504030602030204" pitchFamily="34" charset="0"/>
+              </a:rPr>
               <a:t>Responsible &amp; committed to continuously deliver valuable outcome</a:t>
             </a:r>
-            <a:endParaRPr lang="en-US" sz="1050" dirty="0">
-              <a:latin typeface="Manrope" pitchFamily="2" charset="0"/>
-            </a:endParaRPr>
           </a:p>
         </p:txBody>
       </p:sp>
@@ -31407,7 +32576,9 @@
           <a:lstStyle/>
           <a:p>
             <a:r>
-              <a:rPr lang="en-US" sz="4000" dirty="0"/>
+              <a:rPr lang="en-US" sz="3000" dirty="0">
+                <a:latin typeface="Ubuntu" panose="020B0504030602030204" pitchFamily="34" charset="0"/>
+              </a:rPr>
               <a:t>Collaborating with stakeholders to continuously adapt</a:t>
             </a:r>
           </a:p>
@@ -31447,7 +32618,7 @@
           <p:cNvPr id="6" name="Text Placeholder 1">
             <a:extLst>
               <a:ext uri="{FF2B5EF4-FFF2-40B4-BE49-F238E27FC236}">
-                <a16:creationId xmlns:a16="http://schemas.microsoft.com/office/drawing/2014/main" id="{B6E8D1CB-527B-6AED-F2BA-071B9C9B78E9}"/>
+                <a16:creationId xmlns:a16="http://schemas.microsoft.com/office/drawing/2014/main" id="{D8E98A5A-46BD-B309-379D-9FA98DEF33FC}"/>
               </a:ext>
             </a:extLst>
           </p:cNvPr>
@@ -31642,7 +32813,7 @@
     </p:spTree>
     <p:extLst>
       <p:ext uri="{BB962C8B-B14F-4D97-AF65-F5344CB8AC3E}">
-        <p14:creationId xmlns:p14="http://schemas.microsoft.com/office/powerpoint/2010/main" val="4239895058"/>
+        <p14:creationId xmlns:p14="http://schemas.microsoft.com/office/powerpoint/2010/main" val="3134009850"/>
       </p:ext>
     </p:extLst>
   </p:cSld>
@@ -31691,12 +32862,11 @@
           <a:lstStyle/>
           <a:p>
             <a:r>
-              <a:rPr lang="en-US" sz="4000" dirty="0"/>
-              <a:t>Accountable or creating high quality products</a:t>
+              <a:rPr lang="en-US" sz="3000" dirty="0">
+                <a:latin typeface="Ubuntu" panose="020B0504030602030204" pitchFamily="34" charset="0"/>
+              </a:rPr>
+              <a:t>Accountable or creating high quality Products</a:t>
             </a:r>
-            <a:endParaRPr lang="en-US" sz="1050" dirty="0">
-              <a:latin typeface="Manrope" pitchFamily="2" charset="0"/>
-            </a:endParaRPr>
           </a:p>
         </p:txBody>
       </p:sp>
@@ -31751,7 +32921,9 @@
           <a:lstStyle/>
           <a:p>
             <a:r>
-              <a:rPr lang="en-US" sz="4000" dirty="0"/>
+              <a:rPr lang="en-US" sz="3000" dirty="0">
+                <a:latin typeface="Ubuntu" panose="020B0504030602030204" pitchFamily="34" charset="0"/>
+              </a:rPr>
               <a:t>Collaborating with everyone to participate in sharing feedback &amp; learning</a:t>
             </a:r>
           </a:p>
@@ -32035,12 +33207,11 @@
           <a:lstStyle/>
           <a:p>
             <a:r>
-              <a:rPr lang="en-US" sz="4000" dirty="0"/>
-              <a:t>Accountable or creating high quality products</a:t>
+              <a:rPr lang="en-US" sz="3000" dirty="0">
+                <a:latin typeface="Ubuntu" panose="020B0504030602030204" pitchFamily="34" charset="0"/>
+              </a:rPr>
+              <a:t>Accountable or creating high quality Products</a:t>
             </a:r>
-            <a:endParaRPr lang="en-US" sz="1050" dirty="0">
-              <a:latin typeface="Manrope" pitchFamily="2" charset="0"/>
-            </a:endParaRPr>
           </a:p>
         </p:txBody>
       </p:sp>
@@ -32095,7 +33266,9 @@
           <a:lstStyle/>
           <a:p>
             <a:r>
-              <a:rPr lang="en-US" sz="4000" dirty="0"/>
+              <a:rPr lang="en-US" sz="3000" dirty="0">
+                <a:latin typeface="Ubuntu" panose="020B0504030602030204" pitchFamily="34" charset="0"/>
+              </a:rPr>
               <a:t>Collaborating with everyone to participate in sharing feedback &amp; learning</a:t>
             </a:r>
           </a:p>
@@ -32135,7 +33308,7 @@
           <p:cNvPr id="6" name="Text Placeholder 1">
             <a:extLst>
               <a:ext uri="{FF2B5EF4-FFF2-40B4-BE49-F238E27FC236}">
-                <a16:creationId xmlns:a16="http://schemas.microsoft.com/office/drawing/2014/main" id="{A6CFE622-B8F9-400E-7940-DC1B1916F743}"/>
+                <a16:creationId xmlns:a16="http://schemas.microsoft.com/office/drawing/2014/main" id="{D93CADC4-D2B9-3874-59F9-1690AA15F907}"/>
               </a:ext>
             </a:extLst>
           </p:cNvPr>
@@ -32330,7 +33503,7 @@
     </p:spTree>
     <p:extLst>
       <p:ext uri="{BB962C8B-B14F-4D97-AF65-F5344CB8AC3E}">
-        <p14:creationId xmlns:p14="http://schemas.microsoft.com/office/powerpoint/2010/main" val="178219345"/>
+        <p14:creationId xmlns:p14="http://schemas.microsoft.com/office/powerpoint/2010/main" val="2446414719"/>
       </p:ext>
     </p:extLst>
   </p:cSld>
@@ -32556,12 +33729,11 @@
           <a:lstStyle/>
           <a:p>
             <a:r>
-              <a:rPr lang="en-US" sz="4000" dirty="0"/>
+              <a:rPr lang="en-US" sz="3000" dirty="0">
+                <a:latin typeface="Ubuntu" panose="020B0504030602030204" pitchFamily="34" charset="0"/>
+              </a:rPr>
               <a:t>Wants full control &amp; has a directive communication style</a:t>
             </a:r>
-            <a:endParaRPr lang="en-US" sz="1050" dirty="0">
-              <a:latin typeface="Manrope" pitchFamily="2" charset="0"/>
-            </a:endParaRPr>
           </a:p>
         </p:txBody>
       </p:sp>
@@ -32616,8 +33788,10 @@
           <a:lstStyle/>
           <a:p>
             <a:r>
-              <a:rPr lang="en-US" sz="3500" dirty="0"/>
-              <a:t>Gives individual targets and on progress/ efficiency/ quality &amp; outcomes</a:t>
+              <a:rPr lang="en-US" sz="3000" dirty="0">
+                <a:latin typeface="Ubuntu" panose="020B0504030602030204" pitchFamily="34" charset="0"/>
+              </a:rPr>
+              <a:t>Gives individual targets and on progress / efficiency/ quality &amp; outcomes</a:t>
             </a:r>
           </a:p>
         </p:txBody>
@@ -32900,12 +34074,11 @@
           <a:lstStyle/>
           <a:p>
             <a:r>
-              <a:rPr lang="en-US" sz="4000" dirty="0"/>
+              <a:rPr lang="en-US" sz="3000" dirty="0">
+                <a:latin typeface="Ubuntu" panose="020B0504030602030204" pitchFamily="34" charset="0"/>
+              </a:rPr>
               <a:t>Wants full control &amp; has a directive communication style</a:t>
             </a:r>
-            <a:endParaRPr lang="en-US" sz="1050" dirty="0">
-              <a:latin typeface="Manrope" pitchFamily="2" charset="0"/>
-            </a:endParaRPr>
           </a:p>
         </p:txBody>
       </p:sp>
@@ -32960,8 +34133,10 @@
           <a:lstStyle/>
           <a:p>
             <a:r>
-              <a:rPr lang="en-US" sz="3500" dirty="0"/>
-              <a:t>Gives individual targets and on progress/ efficiency/ quality &amp; outcomes</a:t>
+              <a:rPr lang="en-US" sz="3000" dirty="0">
+                <a:latin typeface="Ubuntu" panose="020B0504030602030204" pitchFamily="34" charset="0"/>
+              </a:rPr>
+              <a:t>Gives individual targets and on progress / efficiency/ quality &amp; outcomes</a:t>
             </a:r>
           </a:p>
         </p:txBody>
@@ -33000,7 +34175,7 @@
           <p:cNvPr id="6" name="Text Placeholder 1">
             <a:extLst>
               <a:ext uri="{FF2B5EF4-FFF2-40B4-BE49-F238E27FC236}">
-                <a16:creationId xmlns:a16="http://schemas.microsoft.com/office/drawing/2014/main" id="{EE640219-8CF2-52AD-77AE-27EBB52B6CAD}"/>
+                <a16:creationId xmlns:a16="http://schemas.microsoft.com/office/drawing/2014/main" id="{30EB7D6E-0473-1CF2-0312-219FF0DBC038}"/>
               </a:ext>
             </a:extLst>
           </p:cNvPr>
@@ -33195,7 +34370,7 @@
     </p:spTree>
     <p:extLst>
       <p:ext uri="{BB962C8B-B14F-4D97-AF65-F5344CB8AC3E}">
-        <p14:creationId xmlns:p14="http://schemas.microsoft.com/office/powerpoint/2010/main" val="415980821"/>
+        <p14:creationId xmlns:p14="http://schemas.microsoft.com/office/powerpoint/2010/main" val="2718256781"/>
       </p:ext>
     </p:extLst>
   </p:cSld>
@@ -33244,12 +34419,11 @@
           <a:lstStyle/>
           <a:p>
             <a:r>
-              <a:rPr lang="en-US" sz="4000" dirty="0"/>
+              <a:rPr lang="en-US" sz="3000" dirty="0">
+                <a:latin typeface="Ubuntu" panose="020B0504030602030204" pitchFamily="34" charset="0"/>
+              </a:rPr>
               <a:t>Wants to be in control &amp; delegates less critical responsibilities</a:t>
             </a:r>
-            <a:endParaRPr lang="en-US" sz="1050" dirty="0">
-              <a:latin typeface="Manrope" pitchFamily="2" charset="0"/>
-            </a:endParaRPr>
           </a:p>
         </p:txBody>
       </p:sp>
@@ -33304,8 +34478,10 @@
           <a:lstStyle/>
           <a:p>
             <a:r>
-              <a:rPr lang="en-US" sz="3500" dirty="0"/>
-              <a:t>Gives team(s) targets and on progress/ efficiency/ quality &amp; outcomes</a:t>
+              <a:rPr lang="en-US" sz="3000" dirty="0">
+                <a:latin typeface="Ubuntu" panose="020B0504030602030204" pitchFamily="34" charset="0"/>
+              </a:rPr>
+              <a:t>Gives team(s) targets and on progress / efficiency / quality &amp; outcomes</a:t>
             </a:r>
           </a:p>
         </p:txBody>
@@ -33588,12 +34764,11 @@
           <a:lstStyle/>
           <a:p>
             <a:r>
-              <a:rPr lang="en-US" sz="4000" dirty="0"/>
+              <a:rPr lang="en-US" sz="3000" dirty="0">
+                <a:latin typeface="Ubuntu" panose="020B0504030602030204" pitchFamily="34" charset="0"/>
+              </a:rPr>
               <a:t>Wants to be in control &amp; delegates less critical responsibilities</a:t>
             </a:r>
-            <a:endParaRPr lang="en-US" sz="1050" dirty="0">
-              <a:latin typeface="Manrope" pitchFamily="2" charset="0"/>
-            </a:endParaRPr>
           </a:p>
         </p:txBody>
       </p:sp>
@@ -33648,8 +34823,10 @@
           <a:lstStyle/>
           <a:p>
             <a:r>
-              <a:rPr lang="en-US" sz="3500" dirty="0"/>
-              <a:t>Gives team(s) targets and on progress/ efficiency/ quality &amp; outcomes</a:t>
+              <a:rPr lang="en-US" sz="3000" dirty="0">
+                <a:latin typeface="Ubuntu" panose="020B0504030602030204" pitchFamily="34" charset="0"/>
+              </a:rPr>
+              <a:t>Gives team(s) targets and on progress / efficiency / quality &amp; outcomes</a:t>
             </a:r>
           </a:p>
         </p:txBody>
@@ -33688,7 +34865,7 @@
           <p:cNvPr id="6" name="Text Placeholder 1">
             <a:extLst>
               <a:ext uri="{FF2B5EF4-FFF2-40B4-BE49-F238E27FC236}">
-                <a16:creationId xmlns:a16="http://schemas.microsoft.com/office/drawing/2014/main" id="{C829B1EB-3C9B-D14D-49B7-C01C1DD40CE3}"/>
+                <a16:creationId xmlns:a16="http://schemas.microsoft.com/office/drawing/2014/main" id="{4468637D-9389-3D43-7766-53E64610CED3}"/>
               </a:ext>
             </a:extLst>
           </p:cNvPr>
@@ -33883,7 +35060,7 @@
     </p:spTree>
     <p:extLst>
       <p:ext uri="{BB962C8B-B14F-4D97-AF65-F5344CB8AC3E}">
-        <p14:creationId xmlns:p14="http://schemas.microsoft.com/office/powerpoint/2010/main" val="1467359079"/>
+        <p14:creationId xmlns:p14="http://schemas.microsoft.com/office/powerpoint/2010/main" val="116660721"/>
       </p:ext>
     </p:extLst>
   </p:cSld>
@@ -33932,12 +35109,11 @@
           <a:lstStyle/>
           <a:p>
             <a:r>
-              <a:rPr lang="en-US" sz="4000" dirty="0"/>
-              <a:t>DELEGATES MORE IMPORTANT RESPONSIBILITIES</a:t>
+              <a:rPr lang="en-US" sz="3000" dirty="0">
+                <a:latin typeface="Ubuntu" panose="020B0504030602030204" pitchFamily="34" charset="0"/>
+              </a:rPr>
+              <a:t>Delegates more important responsibilities</a:t>
             </a:r>
-            <a:endParaRPr lang="en-US" sz="1050" dirty="0">
-              <a:latin typeface="Manrope" pitchFamily="2" charset="0"/>
-            </a:endParaRPr>
           </a:p>
         </p:txBody>
       </p:sp>
@@ -33992,8 +35168,10 @@
           <a:lstStyle/>
           <a:p>
             <a:r>
-              <a:rPr lang="en-US" sz="3500" dirty="0"/>
-              <a:t>PROVIDES BOUNDARY CONDITIONS FOR TEAMS TO SET THEIR OWN TARGETS</a:t>
+              <a:rPr lang="en-US" sz="3000" dirty="0">
+                <a:latin typeface="Ubuntu" panose="020B0504030602030204" pitchFamily="34" charset="0"/>
+              </a:rPr>
+              <a:t>Provides boundary conditions for teams to set  their own targets</a:t>
             </a:r>
           </a:p>
         </p:txBody>
@@ -34276,12 +35454,11 @@
           <a:lstStyle/>
           <a:p>
             <a:r>
-              <a:rPr lang="en-US" sz="4000" dirty="0"/>
-              <a:t>DELEGATES MORE IMPORTANT RESPONSIBILITIES</a:t>
+              <a:rPr lang="en-US" sz="3000" dirty="0">
+                <a:latin typeface="Ubuntu" panose="020B0504030602030204" pitchFamily="34" charset="0"/>
+              </a:rPr>
+              <a:t>Delegates more important responsibilities</a:t>
             </a:r>
-            <a:endParaRPr lang="en-US" sz="1050" dirty="0">
-              <a:latin typeface="Manrope" pitchFamily="2" charset="0"/>
-            </a:endParaRPr>
           </a:p>
         </p:txBody>
       </p:sp>
@@ -34336,8 +35513,10 @@
           <a:lstStyle/>
           <a:p>
             <a:r>
-              <a:rPr lang="en-US" sz="3500" dirty="0"/>
-              <a:t>PROVIDES BOUNDARY CONDITIONS FOR TEAMS TO SET THEIR OWN TARGETS</a:t>
+              <a:rPr lang="en-US" sz="3000" dirty="0">
+                <a:latin typeface="Ubuntu" panose="020B0504030602030204" pitchFamily="34" charset="0"/>
+              </a:rPr>
+              <a:t>Provides boundary conditions for teams to set  their own targets</a:t>
             </a:r>
           </a:p>
         </p:txBody>
@@ -34376,7 +35555,7 @@
           <p:cNvPr id="6" name="Text Placeholder 1">
             <a:extLst>
               <a:ext uri="{FF2B5EF4-FFF2-40B4-BE49-F238E27FC236}">
-                <a16:creationId xmlns:a16="http://schemas.microsoft.com/office/drawing/2014/main" id="{6F8856BA-9EA8-97AD-E583-646C0191130C}"/>
+                <a16:creationId xmlns:a16="http://schemas.microsoft.com/office/drawing/2014/main" id="{BA430EAE-37CA-BDC6-7261-6924ACB82ECC}"/>
               </a:ext>
             </a:extLst>
           </p:cNvPr>
@@ -34571,7 +35750,7 @@
     </p:spTree>
     <p:extLst>
       <p:ext uri="{BB962C8B-B14F-4D97-AF65-F5344CB8AC3E}">
-        <p14:creationId xmlns:p14="http://schemas.microsoft.com/office/powerpoint/2010/main" val="2313812796"/>
+        <p14:creationId xmlns:p14="http://schemas.microsoft.com/office/powerpoint/2010/main" val="781062866"/>
       </p:ext>
     </p:extLst>
   </p:cSld>
@@ -34620,12 +35799,11 @@
           <a:lstStyle/>
           <a:p>
             <a:r>
-              <a:rPr lang="en-US" sz="4000" dirty="0"/>
-              <a:t>DELEGATES ALL BUT CRITICAL DECISIONS &amp; RESPONSIBILITIES</a:t>
+              <a:rPr lang="en-US" sz="3000" dirty="0">
+                <a:latin typeface="Ubuntu" panose="020B0504030602030204" pitchFamily="34" charset="0"/>
+              </a:rPr>
+              <a:t>Delegates all but critical decisions &amp; responsibilities</a:t>
             </a:r>
-            <a:endParaRPr lang="en-US" sz="1050" dirty="0">
-              <a:latin typeface="Manrope" pitchFamily="2" charset="0"/>
-            </a:endParaRPr>
           </a:p>
         </p:txBody>
       </p:sp>
@@ -34680,8 +35858,10 @@
           <a:lstStyle/>
           <a:p>
             <a:r>
-              <a:rPr lang="en-US" dirty="0"/>
-              <a:t>CREATES AN ENVIRONMENT WHERE TEAMS CAN SELF-MANAGE &amp; CREATE VALUE</a:t>
+              <a:rPr lang="en-US" sz="3000" dirty="0">
+                <a:latin typeface="Ubuntu" panose="020B0504030602030204" pitchFamily="34" charset="0"/>
+              </a:rPr>
+              <a:t>Creates an environment where teams can self-manage &amp; create value</a:t>
             </a:r>
           </a:p>
         </p:txBody>
@@ -34964,12 +36144,11 @@
           <a:lstStyle/>
           <a:p>
             <a:r>
-              <a:rPr lang="en-US" sz="4000" dirty="0"/>
-              <a:t>DELEGATES ALL BUT CRITICAL DECISIONS &amp; RESPONSIBILITIES</a:t>
+              <a:rPr lang="en-US" sz="3000" dirty="0">
+                <a:latin typeface="Ubuntu" panose="020B0504030602030204" pitchFamily="34" charset="0"/>
+              </a:rPr>
+              <a:t>Delegates all but critical decisions &amp; responsibilities</a:t>
             </a:r>
-            <a:endParaRPr lang="en-US" sz="1050" dirty="0">
-              <a:latin typeface="Manrope" pitchFamily="2" charset="0"/>
-            </a:endParaRPr>
           </a:p>
         </p:txBody>
       </p:sp>
@@ -35024,8 +36203,10 @@
           <a:lstStyle/>
           <a:p>
             <a:r>
-              <a:rPr lang="en-US" dirty="0"/>
-              <a:t>CREATES AN ENVIRONMENT WHERE TEAMS CAN SELF-MANAGE &amp; CREATE VALUE</a:t>
+              <a:rPr lang="en-US" sz="3000" dirty="0">
+                <a:latin typeface="Ubuntu" panose="020B0504030602030204" pitchFamily="34" charset="0"/>
+              </a:rPr>
+              <a:t>Creates an environment where teams can self-manage &amp; create value</a:t>
             </a:r>
           </a:p>
         </p:txBody>
@@ -35064,7 +36245,7 @@
           <p:cNvPr id="6" name="Text Placeholder 1">
             <a:extLst>
               <a:ext uri="{FF2B5EF4-FFF2-40B4-BE49-F238E27FC236}">
-                <a16:creationId xmlns:a16="http://schemas.microsoft.com/office/drawing/2014/main" id="{C6EF0E42-794A-4C32-B57E-C28AD4330158}"/>
+                <a16:creationId xmlns:a16="http://schemas.microsoft.com/office/drawing/2014/main" id="{D869DEFD-FAD9-D801-FF67-E2AA59254600}"/>
               </a:ext>
             </a:extLst>
           </p:cNvPr>
@@ -35259,7 +36440,7 @@
     </p:spTree>
     <p:extLst>
       <p:ext uri="{BB962C8B-B14F-4D97-AF65-F5344CB8AC3E}">
-        <p14:creationId xmlns:p14="http://schemas.microsoft.com/office/powerpoint/2010/main" val="2393475525"/>
+        <p14:creationId xmlns:p14="http://schemas.microsoft.com/office/powerpoint/2010/main" val="3259217527"/>
       </p:ext>
     </p:extLst>
   </p:cSld>
@@ -35308,12 +36489,11 @@
           <a:lstStyle/>
           <a:p>
             <a:r>
-              <a:rPr lang="en-US" sz="4000" dirty="0"/>
-              <a:t>DELEGATE ALL DECISIONS &amp; RESPONSIBILITIES</a:t>
+              <a:rPr lang="en-US" sz="3000" dirty="0">
+                <a:latin typeface="Ubuntu" panose="020B0504030602030204" pitchFamily="34" charset="0"/>
+              </a:rPr>
+              <a:t>Delegate all decisions &amp; responsibilities</a:t>
             </a:r>
-            <a:endParaRPr lang="en-US" sz="1050" dirty="0">
-              <a:latin typeface="Manrope" pitchFamily="2" charset="0"/>
-            </a:endParaRPr>
           </a:p>
         </p:txBody>
       </p:sp>
@@ -35368,8 +36548,10 @@
           <a:lstStyle/>
           <a:p>
             <a:r>
-              <a:rPr lang="en-US" sz="3500" dirty="0"/>
-              <a:t>FACILITATES ENTREPRENEURSHIP &amp; GROWTH FOR EVERY EMPLOYEE</a:t>
+              <a:rPr lang="en-US" sz="3000" dirty="0">
+                <a:latin typeface="Ubuntu" panose="020B0504030602030204" pitchFamily="34" charset="0"/>
+              </a:rPr>
+              <a:t>Facilitates entrepreneurship &amp; growth for every employee</a:t>
             </a:r>
           </a:p>
         </p:txBody>
@@ -35711,12 +36893,11 @@
           <a:lstStyle/>
           <a:p>
             <a:r>
-              <a:rPr lang="en-US" sz="4000" dirty="0"/>
-              <a:t>DELEGATE ALL DECISIONS &amp; RESPONSIBILITIES</a:t>
+              <a:rPr lang="en-US" sz="3000" dirty="0">
+                <a:latin typeface="Ubuntu" panose="020B0504030602030204" pitchFamily="34" charset="0"/>
+              </a:rPr>
+              <a:t>Delegate all decisions &amp; responsibilities</a:t>
             </a:r>
-            <a:endParaRPr lang="en-US" sz="1050" dirty="0">
-              <a:latin typeface="Manrope" pitchFamily="2" charset="0"/>
-            </a:endParaRPr>
           </a:p>
         </p:txBody>
       </p:sp>
@@ -35771,8 +36952,10 @@
           <a:lstStyle/>
           <a:p>
             <a:r>
-              <a:rPr lang="en-US" sz="3500" dirty="0"/>
-              <a:t>FACILITATES ENTREPRENEURSHIP &amp; GROWTH FOR EVERY EMPLOYEE</a:t>
+              <a:rPr lang="en-US" sz="3000" dirty="0">
+                <a:latin typeface="Ubuntu" panose="020B0504030602030204" pitchFamily="34" charset="0"/>
+              </a:rPr>
+              <a:t>Facilitates entrepreneurship &amp; growth for every employee</a:t>
             </a:r>
           </a:p>
         </p:txBody>
@@ -35811,7 +36994,7 @@
           <p:cNvPr id="6" name="Text Placeholder 1">
             <a:extLst>
               <a:ext uri="{FF2B5EF4-FFF2-40B4-BE49-F238E27FC236}">
-                <a16:creationId xmlns:a16="http://schemas.microsoft.com/office/drawing/2014/main" id="{22EAF0F9-9274-6C7B-3037-6FBA51710A18}"/>
+                <a16:creationId xmlns:a16="http://schemas.microsoft.com/office/drawing/2014/main" id="{0A756B05-B252-E3EA-B220-4ABEC0201AE9}"/>
               </a:ext>
             </a:extLst>
           </p:cNvPr>
@@ -36006,7 +37189,7 @@
     </p:spTree>
     <p:extLst>
       <p:ext uri="{BB962C8B-B14F-4D97-AF65-F5344CB8AC3E}">
-        <p14:creationId xmlns:p14="http://schemas.microsoft.com/office/powerpoint/2010/main" val="1520640515"/>
+        <p14:creationId xmlns:p14="http://schemas.microsoft.com/office/powerpoint/2010/main" val="2466321810"/>
       </p:ext>
     </p:extLst>
   </p:cSld>

</xml_diff>

<commit_message>
Double check the Key card and Fixes #4
</commit_message>
<xml_diff>
--- a/Exploring Self-Management.pptx
+++ b/Exploring Self-Management.pptx
@@ -192,7 +192,7 @@
   <pc:docChgLst>
     <pc:chgData name="Hsia, Cheehong" userId="6bc27941-0d5a-4c11-8dfb-8bbe9da0911b" providerId="ADAL" clId="{5BE5096F-7F8C-496A-A13C-FF7D0CA7A6B4}"/>
     <pc:docChg chg="undo custSel addSld delSld modSld modMainMaster">
-      <pc:chgData name="Hsia, Cheehong" userId="6bc27941-0d5a-4c11-8dfb-8bbe9da0911b" providerId="ADAL" clId="{5BE5096F-7F8C-496A-A13C-FF7D0CA7A6B4}" dt="2024-02-14T15:30:29.053" v="1624" actId="700"/>
+      <pc:chgData name="Hsia, Cheehong" userId="6bc27941-0d5a-4c11-8dfb-8bbe9da0911b" providerId="ADAL" clId="{5BE5096F-7F8C-496A-A13C-FF7D0CA7A6B4}" dt="2024-02-14T15:49:37.961" v="1640" actId="20577"/>
       <pc:docMkLst>
         <pc:docMk/>
       </pc:docMkLst>
@@ -339,13 +339,13 @@
         </pc:spChg>
       </pc:sldChg>
       <pc:sldChg chg="addSp modSp mod">
-        <pc:chgData name="Hsia, Cheehong" userId="6bc27941-0d5a-4c11-8dfb-8bbe9da0911b" providerId="ADAL" clId="{5BE5096F-7F8C-496A-A13C-FF7D0CA7A6B4}" dt="2024-02-14T15:18:31.948" v="1035" actId="20577"/>
+        <pc:chgData name="Hsia, Cheehong" userId="6bc27941-0d5a-4c11-8dfb-8bbe9da0911b" providerId="ADAL" clId="{5BE5096F-7F8C-496A-A13C-FF7D0CA7A6B4}" dt="2024-02-14T15:47:01.919" v="1625" actId="20577"/>
         <pc:sldMkLst>
           <pc:docMk/>
           <pc:sldMk cId="2685147449" sldId="271"/>
         </pc:sldMkLst>
         <pc:spChg chg="mod">
-          <ac:chgData name="Hsia, Cheehong" userId="6bc27941-0d5a-4c11-8dfb-8bbe9da0911b" providerId="ADAL" clId="{5BE5096F-7F8C-496A-A13C-FF7D0CA7A6B4}" dt="2024-02-14T15:18:31.948" v="1035" actId="20577"/>
+          <ac:chgData name="Hsia, Cheehong" userId="6bc27941-0d5a-4c11-8dfb-8bbe9da0911b" providerId="ADAL" clId="{5BE5096F-7F8C-496A-A13C-FF7D0CA7A6B4}" dt="2024-02-14T15:47:01.919" v="1625" actId="20577"/>
           <ac:spMkLst>
             <pc:docMk/>
             <pc:sldMk cId="2685147449" sldId="271"/>
@@ -765,13 +765,13 @@
         </pc:spChg>
       </pc:sldChg>
       <pc:sldChg chg="addSp modSp mod">
-        <pc:chgData name="Hsia, Cheehong" userId="6bc27941-0d5a-4c11-8dfb-8bbe9da0911b" providerId="ADAL" clId="{5BE5096F-7F8C-496A-A13C-FF7D0CA7A6B4}" dt="2024-02-14T15:22:03.481" v="1095" actId="20577"/>
+        <pc:chgData name="Hsia, Cheehong" userId="6bc27941-0d5a-4c11-8dfb-8bbe9da0911b" providerId="ADAL" clId="{5BE5096F-7F8C-496A-A13C-FF7D0CA7A6B4}" dt="2024-02-14T15:49:33.585" v="1633" actId="20577"/>
         <pc:sldMkLst>
           <pc:docMk/>
           <pc:sldMk cId="3337217698" sldId="288"/>
         </pc:sldMkLst>
         <pc:spChg chg="mod">
-          <ac:chgData name="Hsia, Cheehong" userId="6bc27941-0d5a-4c11-8dfb-8bbe9da0911b" providerId="ADAL" clId="{5BE5096F-7F8C-496A-A13C-FF7D0CA7A6B4}" dt="2024-02-14T15:21:51.734" v="1092" actId="255"/>
+          <ac:chgData name="Hsia, Cheehong" userId="6bc27941-0d5a-4c11-8dfb-8bbe9da0911b" providerId="ADAL" clId="{5BE5096F-7F8C-496A-A13C-FF7D0CA7A6B4}" dt="2024-02-14T15:49:33.585" v="1633" actId="20577"/>
           <ac:spMkLst>
             <pc:docMk/>
             <pc:sldMk cId="3337217698" sldId="288"/>
@@ -1740,13 +1740,13 @@
         </pc:spChg>
       </pc:sldChg>
       <pc:sldChg chg="modSp add mod modClrScheme chgLayout">
-        <pc:chgData name="Hsia, Cheehong" userId="6bc27941-0d5a-4c11-8dfb-8bbe9da0911b" providerId="ADAL" clId="{5BE5096F-7F8C-496A-A13C-FF7D0CA7A6B4}" dt="2024-02-14T15:18:58.663" v="1040" actId="700"/>
+        <pc:chgData name="Hsia, Cheehong" userId="6bc27941-0d5a-4c11-8dfb-8bbe9da0911b" providerId="ADAL" clId="{5BE5096F-7F8C-496A-A13C-FF7D0CA7A6B4}" dt="2024-02-14T15:47:04.420" v="1626" actId="20577"/>
         <pc:sldMkLst>
           <pc:docMk/>
           <pc:sldMk cId="393363697" sldId="322"/>
         </pc:sldMkLst>
         <pc:spChg chg="mod ord">
-          <ac:chgData name="Hsia, Cheehong" userId="6bc27941-0d5a-4c11-8dfb-8bbe9da0911b" providerId="ADAL" clId="{5BE5096F-7F8C-496A-A13C-FF7D0CA7A6B4}" dt="2024-02-14T15:18:58.663" v="1040" actId="700"/>
+          <ac:chgData name="Hsia, Cheehong" userId="6bc27941-0d5a-4c11-8dfb-8bbe9da0911b" providerId="ADAL" clId="{5BE5096F-7F8C-496A-A13C-FF7D0CA7A6B4}" dt="2024-02-14T15:47:04.420" v="1626" actId="20577"/>
           <ac:spMkLst>
             <pc:docMk/>
             <pc:sldMk cId="393363697" sldId="322"/>
@@ -1974,13 +1974,13 @@
         </pc:spChg>
       </pc:sldChg>
       <pc:sldChg chg="modSp add mod modClrScheme chgLayout">
-        <pc:chgData name="Hsia, Cheehong" userId="6bc27941-0d5a-4c11-8dfb-8bbe9da0911b" providerId="ADAL" clId="{5BE5096F-7F8C-496A-A13C-FF7D0CA7A6B4}" dt="2024-02-14T15:22:13.964" v="1098" actId="700"/>
+        <pc:chgData name="Hsia, Cheehong" userId="6bc27941-0d5a-4c11-8dfb-8bbe9da0911b" providerId="ADAL" clId="{5BE5096F-7F8C-496A-A13C-FF7D0CA7A6B4}" dt="2024-02-14T15:49:37.961" v="1640" actId="20577"/>
         <pc:sldMkLst>
           <pc:docMk/>
           <pc:sldMk cId="3775546726" sldId="328"/>
         </pc:sldMkLst>
         <pc:spChg chg="mod ord">
-          <ac:chgData name="Hsia, Cheehong" userId="6bc27941-0d5a-4c11-8dfb-8bbe9da0911b" providerId="ADAL" clId="{5BE5096F-7F8C-496A-A13C-FF7D0CA7A6B4}" dt="2024-02-14T15:22:13.964" v="1098" actId="700"/>
+          <ac:chgData name="Hsia, Cheehong" userId="6bc27941-0d5a-4c11-8dfb-8bbe9da0911b" providerId="ADAL" clId="{5BE5096F-7F8C-496A-A13C-FF7D0CA7A6B4}" dt="2024-02-14T15:49:37.961" v="1640" actId="20577"/>
           <ac:spMkLst>
             <pc:docMk/>
             <pc:sldMk cId="3775546726" sldId="328"/>
@@ -23326,7 +23326,7 @@
               <a:rPr lang="en-US" sz="3000" dirty="0">
                 <a:latin typeface="Ubuntu" panose="020B0504030602030204" pitchFamily="34" charset="0"/>
               </a:rPr>
-              <a:t>Facilitates the scrum events</a:t>
+              <a:t>Facilitates the Scrum events</a:t>
             </a:r>
           </a:p>
         </p:txBody>
@@ -23671,7 +23671,7 @@
               <a:rPr lang="en-US" sz="3000" dirty="0">
                 <a:latin typeface="Ubuntu" panose="020B0504030602030204" pitchFamily="34" charset="0"/>
               </a:rPr>
-              <a:t>Facilitates the scrum events</a:t>
+              <a:t>Facilitates the Scrum events</a:t>
             </a:r>
           </a:p>
         </p:txBody>
@@ -27848,7 +27848,7 @@
               <a:rPr lang="en-US" sz="3000" dirty="0">
                 <a:latin typeface="Ubuntu" panose="020B0504030602030204" pitchFamily="34" charset="0"/>
               </a:rPr>
-              <a:t>Focus on creating value &amp; continuously validate assumptions</a:t>
+              <a:t>Focus on creating value &amp; process</a:t>
             </a:r>
           </a:p>
         </p:txBody>
@@ -28193,8 +28193,17 @@
               <a:rPr lang="en-US" sz="3000" dirty="0">
                 <a:latin typeface="Ubuntu" panose="020B0504030602030204" pitchFamily="34" charset="0"/>
               </a:rPr>
-              <a:t>Focus on creating value &amp; continuously validate assumptions</a:t>
+              <a:t>Focus on creating value </a:t>
             </a:r>
+            <a:r>
+              <a:rPr lang="en-US" sz="3000">
+                <a:latin typeface="Ubuntu" panose="020B0504030602030204" pitchFamily="34" charset="0"/>
+              </a:rPr>
+              <a:t>&amp; process</a:t>
+            </a:r>
+            <a:endParaRPr lang="en-US" sz="3000" dirty="0">
+              <a:latin typeface="Ubuntu" panose="020B0504030602030204" pitchFamily="34" charset="0"/>
+            </a:endParaRPr>
           </a:p>
         </p:txBody>
       </p:sp>

</xml_diff>

<commit_message>
Made it more colour blind friendly and this should fixes #1
</commit_message>
<xml_diff>
--- a/Exploring Self-Management.pptx
+++ b/Exploring Self-Management.pptx
@@ -182,7 +182,7 @@
 <file path=ppt/revisionInfo.xml><?xml version="1.0" encoding="utf-8"?>
 <p1510:revInfo xmlns:a="http://schemas.openxmlformats.org/drawingml/2006/main" xmlns:r="http://schemas.openxmlformats.org/officeDocument/2006/relationships" xmlns:p1510="http://schemas.microsoft.com/office/powerpoint/2015/10/main">
   <p1510:revLst>
-    <p1510:client id="{5BE5096F-7F8C-496A-A13C-FF7D0CA7A6B4}" v="98" dt="2024-02-03T15:53:20.693"/>
+    <p1510:client id="{5BE5096F-7F8C-496A-A13C-FF7D0CA7A6B4}" v="102" dt="2024-02-15T16:31:22.373"/>
   </p1510:revLst>
 </p1510:revInfo>
 </file>
@@ -192,10 +192,85 @@
   <pc:docChgLst>
     <pc:chgData name="Hsia, Cheehong" userId="6bc27941-0d5a-4c11-8dfb-8bbe9da0911b" providerId="ADAL" clId="{5BE5096F-7F8C-496A-A13C-FF7D0CA7A6B4}"/>
     <pc:docChg chg="undo custSel addSld delSld modSld modMainMaster">
-      <pc:chgData name="Hsia, Cheehong" userId="6bc27941-0d5a-4c11-8dfb-8bbe9da0911b" providerId="ADAL" clId="{5BE5096F-7F8C-496A-A13C-FF7D0CA7A6B4}" dt="2024-02-14T15:49:37.961" v="1640" actId="20577"/>
+      <pc:chgData name="Hsia, Cheehong" userId="6bc27941-0d5a-4c11-8dfb-8bbe9da0911b" providerId="ADAL" clId="{5BE5096F-7F8C-496A-A13C-FF7D0CA7A6B4}" dt="2024-02-15T16:34:05.991" v="1661" actId="700"/>
       <pc:docMkLst>
         <pc:docMk/>
       </pc:docMkLst>
+      <pc:sldChg chg="modSp mod modClrScheme chgLayout">
+        <pc:chgData name="Hsia, Cheehong" userId="6bc27941-0d5a-4c11-8dfb-8bbe9da0911b" providerId="ADAL" clId="{5BE5096F-7F8C-496A-A13C-FF7D0CA7A6B4}" dt="2024-02-15T16:33:58.900" v="1660" actId="700"/>
+        <pc:sldMkLst>
+          <pc:docMk/>
+          <pc:sldMk cId="2964921137" sldId="258"/>
+        </pc:sldMkLst>
+        <pc:spChg chg="mod ord">
+          <ac:chgData name="Hsia, Cheehong" userId="6bc27941-0d5a-4c11-8dfb-8bbe9da0911b" providerId="ADAL" clId="{5BE5096F-7F8C-496A-A13C-FF7D0CA7A6B4}" dt="2024-02-15T16:33:58.900" v="1660" actId="700"/>
+          <ac:spMkLst>
+            <pc:docMk/>
+            <pc:sldMk cId="2964921137" sldId="258"/>
+            <ac:spMk id="2" creationId="{74D54763-C1BB-24ED-B8EB-3E154A3480C4}"/>
+          </ac:spMkLst>
+        </pc:spChg>
+      </pc:sldChg>
+      <pc:sldChg chg="modSp mod modClrScheme chgLayout">
+        <pc:chgData name="Hsia, Cheehong" userId="6bc27941-0d5a-4c11-8dfb-8bbe9da0911b" providerId="ADAL" clId="{5BE5096F-7F8C-496A-A13C-FF7D0CA7A6B4}" dt="2024-02-15T16:34:05.991" v="1661" actId="700"/>
+        <pc:sldMkLst>
+          <pc:docMk/>
+          <pc:sldMk cId="2121178544" sldId="260"/>
+        </pc:sldMkLst>
+        <pc:spChg chg="mod ord">
+          <ac:chgData name="Hsia, Cheehong" userId="6bc27941-0d5a-4c11-8dfb-8bbe9da0911b" providerId="ADAL" clId="{5BE5096F-7F8C-496A-A13C-FF7D0CA7A6B4}" dt="2024-02-15T16:34:05.991" v="1661" actId="700"/>
+          <ac:spMkLst>
+            <pc:docMk/>
+            <pc:sldMk cId="2121178544" sldId="260"/>
+            <ac:spMk id="2" creationId="{6E54F6D7-9B28-00E6-3865-90B565C3EA6A}"/>
+          </ac:spMkLst>
+        </pc:spChg>
+      </pc:sldChg>
+      <pc:sldChg chg="modSp mod modClrScheme chgLayout">
+        <pc:chgData name="Hsia, Cheehong" userId="6bc27941-0d5a-4c11-8dfb-8bbe9da0911b" providerId="ADAL" clId="{5BE5096F-7F8C-496A-A13C-FF7D0CA7A6B4}" dt="2024-02-15T16:34:05.991" v="1661" actId="700"/>
+        <pc:sldMkLst>
+          <pc:docMk/>
+          <pc:sldMk cId="1767545473" sldId="262"/>
+        </pc:sldMkLst>
+        <pc:spChg chg="mod ord">
+          <ac:chgData name="Hsia, Cheehong" userId="6bc27941-0d5a-4c11-8dfb-8bbe9da0911b" providerId="ADAL" clId="{5BE5096F-7F8C-496A-A13C-FF7D0CA7A6B4}" dt="2024-02-15T16:34:05.991" v="1661" actId="700"/>
+          <ac:spMkLst>
+            <pc:docMk/>
+            <pc:sldMk cId="1767545473" sldId="262"/>
+            <ac:spMk id="2" creationId="{3BD620B5-483D-6397-4DAA-14919A367FC0}"/>
+          </ac:spMkLst>
+        </pc:spChg>
+      </pc:sldChg>
+      <pc:sldChg chg="modSp mod modClrScheme chgLayout">
+        <pc:chgData name="Hsia, Cheehong" userId="6bc27941-0d5a-4c11-8dfb-8bbe9da0911b" providerId="ADAL" clId="{5BE5096F-7F8C-496A-A13C-FF7D0CA7A6B4}" dt="2024-02-15T16:34:05.991" v="1661" actId="700"/>
+        <pc:sldMkLst>
+          <pc:docMk/>
+          <pc:sldMk cId="3000088040" sldId="264"/>
+        </pc:sldMkLst>
+        <pc:spChg chg="mod ord">
+          <ac:chgData name="Hsia, Cheehong" userId="6bc27941-0d5a-4c11-8dfb-8bbe9da0911b" providerId="ADAL" clId="{5BE5096F-7F8C-496A-A13C-FF7D0CA7A6B4}" dt="2024-02-15T16:34:05.991" v="1661" actId="700"/>
+          <ac:spMkLst>
+            <pc:docMk/>
+            <pc:sldMk cId="3000088040" sldId="264"/>
+            <ac:spMk id="2" creationId="{E7E9D49B-A02D-FB7D-2CB8-2560D155D648}"/>
+          </ac:spMkLst>
+        </pc:spChg>
+      </pc:sldChg>
+      <pc:sldChg chg="modSp mod modClrScheme chgLayout">
+        <pc:chgData name="Hsia, Cheehong" userId="6bc27941-0d5a-4c11-8dfb-8bbe9da0911b" providerId="ADAL" clId="{5BE5096F-7F8C-496A-A13C-FF7D0CA7A6B4}" dt="2024-02-15T16:34:05.991" v="1661" actId="700"/>
+        <pc:sldMkLst>
+          <pc:docMk/>
+          <pc:sldMk cId="294217445" sldId="266"/>
+        </pc:sldMkLst>
+        <pc:spChg chg="mod ord">
+          <ac:chgData name="Hsia, Cheehong" userId="6bc27941-0d5a-4c11-8dfb-8bbe9da0911b" providerId="ADAL" clId="{5BE5096F-7F8C-496A-A13C-FF7D0CA7A6B4}" dt="2024-02-15T16:34:05.991" v="1661" actId="700"/>
+          <ac:spMkLst>
+            <pc:docMk/>
+            <pc:sldMk cId="294217445" sldId="266"/>
+            <ac:spMk id="2" creationId="{1072D12A-AB19-16BA-EE4E-47D3CAE28569}"/>
+          </ac:spMkLst>
+        </pc:spChg>
+      </pc:sldChg>
       <pc:sldChg chg="addSp delSp modSp add del mod">
         <pc:chgData name="Hsia, Cheehong" userId="6bc27941-0d5a-4c11-8dfb-8bbe9da0911b" providerId="ADAL" clId="{5BE5096F-7F8C-496A-A13C-FF7D0CA7A6B4}" dt="2024-01-31T20:27:22.949" v="245" actId="47"/>
         <pc:sldMkLst>
@@ -902,8 +977,8 @@
           </ac:spMkLst>
         </pc:spChg>
       </pc:sldChg>
-      <pc:sldChg chg="addSp delSp modSp mod">
-        <pc:chgData name="Hsia, Cheehong" userId="6bc27941-0d5a-4c11-8dfb-8bbe9da0911b" providerId="ADAL" clId="{5BE5096F-7F8C-496A-A13C-FF7D0CA7A6B4}" dt="2024-01-31T21:13:54" v="510" actId="478"/>
+      <pc:sldChg chg="addSp delSp modSp mod modClrScheme chgLayout">
+        <pc:chgData name="Hsia, Cheehong" userId="6bc27941-0d5a-4c11-8dfb-8bbe9da0911b" providerId="ADAL" clId="{5BE5096F-7F8C-496A-A13C-FF7D0CA7A6B4}" dt="2024-02-15T16:32:07.383" v="1649" actId="700"/>
         <pc:sldMkLst>
           <pc:docMk/>
           <pc:sldMk cId="3048837189" sldId="294"/>
@@ -916,6 +991,14 @@
             <ac:spMk id="2" creationId="{1A00D080-CC1E-BAB8-1587-B77E476294D0}"/>
           </ac:spMkLst>
         </pc:spChg>
+        <pc:spChg chg="mod ord">
+          <ac:chgData name="Hsia, Cheehong" userId="6bc27941-0d5a-4c11-8dfb-8bbe9da0911b" providerId="ADAL" clId="{5BE5096F-7F8C-496A-A13C-FF7D0CA7A6B4}" dt="2024-02-15T16:32:07.383" v="1649" actId="700"/>
+          <ac:spMkLst>
+            <pc:docMk/>
+            <pc:sldMk cId="3048837189" sldId="294"/>
+            <ac:spMk id="3" creationId="{442D48EB-34CA-6063-A815-3BD86233718E}"/>
+          </ac:spMkLst>
+        </pc:spChg>
         <pc:spChg chg="add del mod">
           <ac:chgData name="Hsia, Cheehong" userId="6bc27941-0d5a-4c11-8dfb-8bbe9da0911b" providerId="ADAL" clId="{5BE5096F-7F8C-496A-A13C-FF7D0CA7A6B4}" dt="2024-01-31T21:13:54" v="510" actId="478"/>
           <ac:spMkLst>
@@ -965,30 +1048,46 @@
           </ac:picMkLst>
         </pc:picChg>
       </pc:sldChg>
-      <pc:sldChg chg="addSp modSp mod">
-        <pc:chgData name="Hsia, Cheehong" userId="6bc27941-0d5a-4c11-8dfb-8bbe9da0911b" providerId="ADAL" clId="{5BE5096F-7F8C-496A-A13C-FF7D0CA7A6B4}" dt="2024-02-14T15:23:49.503" v="1121" actId="20577"/>
+      <pc:sldChg chg="addSp modSp mod modClrScheme chgLayout">
+        <pc:chgData name="Hsia, Cheehong" userId="6bc27941-0d5a-4c11-8dfb-8bbe9da0911b" providerId="ADAL" clId="{5BE5096F-7F8C-496A-A13C-FF7D0CA7A6B4}" dt="2024-02-15T16:32:41.808" v="1653" actId="207"/>
         <pc:sldMkLst>
           <pc:docMk/>
           <pc:sldMk cId="3190214858" sldId="296"/>
         </pc:sldMkLst>
-        <pc:spChg chg="mod">
-          <ac:chgData name="Hsia, Cheehong" userId="6bc27941-0d5a-4c11-8dfb-8bbe9da0911b" providerId="ADAL" clId="{5BE5096F-7F8C-496A-A13C-FF7D0CA7A6B4}" dt="2024-02-14T15:23:25.803" v="1117" actId="20577"/>
+        <pc:spChg chg="mod ord">
+          <ac:chgData name="Hsia, Cheehong" userId="6bc27941-0d5a-4c11-8dfb-8bbe9da0911b" providerId="ADAL" clId="{5BE5096F-7F8C-496A-A13C-FF7D0CA7A6B4}" dt="2024-02-15T16:32:12.717" v="1650" actId="700"/>
           <ac:spMkLst>
             <pc:docMk/>
             <pc:sldMk cId="3190214858" sldId="296"/>
             <ac:spMk id="2" creationId="{AD90CEB0-783B-5FA4-1028-D4B692C5B2CE}"/>
           </ac:spMkLst>
         </pc:spChg>
-        <pc:spChg chg="mod">
-          <ac:chgData name="Hsia, Cheehong" userId="6bc27941-0d5a-4c11-8dfb-8bbe9da0911b" providerId="ADAL" clId="{5BE5096F-7F8C-496A-A13C-FF7D0CA7A6B4}" dt="2024-02-14T15:23:49.503" v="1121" actId="20577"/>
+        <pc:spChg chg="mod ord">
+          <ac:chgData name="Hsia, Cheehong" userId="6bc27941-0d5a-4c11-8dfb-8bbe9da0911b" providerId="ADAL" clId="{5BE5096F-7F8C-496A-A13C-FF7D0CA7A6B4}" dt="2024-02-15T16:32:12.717" v="1650" actId="700"/>
+          <ac:spMkLst>
+            <pc:docMk/>
+            <pc:sldMk cId="3190214858" sldId="296"/>
+            <ac:spMk id="3" creationId="{11925C94-7DB2-3EEF-C390-EA8A563BE132}"/>
+          </ac:spMkLst>
+        </pc:spChg>
+        <pc:spChg chg="mod ord">
+          <ac:chgData name="Hsia, Cheehong" userId="6bc27941-0d5a-4c11-8dfb-8bbe9da0911b" providerId="ADAL" clId="{5BE5096F-7F8C-496A-A13C-FF7D0CA7A6B4}" dt="2024-02-15T16:32:12.717" v="1650" actId="700"/>
           <ac:spMkLst>
             <pc:docMk/>
             <pc:sldMk cId="3190214858" sldId="296"/>
             <ac:spMk id="4" creationId="{3859056E-FEDA-2D8C-90B8-7DB995ECB8A4}"/>
           </ac:spMkLst>
         </pc:spChg>
+        <pc:spChg chg="mod ord">
+          <ac:chgData name="Hsia, Cheehong" userId="6bc27941-0d5a-4c11-8dfb-8bbe9da0911b" providerId="ADAL" clId="{5BE5096F-7F8C-496A-A13C-FF7D0CA7A6B4}" dt="2024-02-15T16:32:12.717" v="1650" actId="700"/>
+          <ac:spMkLst>
+            <pc:docMk/>
+            <pc:sldMk cId="3190214858" sldId="296"/>
+            <ac:spMk id="5" creationId="{1D8E0DE9-59C5-51BC-C26E-CD16F2ECED89}"/>
+          </ac:spMkLst>
+        </pc:spChg>
         <pc:spChg chg="add mod">
-          <ac:chgData name="Hsia, Cheehong" userId="6bc27941-0d5a-4c11-8dfb-8bbe9da0911b" providerId="ADAL" clId="{5BE5096F-7F8C-496A-A13C-FF7D0CA7A6B4}" dt="2024-02-03T15:48:33.891" v="845" actId="20577"/>
+          <ac:chgData name="Hsia, Cheehong" userId="6bc27941-0d5a-4c11-8dfb-8bbe9da0911b" providerId="ADAL" clId="{5BE5096F-7F8C-496A-A13C-FF7D0CA7A6B4}" dt="2024-02-15T16:32:41.808" v="1653" actId="207"/>
           <ac:spMkLst>
             <pc:docMk/>
             <pc:sldMk cId="3190214858" sldId="296"/>
@@ -1011,30 +1110,46 @@
           </ac:spMkLst>
         </pc:spChg>
       </pc:sldChg>
-      <pc:sldChg chg="addSp modSp mod">
-        <pc:chgData name="Hsia, Cheehong" userId="6bc27941-0d5a-4c11-8dfb-8bbe9da0911b" providerId="ADAL" clId="{5BE5096F-7F8C-496A-A13C-FF7D0CA7A6B4}" dt="2024-02-14T15:24:23.724" v="1131" actId="20577"/>
+      <pc:sldChg chg="addSp modSp mod modClrScheme chgLayout">
+        <pc:chgData name="Hsia, Cheehong" userId="6bc27941-0d5a-4c11-8dfb-8bbe9da0911b" providerId="ADAL" clId="{5BE5096F-7F8C-496A-A13C-FF7D0CA7A6B4}" dt="2024-02-15T16:32:46.757" v="1654" actId="207"/>
         <pc:sldMkLst>
           <pc:docMk/>
           <pc:sldMk cId="2752436879" sldId="298"/>
         </pc:sldMkLst>
-        <pc:spChg chg="mod">
-          <ac:chgData name="Hsia, Cheehong" userId="6bc27941-0d5a-4c11-8dfb-8bbe9da0911b" providerId="ADAL" clId="{5BE5096F-7F8C-496A-A13C-FF7D0CA7A6B4}" dt="2024-02-14T15:24:16.544" v="1128" actId="20577"/>
+        <pc:spChg chg="mod ord">
+          <ac:chgData name="Hsia, Cheehong" userId="6bc27941-0d5a-4c11-8dfb-8bbe9da0911b" providerId="ADAL" clId="{5BE5096F-7F8C-496A-A13C-FF7D0CA7A6B4}" dt="2024-02-15T16:32:20.828" v="1651" actId="700"/>
           <ac:spMkLst>
             <pc:docMk/>
             <pc:sldMk cId="2752436879" sldId="298"/>
             <ac:spMk id="2" creationId="{AD90CEB0-783B-5FA4-1028-D4B692C5B2CE}"/>
           </ac:spMkLst>
         </pc:spChg>
-        <pc:spChg chg="mod">
-          <ac:chgData name="Hsia, Cheehong" userId="6bc27941-0d5a-4c11-8dfb-8bbe9da0911b" providerId="ADAL" clId="{5BE5096F-7F8C-496A-A13C-FF7D0CA7A6B4}" dt="2024-02-14T15:24:23.724" v="1131" actId="20577"/>
+        <pc:spChg chg="mod ord">
+          <ac:chgData name="Hsia, Cheehong" userId="6bc27941-0d5a-4c11-8dfb-8bbe9da0911b" providerId="ADAL" clId="{5BE5096F-7F8C-496A-A13C-FF7D0CA7A6B4}" dt="2024-02-15T16:32:20.828" v="1651" actId="700"/>
+          <ac:spMkLst>
+            <pc:docMk/>
+            <pc:sldMk cId="2752436879" sldId="298"/>
+            <ac:spMk id="3" creationId="{11925C94-7DB2-3EEF-C390-EA8A563BE132}"/>
+          </ac:spMkLst>
+        </pc:spChg>
+        <pc:spChg chg="mod ord">
+          <ac:chgData name="Hsia, Cheehong" userId="6bc27941-0d5a-4c11-8dfb-8bbe9da0911b" providerId="ADAL" clId="{5BE5096F-7F8C-496A-A13C-FF7D0CA7A6B4}" dt="2024-02-15T16:32:20.828" v="1651" actId="700"/>
           <ac:spMkLst>
             <pc:docMk/>
             <pc:sldMk cId="2752436879" sldId="298"/>
             <ac:spMk id="4" creationId="{3859056E-FEDA-2D8C-90B8-7DB995ECB8A4}"/>
           </ac:spMkLst>
         </pc:spChg>
+        <pc:spChg chg="mod ord">
+          <ac:chgData name="Hsia, Cheehong" userId="6bc27941-0d5a-4c11-8dfb-8bbe9da0911b" providerId="ADAL" clId="{5BE5096F-7F8C-496A-A13C-FF7D0CA7A6B4}" dt="2024-02-15T16:32:20.828" v="1651" actId="700"/>
+          <ac:spMkLst>
+            <pc:docMk/>
+            <pc:sldMk cId="2752436879" sldId="298"/>
+            <ac:spMk id="5" creationId="{1D8E0DE9-59C5-51BC-C26E-CD16F2ECED89}"/>
+          </ac:spMkLst>
+        </pc:spChg>
         <pc:spChg chg="add mod">
-          <ac:chgData name="Hsia, Cheehong" userId="6bc27941-0d5a-4c11-8dfb-8bbe9da0911b" providerId="ADAL" clId="{5BE5096F-7F8C-496A-A13C-FF7D0CA7A6B4}" dt="2024-02-03T15:48:40.876" v="849" actId="20577"/>
+          <ac:chgData name="Hsia, Cheehong" userId="6bc27941-0d5a-4c11-8dfb-8bbe9da0911b" providerId="ADAL" clId="{5BE5096F-7F8C-496A-A13C-FF7D0CA7A6B4}" dt="2024-02-15T16:32:46.757" v="1654" actId="207"/>
           <ac:spMkLst>
             <pc:docMk/>
             <pc:sldMk cId="2752436879" sldId="298"/>
@@ -1057,30 +1172,46 @@
           </ac:spMkLst>
         </pc:spChg>
       </pc:sldChg>
-      <pc:sldChg chg="addSp modSp mod">
-        <pc:chgData name="Hsia, Cheehong" userId="6bc27941-0d5a-4c11-8dfb-8bbe9da0911b" providerId="ADAL" clId="{5BE5096F-7F8C-496A-A13C-FF7D0CA7A6B4}" dt="2024-02-14T15:24:52.407" v="1141" actId="20577"/>
+      <pc:sldChg chg="addSp modSp mod modClrScheme chgLayout">
+        <pc:chgData name="Hsia, Cheehong" userId="6bc27941-0d5a-4c11-8dfb-8bbe9da0911b" providerId="ADAL" clId="{5BE5096F-7F8C-496A-A13C-FF7D0CA7A6B4}" dt="2024-02-15T16:32:50.071" v="1655" actId="207"/>
         <pc:sldMkLst>
           <pc:docMk/>
           <pc:sldMk cId="2193924565" sldId="300"/>
         </pc:sldMkLst>
-        <pc:spChg chg="mod">
-          <ac:chgData name="Hsia, Cheehong" userId="6bc27941-0d5a-4c11-8dfb-8bbe9da0911b" providerId="ADAL" clId="{5BE5096F-7F8C-496A-A13C-FF7D0CA7A6B4}" dt="2024-02-14T15:24:42.813" v="1138" actId="20577"/>
+        <pc:spChg chg="mod ord">
+          <ac:chgData name="Hsia, Cheehong" userId="6bc27941-0d5a-4c11-8dfb-8bbe9da0911b" providerId="ADAL" clId="{5BE5096F-7F8C-496A-A13C-FF7D0CA7A6B4}" dt="2024-02-15T16:32:20.828" v="1651" actId="700"/>
           <ac:spMkLst>
             <pc:docMk/>
             <pc:sldMk cId="2193924565" sldId="300"/>
             <ac:spMk id="2" creationId="{AD90CEB0-783B-5FA4-1028-D4B692C5B2CE}"/>
           </ac:spMkLst>
         </pc:spChg>
-        <pc:spChg chg="mod">
-          <ac:chgData name="Hsia, Cheehong" userId="6bc27941-0d5a-4c11-8dfb-8bbe9da0911b" providerId="ADAL" clId="{5BE5096F-7F8C-496A-A13C-FF7D0CA7A6B4}" dt="2024-02-14T15:24:52.407" v="1141" actId="20577"/>
+        <pc:spChg chg="mod ord">
+          <ac:chgData name="Hsia, Cheehong" userId="6bc27941-0d5a-4c11-8dfb-8bbe9da0911b" providerId="ADAL" clId="{5BE5096F-7F8C-496A-A13C-FF7D0CA7A6B4}" dt="2024-02-15T16:32:20.828" v="1651" actId="700"/>
+          <ac:spMkLst>
+            <pc:docMk/>
+            <pc:sldMk cId="2193924565" sldId="300"/>
+            <ac:spMk id="3" creationId="{11925C94-7DB2-3EEF-C390-EA8A563BE132}"/>
+          </ac:spMkLst>
+        </pc:spChg>
+        <pc:spChg chg="mod ord">
+          <ac:chgData name="Hsia, Cheehong" userId="6bc27941-0d5a-4c11-8dfb-8bbe9da0911b" providerId="ADAL" clId="{5BE5096F-7F8C-496A-A13C-FF7D0CA7A6B4}" dt="2024-02-15T16:32:20.828" v="1651" actId="700"/>
           <ac:spMkLst>
             <pc:docMk/>
             <pc:sldMk cId="2193924565" sldId="300"/>
             <ac:spMk id="4" creationId="{3859056E-FEDA-2D8C-90B8-7DB995ECB8A4}"/>
           </ac:spMkLst>
         </pc:spChg>
+        <pc:spChg chg="mod ord">
+          <ac:chgData name="Hsia, Cheehong" userId="6bc27941-0d5a-4c11-8dfb-8bbe9da0911b" providerId="ADAL" clId="{5BE5096F-7F8C-496A-A13C-FF7D0CA7A6B4}" dt="2024-02-15T16:32:20.828" v="1651" actId="700"/>
+          <ac:spMkLst>
+            <pc:docMk/>
+            <pc:sldMk cId="2193924565" sldId="300"/>
+            <ac:spMk id="5" creationId="{1D8E0DE9-59C5-51BC-C26E-CD16F2ECED89}"/>
+          </ac:spMkLst>
+        </pc:spChg>
         <pc:spChg chg="add mod">
-          <ac:chgData name="Hsia, Cheehong" userId="6bc27941-0d5a-4c11-8dfb-8bbe9da0911b" providerId="ADAL" clId="{5BE5096F-7F8C-496A-A13C-FF7D0CA7A6B4}" dt="2024-02-03T15:48:56.170" v="853" actId="20577"/>
+          <ac:chgData name="Hsia, Cheehong" userId="6bc27941-0d5a-4c11-8dfb-8bbe9da0911b" providerId="ADAL" clId="{5BE5096F-7F8C-496A-A13C-FF7D0CA7A6B4}" dt="2024-02-15T16:32:50.071" v="1655" actId="207"/>
           <ac:spMkLst>
             <pc:docMk/>
             <pc:sldMk cId="2193924565" sldId="300"/>
@@ -1103,30 +1234,46 @@
           </ac:spMkLst>
         </pc:spChg>
       </pc:sldChg>
-      <pc:sldChg chg="addSp modSp mod">
-        <pc:chgData name="Hsia, Cheehong" userId="6bc27941-0d5a-4c11-8dfb-8bbe9da0911b" providerId="ADAL" clId="{5BE5096F-7F8C-496A-A13C-FF7D0CA7A6B4}" dt="2024-02-14T15:25:14.635" v="1148" actId="255"/>
+      <pc:sldChg chg="addSp modSp mod modClrScheme chgLayout">
+        <pc:chgData name="Hsia, Cheehong" userId="6bc27941-0d5a-4c11-8dfb-8bbe9da0911b" providerId="ADAL" clId="{5BE5096F-7F8C-496A-A13C-FF7D0CA7A6B4}" dt="2024-02-15T16:32:53.825" v="1656" actId="207"/>
         <pc:sldMkLst>
           <pc:docMk/>
           <pc:sldMk cId="155960899" sldId="302"/>
         </pc:sldMkLst>
-        <pc:spChg chg="mod">
-          <ac:chgData name="Hsia, Cheehong" userId="6bc27941-0d5a-4c11-8dfb-8bbe9da0911b" providerId="ADAL" clId="{5BE5096F-7F8C-496A-A13C-FF7D0CA7A6B4}" dt="2024-02-14T15:25:09.006" v="1146" actId="255"/>
+        <pc:spChg chg="mod ord">
+          <ac:chgData name="Hsia, Cheehong" userId="6bc27941-0d5a-4c11-8dfb-8bbe9da0911b" providerId="ADAL" clId="{5BE5096F-7F8C-496A-A13C-FF7D0CA7A6B4}" dt="2024-02-15T16:32:32.900" v="1652" actId="700"/>
           <ac:spMkLst>
             <pc:docMk/>
             <pc:sldMk cId="155960899" sldId="302"/>
             <ac:spMk id="2" creationId="{AD90CEB0-783B-5FA4-1028-D4B692C5B2CE}"/>
           </ac:spMkLst>
         </pc:spChg>
-        <pc:spChg chg="mod">
-          <ac:chgData name="Hsia, Cheehong" userId="6bc27941-0d5a-4c11-8dfb-8bbe9da0911b" providerId="ADAL" clId="{5BE5096F-7F8C-496A-A13C-FF7D0CA7A6B4}" dt="2024-02-14T15:25:14.635" v="1148" actId="255"/>
+        <pc:spChg chg="mod ord">
+          <ac:chgData name="Hsia, Cheehong" userId="6bc27941-0d5a-4c11-8dfb-8bbe9da0911b" providerId="ADAL" clId="{5BE5096F-7F8C-496A-A13C-FF7D0CA7A6B4}" dt="2024-02-15T16:32:32.900" v="1652" actId="700"/>
+          <ac:spMkLst>
+            <pc:docMk/>
+            <pc:sldMk cId="155960899" sldId="302"/>
+            <ac:spMk id="3" creationId="{11925C94-7DB2-3EEF-C390-EA8A563BE132}"/>
+          </ac:spMkLst>
+        </pc:spChg>
+        <pc:spChg chg="mod ord">
+          <ac:chgData name="Hsia, Cheehong" userId="6bc27941-0d5a-4c11-8dfb-8bbe9da0911b" providerId="ADAL" clId="{5BE5096F-7F8C-496A-A13C-FF7D0CA7A6B4}" dt="2024-02-15T16:32:32.900" v="1652" actId="700"/>
           <ac:spMkLst>
             <pc:docMk/>
             <pc:sldMk cId="155960899" sldId="302"/>
             <ac:spMk id="4" creationId="{3859056E-FEDA-2D8C-90B8-7DB995ECB8A4}"/>
           </ac:spMkLst>
         </pc:spChg>
+        <pc:spChg chg="mod ord">
+          <ac:chgData name="Hsia, Cheehong" userId="6bc27941-0d5a-4c11-8dfb-8bbe9da0911b" providerId="ADAL" clId="{5BE5096F-7F8C-496A-A13C-FF7D0CA7A6B4}" dt="2024-02-15T16:32:32.900" v="1652" actId="700"/>
+          <ac:spMkLst>
+            <pc:docMk/>
+            <pc:sldMk cId="155960899" sldId="302"/>
+            <ac:spMk id="5" creationId="{1D8E0DE9-59C5-51BC-C26E-CD16F2ECED89}"/>
+          </ac:spMkLst>
+        </pc:spChg>
         <pc:spChg chg="add mod">
-          <ac:chgData name="Hsia, Cheehong" userId="6bc27941-0d5a-4c11-8dfb-8bbe9da0911b" providerId="ADAL" clId="{5BE5096F-7F8C-496A-A13C-FF7D0CA7A6B4}" dt="2024-02-03T15:49:05.730" v="857" actId="20577"/>
+          <ac:chgData name="Hsia, Cheehong" userId="6bc27941-0d5a-4c11-8dfb-8bbe9da0911b" providerId="ADAL" clId="{5BE5096F-7F8C-496A-A13C-FF7D0CA7A6B4}" dt="2024-02-15T16:32:53.825" v="1656" actId="207"/>
           <ac:spMkLst>
             <pc:docMk/>
             <pc:sldMk cId="155960899" sldId="302"/>
@@ -1149,30 +1296,46 @@
           </ac:spMkLst>
         </pc:spChg>
       </pc:sldChg>
-      <pc:sldChg chg="addSp modSp mod">
-        <pc:chgData name="Hsia, Cheehong" userId="6bc27941-0d5a-4c11-8dfb-8bbe9da0911b" providerId="ADAL" clId="{5BE5096F-7F8C-496A-A13C-FF7D0CA7A6B4}" dt="2024-02-14T15:25:39.039" v="1156" actId="255"/>
+      <pc:sldChg chg="addSp modSp mod modClrScheme chgLayout">
+        <pc:chgData name="Hsia, Cheehong" userId="6bc27941-0d5a-4c11-8dfb-8bbe9da0911b" providerId="ADAL" clId="{5BE5096F-7F8C-496A-A13C-FF7D0CA7A6B4}" dt="2024-02-15T16:32:57.366" v="1657" actId="207"/>
         <pc:sldMkLst>
           <pc:docMk/>
           <pc:sldMk cId="1487932769" sldId="304"/>
         </pc:sldMkLst>
-        <pc:spChg chg="mod">
-          <ac:chgData name="Hsia, Cheehong" userId="6bc27941-0d5a-4c11-8dfb-8bbe9da0911b" providerId="ADAL" clId="{5BE5096F-7F8C-496A-A13C-FF7D0CA7A6B4}" dt="2024-02-14T15:25:33.114" v="1154" actId="20577"/>
+        <pc:spChg chg="mod ord">
+          <ac:chgData name="Hsia, Cheehong" userId="6bc27941-0d5a-4c11-8dfb-8bbe9da0911b" providerId="ADAL" clId="{5BE5096F-7F8C-496A-A13C-FF7D0CA7A6B4}" dt="2024-02-15T16:32:32.900" v="1652" actId="700"/>
           <ac:spMkLst>
             <pc:docMk/>
             <pc:sldMk cId="1487932769" sldId="304"/>
             <ac:spMk id="2" creationId="{AD90CEB0-783B-5FA4-1028-D4B692C5B2CE}"/>
           </ac:spMkLst>
         </pc:spChg>
-        <pc:spChg chg="mod">
-          <ac:chgData name="Hsia, Cheehong" userId="6bc27941-0d5a-4c11-8dfb-8bbe9da0911b" providerId="ADAL" clId="{5BE5096F-7F8C-496A-A13C-FF7D0CA7A6B4}" dt="2024-02-14T15:25:39.039" v="1156" actId="255"/>
+        <pc:spChg chg="mod ord">
+          <ac:chgData name="Hsia, Cheehong" userId="6bc27941-0d5a-4c11-8dfb-8bbe9da0911b" providerId="ADAL" clId="{5BE5096F-7F8C-496A-A13C-FF7D0CA7A6B4}" dt="2024-02-15T16:32:32.900" v="1652" actId="700"/>
+          <ac:spMkLst>
+            <pc:docMk/>
+            <pc:sldMk cId="1487932769" sldId="304"/>
+            <ac:spMk id="3" creationId="{11925C94-7DB2-3EEF-C390-EA8A563BE132}"/>
+          </ac:spMkLst>
+        </pc:spChg>
+        <pc:spChg chg="mod ord">
+          <ac:chgData name="Hsia, Cheehong" userId="6bc27941-0d5a-4c11-8dfb-8bbe9da0911b" providerId="ADAL" clId="{5BE5096F-7F8C-496A-A13C-FF7D0CA7A6B4}" dt="2024-02-15T16:32:32.900" v="1652" actId="700"/>
           <ac:spMkLst>
             <pc:docMk/>
             <pc:sldMk cId="1487932769" sldId="304"/>
             <ac:spMk id="4" creationId="{3859056E-FEDA-2D8C-90B8-7DB995ECB8A4}"/>
           </ac:spMkLst>
         </pc:spChg>
+        <pc:spChg chg="mod ord">
+          <ac:chgData name="Hsia, Cheehong" userId="6bc27941-0d5a-4c11-8dfb-8bbe9da0911b" providerId="ADAL" clId="{5BE5096F-7F8C-496A-A13C-FF7D0CA7A6B4}" dt="2024-02-15T16:32:32.900" v="1652" actId="700"/>
+          <ac:spMkLst>
+            <pc:docMk/>
+            <pc:sldMk cId="1487932769" sldId="304"/>
+            <ac:spMk id="5" creationId="{1D8E0DE9-59C5-51BC-C26E-CD16F2ECED89}"/>
+          </ac:spMkLst>
+        </pc:spChg>
         <pc:spChg chg="add mod">
-          <ac:chgData name="Hsia, Cheehong" userId="6bc27941-0d5a-4c11-8dfb-8bbe9da0911b" providerId="ADAL" clId="{5BE5096F-7F8C-496A-A13C-FF7D0CA7A6B4}" dt="2024-02-03T15:49:13.900" v="861" actId="20577"/>
+          <ac:chgData name="Hsia, Cheehong" userId="6bc27941-0d5a-4c11-8dfb-8bbe9da0911b" providerId="ADAL" clId="{5BE5096F-7F8C-496A-A13C-FF7D0CA7A6B4}" dt="2024-02-15T16:32:57.366" v="1657" actId="207"/>
           <ac:spMkLst>
             <pc:docMk/>
             <pc:sldMk cId="1487932769" sldId="304"/>
@@ -1195,26 +1358,57 @@
           </ac:spMkLst>
         </pc:spChg>
       </pc:sldChg>
-      <pc:sldChg chg="addSp modSp mod">
-        <pc:chgData name="Hsia, Cheehong" userId="6bc27941-0d5a-4c11-8dfb-8bbe9da0911b" providerId="ADAL" clId="{5BE5096F-7F8C-496A-A13C-FF7D0CA7A6B4}" dt="2024-02-14T15:26:14.343" v="1166" actId="20577"/>
+      <pc:sldChg chg="modSp mod modClrScheme chgLayout">
+        <pc:chgData name="Hsia, Cheehong" userId="6bc27941-0d5a-4c11-8dfb-8bbe9da0911b" providerId="ADAL" clId="{5BE5096F-7F8C-496A-A13C-FF7D0CA7A6B4}" dt="2024-02-15T16:33:27.078" v="1658" actId="700"/>
+        <pc:sldMkLst>
+          <pc:docMk/>
+          <pc:sldMk cId="3441977504" sldId="306"/>
+        </pc:sldMkLst>
+        <pc:spChg chg="mod ord">
+          <ac:chgData name="Hsia, Cheehong" userId="6bc27941-0d5a-4c11-8dfb-8bbe9da0911b" providerId="ADAL" clId="{5BE5096F-7F8C-496A-A13C-FF7D0CA7A6B4}" dt="2024-02-15T16:33:27.078" v="1658" actId="700"/>
+          <ac:spMkLst>
+            <pc:docMk/>
+            <pc:sldMk cId="3441977504" sldId="306"/>
+            <ac:spMk id="2" creationId="{D43A5880-B244-5B8B-D3F4-CD35BC7751FF}"/>
+          </ac:spMkLst>
+        </pc:spChg>
+      </pc:sldChg>
+      <pc:sldChg chg="addSp modSp mod modClrScheme chgLayout">
+        <pc:chgData name="Hsia, Cheehong" userId="6bc27941-0d5a-4c11-8dfb-8bbe9da0911b" providerId="ADAL" clId="{5BE5096F-7F8C-496A-A13C-FF7D0CA7A6B4}" dt="2024-02-15T16:33:37.976" v="1659" actId="700"/>
         <pc:sldMkLst>
           <pc:docMk/>
           <pc:sldMk cId="961020213" sldId="308"/>
         </pc:sldMkLst>
-        <pc:spChg chg="mod">
-          <ac:chgData name="Hsia, Cheehong" userId="6bc27941-0d5a-4c11-8dfb-8bbe9da0911b" providerId="ADAL" clId="{5BE5096F-7F8C-496A-A13C-FF7D0CA7A6B4}" dt="2024-02-14T15:26:03.778" v="1161" actId="255"/>
+        <pc:spChg chg="mod ord">
+          <ac:chgData name="Hsia, Cheehong" userId="6bc27941-0d5a-4c11-8dfb-8bbe9da0911b" providerId="ADAL" clId="{5BE5096F-7F8C-496A-A13C-FF7D0CA7A6B4}" dt="2024-02-15T16:33:37.976" v="1659" actId="700"/>
           <ac:spMkLst>
             <pc:docMk/>
             <pc:sldMk cId="961020213" sldId="308"/>
             <ac:spMk id="2" creationId="{9024BA51-C630-BA2A-58B6-69F9BB6816A0}"/>
           </ac:spMkLst>
         </pc:spChg>
-        <pc:spChg chg="mod">
-          <ac:chgData name="Hsia, Cheehong" userId="6bc27941-0d5a-4c11-8dfb-8bbe9da0911b" providerId="ADAL" clId="{5BE5096F-7F8C-496A-A13C-FF7D0CA7A6B4}" dt="2024-02-14T15:26:14.343" v="1166" actId="20577"/>
+        <pc:spChg chg="mod ord">
+          <ac:chgData name="Hsia, Cheehong" userId="6bc27941-0d5a-4c11-8dfb-8bbe9da0911b" providerId="ADAL" clId="{5BE5096F-7F8C-496A-A13C-FF7D0CA7A6B4}" dt="2024-02-15T16:33:37.976" v="1659" actId="700"/>
+          <ac:spMkLst>
+            <pc:docMk/>
+            <pc:sldMk cId="961020213" sldId="308"/>
+            <ac:spMk id="3" creationId="{2077BF95-1F9E-AA05-3D0B-83E184AA9C48}"/>
+          </ac:spMkLst>
+        </pc:spChg>
+        <pc:spChg chg="mod ord">
+          <ac:chgData name="Hsia, Cheehong" userId="6bc27941-0d5a-4c11-8dfb-8bbe9da0911b" providerId="ADAL" clId="{5BE5096F-7F8C-496A-A13C-FF7D0CA7A6B4}" dt="2024-02-15T16:33:37.976" v="1659" actId="700"/>
           <ac:spMkLst>
             <pc:docMk/>
             <pc:sldMk cId="961020213" sldId="308"/>
             <ac:spMk id="4" creationId="{8946D5DF-DDC9-DF42-4883-DA9549CF8DE5}"/>
+          </ac:spMkLst>
+        </pc:spChg>
+        <pc:spChg chg="mod ord">
+          <ac:chgData name="Hsia, Cheehong" userId="6bc27941-0d5a-4c11-8dfb-8bbe9da0911b" providerId="ADAL" clId="{5BE5096F-7F8C-496A-A13C-FF7D0CA7A6B4}" dt="2024-02-15T16:33:37.976" v="1659" actId="700"/>
+          <ac:spMkLst>
+            <pc:docMk/>
+            <pc:sldMk cId="961020213" sldId="308"/>
+            <ac:spMk id="5" creationId="{860EF69F-79FC-8315-A261-A0DDABAAA234}"/>
           </ac:spMkLst>
         </pc:spChg>
         <pc:spChg chg="add mod">
@@ -1241,26 +1435,42 @@
           </ac:spMkLst>
         </pc:spChg>
       </pc:sldChg>
-      <pc:sldChg chg="addSp modSp mod">
-        <pc:chgData name="Hsia, Cheehong" userId="6bc27941-0d5a-4c11-8dfb-8bbe9da0911b" providerId="ADAL" clId="{5BE5096F-7F8C-496A-A13C-FF7D0CA7A6B4}" dt="2024-02-14T15:26:34.448" v="1175" actId="20577"/>
+      <pc:sldChg chg="addSp modSp mod modClrScheme chgLayout">
+        <pc:chgData name="Hsia, Cheehong" userId="6bc27941-0d5a-4c11-8dfb-8bbe9da0911b" providerId="ADAL" clId="{5BE5096F-7F8C-496A-A13C-FF7D0CA7A6B4}" dt="2024-02-15T16:33:37.976" v="1659" actId="700"/>
         <pc:sldMkLst>
           <pc:docMk/>
           <pc:sldMk cId="1482915617" sldId="310"/>
         </pc:sldMkLst>
-        <pc:spChg chg="mod">
-          <ac:chgData name="Hsia, Cheehong" userId="6bc27941-0d5a-4c11-8dfb-8bbe9da0911b" providerId="ADAL" clId="{5BE5096F-7F8C-496A-A13C-FF7D0CA7A6B4}" dt="2024-02-14T15:26:26.946" v="1171" actId="255"/>
+        <pc:spChg chg="mod ord">
+          <ac:chgData name="Hsia, Cheehong" userId="6bc27941-0d5a-4c11-8dfb-8bbe9da0911b" providerId="ADAL" clId="{5BE5096F-7F8C-496A-A13C-FF7D0CA7A6B4}" dt="2024-02-15T16:33:37.976" v="1659" actId="700"/>
           <ac:spMkLst>
             <pc:docMk/>
             <pc:sldMk cId="1482915617" sldId="310"/>
             <ac:spMk id="2" creationId="{9024BA51-C630-BA2A-58B6-69F9BB6816A0}"/>
           </ac:spMkLst>
         </pc:spChg>
-        <pc:spChg chg="mod">
-          <ac:chgData name="Hsia, Cheehong" userId="6bc27941-0d5a-4c11-8dfb-8bbe9da0911b" providerId="ADAL" clId="{5BE5096F-7F8C-496A-A13C-FF7D0CA7A6B4}" dt="2024-02-14T15:26:34.448" v="1175" actId="20577"/>
+        <pc:spChg chg="mod ord">
+          <ac:chgData name="Hsia, Cheehong" userId="6bc27941-0d5a-4c11-8dfb-8bbe9da0911b" providerId="ADAL" clId="{5BE5096F-7F8C-496A-A13C-FF7D0CA7A6B4}" dt="2024-02-15T16:33:37.976" v="1659" actId="700"/>
+          <ac:spMkLst>
+            <pc:docMk/>
+            <pc:sldMk cId="1482915617" sldId="310"/>
+            <ac:spMk id="3" creationId="{2077BF95-1F9E-AA05-3D0B-83E184AA9C48}"/>
+          </ac:spMkLst>
+        </pc:spChg>
+        <pc:spChg chg="mod ord">
+          <ac:chgData name="Hsia, Cheehong" userId="6bc27941-0d5a-4c11-8dfb-8bbe9da0911b" providerId="ADAL" clId="{5BE5096F-7F8C-496A-A13C-FF7D0CA7A6B4}" dt="2024-02-15T16:33:37.976" v="1659" actId="700"/>
           <ac:spMkLst>
             <pc:docMk/>
             <pc:sldMk cId="1482915617" sldId="310"/>
             <ac:spMk id="4" creationId="{8946D5DF-DDC9-DF42-4883-DA9549CF8DE5}"/>
+          </ac:spMkLst>
+        </pc:spChg>
+        <pc:spChg chg="mod ord">
+          <ac:chgData name="Hsia, Cheehong" userId="6bc27941-0d5a-4c11-8dfb-8bbe9da0911b" providerId="ADAL" clId="{5BE5096F-7F8C-496A-A13C-FF7D0CA7A6B4}" dt="2024-02-15T16:33:37.976" v="1659" actId="700"/>
+          <ac:spMkLst>
+            <pc:docMk/>
+            <pc:sldMk cId="1482915617" sldId="310"/>
+            <ac:spMk id="5" creationId="{860EF69F-79FC-8315-A261-A0DDABAAA234}"/>
           </ac:spMkLst>
         </pc:spChg>
         <pc:spChg chg="add mod">
@@ -1287,26 +1497,42 @@
           </ac:spMkLst>
         </pc:spChg>
       </pc:sldChg>
-      <pc:sldChg chg="addSp modSp mod">
-        <pc:chgData name="Hsia, Cheehong" userId="6bc27941-0d5a-4c11-8dfb-8bbe9da0911b" providerId="ADAL" clId="{5BE5096F-7F8C-496A-A13C-FF7D0CA7A6B4}" dt="2024-02-14T15:27:53.942" v="1326" actId="20577"/>
+      <pc:sldChg chg="addSp modSp mod modClrScheme chgLayout">
+        <pc:chgData name="Hsia, Cheehong" userId="6bc27941-0d5a-4c11-8dfb-8bbe9da0911b" providerId="ADAL" clId="{5BE5096F-7F8C-496A-A13C-FF7D0CA7A6B4}" dt="2024-02-15T16:33:37.976" v="1659" actId="700"/>
         <pc:sldMkLst>
           <pc:docMk/>
           <pc:sldMk cId="3790017242" sldId="312"/>
         </pc:sldMkLst>
-        <pc:spChg chg="mod">
-          <ac:chgData name="Hsia, Cheehong" userId="6bc27941-0d5a-4c11-8dfb-8bbe9da0911b" providerId="ADAL" clId="{5BE5096F-7F8C-496A-A13C-FF7D0CA7A6B4}" dt="2024-02-14T15:27:12.206" v="1227" actId="20577"/>
+        <pc:spChg chg="mod ord">
+          <ac:chgData name="Hsia, Cheehong" userId="6bc27941-0d5a-4c11-8dfb-8bbe9da0911b" providerId="ADAL" clId="{5BE5096F-7F8C-496A-A13C-FF7D0CA7A6B4}" dt="2024-02-15T16:33:37.976" v="1659" actId="700"/>
           <ac:spMkLst>
             <pc:docMk/>
             <pc:sldMk cId="3790017242" sldId="312"/>
             <ac:spMk id="2" creationId="{9024BA51-C630-BA2A-58B6-69F9BB6816A0}"/>
           </ac:spMkLst>
         </pc:spChg>
-        <pc:spChg chg="mod">
-          <ac:chgData name="Hsia, Cheehong" userId="6bc27941-0d5a-4c11-8dfb-8bbe9da0911b" providerId="ADAL" clId="{5BE5096F-7F8C-496A-A13C-FF7D0CA7A6B4}" dt="2024-02-14T15:27:53.942" v="1326" actId="20577"/>
+        <pc:spChg chg="mod ord">
+          <ac:chgData name="Hsia, Cheehong" userId="6bc27941-0d5a-4c11-8dfb-8bbe9da0911b" providerId="ADAL" clId="{5BE5096F-7F8C-496A-A13C-FF7D0CA7A6B4}" dt="2024-02-15T16:33:37.976" v="1659" actId="700"/>
+          <ac:spMkLst>
+            <pc:docMk/>
+            <pc:sldMk cId="3790017242" sldId="312"/>
+            <ac:spMk id="3" creationId="{2077BF95-1F9E-AA05-3D0B-83E184AA9C48}"/>
+          </ac:spMkLst>
+        </pc:spChg>
+        <pc:spChg chg="mod ord">
+          <ac:chgData name="Hsia, Cheehong" userId="6bc27941-0d5a-4c11-8dfb-8bbe9da0911b" providerId="ADAL" clId="{5BE5096F-7F8C-496A-A13C-FF7D0CA7A6B4}" dt="2024-02-15T16:33:37.976" v="1659" actId="700"/>
           <ac:spMkLst>
             <pc:docMk/>
             <pc:sldMk cId="3790017242" sldId="312"/>
             <ac:spMk id="4" creationId="{8946D5DF-DDC9-DF42-4883-DA9549CF8DE5}"/>
+          </ac:spMkLst>
+        </pc:spChg>
+        <pc:spChg chg="mod ord">
+          <ac:chgData name="Hsia, Cheehong" userId="6bc27941-0d5a-4c11-8dfb-8bbe9da0911b" providerId="ADAL" clId="{5BE5096F-7F8C-496A-A13C-FF7D0CA7A6B4}" dt="2024-02-15T16:33:37.976" v="1659" actId="700"/>
+          <ac:spMkLst>
+            <pc:docMk/>
+            <pc:sldMk cId="3790017242" sldId="312"/>
+            <ac:spMk id="5" creationId="{860EF69F-79FC-8315-A261-A0DDABAAA234}"/>
           </ac:spMkLst>
         </pc:spChg>
         <pc:spChg chg="add mod">
@@ -1333,26 +1559,42 @@
           </ac:spMkLst>
         </pc:spChg>
       </pc:sldChg>
-      <pc:sldChg chg="addSp modSp mod">
-        <pc:chgData name="Hsia, Cheehong" userId="6bc27941-0d5a-4c11-8dfb-8bbe9da0911b" providerId="ADAL" clId="{5BE5096F-7F8C-496A-A13C-FF7D0CA7A6B4}" dt="2024-02-14T15:29:07.335" v="1483" actId="20577"/>
+      <pc:sldChg chg="addSp modSp mod modClrScheme chgLayout">
+        <pc:chgData name="Hsia, Cheehong" userId="6bc27941-0d5a-4c11-8dfb-8bbe9da0911b" providerId="ADAL" clId="{5BE5096F-7F8C-496A-A13C-FF7D0CA7A6B4}" dt="2024-02-15T16:33:37.976" v="1659" actId="700"/>
         <pc:sldMkLst>
           <pc:docMk/>
           <pc:sldMk cId="2198057494" sldId="314"/>
         </pc:sldMkLst>
-        <pc:spChg chg="mod">
-          <ac:chgData name="Hsia, Cheehong" userId="6bc27941-0d5a-4c11-8dfb-8bbe9da0911b" providerId="ADAL" clId="{5BE5096F-7F8C-496A-A13C-FF7D0CA7A6B4}" dt="2024-02-14T15:28:35.051" v="1395" actId="20577"/>
+        <pc:spChg chg="mod ord">
+          <ac:chgData name="Hsia, Cheehong" userId="6bc27941-0d5a-4c11-8dfb-8bbe9da0911b" providerId="ADAL" clId="{5BE5096F-7F8C-496A-A13C-FF7D0CA7A6B4}" dt="2024-02-15T16:33:37.976" v="1659" actId="700"/>
           <ac:spMkLst>
             <pc:docMk/>
             <pc:sldMk cId="2198057494" sldId="314"/>
             <ac:spMk id="2" creationId="{9024BA51-C630-BA2A-58B6-69F9BB6816A0}"/>
           </ac:spMkLst>
         </pc:spChg>
-        <pc:spChg chg="mod">
-          <ac:chgData name="Hsia, Cheehong" userId="6bc27941-0d5a-4c11-8dfb-8bbe9da0911b" providerId="ADAL" clId="{5BE5096F-7F8C-496A-A13C-FF7D0CA7A6B4}" dt="2024-02-14T15:29:07.335" v="1483" actId="20577"/>
+        <pc:spChg chg="mod ord">
+          <ac:chgData name="Hsia, Cheehong" userId="6bc27941-0d5a-4c11-8dfb-8bbe9da0911b" providerId="ADAL" clId="{5BE5096F-7F8C-496A-A13C-FF7D0CA7A6B4}" dt="2024-02-15T16:33:37.976" v="1659" actId="700"/>
+          <ac:spMkLst>
+            <pc:docMk/>
+            <pc:sldMk cId="2198057494" sldId="314"/>
+            <ac:spMk id="3" creationId="{2077BF95-1F9E-AA05-3D0B-83E184AA9C48}"/>
+          </ac:spMkLst>
+        </pc:spChg>
+        <pc:spChg chg="mod ord">
+          <ac:chgData name="Hsia, Cheehong" userId="6bc27941-0d5a-4c11-8dfb-8bbe9da0911b" providerId="ADAL" clId="{5BE5096F-7F8C-496A-A13C-FF7D0CA7A6B4}" dt="2024-02-15T16:33:37.976" v="1659" actId="700"/>
           <ac:spMkLst>
             <pc:docMk/>
             <pc:sldMk cId="2198057494" sldId="314"/>
             <ac:spMk id="4" creationId="{8946D5DF-DDC9-DF42-4883-DA9549CF8DE5}"/>
+          </ac:spMkLst>
+        </pc:spChg>
+        <pc:spChg chg="mod ord">
+          <ac:chgData name="Hsia, Cheehong" userId="6bc27941-0d5a-4c11-8dfb-8bbe9da0911b" providerId="ADAL" clId="{5BE5096F-7F8C-496A-A13C-FF7D0CA7A6B4}" dt="2024-02-15T16:33:37.976" v="1659" actId="700"/>
+          <ac:spMkLst>
+            <pc:docMk/>
+            <pc:sldMk cId="2198057494" sldId="314"/>
+            <ac:spMk id="5" creationId="{860EF69F-79FC-8315-A261-A0DDABAAA234}"/>
           </ac:spMkLst>
         </pc:spChg>
         <pc:spChg chg="add mod">
@@ -1379,26 +1621,42 @@
           </ac:spMkLst>
         </pc:spChg>
       </pc:sldChg>
-      <pc:sldChg chg="addSp modSp mod">
-        <pc:chgData name="Hsia, Cheehong" userId="6bc27941-0d5a-4c11-8dfb-8bbe9da0911b" providerId="ADAL" clId="{5BE5096F-7F8C-496A-A13C-FF7D0CA7A6B4}" dt="2024-02-14T15:30:20.423" v="1621" actId="20577"/>
+      <pc:sldChg chg="addSp modSp mod modClrScheme chgLayout">
+        <pc:chgData name="Hsia, Cheehong" userId="6bc27941-0d5a-4c11-8dfb-8bbe9da0911b" providerId="ADAL" clId="{5BE5096F-7F8C-496A-A13C-FF7D0CA7A6B4}" dt="2024-02-15T16:33:37.976" v="1659" actId="700"/>
         <pc:sldMkLst>
           <pc:docMk/>
           <pc:sldMk cId="1870647430" sldId="316"/>
         </pc:sldMkLst>
-        <pc:spChg chg="mod">
-          <ac:chgData name="Hsia, Cheehong" userId="6bc27941-0d5a-4c11-8dfb-8bbe9da0911b" providerId="ADAL" clId="{5BE5096F-7F8C-496A-A13C-FF7D0CA7A6B4}" dt="2024-02-14T15:29:45.483" v="1536" actId="20577"/>
+        <pc:spChg chg="mod ord">
+          <ac:chgData name="Hsia, Cheehong" userId="6bc27941-0d5a-4c11-8dfb-8bbe9da0911b" providerId="ADAL" clId="{5BE5096F-7F8C-496A-A13C-FF7D0CA7A6B4}" dt="2024-02-15T16:33:37.976" v="1659" actId="700"/>
           <ac:spMkLst>
             <pc:docMk/>
             <pc:sldMk cId="1870647430" sldId="316"/>
             <ac:spMk id="2" creationId="{9024BA51-C630-BA2A-58B6-69F9BB6816A0}"/>
           </ac:spMkLst>
         </pc:spChg>
-        <pc:spChg chg="mod">
-          <ac:chgData name="Hsia, Cheehong" userId="6bc27941-0d5a-4c11-8dfb-8bbe9da0911b" providerId="ADAL" clId="{5BE5096F-7F8C-496A-A13C-FF7D0CA7A6B4}" dt="2024-02-14T15:30:20.423" v="1621" actId="20577"/>
+        <pc:spChg chg="mod ord">
+          <ac:chgData name="Hsia, Cheehong" userId="6bc27941-0d5a-4c11-8dfb-8bbe9da0911b" providerId="ADAL" clId="{5BE5096F-7F8C-496A-A13C-FF7D0CA7A6B4}" dt="2024-02-15T16:33:37.976" v="1659" actId="700"/>
+          <ac:spMkLst>
+            <pc:docMk/>
+            <pc:sldMk cId="1870647430" sldId="316"/>
+            <ac:spMk id="3" creationId="{2077BF95-1F9E-AA05-3D0B-83E184AA9C48}"/>
+          </ac:spMkLst>
+        </pc:spChg>
+        <pc:spChg chg="mod ord">
+          <ac:chgData name="Hsia, Cheehong" userId="6bc27941-0d5a-4c11-8dfb-8bbe9da0911b" providerId="ADAL" clId="{5BE5096F-7F8C-496A-A13C-FF7D0CA7A6B4}" dt="2024-02-15T16:33:37.976" v="1659" actId="700"/>
           <ac:spMkLst>
             <pc:docMk/>
             <pc:sldMk cId="1870647430" sldId="316"/>
             <ac:spMk id="4" creationId="{8946D5DF-DDC9-DF42-4883-DA9549CF8DE5}"/>
+          </ac:spMkLst>
+        </pc:spChg>
+        <pc:spChg chg="mod ord">
+          <ac:chgData name="Hsia, Cheehong" userId="6bc27941-0d5a-4c11-8dfb-8bbe9da0911b" providerId="ADAL" clId="{5BE5096F-7F8C-496A-A13C-FF7D0CA7A6B4}" dt="2024-02-15T16:33:37.976" v="1659" actId="700"/>
+          <ac:spMkLst>
+            <pc:docMk/>
+            <pc:sldMk cId="1870647430" sldId="316"/>
+            <ac:spMk id="5" creationId="{860EF69F-79FC-8315-A261-A0DDABAAA234}"/>
           </ac:spMkLst>
         </pc:spChg>
         <pc:spChg chg="add mod">
@@ -2480,8 +2738,8 @@
           </ac:spMkLst>
         </pc:spChg>
       </pc:sldChg>
-      <pc:sldMasterChg chg="modSldLayout">
-        <pc:chgData name="Hsia, Cheehong" userId="6bc27941-0d5a-4c11-8dfb-8bbe9da0911b" providerId="ADAL" clId="{5BE5096F-7F8C-496A-A13C-FF7D0CA7A6B4}" dt="2024-01-31T20:12:39.319" v="46" actId="11529"/>
+      <pc:sldMasterChg chg="addSldLayout delSldLayout modSldLayout">
+        <pc:chgData name="Hsia, Cheehong" userId="6bc27941-0d5a-4c11-8dfb-8bbe9da0911b" providerId="ADAL" clId="{5BE5096F-7F8C-496A-A13C-FF7D0CA7A6B4}" dt="2024-02-15T16:31:22.373" v="1648" actId="207"/>
         <pc:sldMasterMkLst>
           <pc:docMk/>
           <pc:sldMasterMk cId="289967154" sldId="2147483733"/>
@@ -2562,6 +2820,40 @@
               <ac:spMk id="2" creationId="{08954A8A-7BAA-B040-4480-D0525828127D}"/>
             </ac:spMkLst>
           </pc:spChg>
+        </pc:sldLayoutChg>
+        <pc:sldLayoutChg chg="modSp add mod modTransition setBg">
+          <pc:chgData name="Hsia, Cheehong" userId="6bc27941-0d5a-4c11-8dfb-8bbe9da0911b" providerId="ADAL" clId="{5BE5096F-7F8C-496A-A13C-FF7D0CA7A6B4}" dt="2024-02-15T16:31:22.373" v="1648" actId="207"/>
+          <pc:sldLayoutMkLst>
+            <pc:docMk/>
+            <pc:sldMasterMk cId="289967154" sldId="2147483733"/>
+            <pc:sldLayoutMk cId="3436012165" sldId="2147483779"/>
+          </pc:sldLayoutMkLst>
+          <pc:spChg chg="mod">
+            <ac:chgData name="Hsia, Cheehong" userId="6bc27941-0d5a-4c11-8dfb-8bbe9da0911b" providerId="ADAL" clId="{5BE5096F-7F8C-496A-A13C-FF7D0CA7A6B4}" dt="2024-02-15T16:31:19.723" v="1647" actId="20577"/>
+            <ac:spMkLst>
+              <pc:docMk/>
+              <pc:sldMasterMk cId="289967154" sldId="2147483733"/>
+              <pc:sldLayoutMk cId="3436012165" sldId="2147483779"/>
+              <ac:spMk id="13" creationId="{06763006-0C18-679B-4948-F1ED35F64B48}"/>
+            </ac:spMkLst>
+          </pc:spChg>
+          <pc:spChg chg="mod">
+            <ac:chgData name="Hsia, Cheehong" userId="6bc27941-0d5a-4c11-8dfb-8bbe9da0911b" providerId="ADAL" clId="{5BE5096F-7F8C-496A-A13C-FF7D0CA7A6B4}" dt="2024-02-15T16:31:22.373" v="1648" actId="207"/>
+            <ac:spMkLst>
+              <pc:docMk/>
+              <pc:sldMasterMk cId="289967154" sldId="2147483733"/>
+              <pc:sldLayoutMk cId="3436012165" sldId="2147483779"/>
+              <ac:spMk id="15" creationId="{6F89948F-3BC6-AA2A-993E-A68DA4D29C7C}"/>
+            </ac:spMkLst>
+          </pc:spChg>
+        </pc:sldLayoutChg>
+        <pc:sldLayoutChg chg="add del mod modTransition">
+          <pc:chgData name="Hsia, Cheehong" userId="6bc27941-0d5a-4c11-8dfb-8bbe9da0911b" providerId="ADAL" clId="{5BE5096F-7F8C-496A-A13C-FF7D0CA7A6B4}" dt="2024-02-14T17:22:50.851" v="1642" actId="2890"/>
+          <pc:sldLayoutMkLst>
+            <pc:docMk/>
+            <pc:sldMasterMk cId="289967154" sldId="2147483733"/>
+            <pc:sldLayoutMk cId="4251751066" sldId="2147483779"/>
+          </pc:sldLayoutMkLst>
         </pc:sldLayoutChg>
       </pc:sldMasterChg>
     </pc:docChg>
@@ -13689,6 +13981,331 @@
 
 <file path=ppt/slideLayouts/slideLayout26.xml><?xml version="1.0" encoding="utf-8"?>
 <p:sldLayout xmlns:a="http://schemas.openxmlformats.org/drawingml/2006/main" xmlns:r="http://schemas.openxmlformats.org/officeDocument/2006/relationships" xmlns:p="http://schemas.openxmlformats.org/presentationml/2006/main" preserve="1">
+  <p:cSld name="7_Purple BG Title Card">
+    <p:bg>
+      <p:bgPr>
+        <a:solidFill>
+          <a:schemeClr val="bg1"/>
+        </a:solidFill>
+        <a:effectLst/>
+      </p:bgPr>
+    </p:bg>
+    <p:spTree>
+      <p:nvGrpSpPr>
+        <p:cNvPr id="1" name=""/>
+        <p:cNvGrpSpPr/>
+        <p:nvPr/>
+      </p:nvGrpSpPr>
+      <p:grpSpPr>
+        <a:xfrm>
+          <a:off x="0" y="0"/>
+          <a:ext cx="0" cy="0"/>
+          <a:chOff x="0" y="0"/>
+          <a:chExt cx="0" cy="0"/>
+        </a:xfrm>
+      </p:grpSpPr>
+      <p:sp>
+        <p:nvSpPr>
+          <p:cNvPr id="13" name="Text Placeholder 7">
+            <a:extLst>
+              <a:ext uri="{FF2B5EF4-FFF2-40B4-BE49-F238E27FC236}">
+                <a16:creationId xmlns:a16="http://schemas.microsoft.com/office/drawing/2014/main" id="{06763006-0C18-679B-4948-F1ED35F64B48}"/>
+              </a:ext>
+            </a:extLst>
+          </p:cNvPr>
+          <p:cNvSpPr>
+            <a:spLocks noGrp="1"/>
+          </p:cNvSpPr>
+          <p:nvPr>
+            <p:ph type="body" sz="quarter" idx="12" hasCustomPrompt="1"/>
+          </p:nvPr>
+        </p:nvSpPr>
+        <p:spPr>
+          <a:xfrm>
+            <a:off x="457209" y="2006958"/>
+            <a:ext cx="3250262" cy="2914177"/>
+          </a:xfrm>
+          <a:prstGeom prst="rect">
+            <a:avLst/>
+          </a:prstGeom>
+        </p:spPr>
+        <p:txBody>
+          <a:bodyPr tIns="144000" anchor="t"/>
+          <a:lstStyle>
+            <a:lvl1pPr marL="0" indent="0" algn="ctr">
+              <a:buNone/>
+              <a:defRPr sz="4000">
+                <a:solidFill>
+                  <a:srgbClr val="DE8445"/>
+                </a:solidFill>
+                <a:latin typeface="American Captain" pitchFamily="2" charset="77"/>
+              </a:defRPr>
+            </a:lvl1pPr>
+            <a:lvl2pPr marL="457200" indent="0">
+              <a:buNone/>
+              <a:defRPr>
+                <a:latin typeface="American Captain" pitchFamily="2" charset="77"/>
+              </a:defRPr>
+            </a:lvl2pPr>
+            <a:lvl3pPr marL="914400" indent="0">
+              <a:buNone/>
+              <a:defRPr>
+                <a:latin typeface="American Captain" pitchFamily="2" charset="77"/>
+              </a:defRPr>
+            </a:lvl3pPr>
+            <a:lvl4pPr marL="1371600" indent="0">
+              <a:buNone/>
+              <a:defRPr>
+                <a:latin typeface="American Captain" pitchFamily="2" charset="77"/>
+              </a:defRPr>
+            </a:lvl4pPr>
+            <a:lvl5pPr marL="1828800" indent="0">
+              <a:buNone/>
+              <a:defRPr>
+                <a:latin typeface="American Captain" pitchFamily="2" charset="77"/>
+              </a:defRPr>
+            </a:lvl5pPr>
+          </a:lstStyle>
+          <a:p>
+            <a:pPr lvl="0"/>
+            <a:r>
+              <a:rPr lang="en-GB" dirty="0"/>
+              <a:t>YOUR TEXT HERE</a:t>
+            </a:r>
+          </a:p>
+        </p:txBody>
+      </p:sp>
+      <p:sp>
+        <p:nvSpPr>
+          <p:cNvPr id="14" name="Content Placeholder 2">
+            <a:extLst>
+              <a:ext uri="{FF2B5EF4-FFF2-40B4-BE49-F238E27FC236}">
+                <a16:creationId xmlns:a16="http://schemas.microsoft.com/office/drawing/2014/main" id="{BA792C94-C089-C30B-7DAD-9A255E7E4B63}"/>
+              </a:ext>
+            </a:extLst>
+          </p:cNvPr>
+          <p:cNvSpPr>
+            <a:spLocks noGrp="1"/>
+          </p:cNvSpPr>
+          <p:nvPr>
+            <p:ph sz="quarter" idx="13" hasCustomPrompt="1"/>
+          </p:nvPr>
+        </p:nvSpPr>
+        <p:spPr>
+          <a:xfrm>
+            <a:off x="585974" y="1188720"/>
+            <a:ext cx="3003550" cy="703766"/>
+          </a:xfrm>
+          <a:prstGeom prst="rect">
+            <a:avLst/>
+          </a:prstGeom>
+          <a:solidFill>
+            <a:schemeClr val="tx1"/>
+          </a:solidFill>
+        </p:spPr>
+        <p:txBody>
+          <a:bodyPr anchor="b"/>
+          <a:lstStyle>
+            <a:lvl1pPr marL="0" indent="0" algn="ctr">
+              <a:buNone/>
+              <a:defRPr sz="4000">
+                <a:solidFill>
+                  <a:schemeClr val="bg1"/>
+                </a:solidFill>
+                <a:latin typeface="American Captain" pitchFamily="2" charset="77"/>
+              </a:defRPr>
+            </a:lvl1pPr>
+          </a:lstStyle>
+          <a:p>
+            <a:pPr lvl="0"/>
+            <a:r>
+              <a:rPr lang="en-NL" dirty="0"/>
+              <a:t>COLUMN TITLE</a:t>
+            </a:r>
+          </a:p>
+        </p:txBody>
+      </p:sp>
+      <p:sp>
+        <p:nvSpPr>
+          <p:cNvPr id="15" name="Text Placeholder 7">
+            <a:extLst>
+              <a:ext uri="{FF2B5EF4-FFF2-40B4-BE49-F238E27FC236}">
+                <a16:creationId xmlns:a16="http://schemas.microsoft.com/office/drawing/2014/main" id="{6F89948F-3BC6-AA2A-993E-A68DA4D29C7C}"/>
+              </a:ext>
+            </a:extLst>
+          </p:cNvPr>
+          <p:cNvSpPr>
+            <a:spLocks noGrp="1"/>
+          </p:cNvSpPr>
+          <p:nvPr>
+            <p:ph type="body" sz="quarter" idx="14" hasCustomPrompt="1"/>
+          </p:nvPr>
+        </p:nvSpPr>
+        <p:spPr>
+          <a:xfrm>
+            <a:off x="4079591" y="2006958"/>
+            <a:ext cx="3302105" cy="2914177"/>
+          </a:xfrm>
+          <a:prstGeom prst="rect">
+            <a:avLst/>
+          </a:prstGeom>
+        </p:spPr>
+        <p:txBody>
+          <a:bodyPr tIns="144000" anchor="t"/>
+          <a:lstStyle>
+            <a:lvl1pPr marL="0" indent="0" algn="ctr">
+              <a:buNone/>
+              <a:defRPr sz="4000">
+                <a:solidFill>
+                  <a:srgbClr val="DE8445"/>
+                </a:solidFill>
+                <a:latin typeface="American Captain" pitchFamily="2" charset="77"/>
+              </a:defRPr>
+            </a:lvl1pPr>
+            <a:lvl2pPr marL="457200" indent="0">
+              <a:buNone/>
+              <a:defRPr>
+                <a:latin typeface="American Captain" pitchFamily="2" charset="77"/>
+              </a:defRPr>
+            </a:lvl2pPr>
+            <a:lvl3pPr marL="914400" indent="0">
+              <a:buNone/>
+              <a:defRPr>
+                <a:latin typeface="American Captain" pitchFamily="2" charset="77"/>
+              </a:defRPr>
+            </a:lvl3pPr>
+            <a:lvl4pPr marL="1371600" indent="0">
+              <a:buNone/>
+              <a:defRPr>
+                <a:latin typeface="American Captain" pitchFamily="2" charset="77"/>
+              </a:defRPr>
+            </a:lvl4pPr>
+            <a:lvl5pPr marL="1828800" indent="0">
+              <a:buNone/>
+              <a:defRPr>
+                <a:latin typeface="American Captain" pitchFamily="2" charset="77"/>
+              </a:defRPr>
+            </a:lvl5pPr>
+          </a:lstStyle>
+          <a:p>
+            <a:pPr lvl="0"/>
+            <a:r>
+              <a:rPr lang="en-GB" dirty="0"/>
+              <a:t>YOUR TEXT HERE</a:t>
+            </a:r>
+          </a:p>
+        </p:txBody>
+      </p:sp>
+      <p:sp>
+        <p:nvSpPr>
+          <p:cNvPr id="16" name="Content Placeholder 2">
+            <a:extLst>
+              <a:ext uri="{FF2B5EF4-FFF2-40B4-BE49-F238E27FC236}">
+                <a16:creationId xmlns:a16="http://schemas.microsoft.com/office/drawing/2014/main" id="{B6AC4793-B815-FF1A-4923-A0F398D7DBAD}"/>
+              </a:ext>
+            </a:extLst>
+          </p:cNvPr>
+          <p:cNvSpPr>
+            <a:spLocks noGrp="1"/>
+          </p:cNvSpPr>
+          <p:nvPr>
+            <p:ph sz="quarter" idx="15" hasCustomPrompt="1"/>
+          </p:nvPr>
+        </p:nvSpPr>
+        <p:spPr>
+          <a:xfrm>
+            <a:off x="4197264" y="1188720"/>
+            <a:ext cx="3003550" cy="703767"/>
+          </a:xfrm>
+          <a:prstGeom prst="rect">
+            <a:avLst/>
+          </a:prstGeom>
+          <a:solidFill>
+            <a:schemeClr val="tx1"/>
+          </a:solidFill>
+        </p:spPr>
+        <p:txBody>
+          <a:bodyPr anchor="b"/>
+          <a:lstStyle>
+            <a:lvl1pPr marL="0" indent="0" algn="ctr">
+              <a:buNone/>
+              <a:defRPr sz="4000">
+                <a:solidFill>
+                  <a:schemeClr val="bg1"/>
+                </a:solidFill>
+                <a:latin typeface="American Captain" pitchFamily="2" charset="77"/>
+              </a:defRPr>
+            </a:lvl1pPr>
+          </a:lstStyle>
+          <a:p>
+            <a:pPr lvl="0"/>
+            <a:r>
+              <a:rPr lang="en-NL" dirty="0"/>
+              <a:t>COLUMN TITLE</a:t>
+            </a:r>
+          </a:p>
+        </p:txBody>
+      </p:sp>
+      <p:cxnSp>
+        <p:nvCxnSpPr>
+          <p:cNvPr id="17" name="Straight Connector 16">
+            <a:extLst>
+              <a:ext uri="{FF2B5EF4-FFF2-40B4-BE49-F238E27FC236}">
+                <a16:creationId xmlns:a16="http://schemas.microsoft.com/office/drawing/2014/main" id="{09717273-E123-CB98-94F4-809BAB96BB7B}"/>
+              </a:ext>
+            </a:extLst>
+          </p:cNvPr>
+          <p:cNvCxnSpPr>
+            <a:cxnSpLocks/>
+          </p:cNvCxnSpPr>
+          <p:nvPr/>
+        </p:nvCxnSpPr>
+        <p:spPr>
+          <a:xfrm>
+            <a:off x="3893531" y="1188720"/>
+            <a:ext cx="0" cy="3732415"/>
+          </a:xfrm>
+          <a:prstGeom prst="line">
+            <a:avLst/>
+          </a:prstGeom>
+          <a:ln w="38100">
+            <a:solidFill>
+              <a:schemeClr val="bg1">
+                <a:lumMod val="50000"/>
+              </a:schemeClr>
+            </a:solidFill>
+          </a:ln>
+        </p:spPr>
+        <p:style>
+          <a:lnRef idx="1">
+            <a:schemeClr val="accent1"/>
+          </a:lnRef>
+          <a:fillRef idx="0">
+            <a:schemeClr val="accent1"/>
+          </a:fillRef>
+          <a:effectRef idx="0">
+            <a:schemeClr val="accent1"/>
+          </a:effectRef>
+          <a:fontRef idx="minor">
+            <a:schemeClr val="tx1"/>
+          </a:fontRef>
+        </p:style>
+      </p:cxnSp>
+    </p:spTree>
+    <p:extLst>
+      <p:ext uri="{BB962C8B-B14F-4D97-AF65-F5344CB8AC3E}">
+        <p14:creationId xmlns:p14="http://schemas.microsoft.com/office/powerpoint/2010/main" val="3436012165"/>
+      </p:ext>
+    </p:extLst>
+  </p:cSld>
+  <p:clrMapOvr>
+    <a:masterClrMapping/>
+  </p:clrMapOvr>
+</p:sldLayout>
+</file>
+
+<file path=ppt/slideLayouts/slideLayout27.xml><?xml version="1.0" encoding="utf-8"?>
+<p:sldLayout xmlns:a="http://schemas.openxmlformats.org/drawingml/2006/main" xmlns:r="http://schemas.openxmlformats.org/officeDocument/2006/relationships" xmlns:p="http://schemas.openxmlformats.org/presentationml/2006/main" preserve="1">
   <p:cSld name="3_Purple BG Title Card">
     <p:bg>
       <p:bgPr>
@@ -14012,7 +14629,7 @@
 </p:sldLayout>
 </file>
 
-<file path=ppt/slideLayouts/slideLayout27.xml><?xml version="1.0" encoding="utf-8"?>
+<file path=ppt/slideLayouts/slideLayout28.xml><?xml version="1.0" encoding="utf-8"?>
 <p:sldLayout xmlns:a="http://schemas.openxmlformats.org/drawingml/2006/main" xmlns:r="http://schemas.openxmlformats.org/officeDocument/2006/relationships" xmlns:p="http://schemas.openxmlformats.org/presentationml/2006/main" preserve="1">
   <p:cSld name="6_Purple BG Title Card">
     <p:bg>
@@ -14339,7 +14956,7 @@
 </p:sldLayout>
 </file>
 
-<file path=ppt/slideLayouts/slideLayout28.xml><?xml version="1.0" encoding="utf-8"?>
+<file path=ppt/slideLayouts/slideLayout29.xml><?xml version="1.0" encoding="utf-8"?>
 <p:sldLayout xmlns:a="http://schemas.openxmlformats.org/drawingml/2006/main" xmlns:r="http://schemas.openxmlformats.org/officeDocument/2006/relationships" xmlns:p="http://schemas.openxmlformats.org/presentationml/2006/main" preserve="1">
   <p:cSld name="5_Purple BG Title Card">
     <p:bg>
@@ -14657,331 +15274,6 @@
     <p:extLst>
       <p:ext uri="{BB962C8B-B14F-4D97-AF65-F5344CB8AC3E}">
         <p14:creationId xmlns:p14="http://schemas.microsoft.com/office/powerpoint/2010/main" val="2849484981"/>
-      </p:ext>
-    </p:extLst>
-  </p:cSld>
-  <p:clrMapOvr>
-    <a:masterClrMapping/>
-  </p:clrMapOvr>
-</p:sldLayout>
-</file>
-
-<file path=ppt/slideLayouts/slideLayout29.xml><?xml version="1.0" encoding="utf-8"?>
-<p:sldLayout xmlns:a="http://schemas.openxmlformats.org/drawingml/2006/main" xmlns:r="http://schemas.openxmlformats.org/officeDocument/2006/relationships" xmlns:p="http://schemas.openxmlformats.org/presentationml/2006/main" preserve="1">
-  <p:cSld name="4_Purple BG Title Card">
-    <p:bg>
-      <p:bgPr>
-        <a:solidFill>
-          <a:srgbClr val="FFC000"/>
-        </a:solidFill>
-        <a:effectLst/>
-      </p:bgPr>
-    </p:bg>
-    <p:spTree>
-      <p:nvGrpSpPr>
-        <p:cNvPr id="1" name=""/>
-        <p:cNvGrpSpPr/>
-        <p:nvPr/>
-      </p:nvGrpSpPr>
-      <p:grpSpPr>
-        <a:xfrm>
-          <a:off x="0" y="0"/>
-          <a:ext cx="0" cy="0"/>
-          <a:chOff x="0" y="0"/>
-          <a:chExt cx="0" cy="0"/>
-        </a:xfrm>
-      </p:grpSpPr>
-      <p:sp>
-        <p:nvSpPr>
-          <p:cNvPr id="13" name="Text Placeholder 7">
-            <a:extLst>
-              <a:ext uri="{FF2B5EF4-FFF2-40B4-BE49-F238E27FC236}">
-                <a16:creationId xmlns:a16="http://schemas.microsoft.com/office/drawing/2014/main" id="{06763006-0C18-679B-4948-F1ED35F64B48}"/>
-              </a:ext>
-            </a:extLst>
-          </p:cNvPr>
-          <p:cNvSpPr>
-            <a:spLocks noGrp="1"/>
-          </p:cNvSpPr>
-          <p:nvPr>
-            <p:ph type="body" sz="quarter" idx="12" hasCustomPrompt="1"/>
-          </p:nvPr>
-        </p:nvSpPr>
-        <p:spPr>
-          <a:xfrm>
-            <a:off x="457209" y="2006958"/>
-            <a:ext cx="3250262" cy="2914177"/>
-          </a:xfrm>
-          <a:prstGeom prst="rect">
-            <a:avLst/>
-          </a:prstGeom>
-        </p:spPr>
-        <p:txBody>
-          <a:bodyPr tIns="144000" anchor="t"/>
-          <a:lstStyle>
-            <a:lvl1pPr marL="0" indent="0" algn="ctr">
-              <a:buNone/>
-              <a:defRPr sz="4000">
-                <a:solidFill>
-                  <a:schemeClr val="tx1"/>
-                </a:solidFill>
-                <a:latin typeface="American Captain" pitchFamily="2" charset="77"/>
-              </a:defRPr>
-            </a:lvl1pPr>
-            <a:lvl2pPr marL="457200" indent="0">
-              <a:buNone/>
-              <a:defRPr>
-                <a:latin typeface="American Captain" pitchFamily="2" charset="77"/>
-              </a:defRPr>
-            </a:lvl2pPr>
-            <a:lvl3pPr marL="914400" indent="0">
-              <a:buNone/>
-              <a:defRPr>
-                <a:latin typeface="American Captain" pitchFamily="2" charset="77"/>
-              </a:defRPr>
-            </a:lvl3pPr>
-            <a:lvl4pPr marL="1371600" indent="0">
-              <a:buNone/>
-              <a:defRPr>
-                <a:latin typeface="American Captain" pitchFamily="2" charset="77"/>
-              </a:defRPr>
-            </a:lvl4pPr>
-            <a:lvl5pPr marL="1828800" indent="0">
-              <a:buNone/>
-              <a:defRPr>
-                <a:latin typeface="American Captain" pitchFamily="2" charset="77"/>
-              </a:defRPr>
-            </a:lvl5pPr>
-          </a:lstStyle>
-          <a:p>
-            <a:pPr lvl="0"/>
-            <a:r>
-              <a:rPr lang="en-GB" dirty="0"/>
-              <a:t>YOUR TEXT HERE</a:t>
-            </a:r>
-          </a:p>
-        </p:txBody>
-      </p:sp>
-      <p:sp>
-        <p:nvSpPr>
-          <p:cNvPr id="14" name="Content Placeholder 2">
-            <a:extLst>
-              <a:ext uri="{FF2B5EF4-FFF2-40B4-BE49-F238E27FC236}">
-                <a16:creationId xmlns:a16="http://schemas.microsoft.com/office/drawing/2014/main" id="{BA792C94-C089-C30B-7DAD-9A255E7E4B63}"/>
-              </a:ext>
-            </a:extLst>
-          </p:cNvPr>
-          <p:cNvSpPr>
-            <a:spLocks noGrp="1"/>
-          </p:cNvSpPr>
-          <p:nvPr>
-            <p:ph sz="quarter" idx="13" hasCustomPrompt="1"/>
-          </p:nvPr>
-        </p:nvSpPr>
-        <p:spPr>
-          <a:xfrm>
-            <a:off x="585974" y="1188720"/>
-            <a:ext cx="3003550" cy="703766"/>
-          </a:xfrm>
-          <a:prstGeom prst="rect">
-            <a:avLst/>
-          </a:prstGeom>
-          <a:solidFill>
-            <a:schemeClr val="tx1"/>
-          </a:solidFill>
-        </p:spPr>
-        <p:txBody>
-          <a:bodyPr anchor="b"/>
-          <a:lstStyle>
-            <a:lvl1pPr marL="0" indent="0" algn="ctr">
-              <a:buNone/>
-              <a:defRPr sz="4000">
-                <a:solidFill>
-                  <a:schemeClr val="bg1"/>
-                </a:solidFill>
-                <a:latin typeface="American Captain" pitchFamily="2" charset="77"/>
-              </a:defRPr>
-            </a:lvl1pPr>
-          </a:lstStyle>
-          <a:p>
-            <a:pPr lvl="0"/>
-            <a:r>
-              <a:rPr lang="en-NL" dirty="0"/>
-              <a:t>COLUMN TITLE</a:t>
-            </a:r>
-          </a:p>
-        </p:txBody>
-      </p:sp>
-      <p:sp>
-        <p:nvSpPr>
-          <p:cNvPr id="15" name="Text Placeholder 7">
-            <a:extLst>
-              <a:ext uri="{FF2B5EF4-FFF2-40B4-BE49-F238E27FC236}">
-                <a16:creationId xmlns:a16="http://schemas.microsoft.com/office/drawing/2014/main" id="{6F89948F-3BC6-AA2A-993E-A68DA4D29C7C}"/>
-              </a:ext>
-            </a:extLst>
-          </p:cNvPr>
-          <p:cNvSpPr>
-            <a:spLocks noGrp="1"/>
-          </p:cNvSpPr>
-          <p:nvPr>
-            <p:ph type="body" sz="quarter" idx="14" hasCustomPrompt="1"/>
-          </p:nvPr>
-        </p:nvSpPr>
-        <p:spPr>
-          <a:xfrm>
-            <a:off x="4079591" y="2006958"/>
-            <a:ext cx="3302105" cy="2914177"/>
-          </a:xfrm>
-          <a:prstGeom prst="rect">
-            <a:avLst/>
-          </a:prstGeom>
-        </p:spPr>
-        <p:txBody>
-          <a:bodyPr tIns="144000" anchor="t"/>
-          <a:lstStyle>
-            <a:lvl1pPr marL="0" indent="0" algn="ctr">
-              <a:buNone/>
-              <a:defRPr sz="4000">
-                <a:solidFill>
-                  <a:schemeClr val="tx1"/>
-                </a:solidFill>
-                <a:latin typeface="American Captain" pitchFamily="2" charset="77"/>
-              </a:defRPr>
-            </a:lvl1pPr>
-            <a:lvl2pPr marL="457200" indent="0">
-              <a:buNone/>
-              <a:defRPr>
-                <a:latin typeface="American Captain" pitchFamily="2" charset="77"/>
-              </a:defRPr>
-            </a:lvl2pPr>
-            <a:lvl3pPr marL="914400" indent="0">
-              <a:buNone/>
-              <a:defRPr>
-                <a:latin typeface="American Captain" pitchFamily="2" charset="77"/>
-              </a:defRPr>
-            </a:lvl3pPr>
-            <a:lvl4pPr marL="1371600" indent="0">
-              <a:buNone/>
-              <a:defRPr>
-                <a:latin typeface="American Captain" pitchFamily="2" charset="77"/>
-              </a:defRPr>
-            </a:lvl4pPr>
-            <a:lvl5pPr marL="1828800" indent="0">
-              <a:buNone/>
-              <a:defRPr>
-                <a:latin typeface="American Captain" pitchFamily="2" charset="77"/>
-              </a:defRPr>
-            </a:lvl5pPr>
-          </a:lstStyle>
-          <a:p>
-            <a:pPr lvl="0"/>
-            <a:r>
-              <a:rPr lang="en-GB" dirty="0"/>
-              <a:t>YOUR TEXT HERE</a:t>
-            </a:r>
-          </a:p>
-        </p:txBody>
-      </p:sp>
-      <p:sp>
-        <p:nvSpPr>
-          <p:cNvPr id="16" name="Content Placeholder 2">
-            <a:extLst>
-              <a:ext uri="{FF2B5EF4-FFF2-40B4-BE49-F238E27FC236}">
-                <a16:creationId xmlns:a16="http://schemas.microsoft.com/office/drawing/2014/main" id="{B6AC4793-B815-FF1A-4923-A0F398D7DBAD}"/>
-              </a:ext>
-            </a:extLst>
-          </p:cNvPr>
-          <p:cNvSpPr>
-            <a:spLocks noGrp="1"/>
-          </p:cNvSpPr>
-          <p:nvPr>
-            <p:ph sz="quarter" idx="15" hasCustomPrompt="1"/>
-          </p:nvPr>
-        </p:nvSpPr>
-        <p:spPr>
-          <a:xfrm>
-            <a:off x="4197264" y="1188720"/>
-            <a:ext cx="3003550" cy="703767"/>
-          </a:xfrm>
-          <a:prstGeom prst="rect">
-            <a:avLst/>
-          </a:prstGeom>
-          <a:solidFill>
-            <a:schemeClr val="tx1"/>
-          </a:solidFill>
-        </p:spPr>
-        <p:txBody>
-          <a:bodyPr anchor="b"/>
-          <a:lstStyle>
-            <a:lvl1pPr marL="0" indent="0" algn="ctr">
-              <a:buNone/>
-              <a:defRPr sz="4000">
-                <a:solidFill>
-                  <a:schemeClr val="bg1"/>
-                </a:solidFill>
-                <a:latin typeface="American Captain" pitchFamily="2" charset="77"/>
-              </a:defRPr>
-            </a:lvl1pPr>
-          </a:lstStyle>
-          <a:p>
-            <a:pPr lvl="0"/>
-            <a:r>
-              <a:rPr lang="en-NL" dirty="0"/>
-              <a:t>COLUMN TITLE</a:t>
-            </a:r>
-          </a:p>
-        </p:txBody>
-      </p:sp>
-      <p:cxnSp>
-        <p:nvCxnSpPr>
-          <p:cNvPr id="17" name="Straight Connector 16">
-            <a:extLst>
-              <a:ext uri="{FF2B5EF4-FFF2-40B4-BE49-F238E27FC236}">
-                <a16:creationId xmlns:a16="http://schemas.microsoft.com/office/drawing/2014/main" id="{09717273-E123-CB98-94F4-809BAB96BB7B}"/>
-              </a:ext>
-            </a:extLst>
-          </p:cNvPr>
-          <p:cNvCxnSpPr>
-            <a:cxnSpLocks/>
-          </p:cNvCxnSpPr>
-          <p:nvPr/>
-        </p:nvCxnSpPr>
-        <p:spPr>
-          <a:xfrm>
-            <a:off x="3893531" y="1188720"/>
-            <a:ext cx="0" cy="3732415"/>
-          </a:xfrm>
-          <a:prstGeom prst="line">
-            <a:avLst/>
-          </a:prstGeom>
-          <a:ln w="38100">
-            <a:solidFill>
-              <a:schemeClr val="bg1">
-                <a:lumMod val="50000"/>
-              </a:schemeClr>
-            </a:solidFill>
-          </a:ln>
-        </p:spPr>
-        <p:style>
-          <a:lnRef idx="1">
-            <a:schemeClr val="accent1"/>
-          </a:lnRef>
-          <a:fillRef idx="0">
-            <a:schemeClr val="accent1"/>
-          </a:fillRef>
-          <a:effectRef idx="0">
-            <a:schemeClr val="accent1"/>
-          </a:effectRef>
-          <a:fontRef idx="minor">
-            <a:schemeClr val="tx1"/>
-          </a:fontRef>
-        </p:style>
-      </p:cxnSp>
-    </p:spTree>
-    <p:extLst>
-      <p:ext uri="{BB962C8B-B14F-4D97-AF65-F5344CB8AC3E}">
-        <p14:creationId xmlns:p14="http://schemas.microsoft.com/office/powerpoint/2010/main" val="630380160"/>
       </p:ext>
     </p:extLst>
   </p:cSld>
@@ -15186,6 +15478,331 @@
 
 <file path=ppt/slideLayouts/slideLayout30.xml><?xml version="1.0" encoding="utf-8"?>
 <p:sldLayout xmlns:a="http://schemas.openxmlformats.org/drawingml/2006/main" xmlns:r="http://schemas.openxmlformats.org/officeDocument/2006/relationships" xmlns:p="http://schemas.openxmlformats.org/presentationml/2006/main" preserve="1">
+  <p:cSld name="4_Purple BG Title Card">
+    <p:bg>
+      <p:bgPr>
+        <a:solidFill>
+          <a:srgbClr val="FFC000"/>
+        </a:solidFill>
+        <a:effectLst/>
+      </p:bgPr>
+    </p:bg>
+    <p:spTree>
+      <p:nvGrpSpPr>
+        <p:cNvPr id="1" name=""/>
+        <p:cNvGrpSpPr/>
+        <p:nvPr/>
+      </p:nvGrpSpPr>
+      <p:grpSpPr>
+        <a:xfrm>
+          <a:off x="0" y="0"/>
+          <a:ext cx="0" cy="0"/>
+          <a:chOff x="0" y="0"/>
+          <a:chExt cx="0" cy="0"/>
+        </a:xfrm>
+      </p:grpSpPr>
+      <p:sp>
+        <p:nvSpPr>
+          <p:cNvPr id="13" name="Text Placeholder 7">
+            <a:extLst>
+              <a:ext uri="{FF2B5EF4-FFF2-40B4-BE49-F238E27FC236}">
+                <a16:creationId xmlns:a16="http://schemas.microsoft.com/office/drawing/2014/main" id="{06763006-0C18-679B-4948-F1ED35F64B48}"/>
+              </a:ext>
+            </a:extLst>
+          </p:cNvPr>
+          <p:cNvSpPr>
+            <a:spLocks noGrp="1"/>
+          </p:cNvSpPr>
+          <p:nvPr>
+            <p:ph type="body" sz="quarter" idx="12" hasCustomPrompt="1"/>
+          </p:nvPr>
+        </p:nvSpPr>
+        <p:spPr>
+          <a:xfrm>
+            <a:off x="457209" y="2006958"/>
+            <a:ext cx="3250262" cy="2914177"/>
+          </a:xfrm>
+          <a:prstGeom prst="rect">
+            <a:avLst/>
+          </a:prstGeom>
+        </p:spPr>
+        <p:txBody>
+          <a:bodyPr tIns="144000" anchor="t"/>
+          <a:lstStyle>
+            <a:lvl1pPr marL="0" indent="0" algn="ctr">
+              <a:buNone/>
+              <a:defRPr sz="4000">
+                <a:solidFill>
+                  <a:schemeClr val="tx1"/>
+                </a:solidFill>
+                <a:latin typeface="American Captain" pitchFamily="2" charset="77"/>
+              </a:defRPr>
+            </a:lvl1pPr>
+            <a:lvl2pPr marL="457200" indent="0">
+              <a:buNone/>
+              <a:defRPr>
+                <a:latin typeface="American Captain" pitchFamily="2" charset="77"/>
+              </a:defRPr>
+            </a:lvl2pPr>
+            <a:lvl3pPr marL="914400" indent="0">
+              <a:buNone/>
+              <a:defRPr>
+                <a:latin typeface="American Captain" pitchFamily="2" charset="77"/>
+              </a:defRPr>
+            </a:lvl3pPr>
+            <a:lvl4pPr marL="1371600" indent="0">
+              <a:buNone/>
+              <a:defRPr>
+                <a:latin typeface="American Captain" pitchFamily="2" charset="77"/>
+              </a:defRPr>
+            </a:lvl4pPr>
+            <a:lvl5pPr marL="1828800" indent="0">
+              <a:buNone/>
+              <a:defRPr>
+                <a:latin typeface="American Captain" pitchFamily="2" charset="77"/>
+              </a:defRPr>
+            </a:lvl5pPr>
+          </a:lstStyle>
+          <a:p>
+            <a:pPr lvl="0"/>
+            <a:r>
+              <a:rPr lang="en-GB" dirty="0"/>
+              <a:t>YOUR TEXT HERE</a:t>
+            </a:r>
+          </a:p>
+        </p:txBody>
+      </p:sp>
+      <p:sp>
+        <p:nvSpPr>
+          <p:cNvPr id="14" name="Content Placeholder 2">
+            <a:extLst>
+              <a:ext uri="{FF2B5EF4-FFF2-40B4-BE49-F238E27FC236}">
+                <a16:creationId xmlns:a16="http://schemas.microsoft.com/office/drawing/2014/main" id="{BA792C94-C089-C30B-7DAD-9A255E7E4B63}"/>
+              </a:ext>
+            </a:extLst>
+          </p:cNvPr>
+          <p:cNvSpPr>
+            <a:spLocks noGrp="1"/>
+          </p:cNvSpPr>
+          <p:nvPr>
+            <p:ph sz="quarter" idx="13" hasCustomPrompt="1"/>
+          </p:nvPr>
+        </p:nvSpPr>
+        <p:spPr>
+          <a:xfrm>
+            <a:off x="585974" y="1188720"/>
+            <a:ext cx="3003550" cy="703766"/>
+          </a:xfrm>
+          <a:prstGeom prst="rect">
+            <a:avLst/>
+          </a:prstGeom>
+          <a:solidFill>
+            <a:schemeClr val="tx1"/>
+          </a:solidFill>
+        </p:spPr>
+        <p:txBody>
+          <a:bodyPr anchor="b"/>
+          <a:lstStyle>
+            <a:lvl1pPr marL="0" indent="0" algn="ctr">
+              <a:buNone/>
+              <a:defRPr sz="4000">
+                <a:solidFill>
+                  <a:schemeClr val="bg1"/>
+                </a:solidFill>
+                <a:latin typeface="American Captain" pitchFamily="2" charset="77"/>
+              </a:defRPr>
+            </a:lvl1pPr>
+          </a:lstStyle>
+          <a:p>
+            <a:pPr lvl="0"/>
+            <a:r>
+              <a:rPr lang="en-NL" dirty="0"/>
+              <a:t>COLUMN TITLE</a:t>
+            </a:r>
+          </a:p>
+        </p:txBody>
+      </p:sp>
+      <p:sp>
+        <p:nvSpPr>
+          <p:cNvPr id="15" name="Text Placeholder 7">
+            <a:extLst>
+              <a:ext uri="{FF2B5EF4-FFF2-40B4-BE49-F238E27FC236}">
+                <a16:creationId xmlns:a16="http://schemas.microsoft.com/office/drawing/2014/main" id="{6F89948F-3BC6-AA2A-993E-A68DA4D29C7C}"/>
+              </a:ext>
+            </a:extLst>
+          </p:cNvPr>
+          <p:cNvSpPr>
+            <a:spLocks noGrp="1"/>
+          </p:cNvSpPr>
+          <p:nvPr>
+            <p:ph type="body" sz="quarter" idx="14" hasCustomPrompt="1"/>
+          </p:nvPr>
+        </p:nvSpPr>
+        <p:spPr>
+          <a:xfrm>
+            <a:off x="4079591" y="2006958"/>
+            <a:ext cx="3302105" cy="2914177"/>
+          </a:xfrm>
+          <a:prstGeom prst="rect">
+            <a:avLst/>
+          </a:prstGeom>
+        </p:spPr>
+        <p:txBody>
+          <a:bodyPr tIns="144000" anchor="t"/>
+          <a:lstStyle>
+            <a:lvl1pPr marL="0" indent="0" algn="ctr">
+              <a:buNone/>
+              <a:defRPr sz="4000">
+                <a:solidFill>
+                  <a:schemeClr val="tx1"/>
+                </a:solidFill>
+                <a:latin typeface="American Captain" pitchFamily="2" charset="77"/>
+              </a:defRPr>
+            </a:lvl1pPr>
+            <a:lvl2pPr marL="457200" indent="0">
+              <a:buNone/>
+              <a:defRPr>
+                <a:latin typeface="American Captain" pitchFamily="2" charset="77"/>
+              </a:defRPr>
+            </a:lvl2pPr>
+            <a:lvl3pPr marL="914400" indent="0">
+              <a:buNone/>
+              <a:defRPr>
+                <a:latin typeface="American Captain" pitchFamily="2" charset="77"/>
+              </a:defRPr>
+            </a:lvl3pPr>
+            <a:lvl4pPr marL="1371600" indent="0">
+              <a:buNone/>
+              <a:defRPr>
+                <a:latin typeface="American Captain" pitchFamily="2" charset="77"/>
+              </a:defRPr>
+            </a:lvl4pPr>
+            <a:lvl5pPr marL="1828800" indent="0">
+              <a:buNone/>
+              <a:defRPr>
+                <a:latin typeface="American Captain" pitchFamily="2" charset="77"/>
+              </a:defRPr>
+            </a:lvl5pPr>
+          </a:lstStyle>
+          <a:p>
+            <a:pPr lvl="0"/>
+            <a:r>
+              <a:rPr lang="en-GB" dirty="0"/>
+              <a:t>YOUR TEXT HERE</a:t>
+            </a:r>
+          </a:p>
+        </p:txBody>
+      </p:sp>
+      <p:sp>
+        <p:nvSpPr>
+          <p:cNvPr id="16" name="Content Placeholder 2">
+            <a:extLst>
+              <a:ext uri="{FF2B5EF4-FFF2-40B4-BE49-F238E27FC236}">
+                <a16:creationId xmlns:a16="http://schemas.microsoft.com/office/drawing/2014/main" id="{B6AC4793-B815-FF1A-4923-A0F398D7DBAD}"/>
+              </a:ext>
+            </a:extLst>
+          </p:cNvPr>
+          <p:cNvSpPr>
+            <a:spLocks noGrp="1"/>
+          </p:cNvSpPr>
+          <p:nvPr>
+            <p:ph sz="quarter" idx="15" hasCustomPrompt="1"/>
+          </p:nvPr>
+        </p:nvSpPr>
+        <p:spPr>
+          <a:xfrm>
+            <a:off x="4197264" y="1188720"/>
+            <a:ext cx="3003550" cy="703767"/>
+          </a:xfrm>
+          <a:prstGeom prst="rect">
+            <a:avLst/>
+          </a:prstGeom>
+          <a:solidFill>
+            <a:schemeClr val="tx1"/>
+          </a:solidFill>
+        </p:spPr>
+        <p:txBody>
+          <a:bodyPr anchor="b"/>
+          <a:lstStyle>
+            <a:lvl1pPr marL="0" indent="0" algn="ctr">
+              <a:buNone/>
+              <a:defRPr sz="4000">
+                <a:solidFill>
+                  <a:schemeClr val="bg1"/>
+                </a:solidFill>
+                <a:latin typeface="American Captain" pitchFamily="2" charset="77"/>
+              </a:defRPr>
+            </a:lvl1pPr>
+          </a:lstStyle>
+          <a:p>
+            <a:pPr lvl="0"/>
+            <a:r>
+              <a:rPr lang="en-NL" dirty="0"/>
+              <a:t>COLUMN TITLE</a:t>
+            </a:r>
+          </a:p>
+        </p:txBody>
+      </p:sp>
+      <p:cxnSp>
+        <p:nvCxnSpPr>
+          <p:cNvPr id="17" name="Straight Connector 16">
+            <a:extLst>
+              <a:ext uri="{FF2B5EF4-FFF2-40B4-BE49-F238E27FC236}">
+                <a16:creationId xmlns:a16="http://schemas.microsoft.com/office/drawing/2014/main" id="{09717273-E123-CB98-94F4-809BAB96BB7B}"/>
+              </a:ext>
+            </a:extLst>
+          </p:cNvPr>
+          <p:cNvCxnSpPr>
+            <a:cxnSpLocks/>
+          </p:cNvCxnSpPr>
+          <p:nvPr/>
+        </p:nvCxnSpPr>
+        <p:spPr>
+          <a:xfrm>
+            <a:off x="3893531" y="1188720"/>
+            <a:ext cx="0" cy="3732415"/>
+          </a:xfrm>
+          <a:prstGeom prst="line">
+            <a:avLst/>
+          </a:prstGeom>
+          <a:ln w="38100">
+            <a:solidFill>
+              <a:schemeClr val="bg1">
+                <a:lumMod val="50000"/>
+              </a:schemeClr>
+            </a:solidFill>
+          </a:ln>
+        </p:spPr>
+        <p:style>
+          <a:lnRef idx="1">
+            <a:schemeClr val="accent1"/>
+          </a:lnRef>
+          <a:fillRef idx="0">
+            <a:schemeClr val="accent1"/>
+          </a:fillRef>
+          <a:effectRef idx="0">
+            <a:schemeClr val="accent1"/>
+          </a:effectRef>
+          <a:fontRef idx="minor">
+            <a:schemeClr val="tx1"/>
+          </a:fontRef>
+        </p:style>
+      </p:cxnSp>
+    </p:spTree>
+    <p:extLst>
+      <p:ext uri="{BB962C8B-B14F-4D97-AF65-F5344CB8AC3E}">
+        <p14:creationId xmlns:p14="http://schemas.microsoft.com/office/powerpoint/2010/main" val="630380160"/>
+      </p:ext>
+    </p:extLst>
+  </p:cSld>
+  <p:clrMapOvr>
+    <a:masterClrMapping/>
+  </p:clrMapOvr>
+</p:sldLayout>
+</file>
+
+<file path=ppt/slideLayouts/slideLayout31.xml><?xml version="1.0" encoding="utf-8"?>
+<p:sldLayout xmlns:a="http://schemas.openxmlformats.org/drawingml/2006/main" xmlns:r="http://schemas.openxmlformats.org/officeDocument/2006/relationships" xmlns:p="http://schemas.openxmlformats.org/presentationml/2006/main" preserve="1">
   <p:cSld name="2_Purple BG Title Card">
     <p:bg>
       <p:bgPr>
@@ -15509,7 +16126,7 @@
 </p:sldLayout>
 </file>
 
-<file path=ppt/slideLayouts/slideLayout31.xml><?xml version="1.0" encoding="utf-8"?>
+<file path=ppt/slideLayouts/slideLayout32.xml><?xml version="1.0" encoding="utf-8"?>
 <p:sldLayout xmlns:a="http://schemas.openxmlformats.org/drawingml/2006/main" xmlns:r="http://schemas.openxmlformats.org/officeDocument/2006/relationships" xmlns:p="http://schemas.openxmlformats.org/presentationml/2006/main" preserve="1">
   <p:cSld name="Orange BG Text Card">
     <p:bg>
@@ -15618,7 +16235,7 @@
 </p:sldLayout>
 </file>
 
-<file path=ppt/slideLayouts/slideLayout32.xml><?xml version="1.0" encoding="utf-8"?>
+<file path=ppt/slideLayouts/slideLayout33.xml><?xml version="1.0" encoding="utf-8"?>
 <p:sldLayout xmlns:a="http://schemas.openxmlformats.org/drawingml/2006/main" xmlns:r="http://schemas.openxmlformats.org/officeDocument/2006/relationships" xmlns:p="http://schemas.openxmlformats.org/presentationml/2006/main" preserve="1">
   <p:cSld name="White BG Text Orange Card">
     <p:bg>
@@ -15727,7 +16344,7 @@
 </p:sldLayout>
 </file>
 
-<file path=ppt/slideLayouts/slideLayout33.xml><?xml version="1.0" encoding="utf-8"?>
+<file path=ppt/slideLayouts/slideLayout34.xml><?xml version="1.0" encoding="utf-8"?>
 <p:sldLayout xmlns:a="http://schemas.openxmlformats.org/drawingml/2006/main" xmlns:r="http://schemas.openxmlformats.org/officeDocument/2006/relationships" xmlns:p="http://schemas.openxmlformats.org/presentationml/2006/main" preserve="1">
   <p:cSld name="Green BG Text Card">
     <p:bg>
@@ -15838,7 +16455,7 @@
 </p:sldLayout>
 </file>
 
-<file path=ppt/slideLayouts/slideLayout34.xml><?xml version="1.0" encoding="utf-8"?>
+<file path=ppt/slideLayouts/slideLayout35.xml><?xml version="1.0" encoding="utf-8"?>
 <p:sldLayout xmlns:a="http://schemas.openxmlformats.org/drawingml/2006/main" xmlns:r="http://schemas.openxmlformats.org/officeDocument/2006/relationships" xmlns:p="http://schemas.openxmlformats.org/presentationml/2006/main">
   <p:cSld name="Red (Light) BG Text Card">
     <p:bg>
@@ -15963,7 +16580,7 @@
 </p:sldLayout>
 </file>
 
-<file path=ppt/slideLayouts/slideLayout35.xml><?xml version="1.0" encoding="utf-8"?>
+<file path=ppt/slideLayouts/slideLayout36.xml><?xml version="1.0" encoding="utf-8"?>
 <p:sldLayout xmlns:a="http://schemas.openxmlformats.org/drawingml/2006/main" xmlns:r="http://schemas.openxmlformats.org/officeDocument/2006/relationships" xmlns:p="http://schemas.openxmlformats.org/presentationml/2006/main" preserve="1">
   <p:cSld name="Red BG Text Card">
     <p:bg>
@@ -16072,7 +16689,7 @@
 </p:sldLayout>
 </file>
 
-<file path=ppt/slideLayouts/slideLayout36.xml><?xml version="1.0" encoding="utf-8"?>
+<file path=ppt/slideLayouts/slideLayout37.xml><?xml version="1.0" encoding="utf-8"?>
 <p:sldLayout xmlns:a="http://schemas.openxmlformats.org/drawingml/2006/main" xmlns:r="http://schemas.openxmlformats.org/officeDocument/2006/relationships" xmlns:p="http://schemas.openxmlformats.org/presentationml/2006/main" preserve="1">
   <p:cSld name="Purple BG Text Card">
     <p:bg>
@@ -16181,7 +16798,7 @@
 </p:sldLayout>
 </file>
 
-<file path=ppt/slideLayouts/slideLayout37.xml><?xml version="1.0" encoding="utf-8"?>
+<file path=ppt/slideLayouts/slideLayout38.xml><?xml version="1.0" encoding="utf-8"?>
 <p:sldLayout xmlns:a="http://schemas.openxmlformats.org/drawingml/2006/main" xmlns:r="http://schemas.openxmlformats.org/officeDocument/2006/relationships" xmlns:p="http://schemas.openxmlformats.org/presentationml/2006/main" preserve="1">
   <p:cSld name="Blue (Dark) BG Text Card">
     <p:bg>
@@ -16292,7 +16909,7 @@
 </p:sldLayout>
 </file>
 
-<file path=ppt/slideLayouts/slideLayout38.xml><?xml version="1.0" encoding="utf-8"?>
+<file path=ppt/slideLayouts/slideLayout39.xml><?xml version="1.0" encoding="utf-8"?>
 <p:sldLayout xmlns:a="http://schemas.openxmlformats.org/drawingml/2006/main" xmlns:r="http://schemas.openxmlformats.org/officeDocument/2006/relationships" xmlns:p="http://schemas.openxmlformats.org/presentationml/2006/main" preserve="1">
   <p:cSld name="White BG Text Blue Card">
     <p:bg>
@@ -16394,115 +17011,6 @@
     <p:extLst>
       <p:ext uri="{BB962C8B-B14F-4D97-AF65-F5344CB8AC3E}">
         <p14:creationId xmlns:p14="http://schemas.microsoft.com/office/powerpoint/2010/main" val="3988464158"/>
-      </p:ext>
-    </p:extLst>
-  </p:cSld>
-  <p:clrMapOvr>
-    <a:masterClrMapping/>
-  </p:clrMapOvr>
-</p:sldLayout>
-</file>
-
-<file path=ppt/slideLayouts/slideLayout39.xml><?xml version="1.0" encoding="utf-8"?>
-<p:sldLayout xmlns:a="http://schemas.openxmlformats.org/drawingml/2006/main" xmlns:r="http://schemas.openxmlformats.org/officeDocument/2006/relationships" xmlns:p="http://schemas.openxmlformats.org/presentationml/2006/main" preserve="1">
-  <p:cSld name="White BG Text Orange Card w/ Name Game">
-    <p:bg>
-      <p:bgPr>
-        <a:solidFill>
-          <a:schemeClr val="bg1"/>
-        </a:solidFill>
-        <a:effectLst/>
-      </p:bgPr>
-    </p:bg>
-    <p:spTree>
-      <p:nvGrpSpPr>
-        <p:cNvPr id="1" name=""/>
-        <p:cNvGrpSpPr/>
-        <p:nvPr/>
-      </p:nvGrpSpPr>
-      <p:grpSpPr>
-        <a:xfrm>
-          <a:off x="0" y="0"/>
-          <a:ext cx="0" cy="0"/>
-          <a:chOff x="0" y="0"/>
-          <a:chExt cx="0" cy="0"/>
-        </a:xfrm>
-      </p:grpSpPr>
-      <p:sp>
-        <p:nvSpPr>
-          <p:cNvPr id="8" name="Text Placeholder 7">
-            <a:extLst>
-              <a:ext uri="{FF2B5EF4-FFF2-40B4-BE49-F238E27FC236}">
-                <a16:creationId xmlns:a16="http://schemas.microsoft.com/office/drawing/2014/main" id="{23DAF603-FF9A-C57F-E685-C30FDC19F260}"/>
-              </a:ext>
-            </a:extLst>
-          </p:cNvPr>
-          <p:cNvSpPr>
-            <a:spLocks noGrp="1"/>
-          </p:cNvSpPr>
-          <p:nvPr>
-            <p:ph type="body" sz="quarter" idx="12" hasCustomPrompt="1"/>
-          </p:nvPr>
-        </p:nvSpPr>
-        <p:spPr>
-          <a:xfrm>
-            <a:off x="810418" y="1776412"/>
-            <a:ext cx="6154737" cy="1990725"/>
-          </a:xfrm>
-          <a:prstGeom prst="rect">
-            <a:avLst/>
-          </a:prstGeom>
-        </p:spPr>
-        <p:txBody>
-          <a:bodyPr tIns="144000" anchor="ctr"/>
-          <a:lstStyle>
-            <a:lvl1pPr marL="0" indent="0" algn="ctr">
-              <a:buNone/>
-              <a:defRPr sz="4350">
-                <a:solidFill>
-                  <a:schemeClr val="accent2"/>
-                </a:solidFill>
-                <a:latin typeface="Ubuntu" panose="020B0504030602030204" pitchFamily="34" charset="0"/>
-              </a:defRPr>
-            </a:lvl1pPr>
-            <a:lvl2pPr marL="457200" indent="0">
-              <a:buNone/>
-              <a:defRPr>
-                <a:latin typeface="American Captain" pitchFamily="2" charset="77"/>
-              </a:defRPr>
-            </a:lvl2pPr>
-            <a:lvl3pPr marL="914400" indent="0">
-              <a:buNone/>
-              <a:defRPr>
-                <a:latin typeface="American Captain" pitchFamily="2" charset="77"/>
-              </a:defRPr>
-            </a:lvl3pPr>
-            <a:lvl4pPr marL="1371600" indent="0">
-              <a:buNone/>
-              <a:defRPr>
-                <a:latin typeface="American Captain" pitchFamily="2" charset="77"/>
-              </a:defRPr>
-            </a:lvl4pPr>
-            <a:lvl5pPr marL="1828800" indent="0">
-              <a:buNone/>
-              <a:defRPr>
-                <a:latin typeface="American Captain" pitchFamily="2" charset="77"/>
-              </a:defRPr>
-            </a:lvl5pPr>
-          </a:lstStyle>
-          <a:p>
-            <a:pPr lvl="0"/>
-            <a:r>
-              <a:rPr lang="en-GB" dirty="0"/>
-              <a:t>Your text here</a:t>
-            </a:r>
-          </a:p>
-        </p:txBody>
-      </p:sp>
-    </p:spTree>
-    <p:extLst>
-      <p:ext uri="{BB962C8B-B14F-4D97-AF65-F5344CB8AC3E}">
-        <p14:creationId xmlns:p14="http://schemas.microsoft.com/office/powerpoint/2010/main" val="3456044255"/>
       </p:ext>
     </p:extLst>
   </p:cSld>
@@ -16721,6 +17229,115 @@
 
 <file path=ppt/slideLayouts/slideLayout40.xml><?xml version="1.0" encoding="utf-8"?>
 <p:sldLayout xmlns:a="http://schemas.openxmlformats.org/drawingml/2006/main" xmlns:r="http://schemas.openxmlformats.org/officeDocument/2006/relationships" xmlns:p="http://schemas.openxmlformats.org/presentationml/2006/main" preserve="1">
+  <p:cSld name="White BG Text Orange Card w/ Name Game">
+    <p:bg>
+      <p:bgPr>
+        <a:solidFill>
+          <a:schemeClr val="bg1"/>
+        </a:solidFill>
+        <a:effectLst/>
+      </p:bgPr>
+    </p:bg>
+    <p:spTree>
+      <p:nvGrpSpPr>
+        <p:cNvPr id="1" name=""/>
+        <p:cNvGrpSpPr/>
+        <p:nvPr/>
+      </p:nvGrpSpPr>
+      <p:grpSpPr>
+        <a:xfrm>
+          <a:off x="0" y="0"/>
+          <a:ext cx="0" cy="0"/>
+          <a:chOff x="0" y="0"/>
+          <a:chExt cx="0" cy="0"/>
+        </a:xfrm>
+      </p:grpSpPr>
+      <p:sp>
+        <p:nvSpPr>
+          <p:cNvPr id="8" name="Text Placeholder 7">
+            <a:extLst>
+              <a:ext uri="{FF2B5EF4-FFF2-40B4-BE49-F238E27FC236}">
+                <a16:creationId xmlns:a16="http://schemas.microsoft.com/office/drawing/2014/main" id="{23DAF603-FF9A-C57F-E685-C30FDC19F260}"/>
+              </a:ext>
+            </a:extLst>
+          </p:cNvPr>
+          <p:cNvSpPr>
+            <a:spLocks noGrp="1"/>
+          </p:cNvSpPr>
+          <p:nvPr>
+            <p:ph type="body" sz="quarter" idx="12" hasCustomPrompt="1"/>
+          </p:nvPr>
+        </p:nvSpPr>
+        <p:spPr>
+          <a:xfrm>
+            <a:off x="810418" y="1776412"/>
+            <a:ext cx="6154737" cy="1990725"/>
+          </a:xfrm>
+          <a:prstGeom prst="rect">
+            <a:avLst/>
+          </a:prstGeom>
+        </p:spPr>
+        <p:txBody>
+          <a:bodyPr tIns="144000" anchor="ctr"/>
+          <a:lstStyle>
+            <a:lvl1pPr marL="0" indent="0" algn="ctr">
+              <a:buNone/>
+              <a:defRPr sz="4350">
+                <a:solidFill>
+                  <a:schemeClr val="accent2"/>
+                </a:solidFill>
+                <a:latin typeface="Ubuntu" panose="020B0504030602030204" pitchFamily="34" charset="0"/>
+              </a:defRPr>
+            </a:lvl1pPr>
+            <a:lvl2pPr marL="457200" indent="0">
+              <a:buNone/>
+              <a:defRPr>
+                <a:latin typeface="American Captain" pitchFamily="2" charset="77"/>
+              </a:defRPr>
+            </a:lvl2pPr>
+            <a:lvl3pPr marL="914400" indent="0">
+              <a:buNone/>
+              <a:defRPr>
+                <a:latin typeface="American Captain" pitchFamily="2" charset="77"/>
+              </a:defRPr>
+            </a:lvl3pPr>
+            <a:lvl4pPr marL="1371600" indent="0">
+              <a:buNone/>
+              <a:defRPr>
+                <a:latin typeface="American Captain" pitchFamily="2" charset="77"/>
+              </a:defRPr>
+            </a:lvl4pPr>
+            <a:lvl5pPr marL="1828800" indent="0">
+              <a:buNone/>
+              <a:defRPr>
+                <a:latin typeface="American Captain" pitchFamily="2" charset="77"/>
+              </a:defRPr>
+            </a:lvl5pPr>
+          </a:lstStyle>
+          <a:p>
+            <a:pPr lvl="0"/>
+            <a:r>
+              <a:rPr lang="en-GB" dirty="0"/>
+              <a:t>Your text here</a:t>
+            </a:r>
+          </a:p>
+        </p:txBody>
+      </p:sp>
+    </p:spTree>
+    <p:extLst>
+      <p:ext uri="{BB962C8B-B14F-4D97-AF65-F5344CB8AC3E}">
+        <p14:creationId xmlns:p14="http://schemas.microsoft.com/office/powerpoint/2010/main" val="3456044255"/>
+      </p:ext>
+    </p:extLst>
+  </p:cSld>
+  <p:clrMapOvr>
+    <a:masterClrMapping/>
+  </p:clrMapOvr>
+</p:sldLayout>
+</file>
+
+<file path=ppt/slideLayouts/slideLayout41.xml><?xml version="1.0" encoding="utf-8"?>
+<p:sldLayout xmlns:a="http://schemas.openxmlformats.org/drawingml/2006/main" xmlns:r="http://schemas.openxmlformats.org/officeDocument/2006/relationships" xmlns:p="http://schemas.openxmlformats.org/presentationml/2006/main" preserve="1">
   <p:cSld name="White BG Text Blue Card w/ Name Game">
     <p:bg>
       <p:bgPr>
@@ -16830,7 +17447,7 @@
 </p:sldLayout>
 </file>
 
-<file path=ppt/slideLayouts/slideLayout41.xml><?xml version="1.0" encoding="utf-8"?>
+<file path=ppt/slideLayouts/slideLayout42.xml><?xml version="1.0" encoding="utf-8"?>
 <p:sldLayout xmlns:a="http://schemas.openxmlformats.org/drawingml/2006/main" xmlns:r="http://schemas.openxmlformats.org/officeDocument/2006/relationships" xmlns:p="http://schemas.openxmlformats.org/presentationml/2006/main" preserve="1">
   <p:cSld name="Red (light) BG Text Card w/ Name Game">
     <p:bg>
@@ -21523,7 +22140,7 @@
           <p:nvPr/>
         </p:nvPicPr>
         <p:blipFill rotWithShape="1">
-          <a:blip r:embed="rId24"/>
+          <a:blip r:embed="rId25"/>
           <a:srcRect l="9786" t="25471" r="19821" b="29132"/>
           <a:stretch/>
         </p:blipFill>
@@ -21555,19 +22172,20 @@
     <p:sldLayoutId id="2147483739" r:id="rId7"/>
     <p:sldLayoutId id="2147483740" r:id="rId8"/>
     <p:sldLayoutId id="2147483773" r:id="rId9"/>
-    <p:sldLayoutId id="2147483775" r:id="rId10"/>
-    <p:sldLayoutId id="2147483778" r:id="rId11"/>
-    <p:sldLayoutId id="2147483777" r:id="rId12"/>
-    <p:sldLayoutId id="2147483776" r:id="rId13"/>
-    <p:sldLayoutId id="2147483774" r:id="rId14"/>
-    <p:sldLayoutId id="2147483751" r:id="rId15"/>
-    <p:sldLayoutId id="2147483752" r:id="rId16"/>
-    <p:sldLayoutId id="2147483741" r:id="rId17"/>
-    <p:sldLayoutId id="2147483750" r:id="rId18"/>
-    <p:sldLayoutId id="2147483742" r:id="rId19"/>
-    <p:sldLayoutId id="2147483753" r:id="rId20"/>
-    <p:sldLayoutId id="2147483770" r:id="rId21"/>
-    <p:sldLayoutId id="2147483771" r:id="rId22"/>
+    <p:sldLayoutId id="2147483779" r:id="rId10"/>
+    <p:sldLayoutId id="2147483775" r:id="rId11"/>
+    <p:sldLayoutId id="2147483778" r:id="rId12"/>
+    <p:sldLayoutId id="2147483777" r:id="rId13"/>
+    <p:sldLayoutId id="2147483776" r:id="rId14"/>
+    <p:sldLayoutId id="2147483774" r:id="rId15"/>
+    <p:sldLayoutId id="2147483751" r:id="rId16"/>
+    <p:sldLayoutId id="2147483752" r:id="rId17"/>
+    <p:sldLayoutId id="2147483741" r:id="rId18"/>
+    <p:sldLayoutId id="2147483750" r:id="rId19"/>
+    <p:sldLayoutId id="2147483742" r:id="rId20"/>
+    <p:sldLayoutId id="2147483753" r:id="rId21"/>
+    <p:sldLayoutId id="2147483770" r:id="rId22"/>
+    <p:sldLayoutId id="2147483771" r:id="rId23"/>
   </p:sldLayoutIdLst>
   <p:hf sldNum="0" hdr="0" dt="0"/>
   <p:txStyles>
@@ -30334,7 +30952,11 @@
           </a:lstStyle>
           <a:p>
             <a:r>
-              <a:rPr lang="en-US" sz="3000" dirty="0"/>
+              <a:rPr lang="en-US" sz="3000" dirty="0">
+                <a:solidFill>
+                  <a:srgbClr val="DE8445"/>
+                </a:solidFill>
+              </a:rPr>
               <a:t># 7</a:t>
             </a:r>
           </a:p>
@@ -31088,7 +31710,11 @@
           </a:lstStyle>
           <a:p>
             <a:r>
-              <a:rPr lang="en-US" sz="3000" dirty="0"/>
+              <a:rPr lang="en-US" sz="3000" dirty="0">
+                <a:solidFill>
+                  <a:srgbClr val="DE8445"/>
+                </a:solidFill>
+              </a:rPr>
               <a:t># 13</a:t>
             </a:r>
           </a:p>
@@ -31778,7 +32404,11 @@
           </a:lstStyle>
           <a:p>
             <a:r>
-              <a:rPr lang="en-US" sz="3000" dirty="0"/>
+              <a:rPr lang="en-US" sz="3000" dirty="0">
+                <a:solidFill>
+                  <a:srgbClr val="DE8445"/>
+                </a:solidFill>
+              </a:rPr>
               <a:t># 12</a:t>
             </a:r>
           </a:p>
@@ -32468,7 +33098,11 @@
           </a:lstStyle>
           <a:p>
             <a:r>
-              <a:rPr lang="en-US" sz="3000" dirty="0"/>
+              <a:rPr lang="en-US" sz="3000" dirty="0">
+                <a:solidFill>
+                  <a:srgbClr val="DE8445"/>
+                </a:solidFill>
+              </a:rPr>
               <a:t># 18</a:t>
             </a:r>
           </a:p>
@@ -33158,7 +33792,11 @@
           </a:lstStyle>
           <a:p>
             <a:r>
-              <a:rPr lang="en-US" sz="3000" dirty="0"/>
+              <a:rPr lang="en-US" sz="3000" dirty="0">
+                <a:solidFill>
+                  <a:srgbClr val="DE8445"/>
+                </a:solidFill>
+              </a:rPr>
               <a:t># 17</a:t>
             </a:r>
           </a:p>

</xml_diff>